<commit_message>
[upgrade] trilateration bolümü latex de yazıldı
</commit_message>
<xml_diff>
--- a/Tez Çizimleri.pptx
+++ b/Tez Çizimleri.pptx
@@ -8,6 +8,7 @@
     <p:sldId id="256" r:id="rId2"/>
     <p:sldId id="257" r:id="rId3"/>
     <p:sldId id="258" r:id="rId4"/>
+    <p:sldId id="259" r:id="rId5"/>
   </p:sldIdLst>
   <p:sldSz cx="9144000" cy="6858000" type="screen4x3"/>
   <p:notesSz cx="6858000" cy="9144000"/>
@@ -291,7 +292,7 @@
             <a:fld id="{1D8BD707-D9CF-40AE-B4C6-C98DA3205C09}" type="datetimeFigureOut">
               <a:rPr lang="en-US" smtClean="0"/>
               <a:pPr/>
-              <a:t>8/9/2015</a:t>
+              <a:t>8/16/2015</a:t>
             </a:fld>
             <a:endParaRPr lang="en-US"/>
           </a:p>
@@ -458,7 +459,7 @@
             <a:fld id="{1D8BD707-D9CF-40AE-B4C6-C98DA3205C09}" type="datetimeFigureOut">
               <a:rPr lang="en-US" smtClean="0"/>
               <a:pPr/>
-              <a:t>8/9/2015</a:t>
+              <a:t>8/16/2015</a:t>
             </a:fld>
             <a:endParaRPr lang="en-US"/>
           </a:p>
@@ -635,7 +636,7 @@
             <a:fld id="{1D8BD707-D9CF-40AE-B4C6-C98DA3205C09}" type="datetimeFigureOut">
               <a:rPr lang="en-US" smtClean="0"/>
               <a:pPr/>
-              <a:t>8/9/2015</a:t>
+              <a:t>8/16/2015</a:t>
             </a:fld>
             <a:endParaRPr lang="en-US"/>
           </a:p>
@@ -802,7 +803,7 @@
             <a:fld id="{1D8BD707-D9CF-40AE-B4C6-C98DA3205C09}" type="datetimeFigureOut">
               <a:rPr lang="en-US" smtClean="0"/>
               <a:pPr/>
-              <a:t>8/9/2015</a:t>
+              <a:t>8/16/2015</a:t>
             </a:fld>
             <a:endParaRPr lang="en-US"/>
           </a:p>
@@ -1045,7 +1046,7 @@
             <a:fld id="{1D8BD707-D9CF-40AE-B4C6-C98DA3205C09}" type="datetimeFigureOut">
               <a:rPr lang="en-US" smtClean="0"/>
               <a:pPr/>
-              <a:t>8/9/2015</a:t>
+              <a:t>8/16/2015</a:t>
             </a:fld>
             <a:endParaRPr lang="en-US"/>
           </a:p>
@@ -1330,7 +1331,7 @@
             <a:fld id="{1D8BD707-D9CF-40AE-B4C6-C98DA3205C09}" type="datetimeFigureOut">
               <a:rPr lang="en-US" smtClean="0"/>
               <a:pPr/>
-              <a:t>8/9/2015</a:t>
+              <a:t>8/16/2015</a:t>
             </a:fld>
             <a:endParaRPr lang="en-US"/>
           </a:p>
@@ -1749,7 +1750,7 @@
             <a:fld id="{1D8BD707-D9CF-40AE-B4C6-C98DA3205C09}" type="datetimeFigureOut">
               <a:rPr lang="en-US" smtClean="0"/>
               <a:pPr/>
-              <a:t>8/9/2015</a:t>
+              <a:t>8/16/2015</a:t>
             </a:fld>
             <a:endParaRPr lang="en-US"/>
           </a:p>
@@ -1864,7 +1865,7 @@
             <a:fld id="{1D8BD707-D9CF-40AE-B4C6-C98DA3205C09}" type="datetimeFigureOut">
               <a:rPr lang="en-US" smtClean="0"/>
               <a:pPr/>
-              <a:t>8/9/2015</a:t>
+              <a:t>8/16/2015</a:t>
             </a:fld>
             <a:endParaRPr lang="en-US"/>
           </a:p>
@@ -1956,7 +1957,7 @@
             <a:fld id="{1D8BD707-D9CF-40AE-B4C6-C98DA3205C09}" type="datetimeFigureOut">
               <a:rPr lang="en-US" smtClean="0"/>
               <a:pPr/>
-              <a:t>8/9/2015</a:t>
+              <a:t>8/16/2015</a:t>
             </a:fld>
             <a:endParaRPr lang="en-US"/>
           </a:p>
@@ -2230,7 +2231,7 @@
             <a:fld id="{1D8BD707-D9CF-40AE-B4C6-C98DA3205C09}" type="datetimeFigureOut">
               <a:rPr lang="en-US" smtClean="0"/>
               <a:pPr/>
-              <a:t>8/9/2015</a:t>
+              <a:t>8/16/2015</a:t>
             </a:fld>
             <a:endParaRPr lang="en-US"/>
           </a:p>
@@ -2480,7 +2481,7 @@
             <a:fld id="{1D8BD707-D9CF-40AE-B4C6-C98DA3205C09}" type="datetimeFigureOut">
               <a:rPr lang="en-US" smtClean="0"/>
               <a:pPr/>
-              <a:t>8/9/2015</a:t>
+              <a:t>8/16/2015</a:t>
             </a:fld>
             <a:endParaRPr lang="en-US"/>
           </a:p>
@@ -2690,7 +2691,7 @@
             <a:fld id="{1D8BD707-D9CF-40AE-B4C6-C98DA3205C09}" type="datetimeFigureOut">
               <a:rPr lang="en-US" smtClean="0"/>
               <a:pPr/>
-              <a:t>8/9/2015</a:t>
+              <a:t>8/16/2015</a:t>
             </a:fld>
             <a:endParaRPr lang="en-US"/>
           </a:p>
@@ -6944,6 +6945,2267 @@
 </p:sld>
 </file>
 
+<file path=ppt/slides/slide4.xml><?xml version="1.0" encoding="utf-8"?>
+<p:sld xmlns:a="http://schemas.openxmlformats.org/drawingml/2006/main" xmlns:r="http://schemas.openxmlformats.org/officeDocument/2006/relationships" xmlns:p="http://schemas.openxmlformats.org/presentationml/2006/main">
+  <p:cSld>
+    <p:spTree>
+      <p:nvGrpSpPr>
+        <p:cNvPr id="1" name=""/>
+        <p:cNvGrpSpPr/>
+        <p:nvPr/>
+      </p:nvGrpSpPr>
+      <p:grpSpPr>
+        <a:xfrm>
+          <a:off x="0" y="0"/>
+          <a:ext cx="0" cy="0"/>
+          <a:chOff x="0" y="0"/>
+          <a:chExt cx="0" cy="0"/>
+        </a:xfrm>
+      </p:grpSpPr>
+      <p:grpSp>
+        <p:nvGrpSpPr>
+          <p:cNvPr id="109" name="Group 108"/>
+          <p:cNvGrpSpPr/>
+          <p:nvPr/>
+        </p:nvGrpSpPr>
+        <p:grpSpPr>
+          <a:xfrm>
+            <a:off x="304800" y="879896"/>
+            <a:ext cx="8229600" cy="3289716"/>
+            <a:chOff x="304800" y="879896"/>
+            <a:chExt cx="8229600" cy="3289716"/>
+          </a:xfrm>
+        </p:grpSpPr>
+        <p:grpSp>
+          <p:nvGrpSpPr>
+            <p:cNvPr id="4" name="Group 3"/>
+            <p:cNvGrpSpPr/>
+            <p:nvPr/>
+          </p:nvGrpSpPr>
+          <p:grpSpPr>
+            <a:xfrm>
+              <a:off x="304800" y="1676400"/>
+              <a:ext cx="3733799" cy="1887857"/>
+              <a:chOff x="620712" y="4465637"/>
+              <a:chExt cx="3860265" cy="1887857"/>
+            </a:xfrm>
+          </p:grpSpPr>
+          <p:grpSp>
+            <p:nvGrpSpPr>
+              <p:cNvPr id="5" name="Group 19"/>
+              <p:cNvGrpSpPr/>
+              <p:nvPr/>
+            </p:nvGrpSpPr>
+            <p:grpSpPr>
+              <a:xfrm>
+                <a:off x="620712" y="5303837"/>
+                <a:ext cx="355065" cy="363857"/>
+                <a:chOff x="1085617" y="4809368"/>
+                <a:chExt cx="355065" cy="363857"/>
+              </a:xfrm>
+            </p:grpSpPr>
+            <p:sp>
+              <p:nvSpPr>
+                <p:cNvPr id="37" name="CustomShape 2"/>
+                <p:cNvSpPr/>
+                <p:nvPr/>
+              </p:nvSpPr>
+              <p:spPr>
+                <a:xfrm>
+                  <a:off x="1085617" y="4809368"/>
+                  <a:ext cx="355065" cy="363857"/>
+                </a:xfrm>
+                <a:prstGeom prst="ellipse">
+                  <a:avLst/>
+                </a:prstGeom>
+                <a:solidFill>
+                  <a:srgbClr val="579D1C"/>
+                </a:solidFill>
+                <a:ln>
+                  <a:solidFill>
+                    <a:srgbClr val="3465A4"/>
+                  </a:solidFill>
+                </a:ln>
+              </p:spPr>
+            </p:sp>
+            <p:sp>
+              <p:nvSpPr>
+                <p:cNvPr id="38" name="TextBox 37"/>
+                <p:cNvSpPr txBox="1"/>
+                <p:nvPr/>
+              </p:nvSpPr>
+              <p:spPr>
+                <a:xfrm>
+                  <a:off x="1131252" y="4854257"/>
+                  <a:ext cx="269626" cy="276999"/>
+                </a:xfrm>
+                <a:prstGeom prst="rect">
+                  <a:avLst/>
+                </a:prstGeom>
+                <a:noFill/>
+              </p:spPr>
+              <p:txBody>
+                <a:bodyPr wrap="none" rtlCol="0">
+                  <a:spAutoFit/>
+                </a:bodyPr>
+                <a:lstStyle/>
+                <a:p>
+                  <a:r>
+                    <a:rPr lang="en-US" sz="1200" dirty="0" smtClean="0"/>
+                    <a:t>1</a:t>
+                  </a:r>
+                  <a:endParaRPr lang="tr-TR" sz="1200" dirty="0"/>
+                </a:p>
+              </p:txBody>
+            </p:sp>
+          </p:grpSp>
+          <p:grpSp>
+            <p:nvGrpSpPr>
+              <p:cNvPr id="6" name="Group 21"/>
+              <p:cNvGrpSpPr/>
+              <p:nvPr/>
+            </p:nvGrpSpPr>
+            <p:grpSpPr>
+              <a:xfrm>
+                <a:off x="1611312" y="5456237"/>
+                <a:ext cx="355065" cy="363857"/>
+                <a:chOff x="1085617" y="4809368"/>
+                <a:chExt cx="355065" cy="363857"/>
+              </a:xfrm>
+            </p:grpSpPr>
+            <p:sp>
+              <p:nvSpPr>
+                <p:cNvPr id="35" name="CustomShape 2"/>
+                <p:cNvSpPr/>
+                <p:nvPr/>
+              </p:nvSpPr>
+              <p:spPr>
+                <a:xfrm>
+                  <a:off x="1085617" y="4809368"/>
+                  <a:ext cx="355065" cy="363857"/>
+                </a:xfrm>
+                <a:prstGeom prst="ellipse">
+                  <a:avLst/>
+                </a:prstGeom>
+                <a:solidFill>
+                  <a:srgbClr val="579D1C"/>
+                </a:solidFill>
+                <a:ln>
+                  <a:solidFill>
+                    <a:srgbClr val="3465A4"/>
+                  </a:solidFill>
+                </a:ln>
+              </p:spPr>
+            </p:sp>
+            <p:sp>
+              <p:nvSpPr>
+                <p:cNvPr id="36" name="TextBox 35"/>
+                <p:cNvSpPr txBox="1"/>
+                <p:nvPr/>
+              </p:nvSpPr>
+              <p:spPr>
+                <a:xfrm>
+                  <a:off x="1131252" y="4854257"/>
+                  <a:ext cx="269626" cy="276999"/>
+                </a:xfrm>
+                <a:prstGeom prst="rect">
+                  <a:avLst/>
+                </a:prstGeom>
+                <a:noFill/>
+              </p:spPr>
+              <p:txBody>
+                <a:bodyPr wrap="none" rtlCol="0">
+                  <a:spAutoFit/>
+                </a:bodyPr>
+                <a:lstStyle/>
+                <a:p>
+                  <a:r>
+                    <a:rPr lang="en-US" sz="1200" dirty="0" smtClean="0"/>
+                    <a:t>2</a:t>
+                  </a:r>
+                  <a:endParaRPr lang="tr-TR" sz="1200" dirty="0"/>
+                </a:p>
+              </p:txBody>
+            </p:sp>
+          </p:grpSp>
+          <p:grpSp>
+            <p:nvGrpSpPr>
+              <p:cNvPr id="7" name="Group 24"/>
+              <p:cNvGrpSpPr/>
+              <p:nvPr/>
+            </p:nvGrpSpPr>
+            <p:grpSpPr>
+              <a:xfrm>
+                <a:off x="2297112" y="5989637"/>
+                <a:ext cx="355065" cy="363857"/>
+                <a:chOff x="1085617" y="4809368"/>
+                <a:chExt cx="355065" cy="363857"/>
+              </a:xfrm>
+            </p:grpSpPr>
+            <p:sp>
+              <p:nvSpPr>
+                <p:cNvPr id="33" name="CustomShape 2"/>
+                <p:cNvSpPr/>
+                <p:nvPr/>
+              </p:nvSpPr>
+              <p:spPr>
+                <a:xfrm>
+                  <a:off x="1085617" y="4809368"/>
+                  <a:ext cx="355065" cy="363857"/>
+                </a:xfrm>
+                <a:prstGeom prst="ellipse">
+                  <a:avLst/>
+                </a:prstGeom>
+                <a:solidFill>
+                  <a:srgbClr val="579D1C"/>
+                </a:solidFill>
+                <a:ln>
+                  <a:solidFill>
+                    <a:srgbClr val="3465A4"/>
+                  </a:solidFill>
+                </a:ln>
+              </p:spPr>
+            </p:sp>
+            <p:sp>
+              <p:nvSpPr>
+                <p:cNvPr id="34" name="TextBox 33"/>
+                <p:cNvSpPr txBox="1"/>
+                <p:nvPr/>
+              </p:nvSpPr>
+              <p:spPr>
+                <a:xfrm>
+                  <a:off x="1131252" y="4854257"/>
+                  <a:ext cx="269626" cy="276999"/>
+                </a:xfrm>
+                <a:prstGeom prst="rect">
+                  <a:avLst/>
+                </a:prstGeom>
+                <a:noFill/>
+              </p:spPr>
+              <p:txBody>
+                <a:bodyPr wrap="none" rtlCol="0">
+                  <a:spAutoFit/>
+                </a:bodyPr>
+                <a:lstStyle/>
+                <a:p>
+                  <a:r>
+                    <a:rPr lang="en-US" sz="1200" dirty="0" smtClean="0"/>
+                    <a:t>8</a:t>
+                  </a:r>
+                  <a:endParaRPr lang="tr-TR" sz="1200" dirty="0"/>
+                </a:p>
+              </p:txBody>
+            </p:sp>
+          </p:grpSp>
+          <p:grpSp>
+            <p:nvGrpSpPr>
+              <p:cNvPr id="8" name="Group 27"/>
+              <p:cNvGrpSpPr/>
+              <p:nvPr/>
+            </p:nvGrpSpPr>
+            <p:grpSpPr>
+              <a:xfrm>
+                <a:off x="3287712" y="5761037"/>
+                <a:ext cx="355065" cy="363857"/>
+                <a:chOff x="1085617" y="4809368"/>
+                <a:chExt cx="355065" cy="363857"/>
+              </a:xfrm>
+            </p:grpSpPr>
+            <p:sp>
+              <p:nvSpPr>
+                <p:cNvPr id="31" name="CustomShape 2"/>
+                <p:cNvSpPr/>
+                <p:nvPr/>
+              </p:nvSpPr>
+              <p:spPr>
+                <a:xfrm>
+                  <a:off x="1085617" y="4809368"/>
+                  <a:ext cx="355065" cy="363857"/>
+                </a:xfrm>
+                <a:prstGeom prst="ellipse">
+                  <a:avLst/>
+                </a:prstGeom>
+                <a:solidFill>
+                  <a:srgbClr val="579D1C"/>
+                </a:solidFill>
+                <a:ln>
+                  <a:solidFill>
+                    <a:srgbClr val="3465A4"/>
+                  </a:solidFill>
+                </a:ln>
+              </p:spPr>
+            </p:sp>
+            <p:sp>
+              <p:nvSpPr>
+                <p:cNvPr id="32" name="TextBox 31"/>
+                <p:cNvSpPr txBox="1"/>
+                <p:nvPr/>
+              </p:nvSpPr>
+              <p:spPr>
+                <a:xfrm>
+                  <a:off x="1131252" y="4854257"/>
+                  <a:ext cx="269626" cy="276999"/>
+                </a:xfrm>
+                <a:prstGeom prst="rect">
+                  <a:avLst/>
+                </a:prstGeom>
+                <a:noFill/>
+              </p:spPr>
+              <p:txBody>
+                <a:bodyPr wrap="none" rtlCol="0">
+                  <a:spAutoFit/>
+                </a:bodyPr>
+                <a:lstStyle/>
+                <a:p>
+                  <a:r>
+                    <a:rPr lang="en-US" sz="1200" dirty="0" smtClean="0"/>
+                    <a:t>7</a:t>
+                  </a:r>
+                  <a:endParaRPr lang="tr-TR" sz="1200" dirty="0"/>
+                </a:p>
+              </p:txBody>
+            </p:sp>
+          </p:grpSp>
+          <p:grpSp>
+            <p:nvGrpSpPr>
+              <p:cNvPr id="9" name="Group 30"/>
+              <p:cNvGrpSpPr/>
+              <p:nvPr/>
+            </p:nvGrpSpPr>
+            <p:grpSpPr>
+              <a:xfrm>
+                <a:off x="4125912" y="5151437"/>
+                <a:ext cx="355065" cy="363857"/>
+                <a:chOff x="1085617" y="4809368"/>
+                <a:chExt cx="355065" cy="363857"/>
+              </a:xfrm>
+            </p:grpSpPr>
+            <p:sp>
+              <p:nvSpPr>
+                <p:cNvPr id="29" name="CustomShape 2"/>
+                <p:cNvSpPr/>
+                <p:nvPr/>
+              </p:nvSpPr>
+              <p:spPr>
+                <a:xfrm>
+                  <a:off x="1085617" y="4809368"/>
+                  <a:ext cx="355065" cy="363857"/>
+                </a:xfrm>
+                <a:prstGeom prst="ellipse">
+                  <a:avLst/>
+                </a:prstGeom>
+                <a:solidFill>
+                  <a:srgbClr val="579D1C"/>
+                </a:solidFill>
+                <a:ln>
+                  <a:solidFill>
+                    <a:srgbClr val="3465A4"/>
+                  </a:solidFill>
+                </a:ln>
+              </p:spPr>
+            </p:sp>
+            <p:sp>
+              <p:nvSpPr>
+                <p:cNvPr id="30" name="TextBox 29"/>
+                <p:cNvSpPr txBox="1"/>
+                <p:nvPr/>
+              </p:nvSpPr>
+              <p:spPr>
+                <a:xfrm>
+                  <a:off x="1131252" y="4854257"/>
+                  <a:ext cx="269626" cy="276999"/>
+                </a:xfrm>
+                <a:prstGeom prst="rect">
+                  <a:avLst/>
+                </a:prstGeom>
+                <a:noFill/>
+              </p:spPr>
+              <p:txBody>
+                <a:bodyPr wrap="none" rtlCol="0">
+                  <a:spAutoFit/>
+                </a:bodyPr>
+                <a:lstStyle/>
+                <a:p>
+                  <a:r>
+                    <a:rPr lang="en-US" sz="1200" dirty="0" smtClean="0"/>
+                    <a:t>6</a:t>
+                  </a:r>
+                  <a:endParaRPr lang="tr-TR" sz="1200" dirty="0"/>
+                </a:p>
+              </p:txBody>
+            </p:sp>
+          </p:grpSp>
+          <p:grpSp>
+            <p:nvGrpSpPr>
+              <p:cNvPr id="10" name="Group 33"/>
+              <p:cNvGrpSpPr/>
+              <p:nvPr/>
+            </p:nvGrpSpPr>
+            <p:grpSpPr>
+              <a:xfrm>
+                <a:off x="3516312" y="4465637"/>
+                <a:ext cx="355065" cy="363857"/>
+                <a:chOff x="1085617" y="4809368"/>
+                <a:chExt cx="355065" cy="363857"/>
+              </a:xfrm>
+            </p:grpSpPr>
+            <p:sp>
+              <p:nvSpPr>
+                <p:cNvPr id="27" name="CustomShape 2"/>
+                <p:cNvSpPr/>
+                <p:nvPr/>
+              </p:nvSpPr>
+              <p:spPr>
+                <a:xfrm>
+                  <a:off x="1085617" y="4809368"/>
+                  <a:ext cx="355065" cy="363857"/>
+                </a:xfrm>
+                <a:prstGeom prst="ellipse">
+                  <a:avLst/>
+                </a:prstGeom>
+                <a:solidFill>
+                  <a:srgbClr val="579D1C"/>
+                </a:solidFill>
+                <a:ln>
+                  <a:solidFill>
+                    <a:srgbClr val="3465A4"/>
+                  </a:solidFill>
+                </a:ln>
+              </p:spPr>
+            </p:sp>
+            <p:sp>
+              <p:nvSpPr>
+                <p:cNvPr id="28" name="TextBox 27"/>
+                <p:cNvSpPr txBox="1"/>
+                <p:nvPr/>
+              </p:nvSpPr>
+              <p:spPr>
+                <a:xfrm>
+                  <a:off x="1131252" y="4854257"/>
+                  <a:ext cx="269626" cy="276999"/>
+                </a:xfrm>
+                <a:prstGeom prst="rect">
+                  <a:avLst/>
+                </a:prstGeom>
+                <a:noFill/>
+              </p:spPr>
+              <p:txBody>
+                <a:bodyPr wrap="none" rtlCol="0">
+                  <a:spAutoFit/>
+                </a:bodyPr>
+                <a:lstStyle/>
+                <a:p>
+                  <a:r>
+                    <a:rPr lang="en-US" sz="1200" dirty="0" smtClean="0"/>
+                    <a:t>5</a:t>
+                  </a:r>
+                  <a:endParaRPr lang="tr-TR" sz="1200" dirty="0"/>
+                </a:p>
+              </p:txBody>
+            </p:sp>
+          </p:grpSp>
+          <p:grpSp>
+            <p:nvGrpSpPr>
+              <p:cNvPr id="11" name="Group 36"/>
+              <p:cNvGrpSpPr/>
+              <p:nvPr/>
+            </p:nvGrpSpPr>
+            <p:grpSpPr>
+              <a:xfrm>
+                <a:off x="2601912" y="4922837"/>
+                <a:ext cx="355065" cy="363857"/>
+                <a:chOff x="1085617" y="4809368"/>
+                <a:chExt cx="355065" cy="363857"/>
+              </a:xfrm>
+            </p:grpSpPr>
+            <p:sp>
+              <p:nvSpPr>
+                <p:cNvPr id="25" name="CustomShape 2"/>
+                <p:cNvSpPr/>
+                <p:nvPr/>
+              </p:nvSpPr>
+              <p:spPr>
+                <a:xfrm>
+                  <a:off x="1085617" y="4809368"/>
+                  <a:ext cx="355065" cy="363857"/>
+                </a:xfrm>
+                <a:prstGeom prst="ellipse">
+                  <a:avLst/>
+                </a:prstGeom>
+                <a:solidFill>
+                  <a:srgbClr val="579D1C"/>
+                </a:solidFill>
+                <a:ln>
+                  <a:solidFill>
+                    <a:srgbClr val="3465A4"/>
+                  </a:solidFill>
+                </a:ln>
+              </p:spPr>
+            </p:sp>
+            <p:sp>
+              <p:nvSpPr>
+                <p:cNvPr id="26" name="TextBox 25"/>
+                <p:cNvSpPr txBox="1"/>
+                <p:nvPr/>
+              </p:nvSpPr>
+              <p:spPr>
+                <a:xfrm>
+                  <a:off x="1131252" y="4854257"/>
+                  <a:ext cx="269626" cy="276999"/>
+                </a:xfrm>
+                <a:prstGeom prst="rect">
+                  <a:avLst/>
+                </a:prstGeom>
+                <a:noFill/>
+              </p:spPr>
+              <p:txBody>
+                <a:bodyPr wrap="none" rtlCol="0">
+                  <a:spAutoFit/>
+                </a:bodyPr>
+                <a:lstStyle/>
+                <a:p>
+                  <a:r>
+                    <a:rPr lang="en-US" sz="1200" dirty="0" smtClean="0"/>
+                    <a:t>4</a:t>
+                  </a:r>
+                  <a:endParaRPr lang="tr-TR" sz="1200" dirty="0"/>
+                </a:p>
+              </p:txBody>
+            </p:sp>
+          </p:grpSp>
+          <p:grpSp>
+            <p:nvGrpSpPr>
+              <p:cNvPr id="12" name="Group 39"/>
+              <p:cNvGrpSpPr/>
+              <p:nvPr/>
+            </p:nvGrpSpPr>
+            <p:grpSpPr>
+              <a:xfrm>
+                <a:off x="1611312" y="4541837"/>
+                <a:ext cx="355065" cy="363857"/>
+                <a:chOff x="1085617" y="4809368"/>
+                <a:chExt cx="355065" cy="363857"/>
+              </a:xfrm>
+            </p:grpSpPr>
+            <p:sp>
+              <p:nvSpPr>
+                <p:cNvPr id="23" name="CustomShape 2"/>
+                <p:cNvSpPr/>
+                <p:nvPr/>
+              </p:nvSpPr>
+              <p:spPr>
+                <a:xfrm>
+                  <a:off x="1085617" y="4809368"/>
+                  <a:ext cx="355065" cy="363857"/>
+                </a:xfrm>
+                <a:prstGeom prst="ellipse">
+                  <a:avLst/>
+                </a:prstGeom>
+                <a:solidFill>
+                  <a:srgbClr val="579D1C"/>
+                </a:solidFill>
+                <a:ln>
+                  <a:solidFill>
+                    <a:srgbClr val="3465A4"/>
+                  </a:solidFill>
+                </a:ln>
+              </p:spPr>
+            </p:sp>
+            <p:sp>
+              <p:nvSpPr>
+                <p:cNvPr id="24" name="TextBox 23"/>
+                <p:cNvSpPr txBox="1"/>
+                <p:nvPr/>
+              </p:nvSpPr>
+              <p:spPr>
+                <a:xfrm>
+                  <a:off x="1131252" y="4854257"/>
+                  <a:ext cx="269626" cy="276999"/>
+                </a:xfrm>
+                <a:prstGeom prst="rect">
+                  <a:avLst/>
+                </a:prstGeom>
+                <a:noFill/>
+              </p:spPr>
+              <p:txBody>
+                <a:bodyPr wrap="none" rtlCol="0">
+                  <a:spAutoFit/>
+                </a:bodyPr>
+                <a:lstStyle/>
+                <a:p>
+                  <a:r>
+                    <a:rPr lang="en-US" sz="1200" dirty="0" smtClean="0"/>
+                    <a:t>3</a:t>
+                  </a:r>
+                  <a:endParaRPr lang="tr-TR" sz="1200" dirty="0"/>
+                </a:p>
+              </p:txBody>
+            </p:sp>
+          </p:grpSp>
+          <p:cxnSp>
+            <p:nvCxnSpPr>
+              <p:cNvPr id="13" name="Straight Connector 12"/>
+              <p:cNvCxnSpPr/>
+              <p:nvPr/>
+            </p:nvCxnSpPr>
+            <p:spPr>
+              <a:xfrm flipV="1">
+                <a:off x="925512" y="4861877"/>
+                <a:ext cx="762000" cy="518160"/>
+              </a:xfrm>
+              <a:prstGeom prst="line">
+                <a:avLst/>
+              </a:prstGeom>
+              <a:ln w="19050"/>
+            </p:spPr>
+            <p:style>
+              <a:lnRef idx="1">
+                <a:schemeClr val="accent1"/>
+              </a:lnRef>
+              <a:fillRef idx="0">
+                <a:schemeClr val="accent1"/>
+              </a:fillRef>
+              <a:effectRef idx="0">
+                <a:schemeClr val="accent1"/>
+              </a:effectRef>
+              <a:fontRef idx="minor">
+                <a:schemeClr val="tx1"/>
+              </a:fontRef>
+            </p:style>
+          </p:cxnSp>
+          <p:cxnSp>
+            <p:nvCxnSpPr>
+              <p:cNvPr id="14" name="Straight Connector 13"/>
+              <p:cNvCxnSpPr>
+                <a:stCxn id="37" idx="6"/>
+                <a:endCxn id="35" idx="2"/>
+              </p:cNvCxnSpPr>
+              <p:nvPr/>
+            </p:nvCxnSpPr>
+            <p:spPr>
+              <a:xfrm>
+                <a:off x="975777" y="5485766"/>
+                <a:ext cx="635535" cy="152400"/>
+              </a:xfrm>
+              <a:prstGeom prst="line">
+                <a:avLst/>
+              </a:prstGeom>
+              <a:ln w="19050"/>
+            </p:spPr>
+            <p:style>
+              <a:lnRef idx="1">
+                <a:schemeClr val="accent1"/>
+              </a:lnRef>
+              <a:fillRef idx="0">
+                <a:schemeClr val="accent1"/>
+              </a:fillRef>
+              <a:effectRef idx="0">
+                <a:schemeClr val="accent1"/>
+              </a:effectRef>
+              <a:fontRef idx="minor">
+                <a:schemeClr val="tx1"/>
+              </a:fontRef>
+            </p:style>
+          </p:cxnSp>
+          <p:cxnSp>
+            <p:nvCxnSpPr>
+              <p:cNvPr id="15" name="Straight Connector 14"/>
+              <p:cNvCxnSpPr>
+                <a:stCxn id="35" idx="6"/>
+              </p:cNvCxnSpPr>
+              <p:nvPr/>
+            </p:nvCxnSpPr>
+            <p:spPr>
+              <a:xfrm flipV="1">
+                <a:off x="1966377" y="5227637"/>
+                <a:ext cx="711735" cy="410529"/>
+              </a:xfrm>
+              <a:prstGeom prst="line">
+                <a:avLst/>
+              </a:prstGeom>
+              <a:ln w="19050"/>
+            </p:spPr>
+            <p:style>
+              <a:lnRef idx="1">
+                <a:schemeClr val="accent1"/>
+              </a:lnRef>
+              <a:fillRef idx="0">
+                <a:schemeClr val="accent1"/>
+              </a:fillRef>
+              <a:effectRef idx="0">
+                <a:schemeClr val="accent1"/>
+              </a:effectRef>
+              <a:fontRef idx="minor">
+                <a:schemeClr val="tx1"/>
+              </a:fontRef>
+            </p:style>
+          </p:cxnSp>
+          <p:cxnSp>
+            <p:nvCxnSpPr>
+              <p:cNvPr id="16" name="Straight Connector 15"/>
+              <p:cNvCxnSpPr>
+                <a:endCxn id="25" idx="2"/>
+              </p:cNvCxnSpPr>
+              <p:nvPr/>
+            </p:nvCxnSpPr>
+            <p:spPr>
+              <a:xfrm>
+                <a:off x="1916112" y="4831397"/>
+                <a:ext cx="685800" cy="273369"/>
+              </a:xfrm>
+              <a:prstGeom prst="line">
+                <a:avLst/>
+              </a:prstGeom>
+              <a:ln w="19050"/>
+            </p:spPr>
+            <p:style>
+              <a:lnRef idx="1">
+                <a:schemeClr val="accent1"/>
+              </a:lnRef>
+              <a:fillRef idx="0">
+                <a:schemeClr val="accent1"/>
+              </a:fillRef>
+              <a:effectRef idx="0">
+                <a:schemeClr val="accent1"/>
+              </a:effectRef>
+              <a:fontRef idx="minor">
+                <a:schemeClr val="tx1"/>
+              </a:fontRef>
+            </p:style>
+          </p:cxnSp>
+          <p:cxnSp>
+            <p:nvCxnSpPr>
+              <p:cNvPr id="17" name="Straight Connector 16"/>
+              <p:cNvCxnSpPr>
+                <a:endCxn id="27" idx="3"/>
+              </p:cNvCxnSpPr>
+              <p:nvPr/>
+            </p:nvCxnSpPr>
+            <p:spPr>
+              <a:xfrm flipV="1">
+                <a:off x="2906712" y="4776208"/>
+                <a:ext cx="661598" cy="222829"/>
+              </a:xfrm>
+              <a:prstGeom prst="line">
+                <a:avLst/>
+              </a:prstGeom>
+              <a:ln w="19050"/>
+            </p:spPr>
+            <p:style>
+              <a:lnRef idx="1">
+                <a:schemeClr val="accent1"/>
+              </a:lnRef>
+              <a:fillRef idx="0">
+                <a:schemeClr val="accent1"/>
+              </a:fillRef>
+              <a:effectRef idx="0">
+                <a:schemeClr val="accent1"/>
+              </a:effectRef>
+              <a:fontRef idx="minor">
+                <a:schemeClr val="tx1"/>
+              </a:fontRef>
+            </p:style>
+          </p:cxnSp>
+          <p:cxnSp>
+            <p:nvCxnSpPr>
+              <p:cNvPr id="18" name="Straight Connector 17"/>
+              <p:cNvCxnSpPr>
+                <a:stCxn id="31" idx="6"/>
+              </p:cNvCxnSpPr>
+              <p:nvPr/>
+            </p:nvCxnSpPr>
+            <p:spPr>
+              <a:xfrm flipV="1">
+                <a:off x="3642777" y="5456237"/>
+                <a:ext cx="559335" cy="486729"/>
+              </a:xfrm>
+              <a:prstGeom prst="line">
+                <a:avLst/>
+              </a:prstGeom>
+              <a:ln w="19050"/>
+            </p:spPr>
+            <p:style>
+              <a:lnRef idx="1">
+                <a:schemeClr val="accent1"/>
+              </a:lnRef>
+              <a:fillRef idx="0">
+                <a:schemeClr val="accent1"/>
+              </a:fillRef>
+              <a:effectRef idx="0">
+                <a:schemeClr val="accent1"/>
+              </a:effectRef>
+              <a:fontRef idx="minor">
+                <a:schemeClr val="tx1"/>
+              </a:fontRef>
+            </p:style>
+          </p:cxnSp>
+          <p:cxnSp>
+            <p:nvCxnSpPr>
+              <p:cNvPr id="19" name="Straight Connector 18"/>
+              <p:cNvCxnSpPr>
+                <a:stCxn id="33" idx="6"/>
+              </p:cNvCxnSpPr>
+              <p:nvPr/>
+            </p:nvCxnSpPr>
+            <p:spPr>
+              <a:xfrm flipV="1">
+                <a:off x="2652177" y="6065837"/>
+                <a:ext cx="711735" cy="105729"/>
+              </a:xfrm>
+              <a:prstGeom prst="line">
+                <a:avLst/>
+              </a:prstGeom>
+              <a:ln w="19050"/>
+            </p:spPr>
+            <p:style>
+              <a:lnRef idx="1">
+                <a:schemeClr val="accent1"/>
+              </a:lnRef>
+              <a:fillRef idx="0">
+                <a:schemeClr val="accent1"/>
+              </a:fillRef>
+              <a:effectRef idx="0">
+                <a:schemeClr val="accent1"/>
+              </a:effectRef>
+              <a:fontRef idx="minor">
+                <a:schemeClr val="tx1"/>
+              </a:fontRef>
+            </p:style>
+          </p:cxnSp>
+          <p:cxnSp>
+            <p:nvCxnSpPr>
+              <p:cNvPr id="20" name="Straight Connector 19"/>
+              <p:cNvCxnSpPr>
+                <a:stCxn id="35" idx="5"/>
+              </p:cNvCxnSpPr>
+              <p:nvPr/>
+            </p:nvCxnSpPr>
+            <p:spPr>
+              <a:xfrm rot="16200000" flipH="1">
+                <a:off x="1944801" y="5736385"/>
+                <a:ext cx="329509" cy="390353"/>
+              </a:xfrm>
+              <a:prstGeom prst="line">
+                <a:avLst/>
+              </a:prstGeom>
+              <a:ln w="19050"/>
+            </p:spPr>
+            <p:style>
+              <a:lnRef idx="1">
+                <a:schemeClr val="accent1"/>
+              </a:lnRef>
+              <a:fillRef idx="0">
+                <a:schemeClr val="accent1"/>
+              </a:fillRef>
+              <a:effectRef idx="0">
+                <a:schemeClr val="accent1"/>
+              </a:effectRef>
+              <a:fontRef idx="minor">
+                <a:schemeClr val="tx1"/>
+              </a:fontRef>
+            </p:style>
+          </p:cxnSp>
+          <p:cxnSp>
+            <p:nvCxnSpPr>
+              <p:cNvPr id="21" name="Straight Connector 20"/>
+              <p:cNvCxnSpPr>
+                <a:endCxn id="31" idx="1"/>
+              </p:cNvCxnSpPr>
+              <p:nvPr/>
+            </p:nvCxnSpPr>
+            <p:spPr>
+              <a:xfrm rot="16200000" flipH="1">
+                <a:off x="2822248" y="5296861"/>
+                <a:ext cx="525726" cy="509198"/>
+              </a:xfrm>
+              <a:prstGeom prst="line">
+                <a:avLst/>
+              </a:prstGeom>
+              <a:ln w="19050"/>
+            </p:spPr>
+            <p:style>
+              <a:lnRef idx="1">
+                <a:schemeClr val="accent1"/>
+              </a:lnRef>
+              <a:fillRef idx="0">
+                <a:schemeClr val="accent1"/>
+              </a:fillRef>
+              <a:effectRef idx="0">
+                <a:schemeClr val="accent1"/>
+              </a:effectRef>
+              <a:fontRef idx="minor">
+                <a:schemeClr val="tx1"/>
+              </a:fontRef>
+            </p:style>
+          </p:cxnSp>
+          <p:cxnSp>
+            <p:nvCxnSpPr>
+              <p:cNvPr id="22" name="Straight Connector 21"/>
+              <p:cNvCxnSpPr/>
+              <p:nvPr/>
+            </p:nvCxnSpPr>
+            <p:spPr>
+              <a:xfrm>
+                <a:off x="3744912" y="4831397"/>
+                <a:ext cx="457200" cy="396240"/>
+              </a:xfrm>
+              <a:prstGeom prst="line">
+                <a:avLst/>
+              </a:prstGeom>
+              <a:ln w="19050"/>
+            </p:spPr>
+            <p:style>
+              <a:lnRef idx="1">
+                <a:schemeClr val="accent1"/>
+              </a:lnRef>
+              <a:fillRef idx="0">
+                <a:schemeClr val="accent1"/>
+              </a:fillRef>
+              <a:effectRef idx="0">
+                <a:schemeClr val="accent1"/>
+              </a:effectRef>
+              <a:fontRef idx="minor">
+                <a:schemeClr val="tx1"/>
+              </a:fontRef>
+            </p:style>
+          </p:cxnSp>
+        </p:grpSp>
+        <p:grpSp>
+          <p:nvGrpSpPr>
+            <p:cNvPr id="40" name="Group 19"/>
+            <p:cNvGrpSpPr/>
+            <p:nvPr/>
+          </p:nvGrpSpPr>
+          <p:grpSpPr>
+            <a:xfrm rot="2921065">
+              <a:off x="5470188" y="1306339"/>
+              <a:ext cx="343433" cy="363857"/>
+              <a:chOff x="1085617" y="4809368"/>
+              <a:chExt cx="355065" cy="363857"/>
+            </a:xfrm>
+          </p:grpSpPr>
+          <p:sp>
+            <p:nvSpPr>
+              <p:cNvPr id="72" name="CustomShape 2"/>
+              <p:cNvSpPr/>
+              <p:nvPr/>
+            </p:nvSpPr>
+            <p:spPr>
+              <a:xfrm>
+                <a:off x="1085617" y="4809368"/>
+                <a:ext cx="355065" cy="363857"/>
+              </a:xfrm>
+              <a:prstGeom prst="ellipse">
+                <a:avLst/>
+              </a:prstGeom>
+              <a:solidFill>
+                <a:srgbClr val="579D1C"/>
+              </a:solidFill>
+              <a:ln>
+                <a:solidFill>
+                  <a:srgbClr val="3465A4"/>
+                </a:solidFill>
+              </a:ln>
+            </p:spPr>
+          </p:sp>
+          <p:sp>
+            <p:nvSpPr>
+              <p:cNvPr id="73" name="TextBox 72"/>
+              <p:cNvSpPr txBox="1"/>
+              <p:nvPr/>
+            </p:nvSpPr>
+            <p:spPr>
+              <a:xfrm rot="18678935">
+                <a:off x="1135668" y="4849566"/>
+                <a:ext cx="260793" cy="286381"/>
+              </a:xfrm>
+              <a:prstGeom prst="rect">
+                <a:avLst/>
+              </a:prstGeom>
+              <a:noFill/>
+            </p:spPr>
+            <p:txBody>
+              <a:bodyPr wrap="none" rtlCol="0">
+                <a:spAutoFit/>
+              </a:bodyPr>
+              <a:lstStyle/>
+              <a:p>
+                <a:r>
+                  <a:rPr lang="en-US" sz="1200" dirty="0" smtClean="0"/>
+                  <a:t>1</a:t>
+                </a:r>
+                <a:endParaRPr lang="tr-TR" sz="1200" dirty="0"/>
+              </a:p>
+            </p:txBody>
+          </p:sp>
+        </p:grpSp>
+        <p:grpSp>
+          <p:nvGrpSpPr>
+            <p:cNvPr id="41" name="Group 21"/>
+            <p:cNvGrpSpPr/>
+            <p:nvPr/>
+          </p:nvGrpSpPr>
+          <p:grpSpPr>
+            <a:xfrm rot="2921065">
+              <a:off x="5988298" y="2126604"/>
+              <a:ext cx="343433" cy="363857"/>
+              <a:chOff x="1085617" y="4809368"/>
+              <a:chExt cx="355065" cy="363857"/>
+            </a:xfrm>
+          </p:grpSpPr>
+          <p:sp>
+            <p:nvSpPr>
+              <p:cNvPr id="70" name="CustomShape 2"/>
+              <p:cNvSpPr/>
+              <p:nvPr/>
+            </p:nvSpPr>
+            <p:spPr>
+              <a:xfrm>
+                <a:off x="1085617" y="4809368"/>
+                <a:ext cx="355065" cy="363857"/>
+              </a:xfrm>
+              <a:prstGeom prst="ellipse">
+                <a:avLst/>
+              </a:prstGeom>
+              <a:solidFill>
+                <a:srgbClr val="579D1C"/>
+              </a:solidFill>
+              <a:ln>
+                <a:solidFill>
+                  <a:srgbClr val="3465A4"/>
+                </a:solidFill>
+              </a:ln>
+            </p:spPr>
+          </p:sp>
+          <p:sp>
+            <p:nvSpPr>
+              <p:cNvPr id="71" name="TextBox 70"/>
+              <p:cNvSpPr txBox="1"/>
+              <p:nvPr/>
+            </p:nvSpPr>
+            <p:spPr>
+              <a:xfrm rot="18678935">
+                <a:off x="1135668" y="4849566"/>
+                <a:ext cx="260793" cy="286381"/>
+              </a:xfrm>
+              <a:prstGeom prst="rect">
+                <a:avLst/>
+              </a:prstGeom>
+              <a:noFill/>
+            </p:spPr>
+            <p:txBody>
+              <a:bodyPr wrap="none" rtlCol="0">
+                <a:spAutoFit/>
+              </a:bodyPr>
+              <a:lstStyle/>
+              <a:p>
+                <a:r>
+                  <a:rPr lang="en-US" sz="1200" dirty="0" smtClean="0"/>
+                  <a:t>2</a:t>
+                </a:r>
+                <a:endParaRPr lang="tr-TR" sz="1200" dirty="0"/>
+              </a:p>
+            </p:txBody>
+          </p:sp>
+        </p:grpSp>
+        <p:grpSp>
+          <p:nvGrpSpPr>
+            <p:cNvPr id="42" name="Group 24"/>
+            <p:cNvGrpSpPr/>
+            <p:nvPr/>
+          </p:nvGrpSpPr>
+          <p:grpSpPr>
+            <a:xfrm rot="2921065">
+              <a:off x="6025605" y="2976976"/>
+              <a:ext cx="343433" cy="363857"/>
+              <a:chOff x="1085617" y="4809368"/>
+              <a:chExt cx="355065" cy="363857"/>
+            </a:xfrm>
+          </p:grpSpPr>
+          <p:sp>
+            <p:nvSpPr>
+              <p:cNvPr id="68" name="CustomShape 2"/>
+              <p:cNvSpPr/>
+              <p:nvPr/>
+            </p:nvSpPr>
+            <p:spPr>
+              <a:xfrm>
+                <a:off x="1085617" y="4809368"/>
+                <a:ext cx="355065" cy="363857"/>
+              </a:xfrm>
+              <a:prstGeom prst="ellipse">
+                <a:avLst/>
+              </a:prstGeom>
+              <a:solidFill>
+                <a:srgbClr val="579D1C"/>
+              </a:solidFill>
+              <a:ln>
+                <a:solidFill>
+                  <a:srgbClr val="3465A4"/>
+                </a:solidFill>
+              </a:ln>
+            </p:spPr>
+          </p:sp>
+          <p:sp>
+            <p:nvSpPr>
+              <p:cNvPr id="69" name="TextBox 68"/>
+              <p:cNvSpPr txBox="1"/>
+              <p:nvPr/>
+            </p:nvSpPr>
+            <p:spPr>
+              <a:xfrm rot="18678935">
+                <a:off x="1135668" y="4849566"/>
+                <a:ext cx="260793" cy="286381"/>
+              </a:xfrm>
+              <a:prstGeom prst="rect">
+                <a:avLst/>
+              </a:prstGeom>
+              <a:noFill/>
+            </p:spPr>
+            <p:txBody>
+              <a:bodyPr wrap="none" rtlCol="0">
+                <a:spAutoFit/>
+              </a:bodyPr>
+              <a:lstStyle/>
+              <a:p>
+                <a:r>
+                  <a:rPr lang="en-US" sz="1200" dirty="0" smtClean="0"/>
+                  <a:t>8</a:t>
+                </a:r>
+                <a:endParaRPr lang="tr-TR" sz="1200" dirty="0"/>
+              </a:p>
+            </p:txBody>
+          </p:sp>
+        </p:grpSp>
+        <p:grpSp>
+          <p:nvGrpSpPr>
+            <p:cNvPr id="43" name="Group 27"/>
+            <p:cNvGrpSpPr/>
+            <p:nvPr/>
+          </p:nvGrpSpPr>
+          <p:grpSpPr>
+            <a:xfrm rot="2921065">
+              <a:off x="6829877" y="3545703"/>
+              <a:ext cx="343433" cy="363857"/>
+              <a:chOff x="1085617" y="4809368"/>
+              <a:chExt cx="355065" cy="363857"/>
+            </a:xfrm>
+          </p:grpSpPr>
+          <p:sp>
+            <p:nvSpPr>
+              <p:cNvPr id="66" name="CustomShape 2"/>
+              <p:cNvSpPr/>
+              <p:nvPr/>
+            </p:nvSpPr>
+            <p:spPr>
+              <a:xfrm>
+                <a:off x="1085617" y="4809368"/>
+                <a:ext cx="355065" cy="363857"/>
+              </a:xfrm>
+              <a:prstGeom prst="ellipse">
+                <a:avLst/>
+              </a:prstGeom>
+              <a:solidFill>
+                <a:srgbClr val="579D1C"/>
+              </a:solidFill>
+              <a:ln>
+                <a:solidFill>
+                  <a:srgbClr val="3465A4"/>
+                </a:solidFill>
+              </a:ln>
+            </p:spPr>
+          </p:sp>
+          <p:sp>
+            <p:nvSpPr>
+              <p:cNvPr id="67" name="TextBox 66"/>
+              <p:cNvSpPr txBox="1"/>
+              <p:nvPr/>
+            </p:nvSpPr>
+            <p:spPr>
+              <a:xfrm rot="18678935">
+                <a:off x="1135668" y="4849566"/>
+                <a:ext cx="260793" cy="286381"/>
+              </a:xfrm>
+              <a:prstGeom prst="rect">
+                <a:avLst/>
+              </a:prstGeom>
+              <a:noFill/>
+            </p:spPr>
+            <p:txBody>
+              <a:bodyPr wrap="none" rtlCol="0">
+                <a:spAutoFit/>
+              </a:bodyPr>
+              <a:lstStyle/>
+              <a:p>
+                <a:r>
+                  <a:rPr lang="en-US" sz="1200" dirty="0" smtClean="0"/>
+                  <a:t>7</a:t>
+                </a:r>
+                <a:endParaRPr lang="tr-TR" sz="1200" dirty="0"/>
+              </a:p>
+            </p:txBody>
+          </p:sp>
+        </p:grpSp>
+        <p:grpSp>
+          <p:nvGrpSpPr>
+            <p:cNvPr id="44" name="Group 30"/>
+            <p:cNvGrpSpPr/>
+            <p:nvPr/>
+          </p:nvGrpSpPr>
+          <p:grpSpPr>
+            <a:xfrm rot="2921065">
+              <a:off x="7822994" y="3752175"/>
+              <a:ext cx="343433" cy="363857"/>
+              <a:chOff x="1085617" y="4809368"/>
+              <a:chExt cx="355065" cy="363857"/>
+            </a:xfrm>
+          </p:grpSpPr>
+          <p:sp>
+            <p:nvSpPr>
+              <p:cNvPr id="64" name="CustomShape 2"/>
+              <p:cNvSpPr/>
+              <p:nvPr/>
+            </p:nvSpPr>
+            <p:spPr>
+              <a:xfrm>
+                <a:off x="1085617" y="4809368"/>
+                <a:ext cx="355065" cy="363857"/>
+              </a:xfrm>
+              <a:prstGeom prst="ellipse">
+                <a:avLst/>
+              </a:prstGeom>
+              <a:solidFill>
+                <a:srgbClr val="579D1C"/>
+              </a:solidFill>
+              <a:ln>
+                <a:solidFill>
+                  <a:srgbClr val="3465A4"/>
+                </a:solidFill>
+              </a:ln>
+            </p:spPr>
+          </p:sp>
+          <p:sp>
+            <p:nvSpPr>
+              <p:cNvPr id="65" name="TextBox 64"/>
+              <p:cNvSpPr txBox="1"/>
+              <p:nvPr/>
+            </p:nvSpPr>
+            <p:spPr>
+              <a:xfrm rot="18678935">
+                <a:off x="1135668" y="4849566"/>
+                <a:ext cx="260793" cy="286381"/>
+              </a:xfrm>
+              <a:prstGeom prst="rect">
+                <a:avLst/>
+              </a:prstGeom>
+              <a:noFill/>
+            </p:spPr>
+            <p:txBody>
+              <a:bodyPr wrap="none" rtlCol="0">
+                <a:spAutoFit/>
+              </a:bodyPr>
+              <a:lstStyle/>
+              <a:p>
+                <a:r>
+                  <a:rPr lang="en-US" sz="1200" dirty="0" smtClean="0"/>
+                  <a:t>6</a:t>
+                </a:r>
+                <a:endParaRPr lang="tr-TR" sz="1200" dirty="0"/>
+              </a:p>
+            </p:txBody>
+          </p:sp>
+        </p:grpSp>
+        <p:grpSp>
+          <p:nvGrpSpPr>
+            <p:cNvPr id="45" name="Group 33"/>
+            <p:cNvGrpSpPr/>
+            <p:nvPr/>
+          </p:nvGrpSpPr>
+          <p:grpSpPr>
+            <a:xfrm rot="2921065">
+              <a:off x="7948811" y="2856545"/>
+              <a:ext cx="343433" cy="363857"/>
+              <a:chOff x="1085617" y="4809368"/>
+              <a:chExt cx="355065" cy="363857"/>
+            </a:xfrm>
+          </p:grpSpPr>
+          <p:sp>
+            <p:nvSpPr>
+              <p:cNvPr id="62" name="CustomShape 2"/>
+              <p:cNvSpPr/>
+              <p:nvPr/>
+            </p:nvSpPr>
+            <p:spPr>
+              <a:xfrm>
+                <a:off x="1085617" y="4809368"/>
+                <a:ext cx="355065" cy="363857"/>
+              </a:xfrm>
+              <a:prstGeom prst="ellipse">
+                <a:avLst/>
+              </a:prstGeom>
+              <a:solidFill>
+                <a:srgbClr val="579D1C"/>
+              </a:solidFill>
+              <a:ln>
+                <a:solidFill>
+                  <a:srgbClr val="3465A4"/>
+                </a:solidFill>
+              </a:ln>
+            </p:spPr>
+          </p:sp>
+          <p:sp>
+            <p:nvSpPr>
+              <p:cNvPr id="63" name="TextBox 62"/>
+              <p:cNvSpPr txBox="1"/>
+              <p:nvPr/>
+            </p:nvSpPr>
+            <p:spPr>
+              <a:xfrm rot="18678935">
+                <a:off x="1135668" y="4849566"/>
+                <a:ext cx="260793" cy="286381"/>
+              </a:xfrm>
+              <a:prstGeom prst="rect">
+                <a:avLst/>
+              </a:prstGeom>
+              <a:noFill/>
+            </p:spPr>
+            <p:txBody>
+              <a:bodyPr wrap="none" rtlCol="0">
+                <a:spAutoFit/>
+              </a:bodyPr>
+              <a:lstStyle/>
+              <a:p>
+                <a:r>
+                  <a:rPr lang="en-US" sz="1200" dirty="0" smtClean="0"/>
+                  <a:t>5</a:t>
+                </a:r>
+                <a:endParaRPr lang="tr-TR" sz="1200" dirty="0"/>
+              </a:p>
+            </p:txBody>
+          </p:sp>
+        </p:grpSp>
+        <p:grpSp>
+          <p:nvGrpSpPr>
+            <p:cNvPr id="46" name="Group 36"/>
+            <p:cNvGrpSpPr/>
+            <p:nvPr/>
+          </p:nvGrpSpPr>
+          <p:grpSpPr>
+            <a:xfrm rot="2921065">
+              <a:off x="7021500" y="2494099"/>
+              <a:ext cx="343433" cy="363857"/>
+              <a:chOff x="1085617" y="4809368"/>
+              <a:chExt cx="355065" cy="363857"/>
+            </a:xfrm>
+          </p:grpSpPr>
+          <p:sp>
+            <p:nvSpPr>
+              <p:cNvPr id="60" name="CustomShape 2"/>
+              <p:cNvSpPr/>
+              <p:nvPr/>
+            </p:nvSpPr>
+            <p:spPr>
+              <a:xfrm>
+                <a:off x="1085617" y="4809368"/>
+                <a:ext cx="355065" cy="363857"/>
+              </a:xfrm>
+              <a:prstGeom prst="ellipse">
+                <a:avLst/>
+              </a:prstGeom>
+              <a:solidFill>
+                <a:srgbClr val="579D1C"/>
+              </a:solidFill>
+              <a:ln>
+                <a:solidFill>
+                  <a:srgbClr val="3465A4"/>
+                </a:solidFill>
+              </a:ln>
+            </p:spPr>
+          </p:sp>
+          <p:sp>
+            <p:nvSpPr>
+              <p:cNvPr id="61" name="TextBox 60"/>
+              <p:cNvSpPr txBox="1"/>
+              <p:nvPr/>
+            </p:nvSpPr>
+            <p:spPr>
+              <a:xfrm rot="18678935">
+                <a:off x="1135668" y="4849566"/>
+                <a:ext cx="260793" cy="286381"/>
+              </a:xfrm>
+              <a:prstGeom prst="rect">
+                <a:avLst/>
+              </a:prstGeom>
+              <a:noFill/>
+            </p:spPr>
+            <p:txBody>
+              <a:bodyPr wrap="none" rtlCol="0">
+                <a:spAutoFit/>
+              </a:bodyPr>
+              <a:lstStyle/>
+              <a:p>
+                <a:r>
+                  <a:rPr lang="en-US" sz="1200" dirty="0" smtClean="0"/>
+                  <a:t>4</a:t>
+                </a:r>
+                <a:endParaRPr lang="tr-TR" sz="1200" dirty="0"/>
+              </a:p>
+            </p:txBody>
+          </p:sp>
+        </p:grpSp>
+        <p:sp>
+          <p:nvSpPr>
+            <p:cNvPr id="58" name="CustomShape 2"/>
+            <p:cNvSpPr/>
+            <p:nvPr/>
+          </p:nvSpPr>
+          <p:spPr>
+            <a:xfrm rot="2921065">
+              <a:off x="6675089" y="1522911"/>
+              <a:ext cx="343433" cy="363857"/>
+            </a:xfrm>
+            <a:prstGeom prst="ellipse">
+              <a:avLst/>
+            </a:prstGeom>
+            <a:noFill/>
+            <a:ln w="15875">
+              <a:solidFill>
+                <a:srgbClr val="3465A4"/>
+              </a:solidFill>
+              <a:prstDash val="dash"/>
+            </a:ln>
+          </p:spPr>
+        </p:sp>
+        <p:sp>
+          <p:nvSpPr>
+            <p:cNvPr id="59" name="TextBox 58"/>
+            <p:cNvSpPr txBox="1"/>
+            <p:nvPr/>
+          </p:nvSpPr>
+          <p:spPr>
+            <a:xfrm>
+              <a:off x="6717174" y="1569422"/>
+              <a:ext cx="260793" cy="276999"/>
+            </a:xfrm>
+            <a:prstGeom prst="rect">
+              <a:avLst/>
+            </a:prstGeom>
+            <a:noFill/>
+          </p:spPr>
+          <p:txBody>
+            <a:bodyPr wrap="none" rtlCol="0">
+              <a:spAutoFit/>
+            </a:bodyPr>
+            <a:lstStyle/>
+            <a:p>
+              <a:r>
+                <a:rPr lang="en-US" sz="1200" dirty="0" smtClean="0"/>
+                <a:t>3</a:t>
+              </a:r>
+              <a:endParaRPr lang="tr-TR" sz="1200" dirty="0"/>
+            </a:p>
+          </p:txBody>
+        </p:sp>
+        <p:cxnSp>
+          <p:nvCxnSpPr>
+            <p:cNvPr id="48" name="Straight Connector 47"/>
+            <p:cNvCxnSpPr/>
+            <p:nvPr/>
+          </p:nvCxnSpPr>
+          <p:spPr>
+            <a:xfrm rot="2921065" flipV="1">
+              <a:off x="5871957" y="1357584"/>
+              <a:ext cx="737036" cy="518160"/>
+            </a:xfrm>
+            <a:prstGeom prst="line">
+              <a:avLst/>
+            </a:prstGeom>
+            <a:ln w="19050">
+              <a:prstDash val="dash"/>
+            </a:ln>
+          </p:spPr>
+          <p:style>
+            <a:lnRef idx="1">
+              <a:schemeClr val="accent1"/>
+            </a:lnRef>
+            <a:fillRef idx="0">
+              <a:schemeClr val="accent1"/>
+            </a:fillRef>
+            <a:effectRef idx="0">
+              <a:schemeClr val="accent1"/>
+            </a:effectRef>
+            <a:fontRef idx="minor">
+              <a:schemeClr val="tx1"/>
+            </a:fontRef>
+          </p:style>
+        </p:cxnSp>
+        <p:cxnSp>
+          <p:nvCxnSpPr>
+            <p:cNvPr id="49" name="Straight Connector 48"/>
+            <p:cNvCxnSpPr>
+              <a:stCxn id="72" idx="6"/>
+              <a:endCxn id="70" idx="2"/>
+            </p:cNvCxnSpPr>
+            <p:nvPr/>
+          </p:nvCxnSpPr>
+          <p:spPr>
+            <a:xfrm rot="2921065">
+              <a:off x="5593602" y="1822200"/>
+              <a:ext cx="614714" cy="152400"/>
+            </a:xfrm>
+            <a:prstGeom prst="line">
+              <a:avLst/>
+            </a:prstGeom>
+            <a:ln w="19050"/>
+          </p:spPr>
+          <p:style>
+            <a:lnRef idx="1">
+              <a:schemeClr val="accent1"/>
+            </a:lnRef>
+            <a:fillRef idx="0">
+              <a:schemeClr val="accent1"/>
+            </a:fillRef>
+            <a:effectRef idx="0">
+              <a:schemeClr val="accent1"/>
+            </a:effectRef>
+            <a:fontRef idx="minor">
+              <a:schemeClr val="tx1"/>
+            </a:fontRef>
+          </p:style>
+        </p:cxnSp>
+        <p:cxnSp>
+          <p:nvCxnSpPr>
+            <p:cNvPr id="50" name="Straight Connector 49"/>
+            <p:cNvCxnSpPr>
+              <a:stCxn id="70" idx="6"/>
+            </p:cNvCxnSpPr>
+            <p:nvPr/>
+          </p:nvCxnSpPr>
+          <p:spPr>
+            <a:xfrm rot="2921065" flipV="1">
+              <a:off x="6310593" y="2355255"/>
+              <a:ext cx="688418" cy="410529"/>
+            </a:xfrm>
+            <a:prstGeom prst="line">
+              <a:avLst/>
+            </a:prstGeom>
+            <a:ln w="19050"/>
+          </p:spPr>
+          <p:style>
+            <a:lnRef idx="1">
+              <a:schemeClr val="accent1"/>
+            </a:lnRef>
+            <a:fillRef idx="0">
+              <a:schemeClr val="accent1"/>
+            </a:fillRef>
+            <a:effectRef idx="0">
+              <a:schemeClr val="accent1"/>
+            </a:effectRef>
+            <a:fontRef idx="minor">
+              <a:schemeClr val="tx1"/>
+            </a:fontRef>
+          </p:style>
+        </p:cxnSp>
+        <p:cxnSp>
+          <p:nvCxnSpPr>
+            <p:cNvPr id="51" name="Straight Connector 50"/>
+            <p:cNvCxnSpPr>
+              <a:endCxn id="60" idx="2"/>
+            </p:cNvCxnSpPr>
+            <p:nvPr/>
+          </p:nvCxnSpPr>
+          <p:spPr>
+            <a:xfrm rot="2921065">
+              <a:off x="6631876" y="2071021"/>
+              <a:ext cx="663333" cy="273369"/>
+            </a:xfrm>
+            <a:prstGeom prst="line">
+              <a:avLst/>
+            </a:prstGeom>
+            <a:ln w="19050">
+              <a:prstDash val="dash"/>
+            </a:ln>
+          </p:spPr>
+          <p:style>
+            <a:lnRef idx="1">
+              <a:schemeClr val="accent1"/>
+            </a:lnRef>
+            <a:fillRef idx="0">
+              <a:schemeClr val="accent1"/>
+            </a:fillRef>
+            <a:effectRef idx="0">
+              <a:schemeClr val="accent1"/>
+            </a:effectRef>
+            <a:fontRef idx="minor">
+              <a:schemeClr val="tx1"/>
+            </a:fontRef>
+          </p:style>
+        </p:cxnSp>
+        <p:cxnSp>
+          <p:nvCxnSpPr>
+            <p:cNvPr id="52" name="Straight Connector 51"/>
+            <p:cNvCxnSpPr>
+              <a:endCxn id="62" idx="3"/>
+            </p:cNvCxnSpPr>
+            <p:nvPr/>
+          </p:nvCxnSpPr>
+          <p:spPr>
+            <a:xfrm rot="2921065" flipV="1">
+              <a:off x="7328859" y="2754029"/>
+              <a:ext cx="639923" cy="222829"/>
+            </a:xfrm>
+            <a:prstGeom prst="line">
+              <a:avLst/>
+            </a:prstGeom>
+            <a:ln w="19050"/>
+          </p:spPr>
+          <p:style>
+            <a:lnRef idx="1">
+              <a:schemeClr val="accent1"/>
+            </a:lnRef>
+            <a:fillRef idx="0">
+              <a:schemeClr val="accent1"/>
+            </a:fillRef>
+            <a:effectRef idx="0">
+              <a:schemeClr val="accent1"/>
+            </a:effectRef>
+            <a:fontRef idx="minor">
+              <a:schemeClr val="tx1"/>
+            </a:fontRef>
+          </p:style>
+        </p:cxnSp>
+        <p:cxnSp>
+          <p:nvCxnSpPr>
+            <p:cNvPr id="53" name="Straight Connector 52"/>
+            <p:cNvCxnSpPr>
+              <a:stCxn id="66" idx="6"/>
+            </p:cNvCxnSpPr>
+            <p:nvPr/>
+          </p:nvCxnSpPr>
+          <p:spPr>
+            <a:xfrm rot="2921065" flipV="1">
+              <a:off x="7205833" y="3655742"/>
+              <a:ext cx="541011" cy="486729"/>
+            </a:xfrm>
+            <a:prstGeom prst="line">
+              <a:avLst/>
+            </a:prstGeom>
+            <a:ln w="19050"/>
+          </p:spPr>
+          <p:style>
+            <a:lnRef idx="1">
+              <a:schemeClr val="accent1"/>
+            </a:lnRef>
+            <a:fillRef idx="0">
+              <a:schemeClr val="accent1"/>
+            </a:fillRef>
+            <a:effectRef idx="0">
+              <a:schemeClr val="accent1"/>
+            </a:effectRef>
+            <a:fontRef idx="minor">
+              <a:schemeClr val="tx1"/>
+            </a:fontRef>
+          </p:style>
+        </p:cxnSp>
+        <p:cxnSp>
+          <p:nvCxnSpPr>
+            <p:cNvPr id="54" name="Straight Connector 53"/>
+            <p:cNvCxnSpPr>
+              <a:stCxn id="68" idx="6"/>
+            </p:cNvCxnSpPr>
+            <p:nvPr/>
+          </p:nvCxnSpPr>
+          <p:spPr>
+            <a:xfrm rot="2921065" flipV="1">
+              <a:off x="6233435" y="3458643"/>
+              <a:ext cx="688418" cy="105729"/>
+            </a:xfrm>
+            <a:prstGeom prst="line">
+              <a:avLst/>
+            </a:prstGeom>
+            <a:ln w="19050"/>
+          </p:spPr>
+          <p:style>
+            <a:lnRef idx="1">
+              <a:schemeClr val="accent1"/>
+            </a:lnRef>
+            <a:fillRef idx="0">
+              <a:schemeClr val="accent1"/>
+            </a:fillRef>
+            <a:effectRef idx="0">
+              <a:schemeClr val="accent1"/>
+            </a:effectRef>
+            <a:fontRef idx="minor">
+              <a:schemeClr val="tx1"/>
+            </a:fontRef>
+          </p:style>
+        </p:cxnSp>
+        <p:cxnSp>
+          <p:nvCxnSpPr>
+            <p:cNvPr id="55" name="Straight Connector 54"/>
+            <p:cNvCxnSpPr>
+              <a:stCxn id="70" idx="5"/>
+            </p:cNvCxnSpPr>
+            <p:nvPr/>
+          </p:nvCxnSpPr>
+          <p:spPr>
+            <a:xfrm rot="19121065" flipH="1">
+              <a:off x="5979693" y="2546441"/>
+              <a:ext cx="329509" cy="377565"/>
+            </a:xfrm>
+            <a:prstGeom prst="line">
+              <a:avLst/>
+            </a:prstGeom>
+            <a:ln w="19050"/>
+          </p:spPr>
+          <p:style>
+            <a:lnRef idx="1">
+              <a:schemeClr val="accent1"/>
+            </a:lnRef>
+            <a:fillRef idx="0">
+              <a:schemeClr val="accent1"/>
+            </a:fillRef>
+            <a:effectRef idx="0">
+              <a:schemeClr val="accent1"/>
+            </a:effectRef>
+            <a:fontRef idx="minor">
+              <a:schemeClr val="tx1"/>
+            </a:fontRef>
+          </p:style>
+        </p:cxnSp>
+        <p:cxnSp>
+          <p:nvCxnSpPr>
+            <p:cNvPr id="56" name="Straight Connector 55"/>
+            <p:cNvCxnSpPr>
+              <a:endCxn id="66" idx="1"/>
+            </p:cNvCxnSpPr>
+            <p:nvPr/>
+          </p:nvCxnSpPr>
+          <p:spPr>
+            <a:xfrm rot="19121065" flipH="1">
+              <a:off x="6790040" y="2946740"/>
+              <a:ext cx="525726" cy="492516"/>
+            </a:xfrm>
+            <a:prstGeom prst="line">
+              <a:avLst/>
+            </a:prstGeom>
+            <a:ln w="19050"/>
+          </p:spPr>
+          <p:style>
+            <a:lnRef idx="1">
+              <a:schemeClr val="accent1"/>
+            </a:lnRef>
+            <a:fillRef idx="0">
+              <a:schemeClr val="accent1"/>
+            </a:fillRef>
+            <a:effectRef idx="0">
+              <a:schemeClr val="accent1"/>
+            </a:effectRef>
+            <a:fontRef idx="minor">
+              <a:schemeClr val="tx1"/>
+            </a:fontRef>
+          </p:style>
+        </p:cxnSp>
+        <p:cxnSp>
+          <p:nvCxnSpPr>
+            <p:cNvPr id="57" name="Straight Connector 56"/>
+            <p:cNvCxnSpPr/>
+            <p:nvPr/>
+          </p:nvCxnSpPr>
+          <p:spPr>
+            <a:xfrm rot="2921065">
+              <a:off x="7791128" y="3295692"/>
+              <a:ext cx="442222" cy="396240"/>
+            </a:xfrm>
+            <a:prstGeom prst="line">
+              <a:avLst/>
+            </a:prstGeom>
+            <a:ln w="19050"/>
+          </p:spPr>
+          <p:style>
+            <a:lnRef idx="1">
+              <a:schemeClr val="accent1"/>
+            </a:lnRef>
+            <a:fillRef idx="0">
+              <a:schemeClr val="accent1"/>
+            </a:fillRef>
+            <a:effectRef idx="0">
+              <a:schemeClr val="accent1"/>
+            </a:effectRef>
+            <a:fontRef idx="minor">
+              <a:schemeClr val="tx1"/>
+            </a:fontRef>
+          </p:style>
+        </p:cxnSp>
+        <p:sp>
+          <p:nvSpPr>
+            <p:cNvPr id="77" name="Right Arrow 76"/>
+            <p:cNvSpPr/>
+            <p:nvPr/>
+          </p:nvSpPr>
+          <p:spPr>
+            <a:xfrm>
+              <a:off x="4419600" y="2362200"/>
+              <a:ext cx="838200" cy="457200"/>
+            </a:xfrm>
+            <a:prstGeom prst="rightArrow">
+              <a:avLst/>
+            </a:prstGeom>
+          </p:spPr>
+          <p:style>
+            <a:lnRef idx="2">
+              <a:schemeClr val="accent1">
+                <a:shade val="50000"/>
+              </a:schemeClr>
+            </a:lnRef>
+            <a:fillRef idx="1">
+              <a:schemeClr val="accent1"/>
+            </a:fillRef>
+            <a:effectRef idx="0">
+              <a:schemeClr val="accent1"/>
+            </a:effectRef>
+            <a:fontRef idx="minor">
+              <a:schemeClr val="lt1"/>
+            </a:fontRef>
+          </p:style>
+          <p:txBody>
+            <a:bodyPr rtlCol="0" anchor="ctr"/>
+            <a:lstStyle/>
+            <a:p>
+              <a:pPr algn="ctr"/>
+              <a:endParaRPr lang="tr-TR"/>
+            </a:p>
+          </p:txBody>
+        </p:sp>
+        <p:cxnSp>
+          <p:nvCxnSpPr>
+            <p:cNvPr id="79" name="Straight Connector 78"/>
+            <p:cNvCxnSpPr/>
+            <p:nvPr/>
+          </p:nvCxnSpPr>
+          <p:spPr>
+            <a:xfrm rot="5400000" flipH="1" flipV="1">
+              <a:off x="3810000" y="2438400"/>
+              <a:ext cx="1981200" cy="1588"/>
+            </a:xfrm>
+            <a:prstGeom prst="line">
+              <a:avLst/>
+            </a:prstGeom>
+            <a:ln w="19050"/>
+          </p:spPr>
+          <p:style>
+            <a:lnRef idx="1">
+              <a:schemeClr val="accent1"/>
+            </a:lnRef>
+            <a:fillRef idx="0">
+              <a:schemeClr val="accent1"/>
+            </a:fillRef>
+            <a:effectRef idx="0">
+              <a:schemeClr val="accent1"/>
+            </a:effectRef>
+            <a:fontRef idx="minor">
+              <a:schemeClr val="tx1"/>
+            </a:fontRef>
+          </p:style>
+        </p:cxnSp>
+        <p:cxnSp>
+          <p:nvCxnSpPr>
+            <p:cNvPr id="81" name="Curved Connector 80"/>
+            <p:cNvCxnSpPr/>
+            <p:nvPr/>
+          </p:nvCxnSpPr>
+          <p:spPr>
+            <a:xfrm rot="5400000" flipH="1" flipV="1">
+              <a:off x="4610100" y="1333500"/>
+              <a:ext cx="381000" cy="304800"/>
+            </a:xfrm>
+            <a:prstGeom prst="curvedConnector3">
+              <a:avLst>
+                <a:gd name="adj1" fmla="val 172264"/>
+              </a:avLst>
+            </a:prstGeom>
+            <a:ln w="19050">
+              <a:tailEnd type="arrow"/>
+            </a:ln>
+          </p:spPr>
+          <p:style>
+            <a:lnRef idx="1">
+              <a:schemeClr val="accent1"/>
+            </a:lnRef>
+            <a:fillRef idx="0">
+              <a:schemeClr val="accent1"/>
+            </a:fillRef>
+            <a:effectRef idx="0">
+              <a:schemeClr val="accent1"/>
+            </a:effectRef>
+            <a:fontRef idx="minor">
+              <a:schemeClr val="tx1"/>
+            </a:fontRef>
+          </p:style>
+        </p:cxnSp>
+        <p:grpSp>
+          <p:nvGrpSpPr>
+            <p:cNvPr id="88" name="Group 39"/>
+            <p:cNvGrpSpPr/>
+            <p:nvPr/>
+          </p:nvGrpSpPr>
+          <p:grpSpPr>
+            <a:xfrm rot="2921065">
+              <a:off x="7088695" y="1057755"/>
+              <a:ext cx="343433" cy="363857"/>
+              <a:chOff x="1085617" y="4809368"/>
+              <a:chExt cx="355065" cy="363857"/>
+            </a:xfrm>
+          </p:grpSpPr>
+          <p:sp>
+            <p:nvSpPr>
+              <p:cNvPr id="89" name="CustomShape 2"/>
+              <p:cNvSpPr/>
+              <p:nvPr/>
+            </p:nvSpPr>
+            <p:spPr>
+              <a:xfrm>
+                <a:off x="1085617" y="4809368"/>
+                <a:ext cx="355065" cy="363857"/>
+              </a:xfrm>
+              <a:prstGeom prst="ellipse">
+                <a:avLst/>
+              </a:prstGeom>
+              <a:solidFill>
+                <a:srgbClr val="579D1C"/>
+              </a:solidFill>
+              <a:ln>
+                <a:solidFill>
+                  <a:srgbClr val="3465A4"/>
+                </a:solidFill>
+              </a:ln>
+            </p:spPr>
+          </p:sp>
+          <p:sp>
+            <p:nvSpPr>
+              <p:cNvPr id="90" name="TextBox 89"/>
+              <p:cNvSpPr txBox="1"/>
+              <p:nvPr/>
+            </p:nvSpPr>
+            <p:spPr>
+              <a:xfrm rot="18678935">
+                <a:off x="1135668" y="4849566"/>
+                <a:ext cx="260793" cy="286381"/>
+              </a:xfrm>
+              <a:prstGeom prst="rect">
+                <a:avLst/>
+              </a:prstGeom>
+              <a:noFill/>
+            </p:spPr>
+            <p:txBody>
+              <a:bodyPr wrap="none" rtlCol="0">
+                <a:spAutoFit/>
+              </a:bodyPr>
+              <a:lstStyle/>
+              <a:p>
+                <a:r>
+                  <a:rPr lang="en-US" sz="1200" dirty="0" smtClean="0"/>
+                  <a:t>3</a:t>
+                </a:r>
+                <a:endParaRPr lang="tr-TR" sz="1200" dirty="0"/>
+              </a:p>
+            </p:txBody>
+          </p:sp>
+        </p:grpSp>
+        <p:cxnSp>
+          <p:nvCxnSpPr>
+            <p:cNvPr id="92" name="Straight Connector 91"/>
+            <p:cNvCxnSpPr>
+              <a:stCxn id="72" idx="0"/>
+              <a:endCxn id="89" idx="3"/>
+            </p:cNvCxnSpPr>
+            <p:nvPr/>
+          </p:nvCxnSpPr>
+          <p:spPr>
+            <a:xfrm flipV="1">
+              <a:off x="5778549" y="1233416"/>
+              <a:ext cx="1305078" cy="134742"/>
+            </a:xfrm>
+            <a:prstGeom prst="line">
+              <a:avLst/>
+            </a:prstGeom>
+            <a:ln w="19050"/>
+          </p:spPr>
+          <p:style>
+            <a:lnRef idx="1">
+              <a:schemeClr val="accent1"/>
+            </a:lnRef>
+            <a:fillRef idx="0">
+              <a:schemeClr val="accent1"/>
+            </a:fillRef>
+            <a:effectRef idx="0">
+              <a:schemeClr val="accent1"/>
+            </a:effectRef>
+            <a:fontRef idx="minor">
+              <a:schemeClr val="tx1"/>
+            </a:fontRef>
+          </p:style>
+        </p:cxnSp>
+        <p:cxnSp>
+          <p:nvCxnSpPr>
+            <p:cNvPr id="94" name="Straight Connector 93"/>
+            <p:cNvCxnSpPr>
+              <a:stCxn id="60" idx="1"/>
+              <a:endCxn id="89" idx="5"/>
+            </p:cNvCxnSpPr>
+            <p:nvPr/>
+          </p:nvCxnSpPr>
+          <p:spPr>
+            <a:xfrm flipV="1">
+              <a:off x="7209675" y="1415812"/>
+              <a:ext cx="34278" cy="1084087"/>
+            </a:xfrm>
+            <a:prstGeom prst="line">
+              <a:avLst/>
+            </a:prstGeom>
+            <a:ln w="19050"/>
+          </p:spPr>
+          <p:style>
+            <a:lnRef idx="1">
+              <a:schemeClr val="accent1"/>
+            </a:lnRef>
+            <a:fillRef idx="0">
+              <a:schemeClr val="accent1"/>
+            </a:fillRef>
+            <a:effectRef idx="0">
+              <a:schemeClr val="accent1"/>
+            </a:effectRef>
+            <a:fontRef idx="minor">
+              <a:schemeClr val="tx1"/>
+            </a:fontRef>
+          </p:style>
+        </p:cxnSp>
+        <p:cxnSp>
+          <p:nvCxnSpPr>
+            <p:cNvPr id="96" name="Straight Arrow Connector 95"/>
+            <p:cNvCxnSpPr/>
+            <p:nvPr/>
+          </p:nvCxnSpPr>
+          <p:spPr>
+            <a:xfrm rot="5400000" flipH="1" flipV="1">
+              <a:off x="1743974" y="1693652"/>
+              <a:ext cx="609600" cy="304800"/>
+            </a:xfrm>
+            <a:prstGeom prst="straightConnector1">
+              <a:avLst/>
+            </a:prstGeom>
+            <a:ln w="12700">
+              <a:solidFill>
+                <a:schemeClr val="tx1"/>
+              </a:solidFill>
+              <a:tailEnd type="arrow"/>
+            </a:ln>
+          </p:spPr>
+          <p:style>
+            <a:lnRef idx="1">
+              <a:schemeClr val="accent1"/>
+            </a:lnRef>
+            <a:fillRef idx="0">
+              <a:schemeClr val="accent1"/>
+            </a:fillRef>
+            <a:effectRef idx="0">
+              <a:schemeClr val="accent1"/>
+            </a:effectRef>
+            <a:fontRef idx="minor">
+              <a:schemeClr val="tx1"/>
+            </a:fontRef>
+          </p:style>
+        </p:cxnSp>
+        <p:sp>
+          <p:nvSpPr>
+            <p:cNvPr id="97" name="TextBox 96"/>
+            <p:cNvSpPr txBox="1"/>
+            <p:nvPr/>
+          </p:nvSpPr>
+          <p:spPr>
+            <a:xfrm>
+              <a:off x="1777044" y="879896"/>
+              <a:ext cx="1066800" cy="646331"/>
+            </a:xfrm>
+            <a:prstGeom prst="rect">
+              <a:avLst/>
+            </a:prstGeom>
+            <a:noFill/>
+            <a:ln w="12700">
+              <a:solidFill>
+                <a:schemeClr val="accent1">
+                  <a:shade val="95000"/>
+                  <a:satMod val="105000"/>
+                </a:schemeClr>
+              </a:solidFill>
+            </a:ln>
+          </p:spPr>
+          <p:txBody>
+            <a:bodyPr wrap="square" rtlCol="0">
+              <a:spAutoFit/>
+            </a:bodyPr>
+            <a:lstStyle/>
+            <a:p>
+              <a:pPr algn="ctr"/>
+              <a:r>
+                <a:rPr lang="tr-TR" dirty="0" smtClean="0"/>
+                <a:t>Virtual Structure</a:t>
+              </a:r>
+              <a:endParaRPr lang="tr-TR" dirty="0"/>
+            </a:p>
+          </p:txBody>
+        </p:sp>
+        <p:cxnSp>
+          <p:nvCxnSpPr>
+            <p:cNvPr id="99" name="Straight Arrow Connector 98"/>
+            <p:cNvCxnSpPr/>
+            <p:nvPr/>
+          </p:nvCxnSpPr>
+          <p:spPr>
+            <a:xfrm rot="5400000">
+              <a:off x="7407218" y="1709470"/>
+              <a:ext cx="381000" cy="381000"/>
+            </a:xfrm>
+            <a:prstGeom prst="straightConnector1">
+              <a:avLst/>
+            </a:prstGeom>
+            <a:ln>
+              <a:headEnd type="arrow"/>
+              <a:tailEnd type="arrow"/>
+            </a:ln>
+          </p:spPr>
+          <p:style>
+            <a:lnRef idx="1">
+              <a:schemeClr val="accent1"/>
+            </a:lnRef>
+            <a:fillRef idx="0">
+              <a:schemeClr val="accent1"/>
+            </a:fillRef>
+            <a:effectRef idx="0">
+              <a:schemeClr val="accent1"/>
+            </a:effectRef>
+            <a:fontRef idx="minor">
+              <a:schemeClr val="tx1"/>
+            </a:fontRef>
+          </p:style>
+        </p:cxnSp>
+        <p:cxnSp>
+          <p:nvCxnSpPr>
+            <p:cNvPr id="103" name="Straight Connector 102"/>
+            <p:cNvCxnSpPr/>
+            <p:nvPr/>
+          </p:nvCxnSpPr>
+          <p:spPr>
+            <a:xfrm>
+              <a:off x="7010400" y="1828800"/>
+              <a:ext cx="381000" cy="304800"/>
+            </a:xfrm>
+            <a:prstGeom prst="line">
+              <a:avLst/>
+            </a:prstGeom>
+            <a:ln w="15875">
+              <a:solidFill>
+                <a:srgbClr val="FF0000"/>
+              </a:solidFill>
+            </a:ln>
+          </p:spPr>
+          <p:style>
+            <a:lnRef idx="1">
+              <a:schemeClr val="accent1"/>
+            </a:lnRef>
+            <a:fillRef idx="0">
+              <a:schemeClr val="accent1"/>
+            </a:fillRef>
+            <a:effectRef idx="0">
+              <a:schemeClr val="accent1"/>
+            </a:effectRef>
+            <a:fontRef idx="minor">
+              <a:schemeClr val="tx1"/>
+            </a:fontRef>
+          </p:style>
+        </p:cxnSp>
+        <p:cxnSp>
+          <p:nvCxnSpPr>
+            <p:cNvPr id="104" name="Straight Connector 103"/>
+            <p:cNvCxnSpPr/>
+            <p:nvPr/>
+          </p:nvCxnSpPr>
+          <p:spPr>
+            <a:xfrm>
+              <a:off x="7391400" y="1371600"/>
+              <a:ext cx="381000" cy="304800"/>
+            </a:xfrm>
+            <a:prstGeom prst="line">
+              <a:avLst/>
+            </a:prstGeom>
+            <a:ln w="15875">
+              <a:solidFill>
+                <a:srgbClr val="FF0000"/>
+              </a:solidFill>
+            </a:ln>
+          </p:spPr>
+          <p:style>
+            <a:lnRef idx="1">
+              <a:schemeClr val="accent1"/>
+            </a:lnRef>
+            <a:fillRef idx="0">
+              <a:schemeClr val="accent1"/>
+            </a:fillRef>
+            <a:effectRef idx="0">
+              <a:schemeClr val="accent1"/>
+            </a:effectRef>
+            <a:fontRef idx="minor">
+              <a:schemeClr val="tx1"/>
+            </a:fontRef>
+          </p:style>
+        </p:cxnSp>
+        <p:sp>
+          <p:nvSpPr>
+            <p:cNvPr id="108" name="TextBox 107"/>
+            <p:cNvSpPr txBox="1"/>
+            <p:nvPr/>
+          </p:nvSpPr>
+          <p:spPr>
+            <a:xfrm>
+              <a:off x="7604722" y="1752600"/>
+              <a:ext cx="929678" cy="646331"/>
+            </a:xfrm>
+            <a:prstGeom prst="rect">
+              <a:avLst/>
+            </a:prstGeom>
+            <a:noFill/>
+          </p:spPr>
+          <p:txBody>
+            <a:bodyPr wrap="none" rtlCol="0">
+              <a:spAutoFit/>
+            </a:bodyPr>
+            <a:lstStyle/>
+            <a:p>
+              <a:pPr algn="ctr"/>
+              <a:r>
+                <a:rPr lang="tr-TR" dirty="0" smtClean="0"/>
+                <a:t>Relative</a:t>
+              </a:r>
+            </a:p>
+            <a:p>
+              <a:pPr algn="ctr"/>
+              <a:r>
+                <a:rPr lang="tr-TR" dirty="0" smtClean="0"/>
+                <a:t> Error</a:t>
+              </a:r>
+              <a:endParaRPr lang="tr-TR" dirty="0"/>
+            </a:p>
+          </p:txBody>
+        </p:sp>
+      </p:grpSp>
+    </p:spTree>
+  </p:cSld>
+  <p:clrMapOvr>
+    <a:masterClrMapping/>
+  </p:clrMapOvr>
+</p:sld>
+</file>
+
 <file path=ppt/theme/theme1.xml><?xml version="1.0" encoding="utf-8"?>
 <a:theme xmlns:a="http://schemas.openxmlformats.org/drawingml/2006/main" name="Office Theme">
   <a:themeElements>

</xml_diff>

<commit_message>
[upgrade] DSDV bitmek üzere , lost agents ve estimator yazılacak
</commit_message>
<xml_diff>
--- a/Tez Çizimleri.pptx
+++ b/Tez Çizimleri.pptx
@@ -9,6 +9,7 @@
     <p:sldId id="257" r:id="rId3"/>
     <p:sldId id="258" r:id="rId4"/>
     <p:sldId id="259" r:id="rId5"/>
+    <p:sldId id="260" r:id="rId6"/>
   </p:sldIdLst>
   <p:sldSz cx="9144000" cy="6858000" type="screen4x3"/>
   <p:notesSz cx="6858000" cy="9144000"/>
@@ -292,7 +293,7 @@
             <a:fld id="{1D8BD707-D9CF-40AE-B4C6-C98DA3205C09}" type="datetimeFigureOut">
               <a:rPr lang="en-US" smtClean="0"/>
               <a:pPr/>
-              <a:t>8/16/2015</a:t>
+              <a:t>8/22/2015</a:t>
             </a:fld>
             <a:endParaRPr lang="en-US"/>
           </a:p>
@@ -459,7 +460,7 @@
             <a:fld id="{1D8BD707-D9CF-40AE-B4C6-C98DA3205C09}" type="datetimeFigureOut">
               <a:rPr lang="en-US" smtClean="0"/>
               <a:pPr/>
-              <a:t>8/16/2015</a:t>
+              <a:t>8/22/2015</a:t>
             </a:fld>
             <a:endParaRPr lang="en-US"/>
           </a:p>
@@ -636,7 +637,7 @@
             <a:fld id="{1D8BD707-D9CF-40AE-B4C6-C98DA3205C09}" type="datetimeFigureOut">
               <a:rPr lang="en-US" smtClean="0"/>
               <a:pPr/>
-              <a:t>8/16/2015</a:t>
+              <a:t>8/22/2015</a:t>
             </a:fld>
             <a:endParaRPr lang="en-US"/>
           </a:p>
@@ -803,7 +804,7 @@
             <a:fld id="{1D8BD707-D9CF-40AE-B4C6-C98DA3205C09}" type="datetimeFigureOut">
               <a:rPr lang="en-US" smtClean="0"/>
               <a:pPr/>
-              <a:t>8/16/2015</a:t>
+              <a:t>8/22/2015</a:t>
             </a:fld>
             <a:endParaRPr lang="en-US"/>
           </a:p>
@@ -1046,7 +1047,7 @@
             <a:fld id="{1D8BD707-D9CF-40AE-B4C6-C98DA3205C09}" type="datetimeFigureOut">
               <a:rPr lang="en-US" smtClean="0"/>
               <a:pPr/>
-              <a:t>8/16/2015</a:t>
+              <a:t>8/22/2015</a:t>
             </a:fld>
             <a:endParaRPr lang="en-US"/>
           </a:p>
@@ -1331,7 +1332,7 @@
             <a:fld id="{1D8BD707-D9CF-40AE-B4C6-C98DA3205C09}" type="datetimeFigureOut">
               <a:rPr lang="en-US" smtClean="0"/>
               <a:pPr/>
-              <a:t>8/16/2015</a:t>
+              <a:t>8/22/2015</a:t>
             </a:fld>
             <a:endParaRPr lang="en-US"/>
           </a:p>
@@ -1750,7 +1751,7 @@
             <a:fld id="{1D8BD707-D9CF-40AE-B4C6-C98DA3205C09}" type="datetimeFigureOut">
               <a:rPr lang="en-US" smtClean="0"/>
               <a:pPr/>
-              <a:t>8/16/2015</a:t>
+              <a:t>8/22/2015</a:t>
             </a:fld>
             <a:endParaRPr lang="en-US"/>
           </a:p>
@@ -1865,7 +1866,7 @@
             <a:fld id="{1D8BD707-D9CF-40AE-B4C6-C98DA3205C09}" type="datetimeFigureOut">
               <a:rPr lang="en-US" smtClean="0"/>
               <a:pPr/>
-              <a:t>8/16/2015</a:t>
+              <a:t>8/22/2015</a:t>
             </a:fld>
             <a:endParaRPr lang="en-US"/>
           </a:p>
@@ -1957,7 +1958,7 @@
             <a:fld id="{1D8BD707-D9CF-40AE-B4C6-C98DA3205C09}" type="datetimeFigureOut">
               <a:rPr lang="en-US" smtClean="0"/>
               <a:pPr/>
-              <a:t>8/16/2015</a:t>
+              <a:t>8/22/2015</a:t>
             </a:fld>
             <a:endParaRPr lang="en-US"/>
           </a:p>
@@ -2231,7 +2232,7 @@
             <a:fld id="{1D8BD707-D9CF-40AE-B4C6-C98DA3205C09}" type="datetimeFigureOut">
               <a:rPr lang="en-US" smtClean="0"/>
               <a:pPr/>
-              <a:t>8/16/2015</a:t>
+              <a:t>8/22/2015</a:t>
             </a:fld>
             <a:endParaRPr lang="en-US"/>
           </a:p>
@@ -2481,7 +2482,7 @@
             <a:fld id="{1D8BD707-D9CF-40AE-B4C6-C98DA3205C09}" type="datetimeFigureOut">
               <a:rPr lang="en-US" smtClean="0"/>
               <a:pPr/>
-              <a:t>8/16/2015</a:t>
+              <a:t>8/22/2015</a:t>
             </a:fld>
             <a:endParaRPr lang="en-US"/>
           </a:p>
@@ -2691,7 +2692,7 @@
             <a:fld id="{1D8BD707-D9CF-40AE-B4C6-C98DA3205C09}" type="datetimeFigureOut">
               <a:rPr lang="en-US" smtClean="0"/>
               <a:pPr/>
-              <a:t>8/16/2015</a:t>
+              <a:t>8/22/2015</a:t>
             </a:fld>
             <a:endParaRPr lang="en-US"/>
           </a:p>
@@ -9206,6 +9207,2793 @@
 </p:sld>
 </file>
 
+<file path=ppt/slides/slide5.xml><?xml version="1.0" encoding="utf-8"?>
+<p:sld xmlns:a="http://schemas.openxmlformats.org/drawingml/2006/main" xmlns:r="http://schemas.openxmlformats.org/officeDocument/2006/relationships" xmlns:p="http://schemas.openxmlformats.org/presentationml/2006/main">
+  <p:cSld>
+    <p:spTree>
+      <p:nvGrpSpPr>
+        <p:cNvPr id="1" name=""/>
+        <p:cNvGrpSpPr/>
+        <p:nvPr/>
+      </p:nvGrpSpPr>
+      <p:grpSpPr>
+        <a:xfrm>
+          <a:off x="0" y="0"/>
+          <a:ext cx="0" cy="0"/>
+          <a:chOff x="0" y="0"/>
+          <a:chExt cx="0" cy="0"/>
+        </a:xfrm>
+      </p:grpSpPr>
+      <p:grpSp>
+        <p:nvGrpSpPr>
+          <p:cNvPr id="75" name="Group 74"/>
+          <p:cNvGrpSpPr/>
+          <p:nvPr/>
+        </p:nvGrpSpPr>
+        <p:grpSpPr>
+          <a:xfrm>
+            <a:off x="685800" y="1981200"/>
+            <a:ext cx="3798311" cy="2421257"/>
+            <a:chOff x="2667000" y="1981200"/>
+            <a:chExt cx="3798311" cy="2421257"/>
+          </a:xfrm>
+        </p:grpSpPr>
+        <p:grpSp>
+          <p:nvGrpSpPr>
+            <p:cNvPr id="5" name="Group 19"/>
+            <p:cNvGrpSpPr/>
+            <p:nvPr/>
+          </p:nvGrpSpPr>
+          <p:grpSpPr>
+            <a:xfrm>
+              <a:off x="2667000" y="2743200"/>
+              <a:ext cx="343433" cy="363857"/>
+              <a:chOff x="1085617" y="4809368"/>
+              <a:chExt cx="355065" cy="363857"/>
+            </a:xfrm>
+          </p:grpSpPr>
+          <p:sp>
+            <p:nvSpPr>
+              <p:cNvPr id="37" name="CustomShape 2"/>
+              <p:cNvSpPr/>
+              <p:nvPr/>
+            </p:nvSpPr>
+            <p:spPr>
+              <a:xfrm>
+                <a:off x="1085617" y="4809368"/>
+                <a:ext cx="355065" cy="363857"/>
+              </a:xfrm>
+              <a:prstGeom prst="ellipse">
+                <a:avLst/>
+              </a:prstGeom>
+              <a:solidFill>
+                <a:srgbClr val="579D1C"/>
+              </a:solidFill>
+              <a:ln>
+                <a:solidFill>
+                  <a:srgbClr val="3465A4"/>
+                </a:solidFill>
+              </a:ln>
+            </p:spPr>
+          </p:sp>
+          <p:sp>
+            <p:nvSpPr>
+              <p:cNvPr id="38" name="TextBox 37"/>
+              <p:cNvSpPr txBox="1"/>
+              <p:nvPr/>
+            </p:nvSpPr>
+            <p:spPr>
+              <a:xfrm>
+                <a:off x="1131252" y="4854257"/>
+                <a:ext cx="292017" cy="276999"/>
+              </a:xfrm>
+              <a:prstGeom prst="rect">
+                <a:avLst/>
+              </a:prstGeom>
+              <a:noFill/>
+            </p:spPr>
+            <p:txBody>
+              <a:bodyPr wrap="none" rtlCol="0">
+                <a:spAutoFit/>
+              </a:bodyPr>
+              <a:lstStyle/>
+              <a:p>
+                <a:r>
+                  <a:rPr lang="tr-TR" sz="1200" dirty="0" smtClean="0"/>
+                  <a:t>G</a:t>
+                </a:r>
+                <a:endParaRPr lang="tr-TR" sz="1200" dirty="0"/>
+              </a:p>
+            </p:txBody>
+          </p:sp>
+        </p:grpSp>
+        <p:grpSp>
+          <p:nvGrpSpPr>
+            <p:cNvPr id="6" name="Group 21"/>
+            <p:cNvGrpSpPr/>
+            <p:nvPr/>
+          </p:nvGrpSpPr>
+          <p:grpSpPr>
+            <a:xfrm>
+              <a:off x="3048000" y="3657600"/>
+              <a:ext cx="343433" cy="363857"/>
+              <a:chOff x="1085617" y="4809368"/>
+              <a:chExt cx="355065" cy="363857"/>
+            </a:xfrm>
+          </p:grpSpPr>
+          <p:sp>
+            <p:nvSpPr>
+              <p:cNvPr id="35" name="CustomShape 2"/>
+              <p:cNvSpPr/>
+              <p:nvPr/>
+            </p:nvSpPr>
+            <p:spPr>
+              <a:xfrm>
+                <a:off x="1085617" y="4809368"/>
+                <a:ext cx="355065" cy="363857"/>
+              </a:xfrm>
+              <a:prstGeom prst="ellipse">
+                <a:avLst/>
+              </a:prstGeom>
+              <a:solidFill>
+                <a:srgbClr val="579D1C"/>
+              </a:solidFill>
+              <a:ln>
+                <a:solidFill>
+                  <a:srgbClr val="3465A4"/>
+                </a:solidFill>
+              </a:ln>
+            </p:spPr>
+          </p:sp>
+          <p:sp>
+            <p:nvSpPr>
+              <p:cNvPr id="36" name="TextBox 35"/>
+              <p:cNvSpPr txBox="1"/>
+              <p:nvPr/>
+            </p:nvSpPr>
+            <p:spPr>
+              <a:xfrm>
+                <a:off x="1131252" y="4854257"/>
+                <a:ext cx="263842" cy="276999"/>
+              </a:xfrm>
+              <a:prstGeom prst="rect">
+                <a:avLst/>
+              </a:prstGeom>
+              <a:noFill/>
+            </p:spPr>
+            <p:txBody>
+              <a:bodyPr wrap="none" rtlCol="0">
+                <a:spAutoFit/>
+              </a:bodyPr>
+              <a:lstStyle/>
+              <a:p>
+                <a:r>
+                  <a:rPr lang="tr-TR" sz="1200" dirty="0" smtClean="0"/>
+                  <a:t>F</a:t>
+                </a:r>
+                <a:endParaRPr lang="tr-TR" sz="1200" dirty="0"/>
+              </a:p>
+            </p:txBody>
+          </p:sp>
+        </p:grpSp>
+        <p:grpSp>
+          <p:nvGrpSpPr>
+            <p:cNvPr id="7" name="Group 24"/>
+            <p:cNvGrpSpPr/>
+            <p:nvPr/>
+          </p:nvGrpSpPr>
+          <p:grpSpPr>
+            <a:xfrm>
+              <a:off x="4267200" y="4038600"/>
+              <a:ext cx="343433" cy="363857"/>
+              <a:chOff x="1085617" y="4809368"/>
+              <a:chExt cx="355065" cy="363857"/>
+            </a:xfrm>
+          </p:grpSpPr>
+          <p:sp>
+            <p:nvSpPr>
+              <p:cNvPr id="33" name="CustomShape 2"/>
+              <p:cNvSpPr/>
+              <p:nvPr/>
+            </p:nvSpPr>
+            <p:spPr>
+              <a:xfrm>
+                <a:off x="1085617" y="4809368"/>
+                <a:ext cx="355065" cy="363857"/>
+              </a:xfrm>
+              <a:prstGeom prst="ellipse">
+                <a:avLst/>
+              </a:prstGeom>
+              <a:solidFill>
+                <a:srgbClr val="579D1C"/>
+              </a:solidFill>
+              <a:ln>
+                <a:solidFill>
+                  <a:srgbClr val="3465A4"/>
+                </a:solidFill>
+              </a:ln>
+            </p:spPr>
+          </p:sp>
+          <p:sp>
+            <p:nvSpPr>
+              <p:cNvPr id="34" name="TextBox 33"/>
+              <p:cNvSpPr txBox="1"/>
+              <p:nvPr/>
+            </p:nvSpPr>
+            <p:spPr>
+              <a:xfrm>
+                <a:off x="1131252" y="4854257"/>
+                <a:ext cx="268814" cy="276999"/>
+              </a:xfrm>
+              <a:prstGeom prst="rect">
+                <a:avLst/>
+              </a:prstGeom>
+              <a:noFill/>
+            </p:spPr>
+            <p:txBody>
+              <a:bodyPr wrap="none" rtlCol="0">
+                <a:spAutoFit/>
+              </a:bodyPr>
+              <a:lstStyle/>
+              <a:p>
+                <a:r>
+                  <a:rPr lang="tr-TR" sz="1200" dirty="0" smtClean="0"/>
+                  <a:t>E</a:t>
+                </a:r>
+                <a:endParaRPr lang="tr-TR" sz="1200" dirty="0"/>
+              </a:p>
+            </p:txBody>
+          </p:sp>
+        </p:grpSp>
+        <p:grpSp>
+          <p:nvGrpSpPr>
+            <p:cNvPr id="8" name="Group 27"/>
+            <p:cNvGrpSpPr/>
+            <p:nvPr/>
+          </p:nvGrpSpPr>
+          <p:grpSpPr>
+            <a:xfrm>
+              <a:off x="5257800" y="3886200"/>
+              <a:ext cx="343433" cy="363857"/>
+              <a:chOff x="1085617" y="4809368"/>
+              <a:chExt cx="355065" cy="363857"/>
+            </a:xfrm>
+          </p:grpSpPr>
+          <p:sp>
+            <p:nvSpPr>
+              <p:cNvPr id="31" name="CustomShape 2"/>
+              <p:cNvSpPr/>
+              <p:nvPr/>
+            </p:nvSpPr>
+            <p:spPr>
+              <a:xfrm>
+                <a:off x="1085617" y="4809368"/>
+                <a:ext cx="355065" cy="363857"/>
+              </a:xfrm>
+              <a:prstGeom prst="ellipse">
+                <a:avLst/>
+              </a:prstGeom>
+              <a:solidFill>
+                <a:srgbClr val="579D1C"/>
+              </a:solidFill>
+              <a:ln>
+                <a:solidFill>
+                  <a:srgbClr val="3465A4"/>
+                </a:solidFill>
+              </a:ln>
+            </p:spPr>
+          </p:sp>
+          <p:sp>
+            <p:nvSpPr>
+              <p:cNvPr id="32" name="TextBox 31"/>
+              <p:cNvSpPr txBox="1"/>
+              <p:nvPr/>
+            </p:nvSpPr>
+            <p:spPr>
+              <a:xfrm>
+                <a:off x="1131252" y="4854257"/>
+                <a:ext cx="288702" cy="276999"/>
+              </a:xfrm>
+              <a:prstGeom prst="rect">
+                <a:avLst/>
+              </a:prstGeom>
+              <a:noFill/>
+            </p:spPr>
+            <p:txBody>
+              <a:bodyPr wrap="none" rtlCol="0">
+                <a:spAutoFit/>
+              </a:bodyPr>
+              <a:lstStyle/>
+              <a:p>
+                <a:r>
+                  <a:rPr lang="tr-TR" sz="1200" dirty="0" smtClean="0"/>
+                  <a:t>D</a:t>
+                </a:r>
+                <a:endParaRPr lang="tr-TR" sz="1200" dirty="0"/>
+              </a:p>
+            </p:txBody>
+          </p:sp>
+        </p:grpSp>
+        <p:grpSp>
+          <p:nvGrpSpPr>
+            <p:cNvPr id="9" name="Group 30"/>
+            <p:cNvGrpSpPr/>
+            <p:nvPr/>
+          </p:nvGrpSpPr>
+          <p:grpSpPr>
+            <a:xfrm>
+              <a:off x="6121878" y="3454878"/>
+              <a:ext cx="343433" cy="363857"/>
+              <a:chOff x="1085617" y="4809368"/>
+              <a:chExt cx="355065" cy="363857"/>
+            </a:xfrm>
+          </p:grpSpPr>
+          <p:sp>
+            <p:nvSpPr>
+              <p:cNvPr id="29" name="CustomShape 2"/>
+              <p:cNvSpPr/>
+              <p:nvPr/>
+            </p:nvSpPr>
+            <p:spPr>
+              <a:xfrm>
+                <a:off x="1085617" y="4809368"/>
+                <a:ext cx="355065" cy="363857"/>
+              </a:xfrm>
+              <a:prstGeom prst="ellipse">
+                <a:avLst/>
+              </a:prstGeom>
+              <a:solidFill>
+                <a:srgbClr val="579D1C"/>
+              </a:solidFill>
+              <a:ln>
+                <a:solidFill>
+                  <a:srgbClr val="3465A4"/>
+                </a:solidFill>
+              </a:ln>
+            </p:spPr>
+          </p:sp>
+          <p:sp>
+            <p:nvSpPr>
+              <p:cNvPr id="30" name="TextBox 29"/>
+              <p:cNvSpPr txBox="1"/>
+              <p:nvPr/>
+            </p:nvSpPr>
+            <p:spPr>
+              <a:xfrm>
+                <a:off x="1131252" y="4854257"/>
+                <a:ext cx="275444" cy="276999"/>
+              </a:xfrm>
+              <a:prstGeom prst="rect">
+                <a:avLst/>
+              </a:prstGeom>
+              <a:noFill/>
+            </p:spPr>
+            <p:txBody>
+              <a:bodyPr wrap="none" rtlCol="0">
+                <a:spAutoFit/>
+              </a:bodyPr>
+              <a:lstStyle/>
+              <a:p>
+                <a:r>
+                  <a:rPr lang="tr-TR" sz="1200" dirty="0" smtClean="0"/>
+                  <a:t>C</a:t>
+                </a:r>
+                <a:endParaRPr lang="tr-TR" sz="1200" dirty="0"/>
+              </a:p>
+            </p:txBody>
+          </p:sp>
+        </p:grpSp>
+        <p:grpSp>
+          <p:nvGrpSpPr>
+            <p:cNvPr id="10" name="Group 33"/>
+            <p:cNvGrpSpPr/>
+            <p:nvPr/>
+          </p:nvGrpSpPr>
+          <p:grpSpPr>
+            <a:xfrm>
+              <a:off x="5486400" y="2667000"/>
+              <a:ext cx="343433" cy="363857"/>
+              <a:chOff x="1085617" y="4809368"/>
+              <a:chExt cx="355065" cy="363857"/>
+            </a:xfrm>
+          </p:grpSpPr>
+          <p:sp>
+            <p:nvSpPr>
+              <p:cNvPr id="27" name="CustomShape 2"/>
+              <p:cNvSpPr/>
+              <p:nvPr/>
+            </p:nvSpPr>
+            <p:spPr>
+              <a:xfrm>
+                <a:off x="1085617" y="4809368"/>
+                <a:ext cx="355065" cy="363857"/>
+              </a:xfrm>
+              <a:prstGeom prst="ellipse">
+                <a:avLst/>
+              </a:prstGeom>
+              <a:solidFill>
+                <a:srgbClr val="579D1C"/>
+              </a:solidFill>
+              <a:ln>
+                <a:solidFill>
+                  <a:srgbClr val="3465A4"/>
+                </a:solidFill>
+              </a:ln>
+            </p:spPr>
+          </p:sp>
+          <p:sp>
+            <p:nvSpPr>
+              <p:cNvPr id="28" name="TextBox 27"/>
+              <p:cNvSpPr txBox="1"/>
+              <p:nvPr/>
+            </p:nvSpPr>
+            <p:spPr>
+              <a:xfrm>
+                <a:off x="1131252" y="4854257"/>
+                <a:ext cx="277100" cy="276999"/>
+              </a:xfrm>
+              <a:prstGeom prst="rect">
+                <a:avLst/>
+              </a:prstGeom>
+              <a:noFill/>
+            </p:spPr>
+            <p:txBody>
+              <a:bodyPr wrap="none" rtlCol="0">
+                <a:spAutoFit/>
+              </a:bodyPr>
+              <a:lstStyle/>
+              <a:p>
+                <a:r>
+                  <a:rPr lang="tr-TR" sz="1200" dirty="0" smtClean="0"/>
+                  <a:t>B</a:t>
+                </a:r>
+                <a:endParaRPr lang="tr-TR" sz="1200" dirty="0"/>
+              </a:p>
+            </p:txBody>
+          </p:sp>
+        </p:grpSp>
+        <p:grpSp>
+          <p:nvGrpSpPr>
+            <p:cNvPr id="11" name="Group 36"/>
+            <p:cNvGrpSpPr/>
+            <p:nvPr/>
+          </p:nvGrpSpPr>
+          <p:grpSpPr>
+            <a:xfrm>
+              <a:off x="4583294" y="2362200"/>
+              <a:ext cx="343433" cy="363857"/>
+              <a:chOff x="1085617" y="4809368"/>
+              <a:chExt cx="355065" cy="363857"/>
+            </a:xfrm>
+          </p:grpSpPr>
+          <p:sp>
+            <p:nvSpPr>
+              <p:cNvPr id="25" name="CustomShape 2"/>
+              <p:cNvSpPr/>
+              <p:nvPr/>
+            </p:nvSpPr>
+            <p:spPr>
+              <a:xfrm>
+                <a:off x="1085617" y="4809368"/>
+                <a:ext cx="355065" cy="363857"/>
+              </a:xfrm>
+              <a:prstGeom prst="ellipse">
+                <a:avLst/>
+              </a:prstGeom>
+              <a:solidFill>
+                <a:srgbClr val="579D1C"/>
+              </a:solidFill>
+              <a:ln>
+                <a:solidFill>
+                  <a:srgbClr val="3465A4"/>
+                </a:solidFill>
+              </a:ln>
+            </p:spPr>
+          </p:sp>
+          <p:sp>
+            <p:nvSpPr>
+              <p:cNvPr id="26" name="TextBox 25"/>
+              <p:cNvSpPr txBox="1"/>
+              <p:nvPr/>
+            </p:nvSpPr>
+            <p:spPr>
+              <a:xfrm>
+                <a:off x="1131252" y="4854257"/>
+                <a:ext cx="283729" cy="276999"/>
+              </a:xfrm>
+              <a:prstGeom prst="rect">
+                <a:avLst/>
+              </a:prstGeom>
+              <a:noFill/>
+            </p:spPr>
+            <p:txBody>
+              <a:bodyPr wrap="none" rtlCol="0">
+                <a:spAutoFit/>
+              </a:bodyPr>
+              <a:lstStyle/>
+              <a:p>
+                <a:r>
+                  <a:rPr lang="tr-TR" sz="1200" dirty="0" smtClean="0"/>
+                  <a:t>A</a:t>
+                </a:r>
+                <a:endParaRPr lang="tr-TR" sz="1200" dirty="0"/>
+              </a:p>
+            </p:txBody>
+          </p:sp>
+        </p:grpSp>
+        <p:grpSp>
+          <p:nvGrpSpPr>
+            <p:cNvPr id="12" name="Group 39"/>
+            <p:cNvGrpSpPr/>
+            <p:nvPr/>
+          </p:nvGrpSpPr>
+          <p:grpSpPr>
+            <a:xfrm>
+              <a:off x="3625147" y="1981200"/>
+              <a:ext cx="343433" cy="363857"/>
+              <a:chOff x="1085617" y="4809368"/>
+              <a:chExt cx="355065" cy="363857"/>
+            </a:xfrm>
+          </p:grpSpPr>
+          <p:sp>
+            <p:nvSpPr>
+              <p:cNvPr id="23" name="CustomShape 2"/>
+              <p:cNvSpPr/>
+              <p:nvPr/>
+            </p:nvSpPr>
+            <p:spPr>
+              <a:xfrm>
+                <a:off x="1085617" y="4809368"/>
+                <a:ext cx="355065" cy="363857"/>
+              </a:xfrm>
+              <a:prstGeom prst="ellipse">
+                <a:avLst/>
+              </a:prstGeom>
+              <a:solidFill>
+                <a:srgbClr val="579D1C"/>
+              </a:solidFill>
+              <a:ln>
+                <a:solidFill>
+                  <a:srgbClr val="3465A4"/>
+                </a:solidFill>
+              </a:ln>
+            </p:spPr>
+          </p:sp>
+          <p:sp>
+            <p:nvSpPr>
+              <p:cNvPr id="24" name="TextBox 23"/>
+              <p:cNvSpPr txBox="1"/>
+              <p:nvPr/>
+            </p:nvSpPr>
+            <p:spPr>
+              <a:xfrm>
+                <a:off x="1131252" y="4854257"/>
+                <a:ext cx="263842" cy="276999"/>
+              </a:xfrm>
+              <a:prstGeom prst="rect">
+                <a:avLst/>
+              </a:prstGeom>
+              <a:noFill/>
+            </p:spPr>
+            <p:txBody>
+              <a:bodyPr wrap="none" rtlCol="0">
+                <a:spAutoFit/>
+              </a:bodyPr>
+              <a:lstStyle/>
+              <a:p>
+                <a:r>
+                  <a:rPr lang="tr-TR" sz="1200" dirty="0" smtClean="0"/>
+                  <a:t>S</a:t>
+                </a:r>
+                <a:endParaRPr lang="tr-TR" sz="1200" dirty="0"/>
+              </a:p>
+            </p:txBody>
+          </p:sp>
+        </p:grpSp>
+        <p:cxnSp>
+          <p:nvCxnSpPr>
+            <p:cNvPr id="19" name="Straight Connector 18"/>
+            <p:cNvCxnSpPr>
+              <a:stCxn id="33" idx="6"/>
+            </p:cNvCxnSpPr>
+            <p:nvPr/>
+          </p:nvCxnSpPr>
+          <p:spPr>
+            <a:xfrm flipV="1">
+              <a:off x="4610632" y="4114800"/>
+              <a:ext cx="688418" cy="105729"/>
+            </a:xfrm>
+            <a:prstGeom prst="line">
+              <a:avLst/>
+            </a:prstGeom>
+            <a:ln w="19050"/>
+          </p:spPr>
+          <p:style>
+            <a:lnRef idx="1">
+              <a:schemeClr val="accent1"/>
+            </a:lnRef>
+            <a:fillRef idx="0">
+              <a:schemeClr val="accent1"/>
+            </a:fillRef>
+            <a:effectRef idx="0">
+              <a:schemeClr val="accent1"/>
+            </a:effectRef>
+            <a:fontRef idx="minor">
+              <a:schemeClr val="tx1"/>
+            </a:fontRef>
+          </p:style>
+        </p:cxnSp>
+        <p:cxnSp>
+          <p:nvCxnSpPr>
+            <p:cNvPr id="40" name="Straight Arrow Connector 39"/>
+            <p:cNvCxnSpPr/>
+            <p:nvPr/>
+          </p:nvCxnSpPr>
+          <p:spPr>
+            <a:xfrm flipV="1">
+              <a:off x="2971800" y="2286000"/>
+              <a:ext cx="685800" cy="533400"/>
+            </a:xfrm>
+            <a:prstGeom prst="straightConnector1">
+              <a:avLst/>
+            </a:prstGeom>
+            <a:ln w="15875">
+              <a:tailEnd type="arrow"/>
+            </a:ln>
+          </p:spPr>
+          <p:style>
+            <a:lnRef idx="1">
+              <a:schemeClr val="accent1"/>
+            </a:lnRef>
+            <a:fillRef idx="0">
+              <a:schemeClr val="accent1"/>
+            </a:fillRef>
+            <a:effectRef idx="0">
+              <a:schemeClr val="accent1"/>
+            </a:effectRef>
+            <a:fontRef idx="minor">
+              <a:schemeClr val="tx1"/>
+            </a:fontRef>
+          </p:style>
+        </p:cxnSp>
+        <p:cxnSp>
+          <p:nvCxnSpPr>
+            <p:cNvPr id="43" name="Straight Arrow Connector 42"/>
+            <p:cNvCxnSpPr/>
+            <p:nvPr/>
+          </p:nvCxnSpPr>
+          <p:spPr>
+            <a:xfrm>
+              <a:off x="3988278" y="2214775"/>
+              <a:ext cx="620894" cy="258129"/>
+            </a:xfrm>
+            <a:prstGeom prst="straightConnector1">
+              <a:avLst/>
+            </a:prstGeom>
+            <a:ln w="15875">
+              <a:tailEnd type="arrow"/>
+            </a:ln>
+          </p:spPr>
+          <p:style>
+            <a:lnRef idx="1">
+              <a:schemeClr val="accent1"/>
+            </a:lnRef>
+            <a:fillRef idx="0">
+              <a:schemeClr val="accent1"/>
+            </a:fillRef>
+            <a:effectRef idx="0">
+              <a:schemeClr val="accent1"/>
+            </a:effectRef>
+            <a:fontRef idx="minor">
+              <a:schemeClr val="tx1"/>
+            </a:fontRef>
+          </p:style>
+        </p:cxnSp>
+        <p:cxnSp>
+          <p:nvCxnSpPr>
+            <p:cNvPr id="45" name="Straight Arrow Connector 44"/>
+            <p:cNvCxnSpPr/>
+            <p:nvPr/>
+          </p:nvCxnSpPr>
+          <p:spPr>
+            <a:xfrm flipV="1">
+              <a:off x="3352800" y="2667000"/>
+              <a:ext cx="1295400" cy="1066800"/>
+            </a:xfrm>
+            <a:prstGeom prst="straightConnector1">
+              <a:avLst/>
+            </a:prstGeom>
+            <a:ln w="15875">
+              <a:tailEnd type="arrow"/>
+            </a:ln>
+          </p:spPr>
+          <p:style>
+            <a:lnRef idx="1">
+              <a:schemeClr val="accent1"/>
+            </a:lnRef>
+            <a:fillRef idx="0">
+              <a:schemeClr val="accent1"/>
+            </a:fillRef>
+            <a:effectRef idx="0">
+              <a:schemeClr val="accent1"/>
+            </a:effectRef>
+            <a:fontRef idx="minor">
+              <a:schemeClr val="tx1"/>
+            </a:fontRef>
+          </p:style>
+        </p:cxnSp>
+        <p:cxnSp>
+          <p:nvCxnSpPr>
+            <p:cNvPr id="47" name="Straight Arrow Connector 46"/>
+            <p:cNvCxnSpPr/>
+            <p:nvPr/>
+          </p:nvCxnSpPr>
+          <p:spPr>
+            <a:xfrm rot="16200000" flipH="1">
+              <a:off x="2729482" y="3298943"/>
+              <a:ext cx="586686" cy="202695"/>
+            </a:xfrm>
+            <a:prstGeom prst="straightConnector1">
+              <a:avLst/>
+            </a:prstGeom>
+            <a:ln w="15875">
+              <a:tailEnd type="arrow"/>
+            </a:ln>
+          </p:spPr>
+          <p:style>
+            <a:lnRef idx="1">
+              <a:schemeClr val="accent1"/>
+            </a:lnRef>
+            <a:fillRef idx="0">
+              <a:schemeClr val="accent1"/>
+            </a:fillRef>
+            <a:effectRef idx="0">
+              <a:schemeClr val="accent1"/>
+            </a:effectRef>
+            <a:fontRef idx="minor">
+              <a:schemeClr val="tx1"/>
+            </a:fontRef>
+          </p:style>
+        </p:cxnSp>
+        <p:cxnSp>
+          <p:nvCxnSpPr>
+            <p:cNvPr id="49" name="Straight Arrow Connector 48"/>
+            <p:cNvCxnSpPr/>
+            <p:nvPr/>
+          </p:nvCxnSpPr>
+          <p:spPr>
+            <a:xfrm>
+              <a:off x="3285225" y="4012723"/>
+              <a:ext cx="999227" cy="190554"/>
+            </a:xfrm>
+            <a:prstGeom prst="straightConnector1">
+              <a:avLst/>
+            </a:prstGeom>
+            <a:ln w="15875">
+              <a:tailEnd type="arrow"/>
+            </a:ln>
+          </p:spPr>
+          <p:style>
+            <a:lnRef idx="1">
+              <a:schemeClr val="accent1"/>
+            </a:lnRef>
+            <a:fillRef idx="0">
+              <a:schemeClr val="accent1"/>
+            </a:fillRef>
+            <a:effectRef idx="0">
+              <a:schemeClr val="accent1"/>
+            </a:effectRef>
+            <a:fontRef idx="minor">
+              <a:schemeClr val="tx1"/>
+            </a:fontRef>
+          </p:style>
+        </p:cxnSp>
+        <p:cxnSp>
+          <p:nvCxnSpPr>
+            <p:cNvPr id="51" name="Straight Arrow Connector 50"/>
+            <p:cNvCxnSpPr>
+              <a:endCxn id="33" idx="0"/>
+            </p:cNvCxnSpPr>
+            <p:nvPr/>
+          </p:nvCxnSpPr>
+          <p:spPr>
+            <a:xfrm rot="5400000">
+              <a:off x="3933960" y="3248159"/>
+              <a:ext cx="1295399" cy="285483"/>
+            </a:xfrm>
+            <a:prstGeom prst="straightConnector1">
+              <a:avLst/>
+            </a:prstGeom>
+            <a:ln w="15875">
+              <a:tailEnd type="arrow"/>
+            </a:ln>
+          </p:spPr>
+          <p:style>
+            <a:lnRef idx="1">
+              <a:schemeClr val="accent1"/>
+            </a:lnRef>
+            <a:fillRef idx="0">
+              <a:schemeClr val="accent1"/>
+            </a:fillRef>
+            <a:effectRef idx="0">
+              <a:schemeClr val="accent1"/>
+            </a:effectRef>
+            <a:fontRef idx="minor">
+              <a:schemeClr val="tx1"/>
+            </a:fontRef>
+          </p:style>
+        </p:cxnSp>
+        <p:cxnSp>
+          <p:nvCxnSpPr>
+            <p:cNvPr id="53" name="Straight Arrow Connector 52"/>
+            <p:cNvCxnSpPr/>
+            <p:nvPr/>
+          </p:nvCxnSpPr>
+          <p:spPr>
+            <a:xfrm rot="10800000">
+              <a:off x="4909870" y="2616678"/>
+              <a:ext cx="609600" cy="152400"/>
+            </a:xfrm>
+            <a:prstGeom prst="straightConnector1">
+              <a:avLst/>
+            </a:prstGeom>
+            <a:ln w="15875">
+              <a:tailEnd type="arrow"/>
+            </a:ln>
+          </p:spPr>
+          <p:style>
+            <a:lnRef idx="1">
+              <a:schemeClr val="accent1"/>
+            </a:lnRef>
+            <a:fillRef idx="0">
+              <a:schemeClr val="accent1"/>
+            </a:fillRef>
+            <a:effectRef idx="0">
+              <a:schemeClr val="accent1"/>
+            </a:effectRef>
+            <a:fontRef idx="minor">
+              <a:schemeClr val="tx1"/>
+            </a:fontRef>
+          </p:style>
+        </p:cxnSp>
+        <p:cxnSp>
+          <p:nvCxnSpPr>
+            <p:cNvPr id="55" name="Straight Arrow Connector 54"/>
+            <p:cNvCxnSpPr/>
+            <p:nvPr/>
+          </p:nvCxnSpPr>
+          <p:spPr>
+            <a:xfrm rot="16200000" flipH="1">
+              <a:off x="5715000" y="3048000"/>
+              <a:ext cx="533400" cy="381000"/>
+            </a:xfrm>
+            <a:prstGeom prst="straightConnector1">
+              <a:avLst/>
+            </a:prstGeom>
+            <a:ln w="15875">
+              <a:tailEnd type="arrow"/>
+            </a:ln>
+          </p:spPr>
+          <p:style>
+            <a:lnRef idx="1">
+              <a:schemeClr val="accent1"/>
+            </a:lnRef>
+            <a:fillRef idx="0">
+              <a:schemeClr val="accent1"/>
+            </a:fillRef>
+            <a:effectRef idx="0">
+              <a:schemeClr val="accent1"/>
+            </a:effectRef>
+            <a:fontRef idx="minor">
+              <a:schemeClr val="tx1"/>
+            </a:fontRef>
+          </p:style>
+        </p:cxnSp>
+        <p:cxnSp>
+          <p:nvCxnSpPr>
+            <p:cNvPr id="57" name="Straight Arrow Connector 56"/>
+            <p:cNvCxnSpPr/>
+            <p:nvPr/>
+          </p:nvCxnSpPr>
+          <p:spPr>
+            <a:xfrm rot="10800000" flipV="1">
+              <a:off x="5562601" y="3780471"/>
+              <a:ext cx="647167" cy="258129"/>
+            </a:xfrm>
+            <a:prstGeom prst="straightConnector1">
+              <a:avLst/>
+            </a:prstGeom>
+            <a:ln w="15875">
+              <a:tailEnd type="arrow"/>
+            </a:ln>
+          </p:spPr>
+          <p:style>
+            <a:lnRef idx="1">
+              <a:schemeClr val="accent1"/>
+            </a:lnRef>
+            <a:fillRef idx="0">
+              <a:schemeClr val="accent1"/>
+            </a:fillRef>
+            <a:effectRef idx="0">
+              <a:schemeClr val="accent1"/>
+            </a:effectRef>
+            <a:fontRef idx="minor">
+              <a:schemeClr val="tx1"/>
+            </a:fontRef>
+          </p:style>
+        </p:cxnSp>
+        <p:sp>
+          <p:nvSpPr>
+            <p:cNvPr id="60" name="TextBox 59"/>
+            <p:cNvSpPr txBox="1"/>
+            <p:nvPr/>
+          </p:nvSpPr>
+          <p:spPr>
+            <a:xfrm>
+              <a:off x="3124200" y="2286000"/>
+              <a:ext cx="263214" cy="276999"/>
+            </a:xfrm>
+            <a:prstGeom prst="rect">
+              <a:avLst/>
+            </a:prstGeom>
+            <a:noFill/>
+          </p:spPr>
+          <p:txBody>
+            <a:bodyPr wrap="none" rtlCol="0">
+              <a:spAutoFit/>
+            </a:bodyPr>
+            <a:lstStyle/>
+            <a:p>
+              <a:r>
+                <a:rPr lang="tr-TR" sz="1200" dirty="0" smtClean="0"/>
+                <a:t>8</a:t>
+              </a:r>
+              <a:endParaRPr lang="tr-TR" sz="1200" dirty="0"/>
+            </a:p>
+          </p:txBody>
+        </p:sp>
+        <p:sp>
+          <p:nvSpPr>
+            <p:cNvPr id="61" name="TextBox 60"/>
+            <p:cNvSpPr txBox="1"/>
+            <p:nvPr/>
+          </p:nvSpPr>
+          <p:spPr>
+            <a:xfrm>
+              <a:off x="4114800" y="2057400"/>
+              <a:ext cx="341760" cy="276999"/>
+            </a:xfrm>
+            <a:prstGeom prst="rect">
+              <a:avLst/>
+            </a:prstGeom>
+            <a:noFill/>
+          </p:spPr>
+          <p:txBody>
+            <a:bodyPr wrap="none" rtlCol="0">
+              <a:spAutoFit/>
+            </a:bodyPr>
+            <a:lstStyle/>
+            <a:p>
+              <a:r>
+                <a:rPr lang="tr-TR" sz="1200" dirty="0" smtClean="0"/>
+                <a:t>10</a:t>
+              </a:r>
+              <a:endParaRPr lang="tr-TR" sz="1200" dirty="0"/>
+            </a:p>
+          </p:txBody>
+        </p:sp>
+        <p:sp>
+          <p:nvSpPr>
+            <p:cNvPr id="62" name="TextBox 61"/>
+            <p:cNvSpPr txBox="1"/>
+            <p:nvPr/>
+          </p:nvSpPr>
+          <p:spPr>
+            <a:xfrm>
+              <a:off x="2784786" y="3228201"/>
+              <a:ext cx="263214" cy="276999"/>
+            </a:xfrm>
+            <a:prstGeom prst="rect">
+              <a:avLst/>
+            </a:prstGeom>
+            <a:noFill/>
+          </p:spPr>
+          <p:txBody>
+            <a:bodyPr wrap="none" rtlCol="0">
+              <a:spAutoFit/>
+            </a:bodyPr>
+            <a:lstStyle/>
+            <a:p>
+              <a:r>
+                <a:rPr lang="tr-TR" sz="1200" dirty="0" smtClean="0"/>
+                <a:t>1</a:t>
+              </a:r>
+              <a:endParaRPr lang="tr-TR" sz="1200" dirty="0"/>
+            </a:p>
+          </p:txBody>
+        </p:sp>
+        <p:sp>
+          <p:nvSpPr>
+            <p:cNvPr id="63" name="TextBox 62"/>
+            <p:cNvSpPr txBox="1"/>
+            <p:nvPr/>
+          </p:nvSpPr>
+          <p:spPr>
+            <a:xfrm>
+              <a:off x="3810000" y="2971800"/>
+              <a:ext cx="309700" cy="276999"/>
+            </a:xfrm>
+            <a:prstGeom prst="rect">
+              <a:avLst/>
+            </a:prstGeom>
+            <a:noFill/>
+          </p:spPr>
+          <p:txBody>
+            <a:bodyPr wrap="none" rtlCol="0">
+              <a:spAutoFit/>
+            </a:bodyPr>
+            <a:lstStyle/>
+            <a:p>
+              <a:r>
+                <a:rPr lang="tr-TR" sz="1200" dirty="0" smtClean="0"/>
+                <a:t>-4</a:t>
+              </a:r>
+              <a:endParaRPr lang="tr-TR" sz="1200" dirty="0"/>
+            </a:p>
+          </p:txBody>
+        </p:sp>
+        <p:sp>
+          <p:nvSpPr>
+            <p:cNvPr id="64" name="TextBox 63"/>
+            <p:cNvSpPr txBox="1"/>
+            <p:nvPr/>
+          </p:nvSpPr>
+          <p:spPr>
+            <a:xfrm>
+              <a:off x="4572000" y="3200400"/>
+              <a:ext cx="263214" cy="276999"/>
+            </a:xfrm>
+            <a:prstGeom prst="rect">
+              <a:avLst/>
+            </a:prstGeom>
+            <a:noFill/>
+          </p:spPr>
+          <p:txBody>
+            <a:bodyPr wrap="none" rtlCol="0">
+              <a:spAutoFit/>
+            </a:bodyPr>
+            <a:lstStyle/>
+            <a:p>
+              <a:r>
+                <a:rPr lang="tr-TR" sz="1200" dirty="0" smtClean="0"/>
+                <a:t>2</a:t>
+              </a:r>
+              <a:endParaRPr lang="tr-TR" sz="1200" dirty="0"/>
+            </a:p>
+          </p:txBody>
+        </p:sp>
+        <p:sp>
+          <p:nvSpPr>
+            <p:cNvPr id="65" name="TextBox 64"/>
+            <p:cNvSpPr txBox="1"/>
+            <p:nvPr/>
+          </p:nvSpPr>
+          <p:spPr>
+            <a:xfrm>
+              <a:off x="3581400" y="4038600"/>
+              <a:ext cx="309700" cy="276999"/>
+            </a:xfrm>
+            <a:prstGeom prst="rect">
+              <a:avLst/>
+            </a:prstGeom>
+            <a:noFill/>
+          </p:spPr>
+          <p:txBody>
+            <a:bodyPr wrap="none" rtlCol="0">
+              <a:spAutoFit/>
+            </a:bodyPr>
+            <a:lstStyle/>
+            <a:p>
+              <a:r>
+                <a:rPr lang="tr-TR" sz="1200" dirty="0" smtClean="0"/>
+                <a:t>-1</a:t>
+              </a:r>
+              <a:endParaRPr lang="tr-TR" sz="1200" dirty="0"/>
+            </a:p>
+          </p:txBody>
+        </p:sp>
+        <p:sp>
+          <p:nvSpPr>
+            <p:cNvPr id="66" name="TextBox 65"/>
+            <p:cNvSpPr txBox="1"/>
+            <p:nvPr/>
+          </p:nvSpPr>
+          <p:spPr>
+            <a:xfrm>
+              <a:off x="4800600" y="4114800"/>
+              <a:ext cx="309700" cy="276999"/>
+            </a:xfrm>
+            <a:prstGeom prst="rect">
+              <a:avLst/>
+            </a:prstGeom>
+            <a:noFill/>
+          </p:spPr>
+          <p:txBody>
+            <a:bodyPr wrap="none" rtlCol="0">
+              <a:spAutoFit/>
+            </a:bodyPr>
+            <a:lstStyle/>
+            <a:p>
+              <a:r>
+                <a:rPr lang="tr-TR" sz="1200" dirty="0" smtClean="0"/>
+                <a:t>-1</a:t>
+              </a:r>
+              <a:endParaRPr lang="tr-TR" sz="1200" dirty="0"/>
+            </a:p>
+          </p:txBody>
+        </p:sp>
+        <p:sp>
+          <p:nvSpPr>
+            <p:cNvPr id="67" name="TextBox 66"/>
+            <p:cNvSpPr txBox="1"/>
+            <p:nvPr/>
+          </p:nvSpPr>
+          <p:spPr>
+            <a:xfrm>
+              <a:off x="5867400" y="3886200"/>
+              <a:ext cx="263214" cy="276999"/>
+            </a:xfrm>
+            <a:prstGeom prst="rect">
+              <a:avLst/>
+            </a:prstGeom>
+            <a:noFill/>
+          </p:spPr>
+          <p:txBody>
+            <a:bodyPr wrap="none" rtlCol="0">
+              <a:spAutoFit/>
+            </a:bodyPr>
+            <a:lstStyle/>
+            <a:p>
+              <a:r>
+                <a:rPr lang="tr-TR" sz="1200" dirty="0" smtClean="0"/>
+                <a:t>3</a:t>
+              </a:r>
+              <a:endParaRPr lang="tr-TR" sz="1200" dirty="0"/>
+            </a:p>
+          </p:txBody>
+        </p:sp>
+        <p:sp>
+          <p:nvSpPr>
+            <p:cNvPr id="68" name="TextBox 67"/>
+            <p:cNvSpPr txBox="1"/>
+            <p:nvPr/>
+          </p:nvSpPr>
+          <p:spPr>
+            <a:xfrm>
+              <a:off x="5867400" y="2971800"/>
+              <a:ext cx="263214" cy="276999"/>
+            </a:xfrm>
+            <a:prstGeom prst="rect">
+              <a:avLst/>
+            </a:prstGeom>
+            <a:noFill/>
+          </p:spPr>
+          <p:txBody>
+            <a:bodyPr wrap="none" rtlCol="0">
+              <a:spAutoFit/>
+            </a:bodyPr>
+            <a:lstStyle/>
+            <a:p>
+              <a:r>
+                <a:rPr lang="tr-TR" sz="1200" dirty="0" smtClean="0"/>
+                <a:t>1</a:t>
+              </a:r>
+              <a:endParaRPr lang="tr-TR" sz="1200" dirty="0"/>
+            </a:p>
+          </p:txBody>
+        </p:sp>
+        <p:sp>
+          <p:nvSpPr>
+            <p:cNvPr id="69" name="TextBox 68"/>
+            <p:cNvSpPr txBox="1"/>
+            <p:nvPr/>
+          </p:nvSpPr>
+          <p:spPr>
+            <a:xfrm>
+              <a:off x="5105400" y="2438400"/>
+              <a:ext cx="263214" cy="276999"/>
+            </a:xfrm>
+            <a:prstGeom prst="rect">
+              <a:avLst/>
+            </a:prstGeom>
+            <a:noFill/>
+          </p:spPr>
+          <p:txBody>
+            <a:bodyPr wrap="none" rtlCol="0">
+              <a:spAutoFit/>
+            </a:bodyPr>
+            <a:lstStyle/>
+            <a:p>
+              <a:r>
+                <a:rPr lang="tr-TR" sz="1200" dirty="0" smtClean="0"/>
+                <a:t>1</a:t>
+              </a:r>
+              <a:endParaRPr lang="tr-TR" sz="1200" dirty="0"/>
+            </a:p>
+          </p:txBody>
+        </p:sp>
+        <p:cxnSp>
+          <p:nvCxnSpPr>
+            <p:cNvPr id="70" name="Straight Arrow Connector 69"/>
+            <p:cNvCxnSpPr>
+              <a:stCxn id="33" idx="7"/>
+              <a:endCxn id="27" idx="3"/>
+            </p:cNvCxnSpPr>
+            <p:nvPr/>
+          </p:nvCxnSpPr>
+          <p:spPr>
+            <a:xfrm rot="5400000" flipH="1" flipV="1">
+              <a:off x="4491359" y="3046551"/>
+              <a:ext cx="1114315" cy="976357"/>
+            </a:xfrm>
+            <a:prstGeom prst="straightConnector1">
+              <a:avLst/>
+            </a:prstGeom>
+            <a:ln w="15875">
+              <a:tailEnd type="arrow"/>
+            </a:ln>
+          </p:spPr>
+          <p:style>
+            <a:lnRef idx="1">
+              <a:schemeClr val="accent1"/>
+            </a:lnRef>
+            <a:fillRef idx="0">
+              <a:schemeClr val="accent1"/>
+            </a:fillRef>
+            <a:effectRef idx="0">
+              <a:schemeClr val="accent1"/>
+            </a:effectRef>
+            <a:fontRef idx="minor">
+              <a:schemeClr val="tx1"/>
+            </a:fontRef>
+          </p:style>
+        </p:cxnSp>
+        <p:sp>
+          <p:nvSpPr>
+            <p:cNvPr id="74" name="TextBox 73"/>
+            <p:cNvSpPr txBox="1"/>
+            <p:nvPr/>
+          </p:nvSpPr>
+          <p:spPr>
+            <a:xfrm>
+              <a:off x="5181600" y="3276600"/>
+              <a:ext cx="309700" cy="276999"/>
+            </a:xfrm>
+            <a:prstGeom prst="rect">
+              <a:avLst/>
+            </a:prstGeom>
+            <a:noFill/>
+          </p:spPr>
+          <p:txBody>
+            <a:bodyPr wrap="none" rtlCol="0">
+              <a:spAutoFit/>
+            </a:bodyPr>
+            <a:lstStyle/>
+            <a:p>
+              <a:r>
+                <a:rPr lang="tr-TR" sz="1200" dirty="0" smtClean="0"/>
+                <a:t>-2</a:t>
+              </a:r>
+              <a:endParaRPr lang="tr-TR" sz="1200" dirty="0"/>
+            </a:p>
+          </p:txBody>
+        </p:sp>
+      </p:grpSp>
+      <p:graphicFrame>
+        <p:nvGraphicFramePr>
+          <p:cNvPr id="76" name="Table 75"/>
+          <p:cNvGraphicFramePr>
+            <a:graphicFrameLocks noGrp="1"/>
+          </p:cNvGraphicFramePr>
+          <p:nvPr/>
+        </p:nvGraphicFramePr>
+        <p:xfrm>
+          <a:off x="4648200" y="1219200"/>
+          <a:ext cx="4241803" cy="3657600"/>
+        </p:xfrm>
+        <a:graphic>
+          <a:graphicData uri="http://schemas.openxmlformats.org/drawingml/2006/table">
+            <a:tbl>
+              <a:tblPr firstRow="1" bandRow="1">
+                <a:tableStyleId>{5C22544A-7EE6-4342-B048-85BDC9FD1C3A}</a:tableStyleId>
+              </a:tblPr>
+              <a:tblGrid>
+                <a:gridCol w="738505"/>
+                <a:gridCol w="350520"/>
+                <a:gridCol w="467043"/>
+                <a:gridCol w="467043"/>
+                <a:gridCol w="467043"/>
+                <a:gridCol w="467043"/>
+                <a:gridCol w="467043"/>
+                <a:gridCol w="467043"/>
+                <a:gridCol w="350520"/>
+              </a:tblGrid>
+              <a:tr h="307340">
+                <a:tc>
+                  <a:txBody>
+                    <a:bodyPr/>
+                    <a:lstStyle/>
+                    <a:p>
+                      <a:pPr algn="ctr"/>
+                      <a:endParaRPr lang="tr-TR" dirty="0"/>
+                    </a:p>
+                  </a:txBody>
+                  <a:tcPr/>
+                </a:tc>
+                <a:tc gridSpan="8">
+                  <a:txBody>
+                    <a:bodyPr/>
+                    <a:lstStyle/>
+                    <a:p>
+                      <a:pPr algn="ctr"/>
+                      <a:r>
+                        <a:rPr lang="tr-TR" b="1" dirty="0" smtClean="0"/>
+                        <a:t>Iteration</a:t>
+                      </a:r>
+                      <a:endParaRPr lang="tr-TR" b="1" dirty="0"/>
+                    </a:p>
+                  </a:txBody>
+                  <a:tcPr/>
+                </a:tc>
+                <a:tc hMerge="1">
+                  <a:txBody>
+                    <a:bodyPr/>
+                    <a:lstStyle/>
+                    <a:p>
+                      <a:endParaRPr lang="tr-TR" dirty="0"/>
+                    </a:p>
+                  </a:txBody>
+                  <a:tcPr/>
+                </a:tc>
+                <a:tc hMerge="1">
+                  <a:txBody>
+                    <a:bodyPr/>
+                    <a:lstStyle/>
+                    <a:p>
+                      <a:endParaRPr lang="tr-TR" dirty="0"/>
+                    </a:p>
+                  </a:txBody>
+                  <a:tcPr/>
+                </a:tc>
+                <a:tc hMerge="1">
+                  <a:txBody>
+                    <a:bodyPr/>
+                    <a:lstStyle/>
+                    <a:p>
+                      <a:endParaRPr lang="tr-TR" dirty="0"/>
+                    </a:p>
+                  </a:txBody>
+                  <a:tcPr/>
+                </a:tc>
+                <a:tc hMerge="1">
+                  <a:txBody>
+                    <a:bodyPr/>
+                    <a:lstStyle/>
+                    <a:p>
+                      <a:endParaRPr lang="tr-TR" dirty="0"/>
+                    </a:p>
+                  </a:txBody>
+                  <a:tcPr/>
+                </a:tc>
+                <a:tc hMerge="1">
+                  <a:txBody>
+                    <a:bodyPr/>
+                    <a:lstStyle/>
+                    <a:p>
+                      <a:endParaRPr lang="tr-TR" dirty="0"/>
+                    </a:p>
+                  </a:txBody>
+                  <a:tcPr/>
+                </a:tc>
+                <a:tc hMerge="1">
+                  <a:txBody>
+                    <a:bodyPr/>
+                    <a:lstStyle/>
+                    <a:p>
+                      <a:endParaRPr lang="tr-TR" dirty="0"/>
+                    </a:p>
+                  </a:txBody>
+                  <a:tcPr/>
+                </a:tc>
+                <a:tc hMerge="1">
+                  <a:txBody>
+                    <a:bodyPr/>
+                    <a:lstStyle/>
+                    <a:p>
+                      <a:endParaRPr lang="tr-TR" dirty="0"/>
+                    </a:p>
+                  </a:txBody>
+                  <a:tcPr/>
+                </a:tc>
+              </a:tr>
+              <a:tr h="307340">
+                <a:tc>
+                  <a:txBody>
+                    <a:bodyPr/>
+                    <a:lstStyle/>
+                    <a:p>
+                      <a:pPr algn="ctr"/>
+                      <a:r>
+                        <a:rPr lang="tr-TR" b="1" dirty="0" smtClean="0"/>
+                        <a:t>Node</a:t>
+                      </a:r>
+                      <a:endParaRPr lang="tr-TR" b="1" dirty="0"/>
+                    </a:p>
+                  </a:txBody>
+                  <a:tcPr/>
+                </a:tc>
+                <a:tc>
+                  <a:txBody>
+                    <a:bodyPr/>
+                    <a:lstStyle/>
+                    <a:p>
+                      <a:pPr algn="ctr"/>
+                      <a:r>
+                        <a:rPr lang="tr-TR" dirty="0" smtClean="0"/>
+                        <a:t>0</a:t>
+                      </a:r>
+                      <a:endParaRPr lang="tr-TR" dirty="0"/>
+                    </a:p>
+                  </a:txBody>
+                  <a:tcPr/>
+                </a:tc>
+                <a:tc>
+                  <a:txBody>
+                    <a:bodyPr/>
+                    <a:lstStyle/>
+                    <a:p>
+                      <a:pPr algn="ctr"/>
+                      <a:r>
+                        <a:rPr lang="tr-TR" dirty="0" smtClean="0"/>
+                        <a:t>1</a:t>
+                      </a:r>
+                      <a:endParaRPr lang="tr-TR" dirty="0"/>
+                    </a:p>
+                  </a:txBody>
+                  <a:tcPr/>
+                </a:tc>
+                <a:tc>
+                  <a:txBody>
+                    <a:bodyPr/>
+                    <a:lstStyle/>
+                    <a:p>
+                      <a:pPr algn="ctr"/>
+                      <a:r>
+                        <a:rPr lang="tr-TR" dirty="0" smtClean="0"/>
+                        <a:t>2</a:t>
+                      </a:r>
+                      <a:endParaRPr lang="tr-TR" dirty="0"/>
+                    </a:p>
+                  </a:txBody>
+                  <a:tcPr/>
+                </a:tc>
+                <a:tc>
+                  <a:txBody>
+                    <a:bodyPr/>
+                    <a:lstStyle/>
+                    <a:p>
+                      <a:pPr algn="ctr"/>
+                      <a:r>
+                        <a:rPr lang="tr-TR" dirty="0" smtClean="0"/>
+                        <a:t>3</a:t>
+                      </a:r>
+                      <a:endParaRPr lang="tr-TR" dirty="0"/>
+                    </a:p>
+                  </a:txBody>
+                  <a:tcPr/>
+                </a:tc>
+                <a:tc>
+                  <a:txBody>
+                    <a:bodyPr/>
+                    <a:lstStyle/>
+                    <a:p>
+                      <a:pPr algn="ctr"/>
+                      <a:r>
+                        <a:rPr lang="tr-TR" dirty="0" smtClean="0"/>
+                        <a:t>4</a:t>
+                      </a:r>
+                      <a:endParaRPr lang="tr-TR" dirty="0"/>
+                    </a:p>
+                  </a:txBody>
+                  <a:tcPr/>
+                </a:tc>
+                <a:tc>
+                  <a:txBody>
+                    <a:bodyPr/>
+                    <a:lstStyle/>
+                    <a:p>
+                      <a:pPr algn="ctr"/>
+                      <a:r>
+                        <a:rPr lang="tr-TR" dirty="0" smtClean="0"/>
+                        <a:t>5</a:t>
+                      </a:r>
+                      <a:endParaRPr lang="tr-TR" dirty="0"/>
+                    </a:p>
+                  </a:txBody>
+                  <a:tcPr/>
+                </a:tc>
+                <a:tc>
+                  <a:txBody>
+                    <a:bodyPr/>
+                    <a:lstStyle/>
+                    <a:p>
+                      <a:pPr algn="ctr"/>
+                      <a:r>
+                        <a:rPr lang="tr-TR" dirty="0" smtClean="0"/>
+                        <a:t>6</a:t>
+                      </a:r>
+                      <a:endParaRPr lang="tr-TR" dirty="0"/>
+                    </a:p>
+                  </a:txBody>
+                  <a:tcPr/>
+                </a:tc>
+                <a:tc>
+                  <a:txBody>
+                    <a:bodyPr/>
+                    <a:lstStyle/>
+                    <a:p>
+                      <a:pPr algn="ctr"/>
+                      <a:r>
+                        <a:rPr lang="tr-TR" dirty="0" smtClean="0"/>
+                        <a:t>7</a:t>
+                      </a:r>
+                      <a:endParaRPr lang="tr-TR" dirty="0"/>
+                    </a:p>
+                  </a:txBody>
+                  <a:tcPr/>
+                </a:tc>
+              </a:tr>
+              <a:tr h="307340">
+                <a:tc>
+                  <a:txBody>
+                    <a:bodyPr/>
+                    <a:lstStyle/>
+                    <a:p>
+                      <a:pPr algn="ctr"/>
+                      <a:r>
+                        <a:rPr lang="tr-TR" b="1" dirty="0" smtClean="0"/>
+                        <a:t>S</a:t>
+                      </a:r>
+                      <a:endParaRPr lang="tr-TR" b="1" dirty="0"/>
+                    </a:p>
+                  </a:txBody>
+                  <a:tcPr/>
+                </a:tc>
+                <a:tc>
+                  <a:txBody>
+                    <a:bodyPr/>
+                    <a:lstStyle/>
+                    <a:p>
+                      <a:pPr algn="ctr"/>
+                      <a:r>
+                        <a:rPr lang="tr-TR" dirty="0" smtClean="0"/>
+                        <a:t>0</a:t>
+                      </a:r>
+                      <a:endParaRPr lang="tr-TR" dirty="0"/>
+                    </a:p>
+                  </a:txBody>
+                  <a:tcPr/>
+                </a:tc>
+                <a:tc>
+                  <a:txBody>
+                    <a:bodyPr/>
+                    <a:lstStyle/>
+                    <a:p>
+                      <a:pPr algn="ctr"/>
+                      <a:r>
+                        <a:rPr lang="tr-TR" dirty="0" smtClean="0"/>
+                        <a:t>0</a:t>
+                      </a:r>
+                      <a:endParaRPr lang="tr-TR" dirty="0"/>
+                    </a:p>
+                  </a:txBody>
+                  <a:tcPr/>
+                </a:tc>
+                <a:tc>
+                  <a:txBody>
+                    <a:bodyPr/>
+                    <a:lstStyle/>
+                    <a:p>
+                      <a:pPr algn="ctr"/>
+                      <a:r>
+                        <a:rPr lang="tr-TR" dirty="0" smtClean="0"/>
+                        <a:t>0</a:t>
+                      </a:r>
+                      <a:endParaRPr lang="tr-TR" dirty="0"/>
+                    </a:p>
+                  </a:txBody>
+                  <a:tcPr/>
+                </a:tc>
+                <a:tc>
+                  <a:txBody>
+                    <a:bodyPr/>
+                    <a:lstStyle/>
+                    <a:p>
+                      <a:pPr algn="ctr"/>
+                      <a:r>
+                        <a:rPr lang="tr-TR" dirty="0" smtClean="0"/>
+                        <a:t>0</a:t>
+                      </a:r>
+                      <a:endParaRPr lang="tr-TR" dirty="0"/>
+                    </a:p>
+                  </a:txBody>
+                  <a:tcPr/>
+                </a:tc>
+                <a:tc>
+                  <a:txBody>
+                    <a:bodyPr/>
+                    <a:lstStyle/>
+                    <a:p>
+                      <a:pPr algn="ctr"/>
+                      <a:r>
+                        <a:rPr lang="tr-TR" dirty="0" smtClean="0"/>
+                        <a:t>0</a:t>
+                      </a:r>
+                      <a:endParaRPr lang="tr-TR" dirty="0"/>
+                    </a:p>
+                  </a:txBody>
+                  <a:tcPr/>
+                </a:tc>
+                <a:tc>
+                  <a:txBody>
+                    <a:bodyPr/>
+                    <a:lstStyle/>
+                    <a:p>
+                      <a:pPr algn="ctr"/>
+                      <a:r>
+                        <a:rPr lang="tr-TR" dirty="0" smtClean="0"/>
+                        <a:t>0</a:t>
+                      </a:r>
+                      <a:endParaRPr lang="tr-TR" dirty="0"/>
+                    </a:p>
+                  </a:txBody>
+                  <a:tcPr/>
+                </a:tc>
+                <a:tc>
+                  <a:txBody>
+                    <a:bodyPr/>
+                    <a:lstStyle/>
+                    <a:p>
+                      <a:pPr algn="ctr"/>
+                      <a:r>
+                        <a:rPr lang="tr-TR" dirty="0" smtClean="0"/>
+                        <a:t>0</a:t>
+                      </a:r>
+                      <a:endParaRPr lang="tr-TR" dirty="0"/>
+                    </a:p>
+                  </a:txBody>
+                  <a:tcPr/>
+                </a:tc>
+                <a:tc>
+                  <a:txBody>
+                    <a:bodyPr/>
+                    <a:lstStyle/>
+                    <a:p>
+                      <a:pPr algn="ctr"/>
+                      <a:r>
+                        <a:rPr lang="tr-TR" dirty="0" smtClean="0"/>
+                        <a:t>0</a:t>
+                      </a:r>
+                      <a:endParaRPr lang="tr-TR" dirty="0"/>
+                    </a:p>
+                  </a:txBody>
+                  <a:tcPr/>
+                </a:tc>
+              </a:tr>
+              <a:tr h="307340">
+                <a:tc>
+                  <a:txBody>
+                    <a:bodyPr/>
+                    <a:lstStyle/>
+                    <a:p>
+                      <a:pPr algn="ctr"/>
+                      <a:r>
+                        <a:rPr lang="tr-TR" b="1" dirty="0" smtClean="0"/>
+                        <a:t>A</a:t>
+                      </a:r>
+                      <a:endParaRPr lang="tr-TR" b="1" dirty="0"/>
+                    </a:p>
+                  </a:txBody>
+                  <a:tcPr/>
+                </a:tc>
+                <a:tc>
+                  <a:txBody>
+                    <a:bodyPr/>
+                    <a:lstStyle/>
+                    <a:p>
+                      <a:pPr algn="ctr"/>
+                      <a:r>
+                        <a:rPr lang="tr-TR" sz="1800" b="0" i="0" kern="1200" dirty="0" smtClean="0">
+                          <a:solidFill>
+                            <a:schemeClr val="dk1"/>
+                          </a:solidFill>
+                          <a:latin typeface="+mn-lt"/>
+                          <a:ea typeface="+mn-ea"/>
+                          <a:cs typeface="+mn-cs"/>
+                        </a:rPr>
+                        <a:t>∞</a:t>
+                      </a:r>
+                      <a:endParaRPr lang="tr-TR" dirty="0"/>
+                    </a:p>
+                  </a:txBody>
+                  <a:tcPr/>
+                </a:tc>
+                <a:tc>
+                  <a:txBody>
+                    <a:bodyPr/>
+                    <a:lstStyle/>
+                    <a:p>
+                      <a:pPr algn="ctr"/>
+                      <a:r>
+                        <a:rPr lang="tr-TR" dirty="0" smtClean="0"/>
+                        <a:t>10</a:t>
+                      </a:r>
+                      <a:endParaRPr lang="tr-TR" dirty="0"/>
+                    </a:p>
+                  </a:txBody>
+                  <a:tcPr/>
+                </a:tc>
+                <a:tc>
+                  <a:txBody>
+                    <a:bodyPr/>
+                    <a:lstStyle/>
+                    <a:p>
+                      <a:pPr algn="ctr"/>
+                      <a:r>
+                        <a:rPr lang="tr-TR" dirty="0" smtClean="0"/>
+                        <a:t>10</a:t>
+                      </a:r>
+                      <a:endParaRPr lang="tr-TR" dirty="0"/>
+                    </a:p>
+                  </a:txBody>
+                  <a:tcPr/>
+                </a:tc>
+                <a:tc>
+                  <a:txBody>
+                    <a:bodyPr/>
+                    <a:lstStyle/>
+                    <a:p>
+                      <a:pPr algn="ctr"/>
+                      <a:r>
+                        <a:rPr lang="tr-TR" dirty="0" smtClean="0"/>
+                        <a:t>5</a:t>
+                      </a:r>
+                      <a:endParaRPr lang="tr-TR" dirty="0"/>
+                    </a:p>
+                  </a:txBody>
+                  <a:tcPr/>
+                </a:tc>
+                <a:tc>
+                  <a:txBody>
+                    <a:bodyPr/>
+                    <a:lstStyle/>
+                    <a:p>
+                      <a:pPr algn="ctr"/>
+                      <a:r>
+                        <a:rPr lang="tr-TR" dirty="0" smtClean="0"/>
+                        <a:t>5</a:t>
+                      </a:r>
+                      <a:endParaRPr lang="tr-TR" dirty="0"/>
+                    </a:p>
+                  </a:txBody>
+                  <a:tcPr/>
+                </a:tc>
+                <a:tc>
+                  <a:txBody>
+                    <a:bodyPr/>
+                    <a:lstStyle/>
+                    <a:p>
+                      <a:pPr algn="ctr"/>
+                      <a:r>
+                        <a:rPr lang="tr-TR" dirty="0" smtClean="0"/>
+                        <a:t>5</a:t>
+                      </a:r>
+                      <a:endParaRPr lang="tr-TR" dirty="0"/>
+                    </a:p>
+                  </a:txBody>
+                  <a:tcPr/>
+                </a:tc>
+                <a:tc>
+                  <a:txBody>
+                    <a:bodyPr/>
+                    <a:lstStyle/>
+                    <a:p>
+                      <a:pPr algn="ctr"/>
+                      <a:r>
+                        <a:rPr lang="tr-TR" dirty="0" smtClean="0"/>
+                        <a:t>5</a:t>
+                      </a:r>
+                      <a:endParaRPr lang="tr-TR" dirty="0"/>
+                    </a:p>
+                  </a:txBody>
+                  <a:tcPr/>
+                </a:tc>
+                <a:tc>
+                  <a:txBody>
+                    <a:bodyPr/>
+                    <a:lstStyle/>
+                    <a:p>
+                      <a:pPr algn="ctr"/>
+                      <a:r>
+                        <a:rPr lang="tr-TR" dirty="0" smtClean="0"/>
+                        <a:t>5</a:t>
+                      </a:r>
+                      <a:endParaRPr lang="tr-TR" dirty="0"/>
+                    </a:p>
+                  </a:txBody>
+                  <a:tcPr/>
+                </a:tc>
+              </a:tr>
+              <a:tr h="307340">
+                <a:tc>
+                  <a:txBody>
+                    <a:bodyPr/>
+                    <a:lstStyle/>
+                    <a:p>
+                      <a:pPr algn="ctr"/>
+                      <a:r>
+                        <a:rPr lang="tr-TR" b="1" dirty="0" smtClean="0"/>
+                        <a:t>B</a:t>
+                      </a:r>
+                      <a:endParaRPr lang="tr-TR" b="1" dirty="0"/>
+                    </a:p>
+                  </a:txBody>
+                  <a:tcPr/>
+                </a:tc>
+                <a:tc>
+                  <a:txBody>
+                    <a:bodyPr/>
+                    <a:lstStyle/>
+                    <a:p>
+                      <a:pPr algn="ctr"/>
+                      <a:r>
+                        <a:rPr lang="tr-TR" sz="1800" b="0" i="0" kern="1200" dirty="0" smtClean="0">
+                          <a:solidFill>
+                            <a:schemeClr val="dk1"/>
+                          </a:solidFill>
+                          <a:latin typeface="+mn-lt"/>
+                          <a:ea typeface="+mn-ea"/>
+                          <a:cs typeface="+mn-cs"/>
+                        </a:rPr>
+                        <a:t>∞</a:t>
+                      </a:r>
+                      <a:endParaRPr lang="tr-TR" dirty="0"/>
+                    </a:p>
+                  </a:txBody>
+                  <a:tcPr/>
+                </a:tc>
+                <a:tc>
+                  <a:txBody>
+                    <a:bodyPr/>
+                    <a:lstStyle/>
+                    <a:p>
+                      <a:pPr algn="ctr"/>
+                      <a:r>
+                        <a:rPr lang="tr-TR" sz="1800" b="0" i="0" kern="1200" dirty="0" smtClean="0">
+                          <a:solidFill>
+                            <a:schemeClr val="dk1"/>
+                          </a:solidFill>
+                          <a:latin typeface="+mn-lt"/>
+                          <a:ea typeface="+mn-ea"/>
+                          <a:cs typeface="+mn-cs"/>
+                        </a:rPr>
+                        <a:t>∞</a:t>
+                      </a:r>
+                      <a:endParaRPr lang="tr-TR" dirty="0"/>
+                    </a:p>
+                  </a:txBody>
+                  <a:tcPr/>
+                </a:tc>
+                <a:tc>
+                  <a:txBody>
+                    <a:bodyPr/>
+                    <a:lstStyle/>
+                    <a:p>
+                      <a:pPr algn="ctr"/>
+                      <a:r>
+                        <a:rPr lang="tr-TR" sz="1800" b="0" i="0" kern="1200" dirty="0" smtClean="0">
+                          <a:solidFill>
+                            <a:schemeClr val="dk1"/>
+                          </a:solidFill>
+                          <a:latin typeface="+mn-lt"/>
+                          <a:ea typeface="+mn-ea"/>
+                          <a:cs typeface="+mn-cs"/>
+                        </a:rPr>
+                        <a:t>∞</a:t>
+                      </a:r>
+                      <a:endParaRPr lang="tr-TR" dirty="0"/>
+                    </a:p>
+                  </a:txBody>
+                  <a:tcPr/>
+                </a:tc>
+                <a:tc>
+                  <a:txBody>
+                    <a:bodyPr/>
+                    <a:lstStyle/>
+                    <a:p>
+                      <a:pPr algn="ctr"/>
+                      <a:r>
+                        <a:rPr lang="tr-TR" dirty="0" smtClean="0"/>
+                        <a:t>10</a:t>
+                      </a:r>
+                      <a:endParaRPr lang="tr-TR" dirty="0"/>
+                    </a:p>
+                  </a:txBody>
+                  <a:tcPr/>
+                </a:tc>
+                <a:tc>
+                  <a:txBody>
+                    <a:bodyPr/>
+                    <a:lstStyle/>
+                    <a:p>
+                      <a:pPr algn="ctr"/>
+                      <a:r>
+                        <a:rPr lang="tr-TR" dirty="0" smtClean="0"/>
+                        <a:t>6</a:t>
+                      </a:r>
+                      <a:endParaRPr lang="tr-TR" dirty="0"/>
+                    </a:p>
+                  </a:txBody>
+                  <a:tcPr/>
+                </a:tc>
+                <a:tc>
+                  <a:txBody>
+                    <a:bodyPr/>
+                    <a:lstStyle/>
+                    <a:p>
+                      <a:pPr algn="ctr"/>
+                      <a:r>
+                        <a:rPr lang="tr-TR" dirty="0" smtClean="0"/>
+                        <a:t>5</a:t>
+                      </a:r>
+                      <a:endParaRPr lang="tr-TR" dirty="0"/>
+                    </a:p>
+                  </a:txBody>
+                  <a:tcPr/>
+                </a:tc>
+                <a:tc>
+                  <a:txBody>
+                    <a:bodyPr/>
+                    <a:lstStyle/>
+                    <a:p>
+                      <a:pPr algn="ctr"/>
+                      <a:r>
+                        <a:rPr lang="tr-TR" dirty="0" smtClean="0"/>
+                        <a:t>5</a:t>
+                      </a:r>
+                      <a:endParaRPr lang="tr-TR" dirty="0"/>
+                    </a:p>
+                  </a:txBody>
+                  <a:tcPr/>
+                </a:tc>
+                <a:tc>
+                  <a:txBody>
+                    <a:bodyPr/>
+                    <a:lstStyle/>
+                    <a:p>
+                      <a:pPr algn="ctr"/>
+                      <a:r>
+                        <a:rPr lang="tr-TR" dirty="0" smtClean="0"/>
+                        <a:t>5</a:t>
+                      </a:r>
+                      <a:endParaRPr lang="tr-TR" dirty="0"/>
+                    </a:p>
+                  </a:txBody>
+                  <a:tcPr/>
+                </a:tc>
+              </a:tr>
+              <a:tr h="307340">
+                <a:tc>
+                  <a:txBody>
+                    <a:bodyPr/>
+                    <a:lstStyle/>
+                    <a:p>
+                      <a:pPr algn="ctr"/>
+                      <a:r>
+                        <a:rPr lang="tr-TR" b="1" dirty="0" smtClean="0"/>
+                        <a:t>C</a:t>
+                      </a:r>
+                      <a:endParaRPr lang="tr-TR" b="1" dirty="0"/>
+                    </a:p>
+                  </a:txBody>
+                  <a:tcPr/>
+                </a:tc>
+                <a:tc>
+                  <a:txBody>
+                    <a:bodyPr/>
+                    <a:lstStyle/>
+                    <a:p>
+                      <a:pPr algn="ctr"/>
+                      <a:r>
+                        <a:rPr lang="tr-TR" sz="1800" b="0" i="0" kern="1200" dirty="0" smtClean="0">
+                          <a:solidFill>
+                            <a:schemeClr val="dk1"/>
+                          </a:solidFill>
+                          <a:latin typeface="+mn-lt"/>
+                          <a:ea typeface="+mn-ea"/>
+                          <a:cs typeface="+mn-cs"/>
+                        </a:rPr>
+                        <a:t>∞</a:t>
+                      </a:r>
+                      <a:endParaRPr lang="tr-TR" dirty="0"/>
+                    </a:p>
+                  </a:txBody>
+                  <a:tcPr/>
+                </a:tc>
+                <a:tc>
+                  <a:txBody>
+                    <a:bodyPr/>
+                    <a:lstStyle/>
+                    <a:p>
+                      <a:pPr algn="ctr"/>
+                      <a:r>
+                        <a:rPr lang="tr-TR" sz="1800" b="0" i="0" kern="1200" dirty="0" smtClean="0">
+                          <a:solidFill>
+                            <a:schemeClr val="dk1"/>
+                          </a:solidFill>
+                          <a:latin typeface="+mn-lt"/>
+                          <a:ea typeface="+mn-ea"/>
+                          <a:cs typeface="+mn-cs"/>
+                        </a:rPr>
+                        <a:t>∞</a:t>
+                      </a:r>
+                      <a:endParaRPr lang="tr-TR" dirty="0"/>
+                    </a:p>
+                  </a:txBody>
+                  <a:tcPr/>
+                </a:tc>
+                <a:tc>
+                  <a:txBody>
+                    <a:bodyPr/>
+                    <a:lstStyle/>
+                    <a:p>
+                      <a:pPr algn="ctr"/>
+                      <a:r>
+                        <a:rPr lang="tr-TR" sz="1800" b="0" i="0" kern="1200" dirty="0" smtClean="0">
+                          <a:solidFill>
+                            <a:schemeClr val="dk1"/>
+                          </a:solidFill>
+                          <a:latin typeface="+mn-lt"/>
+                          <a:ea typeface="+mn-ea"/>
+                          <a:cs typeface="+mn-cs"/>
+                        </a:rPr>
+                        <a:t>∞</a:t>
+                      </a:r>
+                      <a:endParaRPr lang="tr-TR" dirty="0"/>
+                    </a:p>
+                  </a:txBody>
+                  <a:tcPr/>
+                </a:tc>
+                <a:tc>
+                  <a:txBody>
+                    <a:bodyPr/>
+                    <a:lstStyle/>
+                    <a:p>
+                      <a:pPr algn="ctr"/>
+                      <a:r>
+                        <a:rPr lang="tr-TR" sz="1800" b="0" i="0" kern="1200" dirty="0" smtClean="0">
+                          <a:solidFill>
+                            <a:schemeClr val="dk1"/>
+                          </a:solidFill>
+                          <a:latin typeface="+mn-lt"/>
+                          <a:ea typeface="+mn-ea"/>
+                          <a:cs typeface="+mn-cs"/>
+                        </a:rPr>
+                        <a:t>∞</a:t>
+                      </a:r>
+                      <a:endParaRPr lang="tr-TR" dirty="0"/>
+                    </a:p>
+                  </a:txBody>
+                  <a:tcPr/>
+                </a:tc>
+                <a:tc>
+                  <a:txBody>
+                    <a:bodyPr/>
+                    <a:lstStyle/>
+                    <a:p>
+                      <a:pPr algn="ctr"/>
+                      <a:r>
+                        <a:rPr lang="tr-TR" dirty="0" smtClean="0"/>
+                        <a:t>11</a:t>
+                      </a:r>
+                      <a:endParaRPr lang="tr-TR" dirty="0"/>
+                    </a:p>
+                  </a:txBody>
+                  <a:tcPr/>
+                </a:tc>
+                <a:tc>
+                  <a:txBody>
+                    <a:bodyPr/>
+                    <a:lstStyle/>
+                    <a:p>
+                      <a:pPr algn="ctr"/>
+                      <a:r>
+                        <a:rPr lang="tr-TR" dirty="0" smtClean="0"/>
+                        <a:t>7</a:t>
+                      </a:r>
+                      <a:endParaRPr lang="tr-TR" dirty="0"/>
+                    </a:p>
+                  </a:txBody>
+                  <a:tcPr/>
+                </a:tc>
+                <a:tc>
+                  <a:txBody>
+                    <a:bodyPr/>
+                    <a:lstStyle/>
+                    <a:p>
+                      <a:pPr algn="ctr"/>
+                      <a:r>
+                        <a:rPr lang="tr-TR" dirty="0" smtClean="0"/>
+                        <a:t>6</a:t>
+                      </a:r>
+                      <a:endParaRPr lang="tr-TR" dirty="0"/>
+                    </a:p>
+                  </a:txBody>
+                  <a:tcPr/>
+                </a:tc>
+                <a:tc>
+                  <a:txBody>
+                    <a:bodyPr/>
+                    <a:lstStyle/>
+                    <a:p>
+                      <a:pPr algn="ctr"/>
+                      <a:r>
+                        <a:rPr lang="tr-TR" dirty="0" smtClean="0"/>
+                        <a:t>6</a:t>
+                      </a:r>
+                      <a:endParaRPr lang="tr-TR" dirty="0"/>
+                    </a:p>
+                  </a:txBody>
+                  <a:tcPr/>
+                </a:tc>
+              </a:tr>
+              <a:tr h="307340">
+                <a:tc>
+                  <a:txBody>
+                    <a:bodyPr/>
+                    <a:lstStyle/>
+                    <a:p>
+                      <a:pPr algn="ctr"/>
+                      <a:r>
+                        <a:rPr lang="tr-TR" b="1" dirty="0" smtClean="0"/>
+                        <a:t>D</a:t>
+                      </a:r>
+                      <a:endParaRPr lang="tr-TR" b="1" dirty="0"/>
+                    </a:p>
+                  </a:txBody>
+                  <a:tcPr/>
+                </a:tc>
+                <a:tc>
+                  <a:txBody>
+                    <a:bodyPr/>
+                    <a:lstStyle/>
+                    <a:p>
+                      <a:pPr algn="ctr"/>
+                      <a:r>
+                        <a:rPr lang="tr-TR" sz="1800" b="0" i="0" kern="1200" dirty="0" smtClean="0">
+                          <a:solidFill>
+                            <a:schemeClr val="dk1"/>
+                          </a:solidFill>
+                          <a:latin typeface="+mn-lt"/>
+                          <a:ea typeface="+mn-ea"/>
+                          <a:cs typeface="+mn-cs"/>
+                        </a:rPr>
+                        <a:t>∞</a:t>
+                      </a:r>
+                      <a:endParaRPr lang="tr-TR" dirty="0"/>
+                    </a:p>
+                  </a:txBody>
+                  <a:tcPr/>
+                </a:tc>
+                <a:tc>
+                  <a:txBody>
+                    <a:bodyPr/>
+                    <a:lstStyle/>
+                    <a:p>
+                      <a:pPr algn="ctr"/>
+                      <a:r>
+                        <a:rPr lang="tr-TR" sz="1800" b="0" i="0" kern="1200" dirty="0" smtClean="0">
+                          <a:solidFill>
+                            <a:schemeClr val="dk1"/>
+                          </a:solidFill>
+                          <a:latin typeface="+mn-lt"/>
+                          <a:ea typeface="+mn-ea"/>
+                          <a:cs typeface="+mn-cs"/>
+                        </a:rPr>
+                        <a:t>∞</a:t>
+                      </a:r>
+                      <a:endParaRPr lang="tr-TR" dirty="0"/>
+                    </a:p>
+                  </a:txBody>
+                  <a:tcPr/>
+                </a:tc>
+                <a:tc>
+                  <a:txBody>
+                    <a:bodyPr/>
+                    <a:lstStyle/>
+                    <a:p>
+                      <a:pPr algn="ctr"/>
+                      <a:r>
+                        <a:rPr lang="tr-TR" sz="1800" b="0" i="0" kern="1200" dirty="0" smtClean="0">
+                          <a:solidFill>
+                            <a:schemeClr val="dk1"/>
+                          </a:solidFill>
+                          <a:latin typeface="+mn-lt"/>
+                          <a:ea typeface="+mn-ea"/>
+                          <a:cs typeface="+mn-cs"/>
+                        </a:rPr>
+                        <a:t>∞</a:t>
+                      </a:r>
+                      <a:endParaRPr lang="tr-TR" dirty="0"/>
+                    </a:p>
+                  </a:txBody>
+                  <a:tcPr/>
+                </a:tc>
+                <a:tc>
+                  <a:txBody>
+                    <a:bodyPr/>
+                    <a:lstStyle/>
+                    <a:p>
+                      <a:pPr algn="ctr"/>
+                      <a:r>
+                        <a:rPr lang="tr-TR" sz="1800" b="0" i="0" kern="1200" dirty="0" smtClean="0">
+                          <a:solidFill>
+                            <a:schemeClr val="dk1"/>
+                          </a:solidFill>
+                          <a:latin typeface="+mn-lt"/>
+                          <a:ea typeface="+mn-ea"/>
+                          <a:cs typeface="+mn-cs"/>
+                        </a:rPr>
+                        <a:t>∞</a:t>
+                      </a:r>
+                      <a:endParaRPr lang="tr-TR" dirty="0"/>
+                    </a:p>
+                  </a:txBody>
+                  <a:tcPr/>
+                </a:tc>
+                <a:tc>
+                  <a:txBody>
+                    <a:bodyPr/>
+                    <a:lstStyle/>
+                    <a:p>
+                      <a:pPr algn="ctr"/>
+                      <a:r>
+                        <a:rPr lang="tr-TR" sz="1800" b="0" i="0" kern="1200" dirty="0" smtClean="0">
+                          <a:solidFill>
+                            <a:schemeClr val="dk1"/>
+                          </a:solidFill>
+                          <a:latin typeface="+mn-lt"/>
+                          <a:ea typeface="+mn-ea"/>
+                          <a:cs typeface="+mn-cs"/>
+                        </a:rPr>
+                        <a:t>∞</a:t>
+                      </a:r>
+                      <a:endParaRPr lang="tr-TR" dirty="0"/>
+                    </a:p>
+                  </a:txBody>
+                  <a:tcPr/>
+                </a:tc>
+                <a:tc>
+                  <a:txBody>
+                    <a:bodyPr/>
+                    <a:lstStyle/>
+                    <a:p>
+                      <a:pPr algn="ctr"/>
+                      <a:r>
+                        <a:rPr lang="tr-TR" dirty="0" smtClean="0"/>
+                        <a:t>14</a:t>
+                      </a:r>
+                      <a:endParaRPr lang="tr-TR" dirty="0"/>
+                    </a:p>
+                  </a:txBody>
+                  <a:tcPr/>
+                </a:tc>
+                <a:tc>
+                  <a:txBody>
+                    <a:bodyPr/>
+                    <a:lstStyle/>
+                    <a:p>
+                      <a:pPr algn="ctr"/>
+                      <a:r>
+                        <a:rPr lang="tr-TR" dirty="0" smtClean="0"/>
+                        <a:t>10</a:t>
+                      </a:r>
+                      <a:endParaRPr lang="tr-TR" dirty="0"/>
+                    </a:p>
+                  </a:txBody>
+                  <a:tcPr/>
+                </a:tc>
+                <a:tc>
+                  <a:txBody>
+                    <a:bodyPr/>
+                    <a:lstStyle/>
+                    <a:p>
+                      <a:pPr algn="ctr"/>
+                      <a:r>
+                        <a:rPr lang="tr-TR" dirty="0" smtClean="0"/>
+                        <a:t>9</a:t>
+                      </a:r>
+                      <a:endParaRPr lang="tr-TR" dirty="0"/>
+                    </a:p>
+                  </a:txBody>
+                  <a:tcPr/>
+                </a:tc>
+              </a:tr>
+              <a:tr h="307340">
+                <a:tc>
+                  <a:txBody>
+                    <a:bodyPr/>
+                    <a:lstStyle/>
+                    <a:p>
+                      <a:pPr algn="ctr"/>
+                      <a:r>
+                        <a:rPr lang="tr-TR" b="1" dirty="0" smtClean="0"/>
+                        <a:t>E</a:t>
+                      </a:r>
+                      <a:endParaRPr lang="tr-TR" b="1" dirty="0"/>
+                    </a:p>
+                  </a:txBody>
+                  <a:tcPr/>
+                </a:tc>
+                <a:tc>
+                  <a:txBody>
+                    <a:bodyPr/>
+                    <a:lstStyle/>
+                    <a:p>
+                      <a:pPr algn="ctr"/>
+                      <a:r>
+                        <a:rPr lang="tr-TR" sz="1800" b="0" i="0" kern="1200" dirty="0" smtClean="0">
+                          <a:solidFill>
+                            <a:schemeClr val="dk1"/>
+                          </a:solidFill>
+                          <a:latin typeface="+mn-lt"/>
+                          <a:ea typeface="+mn-ea"/>
+                          <a:cs typeface="+mn-cs"/>
+                        </a:rPr>
+                        <a:t>∞</a:t>
+                      </a:r>
+                      <a:endParaRPr lang="tr-TR" dirty="0"/>
+                    </a:p>
+                  </a:txBody>
+                  <a:tcPr/>
+                </a:tc>
+                <a:tc>
+                  <a:txBody>
+                    <a:bodyPr/>
+                    <a:lstStyle/>
+                    <a:p>
+                      <a:pPr algn="ctr"/>
+                      <a:r>
+                        <a:rPr lang="tr-TR" sz="1800" b="0" i="0" kern="1200" dirty="0" smtClean="0">
+                          <a:solidFill>
+                            <a:schemeClr val="dk1"/>
+                          </a:solidFill>
+                          <a:latin typeface="+mn-lt"/>
+                          <a:ea typeface="+mn-ea"/>
+                          <a:cs typeface="+mn-cs"/>
+                        </a:rPr>
+                        <a:t>∞</a:t>
+                      </a:r>
+                      <a:endParaRPr lang="tr-TR" dirty="0"/>
+                    </a:p>
+                  </a:txBody>
+                  <a:tcPr/>
+                </a:tc>
+                <a:tc>
+                  <a:txBody>
+                    <a:bodyPr/>
+                    <a:lstStyle/>
+                    <a:p>
+                      <a:pPr algn="ctr"/>
+                      <a:r>
+                        <a:rPr lang="tr-TR" dirty="0" smtClean="0"/>
+                        <a:t>12</a:t>
+                      </a:r>
+                      <a:endParaRPr lang="tr-TR" dirty="0"/>
+                    </a:p>
+                  </a:txBody>
+                  <a:tcPr/>
+                </a:tc>
+                <a:tc>
+                  <a:txBody>
+                    <a:bodyPr/>
+                    <a:lstStyle/>
+                    <a:p>
+                      <a:pPr algn="ctr"/>
+                      <a:r>
+                        <a:rPr lang="tr-TR" dirty="0" smtClean="0"/>
+                        <a:t>8</a:t>
+                      </a:r>
+                      <a:endParaRPr lang="tr-TR" dirty="0"/>
+                    </a:p>
+                  </a:txBody>
+                  <a:tcPr/>
+                </a:tc>
+                <a:tc>
+                  <a:txBody>
+                    <a:bodyPr/>
+                    <a:lstStyle/>
+                    <a:p>
+                      <a:pPr algn="ctr"/>
+                      <a:r>
+                        <a:rPr lang="tr-TR" dirty="0" smtClean="0"/>
+                        <a:t>7</a:t>
+                      </a:r>
+                      <a:endParaRPr lang="tr-TR" dirty="0"/>
+                    </a:p>
+                  </a:txBody>
+                  <a:tcPr/>
+                </a:tc>
+                <a:tc>
+                  <a:txBody>
+                    <a:bodyPr/>
+                    <a:lstStyle/>
+                    <a:p>
+                      <a:pPr algn="ctr"/>
+                      <a:r>
+                        <a:rPr lang="tr-TR" dirty="0" smtClean="0"/>
+                        <a:t>7</a:t>
+                      </a:r>
+                      <a:endParaRPr lang="tr-TR" dirty="0"/>
+                    </a:p>
+                  </a:txBody>
+                  <a:tcPr/>
+                </a:tc>
+                <a:tc>
+                  <a:txBody>
+                    <a:bodyPr/>
+                    <a:lstStyle/>
+                    <a:p>
+                      <a:pPr algn="ctr"/>
+                      <a:r>
+                        <a:rPr lang="tr-TR" dirty="0" smtClean="0"/>
+                        <a:t>7</a:t>
+                      </a:r>
+                      <a:endParaRPr lang="tr-TR" dirty="0"/>
+                    </a:p>
+                  </a:txBody>
+                  <a:tcPr/>
+                </a:tc>
+                <a:tc>
+                  <a:txBody>
+                    <a:bodyPr/>
+                    <a:lstStyle/>
+                    <a:p>
+                      <a:pPr algn="ctr"/>
+                      <a:r>
+                        <a:rPr lang="tr-TR" dirty="0" smtClean="0"/>
+                        <a:t>7</a:t>
+                      </a:r>
+                      <a:endParaRPr lang="tr-TR" dirty="0"/>
+                    </a:p>
+                  </a:txBody>
+                  <a:tcPr/>
+                </a:tc>
+              </a:tr>
+              <a:tr h="307340">
+                <a:tc>
+                  <a:txBody>
+                    <a:bodyPr/>
+                    <a:lstStyle/>
+                    <a:p>
+                      <a:pPr algn="ctr"/>
+                      <a:r>
+                        <a:rPr lang="tr-TR" b="1" dirty="0" smtClean="0"/>
+                        <a:t>F</a:t>
+                      </a:r>
+                      <a:endParaRPr lang="tr-TR" b="1" dirty="0"/>
+                    </a:p>
+                  </a:txBody>
+                  <a:tcPr/>
+                </a:tc>
+                <a:tc>
+                  <a:txBody>
+                    <a:bodyPr/>
+                    <a:lstStyle/>
+                    <a:p>
+                      <a:pPr algn="ctr"/>
+                      <a:r>
+                        <a:rPr lang="tr-TR" sz="1800" b="0" i="0" kern="1200" dirty="0" smtClean="0">
+                          <a:solidFill>
+                            <a:schemeClr val="dk1"/>
+                          </a:solidFill>
+                          <a:latin typeface="+mn-lt"/>
+                          <a:ea typeface="+mn-ea"/>
+                          <a:cs typeface="+mn-cs"/>
+                        </a:rPr>
+                        <a:t>∞</a:t>
+                      </a:r>
+                      <a:endParaRPr lang="tr-TR" dirty="0"/>
+                    </a:p>
+                  </a:txBody>
+                  <a:tcPr/>
+                </a:tc>
+                <a:tc>
+                  <a:txBody>
+                    <a:bodyPr/>
+                    <a:lstStyle/>
+                    <a:p>
+                      <a:pPr algn="ctr"/>
+                      <a:r>
+                        <a:rPr lang="tr-TR" sz="1800" b="0" i="0" kern="1200" dirty="0" smtClean="0">
+                          <a:solidFill>
+                            <a:schemeClr val="dk1"/>
+                          </a:solidFill>
+                          <a:latin typeface="+mn-lt"/>
+                          <a:ea typeface="+mn-ea"/>
+                          <a:cs typeface="+mn-cs"/>
+                        </a:rPr>
+                        <a:t>∞</a:t>
+                      </a:r>
+                      <a:endParaRPr lang="tr-TR" dirty="0"/>
+                    </a:p>
+                  </a:txBody>
+                  <a:tcPr/>
+                </a:tc>
+                <a:tc>
+                  <a:txBody>
+                    <a:bodyPr/>
+                    <a:lstStyle/>
+                    <a:p>
+                      <a:pPr algn="ctr"/>
+                      <a:r>
+                        <a:rPr lang="tr-TR" dirty="0" smtClean="0"/>
+                        <a:t>9</a:t>
+                      </a:r>
+                      <a:endParaRPr lang="tr-TR" dirty="0"/>
+                    </a:p>
+                  </a:txBody>
+                  <a:tcPr/>
+                </a:tc>
+                <a:tc>
+                  <a:txBody>
+                    <a:bodyPr/>
+                    <a:lstStyle/>
+                    <a:p>
+                      <a:pPr algn="ctr"/>
+                      <a:r>
+                        <a:rPr lang="tr-TR" dirty="0" smtClean="0"/>
+                        <a:t>9</a:t>
+                      </a:r>
+                      <a:endParaRPr lang="tr-TR" dirty="0"/>
+                    </a:p>
+                  </a:txBody>
+                  <a:tcPr/>
+                </a:tc>
+                <a:tc>
+                  <a:txBody>
+                    <a:bodyPr/>
+                    <a:lstStyle/>
+                    <a:p>
+                      <a:pPr algn="ctr"/>
+                      <a:r>
+                        <a:rPr lang="tr-TR" dirty="0" smtClean="0"/>
+                        <a:t>9</a:t>
+                      </a:r>
+                      <a:endParaRPr lang="tr-TR" dirty="0"/>
+                    </a:p>
+                  </a:txBody>
+                  <a:tcPr/>
+                </a:tc>
+                <a:tc>
+                  <a:txBody>
+                    <a:bodyPr/>
+                    <a:lstStyle/>
+                    <a:p>
+                      <a:pPr algn="ctr"/>
+                      <a:r>
+                        <a:rPr lang="tr-TR" dirty="0" smtClean="0"/>
+                        <a:t>9</a:t>
+                      </a:r>
+                      <a:endParaRPr lang="tr-TR" dirty="0"/>
+                    </a:p>
+                  </a:txBody>
+                  <a:tcPr/>
+                </a:tc>
+                <a:tc>
+                  <a:txBody>
+                    <a:bodyPr/>
+                    <a:lstStyle/>
+                    <a:p>
+                      <a:pPr algn="ctr"/>
+                      <a:r>
+                        <a:rPr lang="tr-TR" dirty="0" smtClean="0"/>
+                        <a:t>9</a:t>
+                      </a:r>
+                      <a:endParaRPr lang="tr-TR" dirty="0"/>
+                    </a:p>
+                  </a:txBody>
+                  <a:tcPr/>
+                </a:tc>
+                <a:tc>
+                  <a:txBody>
+                    <a:bodyPr/>
+                    <a:lstStyle/>
+                    <a:p>
+                      <a:pPr algn="ctr"/>
+                      <a:r>
+                        <a:rPr lang="tr-TR" dirty="0" smtClean="0"/>
+                        <a:t>9</a:t>
+                      </a:r>
+                      <a:endParaRPr lang="tr-TR" dirty="0"/>
+                    </a:p>
+                  </a:txBody>
+                  <a:tcPr/>
+                </a:tc>
+              </a:tr>
+              <a:tr h="307340">
+                <a:tc>
+                  <a:txBody>
+                    <a:bodyPr/>
+                    <a:lstStyle/>
+                    <a:p>
+                      <a:pPr algn="ctr"/>
+                      <a:r>
+                        <a:rPr lang="tr-TR" b="1" dirty="0" smtClean="0"/>
+                        <a:t>G</a:t>
+                      </a:r>
+                      <a:endParaRPr lang="tr-TR" b="1" dirty="0"/>
+                    </a:p>
+                  </a:txBody>
+                  <a:tcPr/>
+                </a:tc>
+                <a:tc>
+                  <a:txBody>
+                    <a:bodyPr/>
+                    <a:lstStyle/>
+                    <a:p>
+                      <a:pPr algn="ctr"/>
+                      <a:r>
+                        <a:rPr lang="tr-TR" sz="1800" b="0" i="0" kern="1200" dirty="0" smtClean="0">
+                          <a:solidFill>
+                            <a:schemeClr val="dk1"/>
+                          </a:solidFill>
+                          <a:latin typeface="+mn-lt"/>
+                          <a:ea typeface="+mn-ea"/>
+                          <a:cs typeface="+mn-cs"/>
+                        </a:rPr>
+                        <a:t>∞</a:t>
+                      </a:r>
+                      <a:endParaRPr lang="tr-TR" dirty="0"/>
+                    </a:p>
+                  </a:txBody>
+                  <a:tcPr/>
+                </a:tc>
+                <a:tc>
+                  <a:txBody>
+                    <a:bodyPr/>
+                    <a:lstStyle/>
+                    <a:p>
+                      <a:pPr algn="ctr"/>
+                      <a:r>
+                        <a:rPr lang="tr-TR" sz="1800" b="0" i="0" kern="1200" dirty="0" smtClean="0">
+                          <a:solidFill>
+                            <a:schemeClr val="dk1"/>
+                          </a:solidFill>
+                          <a:latin typeface="+mn-lt"/>
+                          <a:ea typeface="+mn-ea"/>
+                          <a:cs typeface="+mn-cs"/>
+                        </a:rPr>
+                        <a:t>∞</a:t>
+                      </a:r>
+                      <a:endParaRPr lang="tr-TR" dirty="0"/>
+                    </a:p>
+                  </a:txBody>
+                  <a:tcPr/>
+                </a:tc>
+                <a:tc>
+                  <a:txBody>
+                    <a:bodyPr/>
+                    <a:lstStyle/>
+                    <a:p>
+                      <a:pPr algn="ctr"/>
+                      <a:r>
+                        <a:rPr lang="tr-TR" dirty="0" smtClean="0"/>
+                        <a:t>8</a:t>
+                      </a:r>
+                      <a:endParaRPr lang="tr-TR" dirty="0"/>
+                    </a:p>
+                  </a:txBody>
+                  <a:tcPr/>
+                </a:tc>
+                <a:tc>
+                  <a:txBody>
+                    <a:bodyPr/>
+                    <a:lstStyle/>
+                    <a:p>
+                      <a:pPr algn="ctr"/>
+                      <a:r>
+                        <a:rPr lang="tr-TR" dirty="0" smtClean="0"/>
+                        <a:t>8</a:t>
+                      </a:r>
+                      <a:endParaRPr lang="tr-TR" dirty="0"/>
+                    </a:p>
+                  </a:txBody>
+                  <a:tcPr/>
+                </a:tc>
+                <a:tc>
+                  <a:txBody>
+                    <a:bodyPr/>
+                    <a:lstStyle/>
+                    <a:p>
+                      <a:pPr algn="ctr"/>
+                      <a:r>
+                        <a:rPr lang="tr-TR" dirty="0" smtClean="0"/>
+                        <a:t>8</a:t>
+                      </a:r>
+                      <a:endParaRPr lang="tr-TR" dirty="0"/>
+                    </a:p>
+                  </a:txBody>
+                  <a:tcPr/>
+                </a:tc>
+                <a:tc>
+                  <a:txBody>
+                    <a:bodyPr/>
+                    <a:lstStyle/>
+                    <a:p>
+                      <a:pPr algn="ctr"/>
+                      <a:r>
+                        <a:rPr lang="tr-TR" dirty="0" smtClean="0"/>
+                        <a:t>8</a:t>
+                      </a:r>
+                      <a:endParaRPr lang="tr-TR" dirty="0"/>
+                    </a:p>
+                  </a:txBody>
+                  <a:tcPr/>
+                </a:tc>
+                <a:tc>
+                  <a:txBody>
+                    <a:bodyPr/>
+                    <a:lstStyle/>
+                    <a:p>
+                      <a:pPr algn="ctr"/>
+                      <a:r>
+                        <a:rPr lang="tr-TR" dirty="0" smtClean="0"/>
+                        <a:t>8</a:t>
+                      </a:r>
+                      <a:endParaRPr lang="tr-TR" dirty="0"/>
+                    </a:p>
+                  </a:txBody>
+                  <a:tcPr/>
+                </a:tc>
+                <a:tc>
+                  <a:txBody>
+                    <a:bodyPr/>
+                    <a:lstStyle/>
+                    <a:p>
+                      <a:pPr algn="ctr"/>
+                      <a:r>
+                        <a:rPr lang="tr-TR" dirty="0" smtClean="0"/>
+                        <a:t>8</a:t>
+                      </a:r>
+                      <a:endParaRPr lang="tr-TR" dirty="0"/>
+                    </a:p>
+                  </a:txBody>
+                  <a:tcPr/>
+                </a:tc>
+              </a:tr>
+            </a:tbl>
+          </a:graphicData>
+        </a:graphic>
+      </p:graphicFrame>
+    </p:spTree>
+  </p:cSld>
+  <p:clrMapOvr>
+    <a:masterClrMapping/>
+  </p:clrMapOvr>
+</p:sld>
+</file>
+
 <file path=ppt/theme/theme1.xml><?xml version="1.0" encoding="utf-8"?>
 <a:theme xmlns:a="http://schemas.openxmlformats.org/drawingml/2006/main" name="Office Theme">
   <a:themeElements>

</xml_diff>

<commit_message>
[upgrade] formation control started
</commit_message>
<xml_diff>
--- a/Tez Çizimleri.pptx
+++ b/Tez Çizimleri.pptx
@@ -17,6 +17,8 @@
     <p:sldId id="262" r:id="rId11"/>
     <p:sldId id="264" r:id="rId12"/>
     <p:sldId id="265" r:id="rId13"/>
+    <p:sldId id="268" r:id="rId14"/>
+    <p:sldId id="269" r:id="rId15"/>
   </p:sldIdLst>
   <p:sldSz cx="9144000" cy="6858000" type="screen4x3"/>
   <p:notesSz cx="6858000" cy="9144000"/>
@@ -300,7 +302,7 @@
             <a:fld id="{1D8BD707-D9CF-40AE-B4C6-C98DA3205C09}" type="datetimeFigureOut">
               <a:rPr lang="en-US" smtClean="0"/>
               <a:pPr/>
-              <a:t>8/22/2015</a:t>
+              <a:t>8/23/2015</a:t>
             </a:fld>
             <a:endParaRPr lang="en-US"/>
           </a:p>
@@ -467,7 +469,7 @@
             <a:fld id="{1D8BD707-D9CF-40AE-B4C6-C98DA3205C09}" type="datetimeFigureOut">
               <a:rPr lang="en-US" smtClean="0"/>
               <a:pPr/>
-              <a:t>8/22/2015</a:t>
+              <a:t>8/23/2015</a:t>
             </a:fld>
             <a:endParaRPr lang="en-US"/>
           </a:p>
@@ -644,7 +646,7 @@
             <a:fld id="{1D8BD707-D9CF-40AE-B4C6-C98DA3205C09}" type="datetimeFigureOut">
               <a:rPr lang="en-US" smtClean="0"/>
               <a:pPr/>
-              <a:t>8/22/2015</a:t>
+              <a:t>8/23/2015</a:t>
             </a:fld>
             <a:endParaRPr lang="en-US"/>
           </a:p>
@@ -811,7 +813,7 @@
             <a:fld id="{1D8BD707-D9CF-40AE-B4C6-C98DA3205C09}" type="datetimeFigureOut">
               <a:rPr lang="en-US" smtClean="0"/>
               <a:pPr/>
-              <a:t>8/22/2015</a:t>
+              <a:t>8/23/2015</a:t>
             </a:fld>
             <a:endParaRPr lang="en-US"/>
           </a:p>
@@ -1054,7 +1056,7 @@
             <a:fld id="{1D8BD707-D9CF-40AE-B4C6-C98DA3205C09}" type="datetimeFigureOut">
               <a:rPr lang="en-US" smtClean="0"/>
               <a:pPr/>
-              <a:t>8/22/2015</a:t>
+              <a:t>8/23/2015</a:t>
             </a:fld>
             <a:endParaRPr lang="en-US"/>
           </a:p>
@@ -1339,7 +1341,7 @@
             <a:fld id="{1D8BD707-D9CF-40AE-B4C6-C98DA3205C09}" type="datetimeFigureOut">
               <a:rPr lang="en-US" smtClean="0"/>
               <a:pPr/>
-              <a:t>8/22/2015</a:t>
+              <a:t>8/23/2015</a:t>
             </a:fld>
             <a:endParaRPr lang="en-US"/>
           </a:p>
@@ -1758,7 +1760,7 @@
             <a:fld id="{1D8BD707-D9CF-40AE-B4C6-C98DA3205C09}" type="datetimeFigureOut">
               <a:rPr lang="en-US" smtClean="0"/>
               <a:pPr/>
-              <a:t>8/22/2015</a:t>
+              <a:t>8/23/2015</a:t>
             </a:fld>
             <a:endParaRPr lang="en-US"/>
           </a:p>
@@ -1873,7 +1875,7 @@
             <a:fld id="{1D8BD707-D9CF-40AE-B4C6-C98DA3205C09}" type="datetimeFigureOut">
               <a:rPr lang="en-US" smtClean="0"/>
               <a:pPr/>
-              <a:t>8/22/2015</a:t>
+              <a:t>8/23/2015</a:t>
             </a:fld>
             <a:endParaRPr lang="en-US"/>
           </a:p>
@@ -1965,7 +1967,7 @@
             <a:fld id="{1D8BD707-D9CF-40AE-B4C6-C98DA3205C09}" type="datetimeFigureOut">
               <a:rPr lang="en-US" smtClean="0"/>
               <a:pPr/>
-              <a:t>8/22/2015</a:t>
+              <a:t>8/23/2015</a:t>
             </a:fld>
             <a:endParaRPr lang="en-US"/>
           </a:p>
@@ -2239,7 +2241,7 @@
             <a:fld id="{1D8BD707-D9CF-40AE-B4C6-C98DA3205C09}" type="datetimeFigureOut">
               <a:rPr lang="en-US" smtClean="0"/>
               <a:pPr/>
-              <a:t>8/22/2015</a:t>
+              <a:t>8/23/2015</a:t>
             </a:fld>
             <a:endParaRPr lang="en-US"/>
           </a:p>
@@ -2489,7 +2491,7 @@
             <a:fld id="{1D8BD707-D9CF-40AE-B4C6-C98DA3205C09}" type="datetimeFigureOut">
               <a:rPr lang="en-US" smtClean="0"/>
               <a:pPr/>
-              <a:t>8/22/2015</a:t>
+              <a:t>8/23/2015</a:t>
             </a:fld>
             <a:endParaRPr lang="en-US"/>
           </a:p>
@@ -2699,7 +2701,7 @@
             <a:fld id="{1D8BD707-D9CF-40AE-B4C6-C98DA3205C09}" type="datetimeFigureOut">
               <a:rPr lang="en-US" smtClean="0"/>
               <a:pPr/>
-              <a:t>8/22/2015</a:t>
+              <a:t>8/23/2015</a:t>
             </a:fld>
             <a:endParaRPr lang="en-US"/>
           </a:p>
@@ -9411,6 +9413,630 @@
           </p:style>
         </p:cxnSp>
       </p:grpSp>
+    </p:spTree>
+  </p:cSld>
+  <p:clrMapOvr>
+    <a:masterClrMapping/>
+  </p:clrMapOvr>
+</p:sld>
+</file>
+
+<file path=ppt/slides/slide13.xml><?xml version="1.0" encoding="utf-8"?>
+<p:sld xmlns:a="http://schemas.openxmlformats.org/drawingml/2006/main" xmlns:r="http://schemas.openxmlformats.org/officeDocument/2006/relationships" xmlns:p="http://schemas.openxmlformats.org/presentationml/2006/main">
+  <p:cSld>
+    <p:spTree>
+      <p:nvGrpSpPr>
+        <p:cNvPr id="1" name=""/>
+        <p:cNvGrpSpPr/>
+        <p:nvPr/>
+      </p:nvGrpSpPr>
+      <p:grpSpPr>
+        <a:xfrm>
+          <a:off x="0" y="0"/>
+          <a:ext cx="0" cy="0"/>
+          <a:chOff x="0" y="0"/>
+          <a:chExt cx="0" cy="0"/>
+        </a:xfrm>
+      </p:grpSpPr>
+      <p:grpSp>
+        <p:nvGrpSpPr>
+          <p:cNvPr id="22" name="Group 21"/>
+          <p:cNvGrpSpPr/>
+          <p:nvPr/>
+        </p:nvGrpSpPr>
+        <p:grpSpPr>
+          <a:xfrm>
+            <a:off x="914400" y="1752600"/>
+            <a:ext cx="6641750" cy="2822377"/>
+            <a:chOff x="914400" y="1752600"/>
+            <a:chExt cx="6641750" cy="2822377"/>
+          </a:xfrm>
+        </p:grpSpPr>
+        <p:sp>
+          <p:nvSpPr>
+            <p:cNvPr id="9" name="TextBox 8"/>
+            <p:cNvSpPr txBox="1"/>
+            <p:nvPr/>
+          </p:nvSpPr>
+          <p:spPr>
+            <a:xfrm>
+              <a:off x="3200400" y="1752600"/>
+              <a:ext cx="2355581" cy="369332"/>
+            </a:xfrm>
+            <a:prstGeom prst="rect">
+              <a:avLst/>
+            </a:prstGeom>
+            <a:noFill/>
+          </p:spPr>
+          <p:txBody>
+            <a:bodyPr wrap="none" rtlCol="0">
+              <a:spAutoFit/>
+            </a:bodyPr>
+            <a:lstStyle/>
+            <a:p>
+              <a:r>
+                <a:rPr lang="tr-TR" b="1" dirty="0" smtClean="0"/>
+                <a:t>FORMATION CONTROL</a:t>
+              </a:r>
+              <a:endParaRPr lang="tr-TR" b="1" dirty="0"/>
+            </a:p>
+          </p:txBody>
+        </p:sp>
+        <p:cxnSp>
+          <p:nvCxnSpPr>
+            <p:cNvPr id="11" name="Straight Arrow Connector 10"/>
+            <p:cNvCxnSpPr/>
+            <p:nvPr/>
+          </p:nvCxnSpPr>
+          <p:spPr>
+            <a:xfrm rot="10800000" flipV="1">
+              <a:off x="2819400" y="2133600"/>
+              <a:ext cx="1219200" cy="533400"/>
+            </a:xfrm>
+            <a:prstGeom prst="straightConnector1">
+              <a:avLst/>
+            </a:prstGeom>
+            <a:ln w="22225">
+              <a:tailEnd type="arrow"/>
+            </a:ln>
+          </p:spPr>
+          <p:style>
+            <a:lnRef idx="1">
+              <a:schemeClr val="accent1"/>
+            </a:lnRef>
+            <a:fillRef idx="0">
+              <a:schemeClr val="accent1"/>
+            </a:fillRef>
+            <a:effectRef idx="0">
+              <a:schemeClr val="accent1"/>
+            </a:effectRef>
+            <a:fontRef idx="minor">
+              <a:schemeClr val="tx1"/>
+            </a:fontRef>
+          </p:style>
+        </p:cxnSp>
+        <p:cxnSp>
+          <p:nvCxnSpPr>
+            <p:cNvPr id="12" name="Straight Arrow Connector 11"/>
+            <p:cNvCxnSpPr/>
+            <p:nvPr/>
+          </p:nvCxnSpPr>
+          <p:spPr>
+            <a:xfrm>
+              <a:off x="4724400" y="2133600"/>
+              <a:ext cx="1066800" cy="533400"/>
+            </a:xfrm>
+            <a:prstGeom prst="straightConnector1">
+              <a:avLst/>
+            </a:prstGeom>
+            <a:ln w="22225">
+              <a:tailEnd type="arrow"/>
+            </a:ln>
+          </p:spPr>
+          <p:style>
+            <a:lnRef idx="1">
+              <a:schemeClr val="accent1"/>
+            </a:lnRef>
+            <a:fillRef idx="0">
+              <a:schemeClr val="accent1"/>
+            </a:fillRef>
+            <a:effectRef idx="0">
+              <a:schemeClr val="accent1"/>
+            </a:effectRef>
+            <a:fontRef idx="minor">
+              <a:schemeClr val="tx1"/>
+            </a:fontRef>
+          </p:style>
+        </p:cxnSp>
+        <p:sp>
+          <p:nvSpPr>
+            <p:cNvPr id="14" name="TextBox 13"/>
+            <p:cNvSpPr txBox="1"/>
+            <p:nvPr/>
+          </p:nvSpPr>
+          <p:spPr>
+            <a:xfrm>
+              <a:off x="1905000" y="2743200"/>
+              <a:ext cx="1705403" cy="646331"/>
+            </a:xfrm>
+            <a:prstGeom prst="rect">
+              <a:avLst/>
+            </a:prstGeom>
+            <a:noFill/>
+          </p:spPr>
+          <p:txBody>
+            <a:bodyPr wrap="none" rtlCol="0">
+              <a:spAutoFit/>
+            </a:bodyPr>
+            <a:lstStyle/>
+            <a:p>
+              <a:pPr algn="ctr"/>
+              <a:r>
+                <a:rPr lang="tr-TR" dirty="0" smtClean="0"/>
+                <a:t>Potential Field</a:t>
+              </a:r>
+            </a:p>
+            <a:p>
+              <a:pPr algn="ctr"/>
+              <a:r>
+                <a:rPr lang="tr-TR" dirty="0" smtClean="0"/>
+                <a:t>Based Approach</a:t>
+              </a:r>
+              <a:endParaRPr lang="tr-TR" dirty="0"/>
+            </a:p>
+          </p:txBody>
+        </p:sp>
+        <p:sp>
+          <p:nvSpPr>
+            <p:cNvPr id="15" name="TextBox 14"/>
+            <p:cNvSpPr txBox="1"/>
+            <p:nvPr/>
+          </p:nvSpPr>
+          <p:spPr>
+            <a:xfrm>
+              <a:off x="4953000" y="2743200"/>
+              <a:ext cx="1904560" cy="646331"/>
+            </a:xfrm>
+            <a:prstGeom prst="rect">
+              <a:avLst/>
+            </a:prstGeom>
+            <a:noFill/>
+          </p:spPr>
+          <p:txBody>
+            <a:bodyPr wrap="none" rtlCol="0">
+              <a:spAutoFit/>
+            </a:bodyPr>
+            <a:lstStyle/>
+            <a:p>
+              <a:pPr algn="ctr"/>
+              <a:r>
+                <a:rPr lang="tr-TR" dirty="0" smtClean="0"/>
+                <a:t>Shape Partitioning</a:t>
+              </a:r>
+            </a:p>
+            <a:p>
+              <a:pPr algn="ctr"/>
+              <a:r>
+                <a:rPr lang="tr-TR" dirty="0" smtClean="0"/>
+                <a:t>Based Approaches</a:t>
+              </a:r>
+              <a:endParaRPr lang="tr-TR" dirty="0"/>
+            </a:p>
+          </p:txBody>
+        </p:sp>
+        <p:sp>
+          <p:nvSpPr>
+            <p:cNvPr id="16" name="Right Arrow 15"/>
+            <p:cNvSpPr/>
+            <p:nvPr/>
+          </p:nvSpPr>
+          <p:spPr>
+            <a:xfrm>
+              <a:off x="914400" y="3581400"/>
+              <a:ext cx="685800" cy="304800"/>
+            </a:xfrm>
+            <a:prstGeom prst="rightArrow">
+              <a:avLst/>
+            </a:prstGeom>
+          </p:spPr>
+          <p:style>
+            <a:lnRef idx="2">
+              <a:schemeClr val="accent1">
+                <a:shade val="50000"/>
+              </a:schemeClr>
+            </a:lnRef>
+            <a:fillRef idx="1">
+              <a:schemeClr val="accent1"/>
+            </a:fillRef>
+            <a:effectRef idx="0">
+              <a:schemeClr val="accent1"/>
+            </a:effectRef>
+            <a:fontRef idx="minor">
+              <a:schemeClr val="lt1"/>
+            </a:fontRef>
+          </p:style>
+          <p:txBody>
+            <a:bodyPr rtlCol="0" anchor="ctr"/>
+            <a:lstStyle/>
+            <a:p>
+              <a:pPr algn="ctr"/>
+              <a:endParaRPr lang="tr-TR"/>
+            </a:p>
+          </p:txBody>
+        </p:sp>
+        <p:sp>
+          <p:nvSpPr>
+            <p:cNvPr id="17" name="Right Arrow 16"/>
+            <p:cNvSpPr/>
+            <p:nvPr/>
+          </p:nvSpPr>
+          <p:spPr>
+            <a:xfrm>
+              <a:off x="4419600" y="3581400"/>
+              <a:ext cx="685800" cy="304800"/>
+            </a:xfrm>
+            <a:prstGeom prst="rightArrow">
+              <a:avLst/>
+            </a:prstGeom>
+          </p:spPr>
+          <p:style>
+            <a:lnRef idx="2">
+              <a:schemeClr val="accent1">
+                <a:shade val="50000"/>
+              </a:schemeClr>
+            </a:lnRef>
+            <a:fillRef idx="1">
+              <a:schemeClr val="accent1"/>
+            </a:fillRef>
+            <a:effectRef idx="0">
+              <a:schemeClr val="accent1"/>
+            </a:effectRef>
+            <a:fontRef idx="minor">
+              <a:schemeClr val="lt1"/>
+            </a:fontRef>
+          </p:style>
+          <p:txBody>
+            <a:bodyPr rtlCol="0" anchor="ctr"/>
+            <a:lstStyle/>
+            <a:p>
+              <a:pPr algn="ctr"/>
+              <a:endParaRPr lang="tr-TR"/>
+            </a:p>
+          </p:txBody>
+        </p:sp>
+        <p:sp>
+          <p:nvSpPr>
+            <p:cNvPr id="18" name="Right Arrow 17"/>
+            <p:cNvSpPr/>
+            <p:nvPr/>
+          </p:nvSpPr>
+          <p:spPr>
+            <a:xfrm>
+              <a:off x="4419600" y="4267200"/>
+              <a:ext cx="685800" cy="304800"/>
+            </a:xfrm>
+            <a:prstGeom prst="rightArrow">
+              <a:avLst/>
+            </a:prstGeom>
+          </p:spPr>
+          <p:style>
+            <a:lnRef idx="2">
+              <a:schemeClr val="accent1">
+                <a:shade val="50000"/>
+              </a:schemeClr>
+            </a:lnRef>
+            <a:fillRef idx="1">
+              <a:schemeClr val="accent1"/>
+            </a:fillRef>
+            <a:effectRef idx="0">
+              <a:schemeClr val="accent1"/>
+            </a:effectRef>
+            <a:fontRef idx="minor">
+              <a:schemeClr val="lt1"/>
+            </a:fontRef>
+          </p:style>
+          <p:txBody>
+            <a:bodyPr rtlCol="0" anchor="ctr"/>
+            <a:lstStyle/>
+            <a:p>
+              <a:pPr algn="ctr"/>
+              <a:endParaRPr lang="tr-TR"/>
+            </a:p>
+          </p:txBody>
+        </p:sp>
+        <p:sp>
+          <p:nvSpPr>
+            <p:cNvPr id="19" name="TextBox 18"/>
+            <p:cNvSpPr txBox="1"/>
+            <p:nvPr/>
+          </p:nvSpPr>
+          <p:spPr>
+            <a:xfrm>
+              <a:off x="1600200" y="3581400"/>
+              <a:ext cx="2057400" cy="307777"/>
+            </a:xfrm>
+            <a:prstGeom prst="rect">
+              <a:avLst/>
+            </a:prstGeom>
+            <a:noFill/>
+          </p:spPr>
+          <p:txBody>
+            <a:bodyPr wrap="square" rtlCol="0">
+              <a:spAutoFit/>
+            </a:bodyPr>
+            <a:lstStyle/>
+            <a:p>
+              <a:r>
+                <a:rPr lang="tr-TR" sz="1400" dirty="0" smtClean="0"/>
+                <a:t>Artificial Forces Method</a:t>
+              </a:r>
+            </a:p>
+          </p:txBody>
+        </p:sp>
+        <p:sp>
+          <p:nvSpPr>
+            <p:cNvPr id="20" name="TextBox 19"/>
+            <p:cNvSpPr txBox="1"/>
+            <p:nvPr/>
+          </p:nvSpPr>
+          <p:spPr>
+            <a:xfrm>
+              <a:off x="5181600" y="3581400"/>
+              <a:ext cx="1919115" cy="307777"/>
+            </a:xfrm>
+            <a:prstGeom prst="rect">
+              <a:avLst/>
+            </a:prstGeom>
+            <a:noFill/>
+          </p:spPr>
+          <p:txBody>
+            <a:bodyPr wrap="none" rtlCol="0">
+              <a:spAutoFit/>
+            </a:bodyPr>
+            <a:lstStyle/>
+            <a:p>
+              <a:r>
+                <a:rPr lang="tr-TR" sz="1400" dirty="0" smtClean="0"/>
+                <a:t>Bubble Packing Method</a:t>
+              </a:r>
+            </a:p>
+          </p:txBody>
+        </p:sp>
+        <p:sp>
+          <p:nvSpPr>
+            <p:cNvPr id="21" name="TextBox 20"/>
+            <p:cNvSpPr txBox="1"/>
+            <p:nvPr/>
+          </p:nvSpPr>
+          <p:spPr>
+            <a:xfrm>
+              <a:off x="5240708" y="4267200"/>
+              <a:ext cx="2315442" cy="307777"/>
+            </a:xfrm>
+            <a:prstGeom prst="rect">
+              <a:avLst/>
+            </a:prstGeom>
+            <a:noFill/>
+          </p:spPr>
+          <p:txBody>
+            <a:bodyPr wrap="none" rtlCol="0">
+              <a:spAutoFit/>
+            </a:bodyPr>
+            <a:lstStyle/>
+            <a:p>
+              <a:r>
+                <a:rPr lang="tr-TR" sz="1400" dirty="0" smtClean="0"/>
+                <a:t>Randomized Fractals Method</a:t>
+              </a:r>
+            </a:p>
+          </p:txBody>
+        </p:sp>
+      </p:grpSp>
+    </p:spTree>
+  </p:cSld>
+  <p:clrMapOvr>
+    <a:masterClrMapping/>
+  </p:clrMapOvr>
+</p:sld>
+</file>
+
+<file path=ppt/slides/slide14.xml><?xml version="1.0" encoding="utf-8"?>
+<p:sld xmlns:a="http://schemas.openxmlformats.org/drawingml/2006/main" xmlns:r="http://schemas.openxmlformats.org/officeDocument/2006/relationships" xmlns:p="http://schemas.openxmlformats.org/presentationml/2006/main">
+  <p:cSld>
+    <p:spTree>
+      <p:nvGrpSpPr>
+        <p:cNvPr id="1" name=""/>
+        <p:cNvGrpSpPr/>
+        <p:nvPr/>
+      </p:nvGrpSpPr>
+      <p:grpSpPr>
+        <a:xfrm>
+          <a:off x="0" y="0"/>
+          <a:ext cx="0" cy="0"/>
+          <a:chOff x="0" y="0"/>
+          <a:chExt cx="0" cy="0"/>
+        </a:xfrm>
+      </p:grpSpPr>
+      <p:sp>
+        <p:nvSpPr>
+          <p:cNvPr id="5" name="Freeform 4"/>
+          <p:cNvSpPr/>
+          <p:nvPr/>
+        </p:nvSpPr>
+        <p:spPr>
+          <a:xfrm>
+            <a:off x="3200400" y="2209800"/>
+            <a:ext cx="2760291" cy="2368608"/>
+          </a:xfrm>
+          <a:custGeom>
+            <a:avLst/>
+            <a:gdLst>
+              <a:gd name="connsiteX0" fmla="*/ 2146419 w 2760291"/>
+              <a:gd name="connsiteY0" fmla="*/ 548354 h 2368608"/>
+              <a:gd name="connsiteX1" fmla="*/ 1257656 w 2760291"/>
+              <a:gd name="connsiteY1" fmla="*/ 35607 h 2368608"/>
+              <a:gd name="connsiteX2" fmla="*/ 163794 w 2760291"/>
+              <a:gd name="connsiteY2" fmla="*/ 761999 h 2368608"/>
+              <a:gd name="connsiteX3" fmla="*/ 274890 w 2760291"/>
+              <a:gd name="connsiteY3" fmla="*/ 1471300 h 2368608"/>
+              <a:gd name="connsiteX4" fmla="*/ 1069648 w 2760291"/>
+              <a:gd name="connsiteY4" fmla="*/ 1616578 h 2368608"/>
+              <a:gd name="connsiteX5" fmla="*/ 1291839 w 2760291"/>
+              <a:gd name="connsiteY5" fmla="*/ 2283150 h 2368608"/>
+              <a:gd name="connsiteX6" fmla="*/ 2291697 w 2760291"/>
+              <a:gd name="connsiteY6" fmla="*/ 2129326 h 2368608"/>
+              <a:gd name="connsiteX7" fmla="*/ 2300243 w 2760291"/>
+              <a:gd name="connsiteY7" fmla="*/ 1283292 h 2368608"/>
+              <a:gd name="connsiteX8" fmla="*/ 2736078 w 2760291"/>
+              <a:gd name="connsiteY8" fmla="*/ 924369 h 2368608"/>
+              <a:gd name="connsiteX9" fmla="*/ 2146419 w 2760291"/>
+              <a:gd name="connsiteY9" fmla="*/ 548354 h 2368608"/>
+            </a:gdLst>
+            <a:ahLst/>
+            <a:cxnLst>
+              <a:cxn ang="0">
+                <a:pos x="connsiteX0" y="connsiteY0"/>
+              </a:cxn>
+              <a:cxn ang="0">
+                <a:pos x="connsiteX1" y="connsiteY1"/>
+              </a:cxn>
+              <a:cxn ang="0">
+                <a:pos x="connsiteX2" y="connsiteY2"/>
+              </a:cxn>
+              <a:cxn ang="0">
+                <a:pos x="connsiteX3" y="connsiteY3"/>
+              </a:cxn>
+              <a:cxn ang="0">
+                <a:pos x="connsiteX4" y="connsiteY4"/>
+              </a:cxn>
+              <a:cxn ang="0">
+                <a:pos x="connsiteX5" y="connsiteY5"/>
+              </a:cxn>
+              <a:cxn ang="0">
+                <a:pos x="connsiteX6" y="connsiteY6"/>
+              </a:cxn>
+              <a:cxn ang="0">
+                <a:pos x="connsiteX7" y="connsiteY7"/>
+              </a:cxn>
+              <a:cxn ang="0">
+                <a:pos x="connsiteX8" y="connsiteY8"/>
+              </a:cxn>
+              <a:cxn ang="0">
+                <a:pos x="connsiteX9" y="connsiteY9"/>
+              </a:cxn>
+            </a:cxnLst>
+            <a:rect l="l" t="t" r="r" b="b"/>
+            <a:pathLst>
+              <a:path w="2760291" h="2368608">
+                <a:moveTo>
+                  <a:pt x="2146419" y="548354"/>
+                </a:moveTo>
+                <a:cubicBezTo>
+                  <a:pt x="1900015" y="400227"/>
+                  <a:pt x="1588093" y="0"/>
+                  <a:pt x="1257656" y="35607"/>
+                </a:cubicBezTo>
+                <a:cubicBezTo>
+                  <a:pt x="927219" y="71214"/>
+                  <a:pt x="327588" y="522717"/>
+                  <a:pt x="163794" y="761999"/>
+                </a:cubicBezTo>
+                <a:cubicBezTo>
+                  <a:pt x="0" y="1001281"/>
+                  <a:pt x="123914" y="1328870"/>
+                  <a:pt x="274890" y="1471300"/>
+                </a:cubicBezTo>
+                <a:cubicBezTo>
+                  <a:pt x="425866" y="1613730"/>
+                  <a:pt x="900157" y="1481270"/>
+                  <a:pt x="1069648" y="1616578"/>
+                </a:cubicBezTo>
+                <a:cubicBezTo>
+                  <a:pt x="1239139" y="1751886"/>
+                  <a:pt x="1088164" y="2197692"/>
+                  <a:pt x="1291839" y="2283150"/>
+                </a:cubicBezTo>
+                <a:cubicBezTo>
+                  <a:pt x="1495514" y="2368608"/>
+                  <a:pt x="2123630" y="2295969"/>
+                  <a:pt x="2291697" y="2129326"/>
+                </a:cubicBezTo>
+                <a:cubicBezTo>
+                  <a:pt x="2459764" y="1962683"/>
+                  <a:pt x="2226180" y="1484118"/>
+                  <a:pt x="2300243" y="1283292"/>
+                </a:cubicBezTo>
+                <a:cubicBezTo>
+                  <a:pt x="2374306" y="1082466"/>
+                  <a:pt x="2760291" y="1048283"/>
+                  <a:pt x="2736078" y="924369"/>
+                </a:cubicBezTo>
+                <a:cubicBezTo>
+                  <a:pt x="2711865" y="800455"/>
+                  <a:pt x="2392823" y="696481"/>
+                  <a:pt x="2146419" y="548354"/>
+                </a:cubicBezTo>
+                <a:close/>
+              </a:path>
+            </a:pathLst>
+          </a:custGeom>
+          <a:noFill/>
+        </p:spPr>
+        <p:style>
+          <a:lnRef idx="2">
+            <a:schemeClr val="accent1">
+              <a:shade val="50000"/>
+            </a:schemeClr>
+          </a:lnRef>
+          <a:fillRef idx="1">
+            <a:schemeClr val="accent1"/>
+          </a:fillRef>
+          <a:effectRef idx="0">
+            <a:schemeClr val="accent1"/>
+          </a:effectRef>
+          <a:fontRef idx="minor">
+            <a:schemeClr val="lt1"/>
+          </a:fontRef>
+        </p:style>
+        <p:txBody>
+          <a:bodyPr rtlCol="0" anchor="ctr"/>
+          <a:lstStyle/>
+          <a:p>
+            <a:pPr algn="ctr"/>
+            <a:endParaRPr lang="tr-TR"/>
+          </a:p>
+        </p:txBody>
+      </p:sp>
+      <p:sp>
+        <p:nvSpPr>
+          <p:cNvPr id="6" name="TextBox 5"/>
+          <p:cNvSpPr txBox="1"/>
+          <p:nvPr/>
+        </p:nvSpPr>
+        <p:spPr>
+          <a:xfrm>
+            <a:off x="3429000" y="1066800"/>
+            <a:ext cx="2265236" cy="369332"/>
+          </a:xfrm>
+          <a:prstGeom prst="rect">
+            <a:avLst/>
+          </a:prstGeom>
+          <a:noFill/>
+        </p:spPr>
+        <p:txBody>
+          <a:bodyPr wrap="none" rtlCol="0">
+            <a:spAutoFit/>
+          </a:bodyPr>
+          <a:lstStyle/>
+          <a:p>
+            <a:r>
+              <a:rPr lang="tr-TR" dirty="0" smtClean="0"/>
+              <a:t> A simple closed curve</a:t>
+            </a:r>
+            <a:endParaRPr lang="tr-TR" dirty="0"/>
+          </a:p>
+        </p:txBody>
+      </p:sp>
     </p:spTree>
   </p:cSld>
   <p:clrMapOvr>
@@ -27734,20 +28360,7 @@
                           <a:effectLst/>
                           <a:latin typeface="Arial" charset="0"/>
                         </a:rPr>
-                        <a:t>, </a:t>
-                      </a:r>
-                      <a:r>
-                        <a:rPr kumimoji="0" lang="en-US" sz="1200" b="0" i="0" u="none" strike="noStrike" cap="none" normalizeH="0" baseline="0" dirty="0" smtClean="0">
-                          <a:ln>
-                            <a:noFill/>
-                          </a:ln>
-                          <a:solidFill>
-                            <a:schemeClr val="tx1"/>
-                          </a:solidFill>
-                          <a:effectLst/>
-                          <a:latin typeface="Arial" charset="0"/>
-                        </a:rPr>
-                        <a:t>…</a:t>
+                        <a:t>, …</a:t>
                       </a:r>
                       <a:endParaRPr kumimoji="0" lang="zh-TW" altLang="en-GB" sz="1200" b="0" i="0" u="none" strike="noStrike" cap="none" normalizeH="0" baseline="0" dirty="0" smtClean="0">
                         <a:ln>
@@ -28519,11 +29132,7 @@
               <a:p>
                 <a:r>
                   <a:rPr lang="en-US" sz="1100" dirty="0" smtClean="0"/>
-                  <a:t>(</a:t>
-                </a:r>
-                <a:r>
-                  <a:rPr lang="en-US" sz="1100" dirty="0" smtClean="0"/>
-                  <a:t>D,</a:t>
+                  <a:t>(D,</a:t>
                 </a:r>
                 <a:r>
                   <a:rPr lang="tr-TR" sz="1100" dirty="0" smtClean="0"/>
@@ -28719,11 +29328,7 @@
               <a:p>
                 <a:r>
                   <a:rPr lang="en-US" sz="1100" dirty="0" smtClean="0"/>
-                  <a:t>(</a:t>
-                </a:r>
-                <a:r>
-                  <a:rPr lang="en-US" sz="1100" dirty="0" smtClean="0"/>
-                  <a:t>D,</a:t>
+                  <a:t>(D,</a:t>
                 </a:r>
                 <a:r>
                   <a:rPr lang="tr-TR" sz="1100" dirty="0" smtClean="0"/>

</xml_diff>

<commit_message>
[upgrade] randomized fractal sekilleri cizildi
</commit_message>
<xml_diff>
--- a/Tez Çizimleri.pptx
+++ b/Tez Çizimleri.pptx
@@ -30,6 +30,8 @@
     <p:sldId id="278" r:id="rId24"/>
     <p:sldId id="279" r:id="rId25"/>
     <p:sldId id="280" r:id="rId26"/>
+    <p:sldId id="281" r:id="rId27"/>
+    <p:sldId id="282" r:id="rId28"/>
   </p:sldIdLst>
   <p:sldSz cx="9144000" cy="6858000" type="screen4x3"/>
   <p:notesSz cx="6858000" cy="9144000"/>
@@ -133,6 +135,7 @@
 
 <file path=ppt/charts/chart1.xml><?xml version="1.0" encoding="utf-8"?>
 <c:chartSpace xmlns:c="http://schemas.openxmlformats.org/drawingml/2006/chart" xmlns:a="http://schemas.openxmlformats.org/drawingml/2006/main" xmlns:r="http://schemas.openxmlformats.org/officeDocument/2006/relationships">
+  <c:date1904 val="1"/>
   <c:lang val="tr-TR"/>
   <c:chart>
     <c:title>
@@ -164,7 +167,7 @@
                   <c:v>0.2</c:v>
                 </c:pt>
                 <c:pt idx="2">
-                  <c:v>0.3</c:v>
+                  <c:v>0.30000000000000004</c:v>
                 </c:pt>
                 <c:pt idx="3">
                   <c:v>0.4</c:v>
@@ -173,10 +176,10 @@
                   <c:v>0.5</c:v>
                 </c:pt>
                 <c:pt idx="5">
-                  <c:v>0.6</c:v>
+                  <c:v>0.60000000000000009</c:v>
                 </c:pt>
                 <c:pt idx="6">
-                  <c:v>0.7</c:v>
+                  <c:v>0.70000000000000007</c:v>
                 </c:pt>
                 <c:pt idx="7">
                   <c:v>0.8</c:v>
@@ -206,7 +209,7 @@
                   <c:v>1.6</c:v>
                 </c:pt>
                 <c:pt idx="16">
-                  <c:v>1.7</c:v>
+                  <c:v>1.7000000000000002</c:v>
                 </c:pt>
                 <c:pt idx="17">
                   <c:v>1.8</c:v>
@@ -251,13 +254,13 @@
                 <c:formatCode>General</c:formatCode>
                 <c:ptCount val="28"/>
                 <c:pt idx="0">
-                  <c:v>99.999999999999986</c:v>
+                  <c:v>100</c:v>
                 </c:pt>
                 <c:pt idx="1">
-                  <c:v>24.999999999999996</c:v>
+                  <c:v>24.999999999999993</c:v>
                 </c:pt>
                 <c:pt idx="2">
-                  <c:v>11.111111111111111</c:v>
+                  <c:v>11.111111111111109</c:v>
                 </c:pt>
                 <c:pt idx="3">
                   <c:v>6.2499999999999991</c:v>
@@ -266,46 +269,46 @@
                   <c:v>4</c:v>
                 </c:pt>
                 <c:pt idx="5">
-                  <c:v>2.7777777777777777</c:v>
+                  <c:v>2.777777777777779</c:v>
                 </c:pt>
                 <c:pt idx="6">
-                  <c:v>2.0408163265306127</c:v>
+                  <c:v>2.0408163265306132</c:v>
                 </c:pt>
                 <c:pt idx="7">
                   <c:v>1.5624999999999998</c:v>
                 </c:pt>
                 <c:pt idx="8">
-                  <c:v>1.2345679012345678</c:v>
+                  <c:v>1.2345679012345681</c:v>
                 </c:pt>
                 <c:pt idx="9">
                   <c:v>1</c:v>
                 </c:pt>
                 <c:pt idx="10">
-                  <c:v>0.82644628099173545</c:v>
+                  <c:v>0.82644628099173534</c:v>
                 </c:pt>
                 <c:pt idx="11">
-                  <c:v>0.69444444444444442</c:v>
+                  <c:v>0.69444444444444464</c:v>
                 </c:pt>
                 <c:pt idx="12">
-                  <c:v>0.59171597633136086</c:v>
+                  <c:v>0.59171597633136097</c:v>
                 </c:pt>
                 <c:pt idx="13">
-                  <c:v>0.51020408163265318</c:v>
+                  <c:v>0.51020408163265307</c:v>
                 </c:pt>
                 <c:pt idx="14">
-                  <c:v>0.44444444444444442</c:v>
+                  <c:v>0.44444444444444448</c:v>
                 </c:pt>
                 <c:pt idx="15">
-                  <c:v>0.39062499999999994</c:v>
+                  <c:v>0.39062500000000011</c:v>
                 </c:pt>
                 <c:pt idx="16">
-                  <c:v>0.34602076124567477</c:v>
+                  <c:v>0.34602076124567499</c:v>
                 </c:pt>
                 <c:pt idx="17">
-                  <c:v>0.30864197530864196</c:v>
+                  <c:v>0.30864197530864207</c:v>
                 </c:pt>
                 <c:pt idx="18">
-                  <c:v>0.2770083102493075</c:v>
+                  <c:v>0.27700831024930755</c:v>
                 </c:pt>
                 <c:pt idx="19">
                   <c:v>0.25</c:v>
@@ -317,19 +320,19 @@
                   <c:v>0.20661157024793386</c:v>
                 </c:pt>
                 <c:pt idx="22">
-                  <c:v>0.18903591682419663</c:v>
+                  <c:v>0.18903591682419668</c:v>
                 </c:pt>
                 <c:pt idx="23">
-                  <c:v>0.1736111111111111</c:v>
+                  <c:v>0.17361111111111113</c:v>
                 </c:pt>
                 <c:pt idx="24">
-                  <c:v>0.16</c:v>
+                  <c:v>0.16000000000000003</c:v>
                 </c:pt>
                 <c:pt idx="25">
-                  <c:v>0.14792899408284022</c:v>
+                  <c:v>0.14792899408284027</c:v>
                 </c:pt>
                 <c:pt idx="26">
-                  <c:v>0.1371742112482853</c:v>
+                  <c:v>0.13717421124828527</c:v>
                 </c:pt>
                 <c:pt idx="27">
                   <c:v>0.1275510204081633</c:v>
@@ -339,11 +342,11 @@
           </c:yVal>
           <c:smooth val="1"/>
         </c:ser>
-        <c:axId val="56744576"/>
-        <c:axId val="56769536"/>
+        <c:axId val="74738688"/>
+        <c:axId val="33035392"/>
       </c:scatterChart>
       <c:valAx>
-        <c:axId val="56744576"/>
+        <c:axId val="74738688"/>
         <c:scaling>
           <c:orientation val="minMax"/>
         </c:scaling>
@@ -369,12 +372,12 @@
         </c:title>
         <c:numFmt formatCode="General" sourceLinked="1"/>
         <c:tickLblPos val="nextTo"/>
-        <c:crossAx val="56769536"/>
+        <c:crossAx val="33035392"/>
         <c:crosses val="autoZero"/>
         <c:crossBetween val="midCat"/>
       </c:valAx>
       <c:valAx>
-        <c:axId val="56769536"/>
+        <c:axId val="33035392"/>
         <c:scaling>
           <c:orientation val="minMax"/>
         </c:scaling>
@@ -405,7 +408,7 @@
         </c:title>
         <c:numFmt formatCode="General" sourceLinked="1"/>
         <c:tickLblPos val="nextTo"/>
-        <c:crossAx val="56744576"/>
+        <c:crossAx val="74738688"/>
         <c:crosses val="autoZero"/>
         <c:crossBetween val="midCat"/>
       </c:valAx>
@@ -423,6 +426,7 @@
 
 <file path=ppt/charts/chart2.xml><?xml version="1.0" encoding="utf-8"?>
 <c:chartSpace xmlns:c="http://schemas.openxmlformats.org/drawingml/2006/chart" xmlns:a="http://schemas.openxmlformats.org/drawingml/2006/main" xmlns:r="http://schemas.openxmlformats.org/officeDocument/2006/relationships">
+  <c:date1904 val="1"/>
   <c:lang val="tr-TR"/>
   <c:chart>
     <c:title>
@@ -450,8 +454,8 @@
         <c:manualLayout>
           <c:xMode val="edge"/>
           <c:yMode val="edge"/>
-          <c:x val="0.18133333333333343"/>
-          <c:y val="2.7777777777777801E-2"/>
+          <c:x val="0.18133333333333346"/>
+          <c:y val="2.7777777777777811E-2"/>
         </c:manualLayout>
       </c:layout>
     </c:title>
@@ -484,7 +488,7 @@
                   <c:v>0.2</c:v>
                 </c:pt>
                 <c:pt idx="3">
-                  <c:v>0.3</c:v>
+                  <c:v>0.30000000000000004</c:v>
                 </c:pt>
                 <c:pt idx="4">
                   <c:v>0.4</c:v>
@@ -493,10 +497,10 @@
                   <c:v>0.5</c:v>
                 </c:pt>
                 <c:pt idx="6">
-                  <c:v>0.6</c:v>
+                  <c:v>0.60000000000000009</c:v>
                 </c:pt>
                 <c:pt idx="7">
-                  <c:v>0.7</c:v>
+                  <c:v>0.70000000000000007</c:v>
                 </c:pt>
                 <c:pt idx="8">
                   <c:v>0.8</c:v>
@@ -532,7 +536,7 @@
                   <c:v>1.8</c:v>
                 </c:pt>
                 <c:pt idx="19">
-                  <c:v>1.9</c:v>
+                  <c:v>1.9000000000000001</c:v>
                 </c:pt>
                 <c:pt idx="20">
                   <c:v>2</c:v>
@@ -678,7 +682,7 @@
                   <c:v>0.2</c:v>
                 </c:pt>
                 <c:pt idx="2">
-                  <c:v>0.3</c:v>
+                  <c:v>0.30000000000000004</c:v>
                 </c:pt>
                 <c:pt idx="3">
                   <c:v>0.4</c:v>
@@ -687,10 +691,10 @@
                   <c:v>0.5</c:v>
                 </c:pt>
                 <c:pt idx="5">
-                  <c:v>0.6</c:v>
+                  <c:v>0.60000000000000009</c:v>
                 </c:pt>
                 <c:pt idx="6">
-                  <c:v>0.7</c:v>
+                  <c:v>0.70000000000000007</c:v>
                 </c:pt>
                 <c:pt idx="7">
                   <c:v>0.8</c:v>
@@ -726,7 +730,7 @@
                   <c:v>1.8</c:v>
                 </c:pt>
                 <c:pt idx="18">
-                  <c:v>1.9</c:v>
+                  <c:v>1.9000000000000001</c:v>
                 </c:pt>
                 <c:pt idx="19">
                   <c:v>2</c:v>
@@ -762,13 +766,13 @@
                 <c:formatCode>General</c:formatCode>
                 <c:ptCount val="27"/>
                 <c:pt idx="0">
-                  <c:v>99.999999999999986</c:v>
+                  <c:v>100</c:v>
                 </c:pt>
                 <c:pt idx="1">
-                  <c:v>24.999999999999996</c:v>
+                  <c:v>24.999999999999993</c:v>
                 </c:pt>
                 <c:pt idx="2">
-                  <c:v>11.111111111111111</c:v>
+                  <c:v>11.111111111111109</c:v>
                 </c:pt>
                 <c:pt idx="3">
                   <c:v>6.2499999999999991</c:v>
@@ -777,81 +781,81 @@
                   <c:v>4</c:v>
                 </c:pt>
                 <c:pt idx="5">
-                  <c:v>2.7777777777777777</c:v>
+                  <c:v>2.777777777777779</c:v>
                 </c:pt>
                 <c:pt idx="6">
-                  <c:v>2.0408163265306127</c:v>
+                  <c:v>2.0408163265306132</c:v>
                 </c:pt>
                 <c:pt idx="7">
                   <c:v>1.5624999999999998</c:v>
                 </c:pt>
                 <c:pt idx="8">
-                  <c:v>1.2345679012345678</c:v>
+                  <c:v>1.2345679012345681</c:v>
                 </c:pt>
                 <c:pt idx="9">
                   <c:v>1</c:v>
                 </c:pt>
                 <c:pt idx="10">
-                  <c:v>0.82644628099173545</c:v>
+                  <c:v>0.82644628099173534</c:v>
                 </c:pt>
                 <c:pt idx="11">
-                  <c:v>0.69444444444444442</c:v>
+                  <c:v>0.69444444444444453</c:v>
                 </c:pt>
                 <c:pt idx="12">
                   <c:v>0.59171597633136086</c:v>
                 </c:pt>
                 <c:pt idx="13">
-                  <c:v>0.51020408163265318</c:v>
+                  <c:v>0.51020408163265307</c:v>
                 </c:pt>
                 <c:pt idx="14">
                   <c:v>0.44444444444444442</c:v>
                 </c:pt>
                 <c:pt idx="15">
-                  <c:v>0.39062499999999994</c:v>
+                  <c:v>0.39062500000000011</c:v>
                 </c:pt>
                 <c:pt idx="16">
-                  <c:v>0.34602076124567477</c:v>
+                  <c:v>0.34602076124567493</c:v>
                 </c:pt>
                 <c:pt idx="17">
-                  <c:v>0.30864197530864196</c:v>
+                  <c:v>0.30864197530864207</c:v>
                 </c:pt>
                 <c:pt idx="18">
-                  <c:v>0.2770083102493075</c:v>
+                  <c:v>0.27700831024930755</c:v>
                 </c:pt>
                 <c:pt idx="19">
                   <c:v>0.25</c:v>
                 </c:pt>
                 <c:pt idx="20">
-                  <c:v>0.22675736961451246</c:v>
+                  <c:v>0.22675736961451243</c:v>
                 </c:pt>
                 <c:pt idx="21">
                   <c:v>0.20661157024793386</c:v>
                 </c:pt>
                 <c:pt idx="22">
-                  <c:v>0.18903591682419663</c:v>
+                  <c:v>0.18903591682419668</c:v>
                 </c:pt>
                 <c:pt idx="23">
-                  <c:v>0.1736111111111111</c:v>
+                  <c:v>0.17361111111111113</c:v>
                 </c:pt>
                 <c:pt idx="24">
                   <c:v>0.16</c:v>
                 </c:pt>
                 <c:pt idx="25">
-                  <c:v>0.14792899408284022</c:v>
+                  <c:v>0.14792899408284027</c:v>
                 </c:pt>
                 <c:pt idx="26">
-                  <c:v>0.1371742112482853</c:v>
+                  <c:v>0.13717421124828527</c:v>
                 </c:pt>
               </c:numCache>
             </c:numRef>
           </c:yVal>
           <c:smooth val="1"/>
         </c:ser>
-        <c:axId val="46062592"/>
-        <c:axId val="56799616"/>
+        <c:axId val="33080064"/>
+        <c:axId val="33081984"/>
       </c:scatterChart>
       <c:valAx>
-        <c:axId val="46062592"/>
+        <c:axId val="33080064"/>
         <c:scaling>
           <c:orientation val="minMax"/>
         </c:scaling>
@@ -885,12 +889,12 @@
         </c:title>
         <c:numFmt formatCode="General" sourceLinked="1"/>
         <c:tickLblPos val="nextTo"/>
-        <c:crossAx val="56799616"/>
+        <c:crossAx val="33081984"/>
         <c:crosses val="autoZero"/>
         <c:crossBetween val="midCat"/>
       </c:valAx>
       <c:valAx>
-        <c:axId val="56799616"/>
+        <c:axId val="33081984"/>
         <c:scaling>
           <c:orientation val="minMax"/>
         </c:scaling>
@@ -916,7 +920,7 @@
         </c:title>
         <c:numFmt formatCode="General" sourceLinked="1"/>
         <c:tickLblPos val="nextTo"/>
-        <c:crossAx val="46062592"/>
+        <c:crossAx val="33080064"/>
         <c:crosses val="autoZero"/>
         <c:crossBetween val="midCat"/>
       </c:valAx>
@@ -933,6 +937,7 @@
 
 <file path=ppt/charts/chart3.xml><?xml version="1.0" encoding="utf-8"?>
 <c:chartSpace xmlns:c="http://schemas.openxmlformats.org/drawingml/2006/chart" xmlns:a="http://schemas.openxmlformats.org/drawingml/2006/main" xmlns:r="http://schemas.openxmlformats.org/officeDocument/2006/relationships">
+  <c:date1904 val="1"/>
   <c:lang val="tr-TR"/>
   <c:chart>
     <c:title>
@@ -967,7 +972,7 @@
                   <c:v>0.2</c:v>
                 </c:pt>
                 <c:pt idx="3">
-                  <c:v>0.3</c:v>
+                  <c:v>0.30000000000000004</c:v>
                 </c:pt>
                 <c:pt idx="4">
                   <c:v>0.4</c:v>
@@ -976,10 +981,10 @@
                   <c:v>0.5</c:v>
                 </c:pt>
                 <c:pt idx="6">
-                  <c:v>0.6</c:v>
+                  <c:v>0.60000000000000009</c:v>
                 </c:pt>
                 <c:pt idx="7">
-                  <c:v>0.7</c:v>
+                  <c:v>0.70000000000000007</c:v>
                 </c:pt>
                 <c:pt idx="8">
                   <c:v>0.8</c:v>
@@ -1015,7 +1020,7 @@
                   <c:v>1.8</c:v>
                 </c:pt>
                 <c:pt idx="19">
-                  <c:v>1.9</c:v>
+                  <c:v>1.9000000000000001</c:v>
                 </c:pt>
                 <c:pt idx="20">
                   <c:v>2</c:v>
@@ -1084,16 +1089,16 @@
                   <c:v>3.9679000000000002</c:v>
                 </c:pt>
                 <c:pt idx="2">
-                  <c:v>3.9312</c:v>
+                  <c:v>3.9311999999999996</c:v>
                 </c:pt>
                 <c:pt idx="3">
                   <c:v>3.8893</c:v>
                 </c:pt>
                 <c:pt idx="4">
-                  <c:v>3.8416000000000001</c:v>
+                  <c:v>3.8415999999999997</c:v>
                 </c:pt>
                 <c:pt idx="5">
-                  <c:v>3.7875000000000001</c:v>
+                  <c:v>3.7875000000000005</c:v>
                 </c:pt>
                 <c:pt idx="6">
                   <c:v>3.7263999999999999</c:v>
@@ -1105,7 +1110,7 @@
                   <c:v>3.5808</c:v>
                 </c:pt>
                 <c:pt idx="9">
-                  <c:v>3.4950999999999999</c:v>
+                  <c:v>3.4950999999999994</c:v>
                 </c:pt>
                 <c:pt idx="10">
                   <c:v>3.4</c:v>
@@ -1117,10 +1122,10 @@
                   <c:v>3.1791999999999998</c:v>
                 </c:pt>
                 <c:pt idx="13">
-                  <c:v>3.0522999999999998</c:v>
+                  <c:v>3.0522999999999993</c:v>
                 </c:pt>
                 <c:pt idx="14">
-                  <c:v>2.9136000000000002</c:v>
+                  <c:v>2.9135999999999997</c:v>
                 </c:pt>
                 <c:pt idx="15">
                   <c:v>2.7625000000000002</c:v>
@@ -1132,31 +1137,31 @@
                   <c:v>2.4207000000000001</c:v>
                 </c:pt>
                 <c:pt idx="18">
-                  <c:v>2.2287999999999997</c:v>
+                  <c:v>2.2288000000000001</c:v>
                 </c:pt>
                 <c:pt idx="19">
                   <c:v>2.0221</c:v>
                 </c:pt>
                 <c:pt idx="20">
-                  <c:v>1.7999999999999998</c:v>
+                  <c:v>1.7999999999999996</c:v>
                 </c:pt>
                 <c:pt idx="21">
-                  <c:v>1.5618999999999996</c:v>
+                  <c:v>1.5618999999999994</c:v>
                 </c:pt>
                 <c:pt idx="22">
-                  <c:v>1.307199999999999</c:v>
+                  <c:v>1.3071999999999988</c:v>
                 </c:pt>
                 <c:pt idx="23">
                   <c:v>1.0353000000000008</c:v>
                 </c:pt>
                 <c:pt idx="24">
-                  <c:v>0.74560000000000048</c:v>
+                  <c:v>0.74560000000000071</c:v>
                 </c:pt>
                 <c:pt idx="25">
-                  <c:v>0.4375</c:v>
+                  <c:v>0.43750000000000006</c:v>
                 </c:pt>
                 <c:pt idx="26">
-                  <c:v>0.11039999999999939</c:v>
+                  <c:v>0.11039999999999937</c:v>
                 </c:pt>
                 <c:pt idx="27">
                   <c:v>0</c:v>
@@ -1193,11 +1198,11 @@
           </c:yVal>
           <c:smooth val="1"/>
         </c:ser>
-        <c:axId val="87817600"/>
-        <c:axId val="90169344"/>
+        <c:axId val="74857472"/>
+        <c:axId val="74880128"/>
       </c:scatterChart>
       <c:valAx>
-        <c:axId val="87817600"/>
+        <c:axId val="74857472"/>
         <c:scaling>
           <c:orientation val="minMax"/>
         </c:scaling>
@@ -1222,12 +1227,12 @@
         </c:title>
         <c:numFmt formatCode="General" sourceLinked="1"/>
         <c:tickLblPos val="nextTo"/>
-        <c:crossAx val="90169344"/>
+        <c:crossAx val="74880128"/>
         <c:crosses val="autoZero"/>
         <c:crossBetween val="midCat"/>
       </c:valAx>
       <c:valAx>
-        <c:axId val="90169344"/>
+        <c:axId val="74880128"/>
         <c:scaling>
           <c:orientation val="minMax"/>
         </c:scaling>
@@ -1253,7 +1258,7 @@
         </c:title>
         <c:numFmt formatCode="General" sourceLinked="1"/>
         <c:tickLblPos val="nextTo"/>
-        <c:crossAx val="87817600"/>
+        <c:crossAx val="74857472"/>
         <c:crosses val="autoZero"/>
         <c:crossBetween val="midCat"/>
       </c:valAx>
@@ -1488,7 +1493,7 @@
             <a:fld id="{1D8BD707-D9CF-40AE-B4C6-C98DA3205C09}" type="datetimeFigureOut">
               <a:rPr lang="en-US" smtClean="0"/>
               <a:pPr/>
-              <a:t>9/2/2015</a:t>
+              <a:t>9/3/2015</a:t>
             </a:fld>
             <a:endParaRPr lang="en-US"/>
           </a:p>
@@ -1655,7 +1660,7 @@
             <a:fld id="{1D8BD707-D9CF-40AE-B4C6-C98DA3205C09}" type="datetimeFigureOut">
               <a:rPr lang="en-US" smtClean="0"/>
               <a:pPr/>
-              <a:t>9/2/2015</a:t>
+              <a:t>9/3/2015</a:t>
             </a:fld>
             <a:endParaRPr lang="en-US"/>
           </a:p>
@@ -1832,7 +1837,7 @@
             <a:fld id="{1D8BD707-D9CF-40AE-B4C6-C98DA3205C09}" type="datetimeFigureOut">
               <a:rPr lang="en-US" smtClean="0"/>
               <a:pPr/>
-              <a:t>9/2/2015</a:t>
+              <a:t>9/3/2015</a:t>
             </a:fld>
             <a:endParaRPr lang="en-US"/>
           </a:p>
@@ -1999,7 +2004,7 @@
             <a:fld id="{1D8BD707-D9CF-40AE-B4C6-C98DA3205C09}" type="datetimeFigureOut">
               <a:rPr lang="en-US" smtClean="0"/>
               <a:pPr/>
-              <a:t>9/2/2015</a:t>
+              <a:t>9/3/2015</a:t>
             </a:fld>
             <a:endParaRPr lang="en-US"/>
           </a:p>
@@ -2242,7 +2247,7 @@
             <a:fld id="{1D8BD707-D9CF-40AE-B4C6-C98DA3205C09}" type="datetimeFigureOut">
               <a:rPr lang="en-US" smtClean="0"/>
               <a:pPr/>
-              <a:t>9/2/2015</a:t>
+              <a:t>9/3/2015</a:t>
             </a:fld>
             <a:endParaRPr lang="en-US"/>
           </a:p>
@@ -2527,7 +2532,7 @@
             <a:fld id="{1D8BD707-D9CF-40AE-B4C6-C98DA3205C09}" type="datetimeFigureOut">
               <a:rPr lang="en-US" smtClean="0"/>
               <a:pPr/>
-              <a:t>9/2/2015</a:t>
+              <a:t>9/3/2015</a:t>
             </a:fld>
             <a:endParaRPr lang="en-US"/>
           </a:p>
@@ -2946,7 +2951,7 @@
             <a:fld id="{1D8BD707-D9CF-40AE-B4C6-C98DA3205C09}" type="datetimeFigureOut">
               <a:rPr lang="en-US" smtClean="0"/>
               <a:pPr/>
-              <a:t>9/2/2015</a:t>
+              <a:t>9/3/2015</a:t>
             </a:fld>
             <a:endParaRPr lang="en-US"/>
           </a:p>
@@ -3061,7 +3066,7 @@
             <a:fld id="{1D8BD707-D9CF-40AE-B4C6-C98DA3205C09}" type="datetimeFigureOut">
               <a:rPr lang="en-US" smtClean="0"/>
               <a:pPr/>
-              <a:t>9/2/2015</a:t>
+              <a:t>9/3/2015</a:t>
             </a:fld>
             <a:endParaRPr lang="en-US"/>
           </a:p>
@@ -3153,7 +3158,7 @@
             <a:fld id="{1D8BD707-D9CF-40AE-B4C6-C98DA3205C09}" type="datetimeFigureOut">
               <a:rPr lang="en-US" smtClean="0"/>
               <a:pPr/>
-              <a:t>9/2/2015</a:t>
+              <a:t>9/3/2015</a:t>
             </a:fld>
             <a:endParaRPr lang="en-US"/>
           </a:p>
@@ -3427,7 +3432,7 @@
             <a:fld id="{1D8BD707-D9CF-40AE-B4C6-C98DA3205C09}" type="datetimeFigureOut">
               <a:rPr lang="en-US" smtClean="0"/>
               <a:pPr/>
-              <a:t>9/2/2015</a:t>
+              <a:t>9/3/2015</a:t>
             </a:fld>
             <a:endParaRPr lang="en-US"/>
           </a:p>
@@ -3677,7 +3682,7 @@
             <a:fld id="{1D8BD707-D9CF-40AE-B4C6-C98DA3205C09}" type="datetimeFigureOut">
               <a:rPr lang="en-US" smtClean="0"/>
               <a:pPr/>
-              <a:t>9/2/2015</a:t>
+              <a:t>9/3/2015</a:t>
             </a:fld>
             <a:endParaRPr lang="en-US"/>
           </a:p>
@@ -3887,7 +3892,7 @@
             <a:fld id="{1D8BD707-D9CF-40AE-B4C6-C98DA3205C09}" type="datetimeFigureOut">
               <a:rPr lang="en-US" smtClean="0"/>
               <a:pPr/>
-              <a:t>9/2/2015</a:t>
+              <a:t>9/3/2015</a:t>
             </a:fld>
             <a:endParaRPr lang="en-US"/>
           </a:p>
@@ -24421,6 +24426,381 @@
           <a:effectLst/>
         </p:spPr>
       </p:pic>
+    </p:spTree>
+  </p:cSld>
+  <p:clrMapOvr>
+    <a:masterClrMapping/>
+  </p:clrMapOvr>
+</p:sld>
+</file>
+
+<file path=ppt/slides/slide26.xml><?xml version="1.0" encoding="utf-8"?>
+<p:sld xmlns:a="http://schemas.openxmlformats.org/drawingml/2006/main" xmlns:r="http://schemas.openxmlformats.org/officeDocument/2006/relationships" xmlns:p="http://schemas.openxmlformats.org/presentationml/2006/main">
+  <p:cSld>
+    <p:spTree>
+      <p:nvGrpSpPr>
+        <p:cNvPr id="1" name=""/>
+        <p:cNvGrpSpPr/>
+        <p:nvPr/>
+      </p:nvGrpSpPr>
+      <p:grpSpPr>
+        <a:xfrm>
+          <a:off x="0" y="0"/>
+          <a:ext cx="0" cy="0"/>
+          <a:chOff x="0" y="0"/>
+          <a:chExt cx="0" cy="0"/>
+        </a:xfrm>
+      </p:grpSpPr>
+      <p:pic>
+        <p:nvPicPr>
+          <p:cNvPr id="1027" name="Picture 3"/>
+          <p:cNvPicPr>
+            <a:picLocks noChangeAspect="1" noChangeArrowheads="1"/>
+          </p:cNvPicPr>
+          <p:nvPr/>
+        </p:nvPicPr>
+        <p:blipFill>
+          <a:blip r:embed="rId2"/>
+          <a:srcRect/>
+          <a:stretch>
+            <a:fillRect/>
+          </a:stretch>
+        </p:blipFill>
+        <p:spPr bwMode="auto">
+          <a:xfrm>
+            <a:off x="2971800" y="1219200"/>
+            <a:ext cx="3133725" cy="2733675"/>
+          </a:xfrm>
+          <a:prstGeom prst="rect">
+            <a:avLst/>
+          </a:prstGeom>
+          <a:noFill/>
+          <a:ln w="9525">
+            <a:noFill/>
+            <a:miter lim="800000"/>
+            <a:headEnd/>
+            <a:tailEnd/>
+          </a:ln>
+          <a:effectLst/>
+        </p:spPr>
+      </p:pic>
+      <p:sp>
+        <p:nvSpPr>
+          <p:cNvPr id="16" name="TextBox 15"/>
+          <p:cNvSpPr txBox="1"/>
+          <p:nvPr/>
+        </p:nvSpPr>
+        <p:spPr>
+          <a:xfrm>
+            <a:off x="2286000" y="533400"/>
+            <a:ext cx="4724400" cy="646331"/>
+          </a:xfrm>
+          <a:prstGeom prst="rect">
+            <a:avLst/>
+          </a:prstGeom>
+          <a:noFill/>
+        </p:spPr>
+        <p:txBody>
+          <a:bodyPr wrap="square" rtlCol="0">
+            <a:spAutoFit/>
+          </a:bodyPr>
+          <a:lstStyle/>
+          <a:p>
+            <a:r>
+              <a:rPr lang="tr-TR" dirty="0" smtClean="0"/>
+              <a:t>Node i with 6 neighbors</a:t>
+            </a:r>
+          </a:p>
+          <a:p>
+            <a:endParaRPr lang="tr-TR" dirty="0"/>
+          </a:p>
+        </p:txBody>
+      </p:sp>
+      <p:sp>
+        <p:nvSpPr>
+          <p:cNvPr id="17" name="TextBox 16"/>
+          <p:cNvSpPr txBox="1"/>
+          <p:nvPr/>
+        </p:nvSpPr>
+        <p:spPr>
+          <a:xfrm>
+            <a:off x="2387838" y="2328730"/>
+            <a:ext cx="670376" cy="307777"/>
+          </a:xfrm>
+          <a:prstGeom prst="rect">
+            <a:avLst/>
+          </a:prstGeom>
+          <a:noFill/>
+        </p:spPr>
+        <p:txBody>
+          <a:bodyPr wrap="none" rtlCol="0">
+            <a:spAutoFit/>
+          </a:bodyPr>
+          <a:lstStyle/>
+          <a:p>
+            <a:r>
+              <a:rPr lang="tr-TR" sz="1400" b="1" dirty="0" smtClean="0"/>
+              <a:t>Node i</a:t>
+            </a:r>
+            <a:endParaRPr lang="tr-TR" sz="1400" b="1" dirty="0"/>
+          </a:p>
+        </p:txBody>
+      </p:sp>
+      <p:cxnSp>
+        <p:nvCxnSpPr>
+          <p:cNvPr id="20" name="Straight Arrow Connector 19"/>
+          <p:cNvCxnSpPr/>
+          <p:nvPr/>
+        </p:nvCxnSpPr>
+        <p:spPr>
+          <a:xfrm rot="10800000">
+            <a:off x="2971800" y="2514600"/>
+            <a:ext cx="1371600" cy="381000"/>
+          </a:xfrm>
+          <a:prstGeom prst="straightConnector1">
+            <a:avLst/>
+          </a:prstGeom>
+          <a:ln w="25400">
+            <a:tailEnd type="arrow"/>
+          </a:ln>
+        </p:spPr>
+        <p:style>
+          <a:lnRef idx="1">
+            <a:schemeClr val="accent1"/>
+          </a:lnRef>
+          <a:fillRef idx="0">
+            <a:schemeClr val="accent1"/>
+          </a:fillRef>
+          <a:effectRef idx="0">
+            <a:schemeClr val="accent1"/>
+          </a:effectRef>
+          <a:fontRef idx="minor">
+            <a:schemeClr val="tx1"/>
+          </a:fontRef>
+        </p:style>
+      </p:cxnSp>
+    </p:spTree>
+  </p:cSld>
+  <p:clrMapOvr>
+    <a:masterClrMapping/>
+  </p:clrMapOvr>
+</p:sld>
+</file>
+
+<file path=ppt/slides/slide27.xml><?xml version="1.0" encoding="utf-8"?>
+<p:sld xmlns:a="http://schemas.openxmlformats.org/drawingml/2006/main" xmlns:r="http://schemas.openxmlformats.org/officeDocument/2006/relationships" xmlns:p="http://schemas.openxmlformats.org/presentationml/2006/main">
+  <p:cSld>
+    <p:spTree>
+      <p:nvGrpSpPr>
+        <p:cNvPr id="1" name=""/>
+        <p:cNvGrpSpPr/>
+        <p:nvPr/>
+      </p:nvGrpSpPr>
+      <p:grpSpPr>
+        <a:xfrm>
+          <a:off x="0" y="0"/>
+          <a:ext cx="0" cy="0"/>
+          <a:chOff x="0" y="0"/>
+          <a:chExt cx="0" cy="0"/>
+        </a:xfrm>
+      </p:grpSpPr>
+      <p:pic>
+        <p:nvPicPr>
+          <p:cNvPr id="2051" name="Picture 3"/>
+          <p:cNvPicPr>
+            <a:picLocks noChangeAspect="1" noChangeArrowheads="1"/>
+          </p:cNvPicPr>
+          <p:nvPr/>
+        </p:nvPicPr>
+        <p:blipFill>
+          <a:blip r:embed="rId2"/>
+          <a:srcRect/>
+          <a:stretch>
+            <a:fillRect/>
+          </a:stretch>
+        </p:blipFill>
+        <p:spPr bwMode="auto">
+          <a:xfrm>
+            <a:off x="3043238" y="2066925"/>
+            <a:ext cx="3057525" cy="2724150"/>
+          </a:xfrm>
+          <a:prstGeom prst="rect">
+            <a:avLst/>
+          </a:prstGeom>
+          <a:noFill/>
+          <a:ln w="9525">
+            <a:noFill/>
+            <a:miter lim="800000"/>
+            <a:headEnd/>
+            <a:tailEnd/>
+          </a:ln>
+          <a:effectLst/>
+        </p:spPr>
+      </p:pic>
+      <p:cxnSp>
+        <p:nvCxnSpPr>
+          <p:cNvPr id="7" name="Straight Arrow Connector 6"/>
+          <p:cNvCxnSpPr/>
+          <p:nvPr/>
+        </p:nvCxnSpPr>
+        <p:spPr>
+          <a:xfrm rot="10800000">
+            <a:off x="2997438" y="3361346"/>
+            <a:ext cx="1371600" cy="381000"/>
+          </a:xfrm>
+          <a:prstGeom prst="straightConnector1">
+            <a:avLst/>
+          </a:prstGeom>
+          <a:ln w="25400">
+            <a:tailEnd type="arrow"/>
+          </a:ln>
+        </p:spPr>
+        <p:style>
+          <a:lnRef idx="1">
+            <a:schemeClr val="accent1"/>
+          </a:lnRef>
+          <a:fillRef idx="0">
+            <a:schemeClr val="accent1"/>
+          </a:fillRef>
+          <a:effectRef idx="0">
+            <a:schemeClr val="accent1"/>
+          </a:effectRef>
+          <a:fontRef idx="minor">
+            <a:schemeClr val="tx1"/>
+          </a:fontRef>
+        </p:style>
+      </p:cxnSp>
+      <p:sp>
+        <p:nvSpPr>
+          <p:cNvPr id="8" name="TextBox 7"/>
+          <p:cNvSpPr txBox="1"/>
+          <p:nvPr/>
+        </p:nvSpPr>
+        <p:spPr>
+          <a:xfrm>
+            <a:off x="2514600" y="3073638"/>
+            <a:ext cx="670376" cy="307777"/>
+          </a:xfrm>
+          <a:prstGeom prst="rect">
+            <a:avLst/>
+          </a:prstGeom>
+          <a:noFill/>
+        </p:spPr>
+        <p:txBody>
+          <a:bodyPr wrap="none" rtlCol="0">
+            <a:spAutoFit/>
+          </a:bodyPr>
+          <a:lstStyle/>
+          <a:p>
+            <a:r>
+              <a:rPr lang="tr-TR" sz="1400" b="1" dirty="0" smtClean="0"/>
+              <a:t>Node i</a:t>
+            </a:r>
+            <a:endParaRPr lang="tr-TR" sz="1400" b="1" dirty="0"/>
+          </a:p>
+        </p:txBody>
+      </p:sp>
+      <p:sp>
+        <p:nvSpPr>
+          <p:cNvPr id="9" name="TextBox 8"/>
+          <p:cNvSpPr txBox="1"/>
+          <p:nvPr/>
+        </p:nvSpPr>
+        <p:spPr>
+          <a:xfrm>
+            <a:off x="2362200" y="1219200"/>
+            <a:ext cx="4724400" cy="646331"/>
+          </a:xfrm>
+          <a:prstGeom prst="rect">
+            <a:avLst/>
+          </a:prstGeom>
+          <a:noFill/>
+        </p:spPr>
+        <p:txBody>
+          <a:bodyPr wrap="square" rtlCol="0">
+            <a:spAutoFit/>
+          </a:bodyPr>
+          <a:lstStyle/>
+          <a:p>
+            <a:r>
+              <a:rPr lang="tr-TR" dirty="0" smtClean="0"/>
+              <a:t>The inscribed and circumscribing circles of Voronoi cell belonging to Node i</a:t>
+            </a:r>
+            <a:endParaRPr lang="tr-TR" dirty="0"/>
+          </a:p>
+        </p:txBody>
+      </p:sp>
+      <p:cxnSp>
+        <p:nvCxnSpPr>
+          <p:cNvPr id="10" name="Straight Arrow Connector 9"/>
+          <p:cNvCxnSpPr/>
+          <p:nvPr/>
+        </p:nvCxnSpPr>
+        <p:spPr>
+          <a:xfrm rot="10800000" flipV="1">
+            <a:off x="2895600" y="3962400"/>
+            <a:ext cx="1219200" cy="152400"/>
+          </a:xfrm>
+          <a:prstGeom prst="straightConnector1">
+            <a:avLst/>
+          </a:prstGeom>
+          <a:ln w="25400">
+            <a:tailEnd type="arrow"/>
+          </a:ln>
+        </p:spPr>
+        <p:style>
+          <a:lnRef idx="1">
+            <a:schemeClr val="accent1"/>
+          </a:lnRef>
+          <a:fillRef idx="0">
+            <a:schemeClr val="accent1"/>
+          </a:fillRef>
+          <a:effectRef idx="0">
+            <a:schemeClr val="accent1"/>
+          </a:effectRef>
+          <a:fontRef idx="minor">
+            <a:schemeClr val="tx1"/>
+          </a:fontRef>
+        </p:style>
+      </p:cxnSp>
+      <p:sp>
+        <p:nvSpPr>
+          <p:cNvPr id="14" name="TextBox 13"/>
+          <p:cNvSpPr txBox="1"/>
+          <p:nvPr/>
+        </p:nvSpPr>
+        <p:spPr>
+          <a:xfrm>
+            <a:off x="1887908" y="3962400"/>
+            <a:ext cx="1127937" cy="523220"/>
+          </a:xfrm>
+          <a:prstGeom prst="rect">
+            <a:avLst/>
+          </a:prstGeom>
+          <a:noFill/>
+        </p:spPr>
+        <p:txBody>
+          <a:bodyPr wrap="none" rtlCol="0">
+            <a:spAutoFit/>
+          </a:bodyPr>
+          <a:lstStyle/>
+          <a:p>
+            <a:pPr algn="ctr"/>
+            <a:r>
+              <a:rPr lang="tr-TR" sz="1400" b="1" dirty="0" smtClean="0"/>
+              <a:t>Voronoi Cell </a:t>
+            </a:r>
+          </a:p>
+          <a:p>
+            <a:pPr algn="ctr"/>
+            <a:r>
+              <a:rPr lang="tr-TR" sz="1400" b="1" dirty="0" smtClean="0"/>
+              <a:t>of Node i</a:t>
+            </a:r>
+            <a:endParaRPr lang="tr-TR" sz="1400" b="1" dirty="0"/>
+          </a:p>
+        </p:txBody>
+      </p:sp>
     </p:spTree>
   </p:cSld>
   <p:clrMapOvr>

</xml_diff>

<commit_message>
[upgrade] lqr system design added to the documentation
</commit_message>
<xml_diff>
--- a/Tez Çizimleri.pptx
+++ b/Tez Çizimleri.pptx
@@ -32,6 +32,10 @@
     <p:sldId id="280" r:id="rId26"/>
     <p:sldId id="281" r:id="rId27"/>
     <p:sldId id="282" r:id="rId28"/>
+    <p:sldId id="283" r:id="rId29"/>
+    <p:sldId id="284" r:id="rId30"/>
+    <p:sldId id="285" r:id="rId31"/>
+    <p:sldId id="286" r:id="rId32"/>
   </p:sldIdLst>
   <p:sldSz cx="9144000" cy="6858000" type="screen4x3"/>
   <p:notesSz cx="6858000" cy="9144000"/>
@@ -167,7 +171,7 @@
                   <c:v>0.2</c:v>
                 </c:pt>
                 <c:pt idx="2">
-                  <c:v>0.30000000000000004</c:v>
+                  <c:v>0.3000000000000001</c:v>
                 </c:pt>
                 <c:pt idx="3">
                   <c:v>0.4</c:v>
@@ -176,10 +180,10 @@
                   <c:v>0.5</c:v>
                 </c:pt>
                 <c:pt idx="5">
-                  <c:v>0.60000000000000009</c:v>
+                  <c:v>0.6000000000000002</c:v>
                 </c:pt>
                 <c:pt idx="6">
-                  <c:v>0.70000000000000007</c:v>
+                  <c:v>0.70000000000000018</c:v>
                 </c:pt>
                 <c:pt idx="7">
                   <c:v>0.8</c:v>
@@ -209,7 +213,7 @@
                   <c:v>1.6</c:v>
                 </c:pt>
                 <c:pt idx="16">
-                  <c:v>1.7000000000000002</c:v>
+                  <c:v>1.7000000000000004</c:v>
                 </c:pt>
                 <c:pt idx="17">
                   <c:v>1.8</c:v>
@@ -257,10 +261,10 @@
                   <c:v>100</c:v>
                 </c:pt>
                 <c:pt idx="1">
-                  <c:v>24.999999999999993</c:v>
+                  <c:v>24.999999999999989</c:v>
                 </c:pt>
                 <c:pt idx="2">
-                  <c:v>11.111111111111109</c:v>
+                  <c:v>11.111111111111105</c:v>
                 </c:pt>
                 <c:pt idx="3">
                   <c:v>6.2499999999999991</c:v>
@@ -269,7 +273,7 @@
                   <c:v>4</c:v>
                 </c:pt>
                 <c:pt idx="5">
-                  <c:v>2.777777777777779</c:v>
+                  <c:v>2.7777777777777799</c:v>
                 </c:pt>
                 <c:pt idx="6">
                   <c:v>2.0408163265306132</c:v>
@@ -284,31 +288,31 @@
                   <c:v>1</c:v>
                 </c:pt>
                 <c:pt idx="10">
-                  <c:v>0.82644628099173534</c:v>
+                  <c:v>0.82644628099173523</c:v>
                 </c:pt>
                 <c:pt idx="11">
-                  <c:v>0.69444444444444464</c:v>
+                  <c:v>0.69444444444444475</c:v>
                 </c:pt>
                 <c:pt idx="12">
-                  <c:v>0.59171597633136097</c:v>
+                  <c:v>0.59171597633136108</c:v>
                 </c:pt>
                 <c:pt idx="13">
-                  <c:v>0.51020408163265307</c:v>
+                  <c:v>0.51020408163265296</c:v>
                 </c:pt>
                 <c:pt idx="14">
-                  <c:v>0.44444444444444448</c:v>
+                  <c:v>0.44444444444444453</c:v>
                 </c:pt>
                 <c:pt idx="15">
-                  <c:v>0.39062500000000011</c:v>
+                  <c:v>0.39062500000000017</c:v>
                 </c:pt>
                 <c:pt idx="16">
-                  <c:v>0.34602076124567499</c:v>
+                  <c:v>0.34602076124567521</c:v>
                 </c:pt>
                 <c:pt idx="17">
-                  <c:v>0.30864197530864207</c:v>
+                  <c:v>0.30864197530864218</c:v>
                 </c:pt>
                 <c:pt idx="18">
-                  <c:v>0.27700831024930755</c:v>
+                  <c:v>0.27700831024930761</c:v>
                 </c:pt>
                 <c:pt idx="19">
                   <c:v>0.25</c:v>
@@ -320,19 +324,19 @@
                   <c:v>0.20661157024793386</c:v>
                 </c:pt>
                 <c:pt idx="22">
-                  <c:v>0.18903591682419668</c:v>
+                  <c:v>0.18903591682419674</c:v>
                 </c:pt>
                 <c:pt idx="23">
-                  <c:v>0.17361111111111113</c:v>
+                  <c:v>0.17361111111111116</c:v>
                 </c:pt>
                 <c:pt idx="24">
-                  <c:v>0.16000000000000003</c:v>
+                  <c:v>0.16000000000000006</c:v>
                 </c:pt>
                 <c:pt idx="25">
-                  <c:v>0.14792899408284027</c:v>
+                  <c:v>0.14792899408284033</c:v>
                 </c:pt>
                 <c:pt idx="26">
-                  <c:v>0.13717421124828527</c:v>
+                  <c:v>0.13717421124828524</c:v>
                 </c:pt>
                 <c:pt idx="27">
                   <c:v>0.1275510204081633</c:v>
@@ -342,11 +346,11 @@
           </c:yVal>
           <c:smooth val="1"/>
         </c:ser>
-        <c:axId val="74738688"/>
-        <c:axId val="33035392"/>
+        <c:axId val="51393280"/>
+        <c:axId val="51418624"/>
       </c:scatterChart>
       <c:valAx>
-        <c:axId val="74738688"/>
+        <c:axId val="51393280"/>
         <c:scaling>
           <c:orientation val="minMax"/>
         </c:scaling>
@@ -372,12 +376,12 @@
         </c:title>
         <c:numFmt formatCode="General" sourceLinked="1"/>
         <c:tickLblPos val="nextTo"/>
-        <c:crossAx val="33035392"/>
+        <c:crossAx val="51418624"/>
         <c:crosses val="autoZero"/>
         <c:crossBetween val="midCat"/>
       </c:valAx>
       <c:valAx>
-        <c:axId val="33035392"/>
+        <c:axId val="51418624"/>
         <c:scaling>
           <c:orientation val="minMax"/>
         </c:scaling>
@@ -408,7 +412,7 @@
         </c:title>
         <c:numFmt formatCode="General" sourceLinked="1"/>
         <c:tickLblPos val="nextTo"/>
-        <c:crossAx val="74738688"/>
+        <c:crossAx val="51393280"/>
         <c:crosses val="autoZero"/>
         <c:crossBetween val="midCat"/>
       </c:valAx>
@@ -454,8 +458,8 @@
         <c:manualLayout>
           <c:xMode val="edge"/>
           <c:yMode val="edge"/>
-          <c:x val="0.18133333333333346"/>
-          <c:y val="2.7777777777777811E-2"/>
+          <c:x val="0.18133333333333349"/>
+          <c:y val="2.7777777777777821E-2"/>
         </c:manualLayout>
       </c:layout>
     </c:title>
@@ -488,7 +492,7 @@
                   <c:v>0.2</c:v>
                 </c:pt>
                 <c:pt idx="3">
-                  <c:v>0.30000000000000004</c:v>
+                  <c:v>0.3000000000000001</c:v>
                 </c:pt>
                 <c:pt idx="4">
                   <c:v>0.4</c:v>
@@ -497,10 +501,10 @@
                   <c:v>0.5</c:v>
                 </c:pt>
                 <c:pt idx="6">
-                  <c:v>0.60000000000000009</c:v>
+                  <c:v>0.6000000000000002</c:v>
                 </c:pt>
                 <c:pt idx="7">
-                  <c:v>0.70000000000000007</c:v>
+                  <c:v>0.70000000000000018</c:v>
                 </c:pt>
                 <c:pt idx="8">
                   <c:v>0.8</c:v>
@@ -682,7 +686,7 @@
                   <c:v>0.2</c:v>
                 </c:pt>
                 <c:pt idx="2">
-                  <c:v>0.30000000000000004</c:v>
+                  <c:v>0.3000000000000001</c:v>
                 </c:pt>
                 <c:pt idx="3">
                   <c:v>0.4</c:v>
@@ -691,10 +695,10 @@
                   <c:v>0.5</c:v>
                 </c:pt>
                 <c:pt idx="5">
-                  <c:v>0.60000000000000009</c:v>
+                  <c:v>0.6000000000000002</c:v>
                 </c:pt>
                 <c:pt idx="6">
-                  <c:v>0.70000000000000007</c:v>
+                  <c:v>0.70000000000000018</c:v>
                 </c:pt>
                 <c:pt idx="7">
                   <c:v>0.8</c:v>
@@ -769,10 +773,10 @@
                   <c:v>100</c:v>
                 </c:pt>
                 <c:pt idx="1">
-                  <c:v>24.999999999999993</c:v>
+                  <c:v>24.999999999999989</c:v>
                 </c:pt>
                 <c:pt idx="2">
-                  <c:v>11.111111111111109</c:v>
+                  <c:v>11.111111111111105</c:v>
                 </c:pt>
                 <c:pt idx="3">
                   <c:v>6.2499999999999991</c:v>
@@ -781,7 +785,7 @@
                   <c:v>4</c:v>
                 </c:pt>
                 <c:pt idx="5">
-                  <c:v>2.777777777777779</c:v>
+                  <c:v>2.7777777777777799</c:v>
                 </c:pt>
                 <c:pt idx="6">
                   <c:v>2.0408163265306132</c:v>
@@ -796,66 +800,66 @@
                   <c:v>1</c:v>
                 </c:pt>
                 <c:pt idx="10">
-                  <c:v>0.82644628099173534</c:v>
+                  <c:v>0.82644628099173523</c:v>
                 </c:pt>
                 <c:pt idx="11">
-                  <c:v>0.69444444444444453</c:v>
+                  <c:v>0.69444444444444464</c:v>
                 </c:pt>
                 <c:pt idx="12">
                   <c:v>0.59171597633136086</c:v>
                 </c:pt>
                 <c:pt idx="13">
-                  <c:v>0.51020408163265307</c:v>
+                  <c:v>0.51020408163265296</c:v>
                 </c:pt>
                 <c:pt idx="14">
                   <c:v>0.44444444444444442</c:v>
                 </c:pt>
                 <c:pt idx="15">
-                  <c:v>0.39062500000000011</c:v>
+                  <c:v>0.39062500000000017</c:v>
                 </c:pt>
                 <c:pt idx="16">
-                  <c:v>0.34602076124567493</c:v>
+                  <c:v>0.3460207612456751</c:v>
                 </c:pt>
                 <c:pt idx="17">
-                  <c:v>0.30864197530864207</c:v>
+                  <c:v>0.30864197530864218</c:v>
                 </c:pt>
                 <c:pt idx="18">
-                  <c:v>0.27700831024930755</c:v>
+                  <c:v>0.27700831024930761</c:v>
                 </c:pt>
                 <c:pt idx="19">
                   <c:v>0.25</c:v>
                 </c:pt>
                 <c:pt idx="20">
-                  <c:v>0.22675736961451243</c:v>
+                  <c:v>0.2267573696145124</c:v>
                 </c:pt>
                 <c:pt idx="21">
                   <c:v>0.20661157024793386</c:v>
                 </c:pt>
                 <c:pt idx="22">
-                  <c:v>0.18903591682419668</c:v>
+                  <c:v>0.18903591682419674</c:v>
                 </c:pt>
                 <c:pt idx="23">
-                  <c:v>0.17361111111111113</c:v>
+                  <c:v>0.17361111111111116</c:v>
                 </c:pt>
                 <c:pt idx="24">
                   <c:v>0.16</c:v>
                 </c:pt>
                 <c:pt idx="25">
-                  <c:v>0.14792899408284027</c:v>
+                  <c:v>0.14792899408284033</c:v>
                 </c:pt>
                 <c:pt idx="26">
-                  <c:v>0.13717421124828527</c:v>
+                  <c:v>0.13717421124828524</c:v>
                 </c:pt>
               </c:numCache>
             </c:numRef>
           </c:yVal>
           <c:smooth val="1"/>
         </c:ser>
-        <c:axId val="33080064"/>
-        <c:axId val="33081984"/>
+        <c:axId val="51709440"/>
+        <c:axId val="52245248"/>
       </c:scatterChart>
       <c:valAx>
-        <c:axId val="33080064"/>
+        <c:axId val="51709440"/>
         <c:scaling>
           <c:orientation val="minMax"/>
         </c:scaling>
@@ -889,12 +893,12 @@
         </c:title>
         <c:numFmt formatCode="General" sourceLinked="1"/>
         <c:tickLblPos val="nextTo"/>
-        <c:crossAx val="33081984"/>
+        <c:crossAx val="52245248"/>
         <c:crosses val="autoZero"/>
         <c:crossBetween val="midCat"/>
       </c:valAx>
       <c:valAx>
-        <c:axId val="33081984"/>
+        <c:axId val="52245248"/>
         <c:scaling>
           <c:orientation val="minMax"/>
         </c:scaling>
@@ -920,7 +924,7 @@
         </c:title>
         <c:numFmt formatCode="General" sourceLinked="1"/>
         <c:tickLblPos val="nextTo"/>
-        <c:crossAx val="33080064"/>
+        <c:crossAx val="51709440"/>
         <c:crosses val="autoZero"/>
         <c:crossBetween val="midCat"/>
       </c:valAx>
@@ -972,7 +976,7 @@
                   <c:v>0.2</c:v>
                 </c:pt>
                 <c:pt idx="3">
-                  <c:v>0.30000000000000004</c:v>
+                  <c:v>0.3000000000000001</c:v>
                 </c:pt>
                 <c:pt idx="4">
                   <c:v>0.4</c:v>
@@ -981,10 +985,10 @@
                   <c:v>0.5</c:v>
                 </c:pt>
                 <c:pt idx="6">
-                  <c:v>0.60000000000000009</c:v>
+                  <c:v>0.6000000000000002</c:v>
                 </c:pt>
                 <c:pt idx="7">
-                  <c:v>0.70000000000000007</c:v>
+                  <c:v>0.70000000000000018</c:v>
                 </c:pt>
                 <c:pt idx="8">
                   <c:v>0.8</c:v>
@@ -1089,7 +1093,7 @@
                   <c:v>3.9679000000000002</c:v>
                 </c:pt>
                 <c:pt idx="2">
-                  <c:v>3.9311999999999996</c:v>
+                  <c:v>3.9311999999999991</c:v>
                 </c:pt>
                 <c:pt idx="3">
                   <c:v>3.8893</c:v>
@@ -1098,7 +1102,7 @@
                   <c:v>3.8415999999999997</c:v>
                 </c:pt>
                 <c:pt idx="5">
-                  <c:v>3.7875000000000005</c:v>
+                  <c:v>3.787500000000001</c:v>
                 </c:pt>
                 <c:pt idx="6">
                   <c:v>3.7263999999999999</c:v>
@@ -1110,7 +1114,7 @@
                   <c:v>3.5808</c:v>
                 </c:pt>
                 <c:pt idx="9">
-                  <c:v>3.4950999999999994</c:v>
+                  <c:v>3.495099999999999</c:v>
                 </c:pt>
                 <c:pt idx="10">
                   <c:v>3.4</c:v>
@@ -1122,7 +1126,7 @@
                   <c:v>3.1791999999999998</c:v>
                 </c:pt>
                 <c:pt idx="13">
-                  <c:v>3.0522999999999993</c:v>
+                  <c:v>3.0522999999999989</c:v>
                 </c:pt>
                 <c:pt idx="14">
                   <c:v>2.9135999999999997</c:v>
@@ -1143,25 +1147,25 @@
                   <c:v>2.0221</c:v>
                 </c:pt>
                 <c:pt idx="20">
-                  <c:v>1.7999999999999996</c:v>
+                  <c:v>1.7999999999999994</c:v>
                 </c:pt>
                 <c:pt idx="21">
-                  <c:v>1.5618999999999994</c:v>
+                  <c:v>1.5618999999999992</c:v>
                 </c:pt>
                 <c:pt idx="22">
-                  <c:v>1.3071999999999988</c:v>
+                  <c:v>1.3071999999999986</c:v>
                 </c:pt>
                 <c:pt idx="23">
                   <c:v>1.0353000000000008</c:v>
                 </c:pt>
                 <c:pt idx="24">
-                  <c:v>0.74560000000000071</c:v>
+                  <c:v>0.74560000000000082</c:v>
                 </c:pt>
                 <c:pt idx="25">
-                  <c:v>0.43750000000000006</c:v>
+                  <c:v>0.43750000000000011</c:v>
                 </c:pt>
                 <c:pt idx="26">
-                  <c:v>0.11039999999999937</c:v>
+                  <c:v>0.11039999999999936</c:v>
                 </c:pt>
                 <c:pt idx="27">
                   <c:v>0</c:v>
@@ -1198,11 +1202,11 @@
           </c:yVal>
           <c:smooth val="1"/>
         </c:ser>
-        <c:axId val="74857472"/>
-        <c:axId val="74880128"/>
+        <c:axId val="55618176"/>
+        <c:axId val="46425216"/>
       </c:scatterChart>
       <c:valAx>
-        <c:axId val="74857472"/>
+        <c:axId val="55618176"/>
         <c:scaling>
           <c:orientation val="minMax"/>
         </c:scaling>
@@ -1227,12 +1231,12 @@
         </c:title>
         <c:numFmt formatCode="General" sourceLinked="1"/>
         <c:tickLblPos val="nextTo"/>
-        <c:crossAx val="74880128"/>
+        <c:crossAx val="46425216"/>
         <c:crosses val="autoZero"/>
         <c:crossBetween val="midCat"/>
       </c:valAx>
       <c:valAx>
-        <c:axId val="74880128"/>
+        <c:axId val="46425216"/>
         <c:scaling>
           <c:orientation val="minMax"/>
         </c:scaling>
@@ -1258,7 +1262,7 @@
         </c:title>
         <c:numFmt formatCode="General" sourceLinked="1"/>
         <c:tickLblPos val="nextTo"/>
-        <c:crossAx val="74857472"/>
+        <c:crossAx val="55618176"/>
         <c:crosses val="autoZero"/>
         <c:crossBetween val="midCat"/>
       </c:valAx>
@@ -1493,7 +1497,7 @@
             <a:fld id="{1D8BD707-D9CF-40AE-B4C6-C98DA3205C09}" type="datetimeFigureOut">
               <a:rPr lang="en-US" smtClean="0"/>
               <a:pPr/>
-              <a:t>9/3/2015</a:t>
+              <a:t>9/13/2015</a:t>
             </a:fld>
             <a:endParaRPr lang="en-US"/>
           </a:p>
@@ -1660,7 +1664,7 @@
             <a:fld id="{1D8BD707-D9CF-40AE-B4C6-C98DA3205C09}" type="datetimeFigureOut">
               <a:rPr lang="en-US" smtClean="0"/>
               <a:pPr/>
-              <a:t>9/3/2015</a:t>
+              <a:t>9/13/2015</a:t>
             </a:fld>
             <a:endParaRPr lang="en-US"/>
           </a:p>
@@ -1837,7 +1841,7 @@
             <a:fld id="{1D8BD707-D9CF-40AE-B4C6-C98DA3205C09}" type="datetimeFigureOut">
               <a:rPr lang="en-US" smtClean="0"/>
               <a:pPr/>
-              <a:t>9/3/2015</a:t>
+              <a:t>9/13/2015</a:t>
             </a:fld>
             <a:endParaRPr lang="en-US"/>
           </a:p>
@@ -2004,7 +2008,7 @@
             <a:fld id="{1D8BD707-D9CF-40AE-B4C6-C98DA3205C09}" type="datetimeFigureOut">
               <a:rPr lang="en-US" smtClean="0"/>
               <a:pPr/>
-              <a:t>9/3/2015</a:t>
+              <a:t>9/13/2015</a:t>
             </a:fld>
             <a:endParaRPr lang="en-US"/>
           </a:p>
@@ -2247,7 +2251,7 @@
             <a:fld id="{1D8BD707-D9CF-40AE-B4C6-C98DA3205C09}" type="datetimeFigureOut">
               <a:rPr lang="en-US" smtClean="0"/>
               <a:pPr/>
-              <a:t>9/3/2015</a:t>
+              <a:t>9/13/2015</a:t>
             </a:fld>
             <a:endParaRPr lang="en-US"/>
           </a:p>
@@ -2532,7 +2536,7 @@
             <a:fld id="{1D8BD707-D9CF-40AE-B4C6-C98DA3205C09}" type="datetimeFigureOut">
               <a:rPr lang="en-US" smtClean="0"/>
               <a:pPr/>
-              <a:t>9/3/2015</a:t>
+              <a:t>9/13/2015</a:t>
             </a:fld>
             <a:endParaRPr lang="en-US"/>
           </a:p>
@@ -2951,7 +2955,7 @@
             <a:fld id="{1D8BD707-D9CF-40AE-B4C6-C98DA3205C09}" type="datetimeFigureOut">
               <a:rPr lang="en-US" smtClean="0"/>
               <a:pPr/>
-              <a:t>9/3/2015</a:t>
+              <a:t>9/13/2015</a:t>
             </a:fld>
             <a:endParaRPr lang="en-US"/>
           </a:p>
@@ -3066,7 +3070,7 @@
             <a:fld id="{1D8BD707-D9CF-40AE-B4C6-C98DA3205C09}" type="datetimeFigureOut">
               <a:rPr lang="en-US" smtClean="0"/>
               <a:pPr/>
-              <a:t>9/3/2015</a:t>
+              <a:t>9/13/2015</a:t>
             </a:fld>
             <a:endParaRPr lang="en-US"/>
           </a:p>
@@ -3158,7 +3162,7 @@
             <a:fld id="{1D8BD707-D9CF-40AE-B4C6-C98DA3205C09}" type="datetimeFigureOut">
               <a:rPr lang="en-US" smtClean="0"/>
               <a:pPr/>
-              <a:t>9/3/2015</a:t>
+              <a:t>9/13/2015</a:t>
             </a:fld>
             <a:endParaRPr lang="en-US"/>
           </a:p>
@@ -3432,7 +3436,7 @@
             <a:fld id="{1D8BD707-D9CF-40AE-B4C6-C98DA3205C09}" type="datetimeFigureOut">
               <a:rPr lang="en-US" smtClean="0"/>
               <a:pPr/>
-              <a:t>9/3/2015</a:t>
+              <a:t>9/13/2015</a:t>
             </a:fld>
             <a:endParaRPr lang="en-US"/>
           </a:p>
@@ -3682,7 +3686,7 @@
             <a:fld id="{1D8BD707-D9CF-40AE-B4C6-C98DA3205C09}" type="datetimeFigureOut">
               <a:rPr lang="en-US" smtClean="0"/>
               <a:pPr/>
-              <a:t>9/3/2015</a:t>
+              <a:t>9/13/2015</a:t>
             </a:fld>
             <a:endParaRPr lang="en-US"/>
           </a:p>
@@ -3892,7 +3896,7 @@
             <a:fld id="{1D8BD707-D9CF-40AE-B4C6-C98DA3205C09}" type="datetimeFigureOut">
               <a:rPr lang="en-US" smtClean="0"/>
               <a:pPr/>
-              <a:t>9/3/2015</a:t>
+              <a:t>9/13/2015</a:t>
             </a:fld>
             <a:endParaRPr lang="en-US"/>
           </a:p>
@@ -24809,6 +24813,1862 @@
 </p:sld>
 </file>
 
+<file path=ppt/slides/slide28.xml><?xml version="1.0" encoding="utf-8"?>
+<p:sld xmlns:a="http://schemas.openxmlformats.org/drawingml/2006/main" xmlns:r="http://schemas.openxmlformats.org/officeDocument/2006/relationships" xmlns:p="http://schemas.openxmlformats.org/presentationml/2006/main">
+  <p:cSld>
+    <p:spTree>
+      <p:nvGrpSpPr>
+        <p:cNvPr id="1" name=""/>
+        <p:cNvGrpSpPr/>
+        <p:nvPr/>
+      </p:nvGrpSpPr>
+      <p:grpSpPr>
+        <a:xfrm>
+          <a:off x="0" y="0"/>
+          <a:ext cx="0" cy="0"/>
+          <a:chOff x="0" y="0"/>
+          <a:chExt cx="0" cy="0"/>
+        </a:xfrm>
+      </p:grpSpPr>
+      <p:sp>
+        <p:nvSpPr>
+          <p:cNvPr id="1028" name="Rectangle 4"/>
+          <p:cNvSpPr>
+            <a:spLocks noChangeArrowheads="1"/>
+          </p:cNvSpPr>
+          <p:nvPr/>
+        </p:nvSpPr>
+        <p:spPr bwMode="auto">
+          <a:xfrm>
+            <a:off x="0" y="0"/>
+            <a:ext cx="9144000" cy="457200"/>
+          </a:xfrm>
+          <a:prstGeom prst="rect">
+            <a:avLst/>
+          </a:prstGeom>
+          <a:noFill/>
+          <a:ln w="9525">
+            <a:noFill/>
+            <a:miter lim="800000"/>
+            <a:headEnd/>
+            <a:tailEnd/>
+          </a:ln>
+          <a:effectLst/>
+        </p:spPr>
+        <p:txBody>
+          <a:bodyPr vert="horz" wrap="none" lIns="91440" tIns="45720" rIns="91440" bIns="45720" numCol="1" anchor="ctr" anchorCtr="0" compatLnSpc="1">
+            <a:prstTxWarp prst="textNoShape">
+              <a:avLst/>
+            </a:prstTxWarp>
+            <a:spAutoFit/>
+          </a:bodyPr>
+          <a:lstStyle/>
+          <a:p>
+            <a:endParaRPr lang="tr-TR"/>
+          </a:p>
+        </p:txBody>
+      </p:sp>
+      <p:sp>
+        <p:nvSpPr>
+          <p:cNvPr id="1031" name="Rectangle 7"/>
+          <p:cNvSpPr>
+            <a:spLocks noChangeArrowheads="1"/>
+          </p:cNvSpPr>
+          <p:nvPr/>
+        </p:nvSpPr>
+        <p:spPr bwMode="auto">
+          <a:xfrm>
+            <a:off x="0" y="0"/>
+            <a:ext cx="9144000" cy="457200"/>
+          </a:xfrm>
+          <a:prstGeom prst="rect">
+            <a:avLst/>
+          </a:prstGeom>
+          <a:noFill/>
+          <a:ln w="9525">
+            <a:noFill/>
+            <a:miter lim="800000"/>
+            <a:headEnd/>
+            <a:tailEnd/>
+          </a:ln>
+          <a:effectLst/>
+        </p:spPr>
+        <p:txBody>
+          <a:bodyPr vert="horz" wrap="none" lIns="91440" tIns="45720" rIns="91440" bIns="45720" numCol="1" anchor="ctr" anchorCtr="0" compatLnSpc="1">
+            <a:prstTxWarp prst="textNoShape">
+              <a:avLst/>
+            </a:prstTxWarp>
+            <a:spAutoFit/>
+          </a:bodyPr>
+          <a:lstStyle/>
+          <a:p>
+            <a:endParaRPr lang="tr-TR"/>
+          </a:p>
+        </p:txBody>
+      </p:sp>
+      <p:sp>
+        <p:nvSpPr>
+          <p:cNvPr id="1034" name="Rectangle 10"/>
+          <p:cNvSpPr>
+            <a:spLocks noChangeArrowheads="1"/>
+          </p:cNvSpPr>
+          <p:nvPr/>
+        </p:nvSpPr>
+        <p:spPr bwMode="auto">
+          <a:xfrm>
+            <a:off x="0" y="0"/>
+            <a:ext cx="9144000" cy="0"/>
+          </a:xfrm>
+          <a:prstGeom prst="rect">
+            <a:avLst/>
+          </a:prstGeom>
+          <a:noFill/>
+          <a:ln w="9525">
+            <a:noFill/>
+            <a:miter lim="800000"/>
+            <a:headEnd/>
+            <a:tailEnd/>
+          </a:ln>
+          <a:effectLst/>
+        </p:spPr>
+        <p:txBody>
+          <a:bodyPr vert="horz" wrap="none" lIns="91440" tIns="45720" rIns="91440" bIns="45720" numCol="1" anchor="ctr" anchorCtr="0" compatLnSpc="1">
+            <a:prstTxWarp prst="textNoShape">
+              <a:avLst/>
+            </a:prstTxWarp>
+            <a:spAutoFit/>
+          </a:bodyPr>
+          <a:lstStyle/>
+          <a:p>
+            <a:endParaRPr lang="tr-TR"/>
+          </a:p>
+        </p:txBody>
+      </p:sp>
+      <p:sp>
+        <p:nvSpPr>
+          <p:cNvPr id="1036" name="Rectangle 12"/>
+          <p:cNvSpPr>
+            <a:spLocks noChangeArrowheads="1"/>
+          </p:cNvSpPr>
+          <p:nvPr/>
+        </p:nvSpPr>
+        <p:spPr bwMode="auto">
+          <a:xfrm>
+            <a:off x="0" y="0"/>
+            <a:ext cx="9144000" cy="457200"/>
+          </a:xfrm>
+          <a:prstGeom prst="rect">
+            <a:avLst/>
+          </a:prstGeom>
+          <a:noFill/>
+          <a:ln w="9525">
+            <a:noFill/>
+            <a:miter lim="800000"/>
+            <a:headEnd/>
+            <a:tailEnd/>
+          </a:ln>
+          <a:effectLst/>
+        </p:spPr>
+        <p:txBody>
+          <a:bodyPr vert="horz" wrap="none" lIns="91440" tIns="45720" rIns="91440" bIns="45720" numCol="1" anchor="ctr" anchorCtr="0" compatLnSpc="1">
+            <a:prstTxWarp prst="textNoShape">
+              <a:avLst/>
+            </a:prstTxWarp>
+            <a:spAutoFit/>
+          </a:bodyPr>
+          <a:lstStyle/>
+          <a:p>
+            <a:endParaRPr lang="tr-TR"/>
+          </a:p>
+        </p:txBody>
+      </p:sp>
+      <p:sp>
+        <p:nvSpPr>
+          <p:cNvPr id="1039" name="Rectangle 15"/>
+          <p:cNvSpPr>
+            <a:spLocks noChangeArrowheads="1"/>
+          </p:cNvSpPr>
+          <p:nvPr/>
+        </p:nvSpPr>
+        <p:spPr bwMode="auto">
+          <a:xfrm>
+            <a:off x="0" y="0"/>
+            <a:ext cx="9144000" cy="457200"/>
+          </a:xfrm>
+          <a:prstGeom prst="rect">
+            <a:avLst/>
+          </a:prstGeom>
+          <a:noFill/>
+          <a:ln w="9525">
+            <a:noFill/>
+            <a:miter lim="800000"/>
+            <a:headEnd/>
+            <a:tailEnd/>
+          </a:ln>
+          <a:effectLst/>
+        </p:spPr>
+        <p:txBody>
+          <a:bodyPr vert="horz" wrap="none" lIns="91440" tIns="45720" rIns="91440" bIns="45720" numCol="1" anchor="ctr" anchorCtr="0" compatLnSpc="1">
+            <a:prstTxWarp prst="textNoShape">
+              <a:avLst/>
+            </a:prstTxWarp>
+            <a:spAutoFit/>
+          </a:bodyPr>
+          <a:lstStyle/>
+          <a:p>
+            <a:endParaRPr lang="tr-TR"/>
+          </a:p>
+        </p:txBody>
+      </p:sp>
+      <p:sp>
+        <p:nvSpPr>
+          <p:cNvPr id="1042" name="Rectangle 18"/>
+          <p:cNvSpPr>
+            <a:spLocks noChangeArrowheads="1"/>
+          </p:cNvSpPr>
+          <p:nvPr/>
+        </p:nvSpPr>
+        <p:spPr bwMode="auto">
+          <a:xfrm>
+            <a:off x="0" y="0"/>
+            <a:ext cx="9144000" cy="457200"/>
+          </a:xfrm>
+          <a:prstGeom prst="rect">
+            <a:avLst/>
+          </a:prstGeom>
+          <a:noFill/>
+          <a:ln w="9525">
+            <a:noFill/>
+            <a:miter lim="800000"/>
+            <a:headEnd/>
+            <a:tailEnd/>
+          </a:ln>
+          <a:effectLst/>
+        </p:spPr>
+        <p:txBody>
+          <a:bodyPr vert="horz" wrap="none" lIns="91440" tIns="45720" rIns="91440" bIns="45720" numCol="1" anchor="ctr" anchorCtr="0" compatLnSpc="1">
+            <a:prstTxWarp prst="textNoShape">
+              <a:avLst/>
+            </a:prstTxWarp>
+            <a:spAutoFit/>
+          </a:bodyPr>
+          <a:lstStyle/>
+          <a:p>
+            <a:endParaRPr lang="tr-TR"/>
+          </a:p>
+        </p:txBody>
+      </p:sp>
+      <p:grpSp>
+        <p:nvGrpSpPr>
+          <p:cNvPr id="81" name="Group 80"/>
+          <p:cNvGrpSpPr/>
+          <p:nvPr/>
+        </p:nvGrpSpPr>
+        <p:grpSpPr>
+          <a:xfrm>
+            <a:off x="0" y="762000"/>
+            <a:ext cx="9372600" cy="2239992"/>
+            <a:chOff x="0" y="762000"/>
+            <a:chExt cx="9372600" cy="2239992"/>
+          </a:xfrm>
+        </p:grpSpPr>
+        <p:sp>
+          <p:nvSpPr>
+            <p:cNvPr id="5" name="TextBox 4"/>
+            <p:cNvSpPr txBox="1"/>
+            <p:nvPr/>
+          </p:nvSpPr>
+          <p:spPr>
+            <a:xfrm>
+              <a:off x="7062159" y="1535500"/>
+              <a:ext cx="871268" cy="369332"/>
+            </a:xfrm>
+            <a:prstGeom prst="rect">
+              <a:avLst/>
+            </a:prstGeom>
+            <a:noFill/>
+            <a:ln w="15875">
+              <a:solidFill>
+                <a:schemeClr val="accent1"/>
+              </a:solidFill>
+            </a:ln>
+          </p:spPr>
+          <p:txBody>
+            <a:bodyPr wrap="square" rtlCol="0">
+              <a:spAutoFit/>
+            </a:bodyPr>
+            <a:lstStyle/>
+            <a:p>
+              <a:pPr algn="ctr"/>
+              <a:r>
+                <a:rPr lang="tr-TR" dirty="0" smtClean="0"/>
+                <a:t>Plant</a:t>
+              </a:r>
+              <a:endParaRPr lang="tr-TR" dirty="0"/>
+            </a:p>
+          </p:txBody>
+        </p:sp>
+        <p:cxnSp>
+          <p:nvCxnSpPr>
+            <p:cNvPr id="13" name="Straight Arrow Connector 12"/>
+            <p:cNvCxnSpPr>
+              <a:endCxn id="5" idx="1"/>
+            </p:cNvCxnSpPr>
+            <p:nvPr/>
+          </p:nvCxnSpPr>
+          <p:spPr>
+            <a:xfrm flipV="1">
+              <a:off x="6285782" y="1720166"/>
+              <a:ext cx="776377" cy="9430"/>
+            </a:xfrm>
+            <a:prstGeom prst="straightConnector1">
+              <a:avLst/>
+            </a:prstGeom>
+            <a:ln>
+              <a:tailEnd type="arrow"/>
+            </a:ln>
+          </p:spPr>
+          <p:style>
+            <a:lnRef idx="1">
+              <a:schemeClr val="accent1"/>
+            </a:lnRef>
+            <a:fillRef idx="0">
+              <a:schemeClr val="accent1"/>
+            </a:fillRef>
+            <a:effectRef idx="0">
+              <a:schemeClr val="accent1"/>
+            </a:effectRef>
+            <a:fontRef idx="minor">
+              <a:schemeClr val="tx1"/>
+            </a:fontRef>
+          </p:style>
+        </p:cxnSp>
+        <p:sp>
+          <p:nvSpPr>
+            <p:cNvPr id="15" name="Oval 14"/>
+            <p:cNvSpPr/>
+            <p:nvPr/>
+          </p:nvSpPr>
+          <p:spPr>
+            <a:xfrm>
+              <a:off x="3945148" y="1515373"/>
+              <a:ext cx="448574" cy="405442"/>
+            </a:xfrm>
+            <a:prstGeom prst="ellipse">
+              <a:avLst/>
+            </a:prstGeom>
+            <a:noFill/>
+          </p:spPr>
+          <p:style>
+            <a:lnRef idx="2">
+              <a:schemeClr val="accent1">
+                <a:shade val="50000"/>
+              </a:schemeClr>
+            </a:lnRef>
+            <a:fillRef idx="1">
+              <a:schemeClr val="accent1"/>
+            </a:fillRef>
+            <a:effectRef idx="0">
+              <a:schemeClr val="accent1"/>
+            </a:effectRef>
+            <a:fontRef idx="minor">
+              <a:schemeClr val="lt1"/>
+            </a:fontRef>
+          </p:style>
+          <p:txBody>
+            <a:bodyPr rtlCol="0" anchor="ctr"/>
+            <a:lstStyle/>
+            <a:p>
+              <a:pPr algn="ctr"/>
+              <a:endParaRPr lang="tr-TR"/>
+            </a:p>
+          </p:txBody>
+        </p:sp>
+        <p:cxnSp>
+          <p:nvCxnSpPr>
+            <p:cNvPr id="16" name="Straight Arrow Connector 15"/>
+            <p:cNvCxnSpPr>
+              <a:stCxn id="5" idx="3"/>
+            </p:cNvCxnSpPr>
+            <p:nvPr/>
+          </p:nvCxnSpPr>
+          <p:spPr>
+            <a:xfrm flipV="1">
+              <a:off x="7933427" y="1716657"/>
+              <a:ext cx="905773" cy="3509"/>
+            </a:xfrm>
+            <a:prstGeom prst="straightConnector1">
+              <a:avLst/>
+            </a:prstGeom>
+            <a:ln>
+              <a:tailEnd type="arrow"/>
+            </a:ln>
+          </p:spPr>
+          <p:style>
+            <a:lnRef idx="1">
+              <a:schemeClr val="accent1"/>
+            </a:lnRef>
+            <a:fillRef idx="0">
+              <a:schemeClr val="accent1"/>
+            </a:fillRef>
+            <a:effectRef idx="0">
+              <a:schemeClr val="accent1"/>
+            </a:effectRef>
+            <a:fontRef idx="minor">
+              <a:schemeClr val="tx1"/>
+            </a:fontRef>
+          </p:style>
+        </p:cxnSp>
+        <p:cxnSp>
+          <p:nvCxnSpPr>
+            <p:cNvPr id="17" name="Straight Connector 16"/>
+            <p:cNvCxnSpPr/>
+            <p:nvPr/>
+          </p:nvCxnSpPr>
+          <p:spPr>
+            <a:xfrm rot="16200000" flipH="1">
+              <a:off x="7812657" y="2337759"/>
+              <a:ext cx="1259456" cy="17252"/>
+            </a:xfrm>
+            <a:prstGeom prst="line">
+              <a:avLst/>
+            </a:prstGeom>
+          </p:spPr>
+          <p:style>
+            <a:lnRef idx="1">
+              <a:schemeClr val="accent1"/>
+            </a:lnRef>
+            <a:fillRef idx="0">
+              <a:schemeClr val="accent1"/>
+            </a:fillRef>
+            <a:effectRef idx="0">
+              <a:schemeClr val="accent1"/>
+            </a:effectRef>
+            <a:fontRef idx="minor">
+              <a:schemeClr val="tx1"/>
+            </a:fontRef>
+          </p:style>
+        </p:cxnSp>
+        <p:cxnSp>
+          <p:nvCxnSpPr>
+            <p:cNvPr id="18" name="Straight Connector 17"/>
+            <p:cNvCxnSpPr/>
+            <p:nvPr/>
+          </p:nvCxnSpPr>
+          <p:spPr>
+            <a:xfrm rot="10800000" flipV="1">
+              <a:off x="4189563" y="2984738"/>
+              <a:ext cx="4261455" cy="17254"/>
+            </a:xfrm>
+            <a:prstGeom prst="line">
+              <a:avLst/>
+            </a:prstGeom>
+          </p:spPr>
+          <p:style>
+            <a:lnRef idx="1">
+              <a:schemeClr val="accent1"/>
+            </a:lnRef>
+            <a:fillRef idx="0">
+              <a:schemeClr val="accent1"/>
+            </a:fillRef>
+            <a:effectRef idx="0">
+              <a:schemeClr val="accent1"/>
+            </a:effectRef>
+            <a:fontRef idx="minor">
+              <a:schemeClr val="tx1"/>
+            </a:fontRef>
+          </p:style>
+        </p:cxnSp>
+        <p:cxnSp>
+          <p:nvCxnSpPr>
+            <p:cNvPr id="19" name="Straight Arrow Connector 18"/>
+            <p:cNvCxnSpPr/>
+            <p:nvPr/>
+          </p:nvCxnSpPr>
+          <p:spPr>
+            <a:xfrm rot="16200000" flipV="1">
+              <a:off x="3638911" y="2459885"/>
+              <a:ext cx="1063924" cy="2875"/>
+            </a:xfrm>
+            <a:prstGeom prst="straightConnector1">
+              <a:avLst/>
+            </a:prstGeom>
+            <a:ln>
+              <a:tailEnd type="arrow"/>
+            </a:ln>
+          </p:spPr>
+          <p:style>
+            <a:lnRef idx="1">
+              <a:schemeClr val="accent1"/>
+            </a:lnRef>
+            <a:fillRef idx="0">
+              <a:schemeClr val="accent1"/>
+            </a:fillRef>
+            <a:effectRef idx="0">
+              <a:schemeClr val="accent1"/>
+            </a:effectRef>
+            <a:fontRef idx="minor">
+              <a:schemeClr val="tx1"/>
+            </a:fontRef>
+          </p:style>
+        </p:cxnSp>
+        <p:cxnSp>
+          <p:nvCxnSpPr>
+            <p:cNvPr id="20" name="Straight Arrow Connector 19"/>
+            <p:cNvCxnSpPr/>
+            <p:nvPr/>
+          </p:nvCxnSpPr>
+          <p:spPr>
+            <a:xfrm flipV="1">
+              <a:off x="3163019" y="1752600"/>
+              <a:ext cx="790755" cy="7188"/>
+            </a:xfrm>
+            <a:prstGeom prst="straightConnector1">
+              <a:avLst/>
+            </a:prstGeom>
+            <a:ln>
+              <a:tailEnd type="arrow"/>
+            </a:ln>
+          </p:spPr>
+          <p:style>
+            <a:lnRef idx="1">
+              <a:schemeClr val="accent1"/>
+            </a:lnRef>
+            <a:fillRef idx="0">
+              <a:schemeClr val="accent1"/>
+            </a:fillRef>
+            <a:effectRef idx="0">
+              <a:schemeClr val="accent1"/>
+            </a:effectRef>
+            <a:fontRef idx="minor">
+              <a:schemeClr val="tx1"/>
+            </a:fontRef>
+          </p:style>
+        </p:cxnSp>
+        <p:sp>
+          <p:nvSpPr>
+            <p:cNvPr id="22" name="TextBox 21"/>
+            <p:cNvSpPr txBox="1"/>
+            <p:nvPr/>
+          </p:nvSpPr>
+          <p:spPr>
+            <a:xfrm>
+              <a:off x="8384878" y="1348596"/>
+              <a:ext cx="301686" cy="369332"/>
+            </a:xfrm>
+            <a:prstGeom prst="rect">
+              <a:avLst/>
+            </a:prstGeom>
+            <a:noFill/>
+          </p:spPr>
+          <p:txBody>
+            <a:bodyPr wrap="none" rtlCol="0">
+              <a:spAutoFit/>
+            </a:bodyPr>
+            <a:lstStyle/>
+            <a:p>
+              <a:r>
+                <a:rPr lang="tr-TR" dirty="0" smtClean="0"/>
+                <a:t>y</a:t>
+              </a:r>
+              <a:endParaRPr lang="tr-TR" dirty="0"/>
+            </a:p>
+          </p:txBody>
+        </p:sp>
+        <p:cxnSp>
+          <p:nvCxnSpPr>
+            <p:cNvPr id="26" name="Straight Arrow Connector 25"/>
+            <p:cNvCxnSpPr>
+              <a:stCxn id="15" idx="6"/>
+              <a:endCxn id="27" idx="1"/>
+            </p:cNvCxnSpPr>
+            <p:nvPr/>
+          </p:nvCxnSpPr>
+          <p:spPr>
+            <a:xfrm flipV="1">
+              <a:off x="4393722" y="1717212"/>
+              <a:ext cx="736159" cy="882"/>
+            </a:xfrm>
+            <a:prstGeom prst="straightConnector1">
+              <a:avLst/>
+            </a:prstGeom>
+            <a:ln>
+              <a:tailEnd type="arrow"/>
+            </a:ln>
+          </p:spPr>
+          <p:style>
+            <a:lnRef idx="1">
+              <a:schemeClr val="accent1"/>
+            </a:lnRef>
+            <a:fillRef idx="0">
+              <a:schemeClr val="accent1"/>
+            </a:fillRef>
+            <a:effectRef idx="0">
+              <a:schemeClr val="accent1"/>
+            </a:effectRef>
+            <a:fontRef idx="minor">
+              <a:schemeClr val="tx1"/>
+            </a:fontRef>
+          </p:style>
+        </p:cxnSp>
+        <p:sp>
+          <p:nvSpPr>
+            <p:cNvPr id="27" name="TextBox 26"/>
+            <p:cNvSpPr txBox="1"/>
+            <p:nvPr/>
+          </p:nvSpPr>
+          <p:spPr>
+            <a:xfrm>
+              <a:off x="5129881" y="1532546"/>
+              <a:ext cx="1167522" cy="369332"/>
+            </a:xfrm>
+            <a:prstGeom prst="rect">
+              <a:avLst/>
+            </a:prstGeom>
+            <a:noFill/>
+            <a:ln w="15875">
+              <a:solidFill>
+                <a:schemeClr val="accent1"/>
+              </a:solidFill>
+            </a:ln>
+          </p:spPr>
+          <p:txBody>
+            <a:bodyPr wrap="square" rtlCol="0">
+              <a:spAutoFit/>
+            </a:bodyPr>
+            <a:lstStyle/>
+            <a:p>
+              <a:pPr algn="ctr"/>
+              <a:r>
+                <a:rPr lang="tr-TR" dirty="0" smtClean="0"/>
+                <a:t>Controller</a:t>
+              </a:r>
+              <a:endParaRPr lang="tr-TR" dirty="0"/>
+            </a:p>
+          </p:txBody>
+        </p:sp>
+        <p:sp>
+          <p:nvSpPr>
+            <p:cNvPr id="30" name="TextBox 29"/>
+            <p:cNvSpPr txBox="1"/>
+            <p:nvPr/>
+          </p:nvSpPr>
+          <p:spPr>
+            <a:xfrm>
+              <a:off x="2005681" y="1397238"/>
+              <a:ext cx="1167522" cy="738664"/>
+            </a:xfrm>
+            <a:prstGeom prst="rect">
+              <a:avLst/>
+            </a:prstGeom>
+            <a:noFill/>
+            <a:ln w="15875">
+              <a:solidFill>
+                <a:schemeClr val="accent1"/>
+              </a:solidFill>
+            </a:ln>
+          </p:spPr>
+          <p:txBody>
+            <a:bodyPr wrap="square" rtlCol="0">
+              <a:spAutoFit/>
+            </a:bodyPr>
+            <a:lstStyle/>
+            <a:p>
+              <a:pPr algn="ctr"/>
+              <a:r>
+                <a:rPr lang="tr-TR" sz="1400" dirty="0" smtClean="0"/>
+                <a:t>Velocity Setpoint Generator</a:t>
+              </a:r>
+              <a:endParaRPr lang="tr-TR" sz="1400" dirty="0"/>
+            </a:p>
+          </p:txBody>
+        </p:sp>
+        <p:pic>
+          <p:nvPicPr>
+            <p:cNvPr id="1027" name="Picture 3"/>
+            <p:cNvPicPr>
+              <a:picLocks noChangeAspect="1" noChangeArrowheads="1"/>
+            </p:cNvPicPr>
+            <p:nvPr/>
+          </p:nvPicPr>
+          <p:blipFill>
+            <a:blip r:embed="rId2">
+              <a:clrChange>
+                <a:clrFrom>
+                  <a:srgbClr val="FFFFFF"/>
+                </a:clrFrom>
+                <a:clrTo>
+                  <a:srgbClr val="FFFFFF">
+                    <a:alpha val="0"/>
+                  </a:srgbClr>
+                </a:clrTo>
+              </a:clrChange>
+            </a:blip>
+            <a:srcRect/>
+            <a:stretch>
+              <a:fillRect/>
+            </a:stretch>
+          </p:blipFill>
+          <p:spPr bwMode="auto">
+            <a:xfrm>
+              <a:off x="3453481" y="1513195"/>
+              <a:ext cx="304800" cy="265043"/>
+            </a:xfrm>
+            <a:prstGeom prst="rect">
+              <a:avLst/>
+            </a:prstGeom>
+            <a:noFill/>
+          </p:spPr>
+        </p:pic>
+        <p:sp>
+          <p:nvSpPr>
+            <p:cNvPr id="1029" name="Rectangle 5"/>
+            <p:cNvSpPr>
+              <a:spLocks noChangeArrowheads="1"/>
+            </p:cNvSpPr>
+            <p:nvPr/>
+          </p:nvSpPr>
+          <p:spPr bwMode="auto">
+            <a:xfrm>
+              <a:off x="228600" y="838200"/>
+              <a:ext cx="9144000" cy="0"/>
+            </a:xfrm>
+            <a:prstGeom prst="rect">
+              <a:avLst/>
+            </a:prstGeom>
+            <a:noFill/>
+            <a:ln w="9525">
+              <a:noFill/>
+              <a:miter lim="800000"/>
+              <a:headEnd/>
+              <a:tailEnd/>
+            </a:ln>
+            <a:effectLst/>
+          </p:spPr>
+          <p:txBody>
+            <a:bodyPr vert="horz" wrap="none" lIns="91440" tIns="45720" rIns="91440" bIns="45720" numCol="1" anchor="ctr" anchorCtr="0" compatLnSpc="1">
+              <a:prstTxWarp prst="textNoShape">
+                <a:avLst/>
+              </a:prstTxWarp>
+              <a:spAutoFit/>
+            </a:bodyPr>
+            <a:lstStyle/>
+            <a:p>
+              <a:pPr marL="0" marR="0" lvl="0" indent="0" algn="l" defTabSz="914400" rtl="0" eaLnBrk="1" fontAlgn="base" latinLnBrk="0" hangingPunct="1">
+                <a:lnSpc>
+                  <a:spcPct val="100000"/>
+                </a:lnSpc>
+                <a:spcBef>
+                  <a:spcPct val="0"/>
+                </a:spcBef>
+                <a:spcAft>
+                  <a:spcPct val="0"/>
+                </a:spcAft>
+                <a:buClrTx/>
+                <a:buSzTx/>
+                <a:buFontTx/>
+                <a:buNone/>
+                <a:tabLst/>
+              </a:pPr>
+              <a:endParaRPr kumimoji="0" lang="tr-TR" sz="1800" b="0" i="0" u="none" strike="noStrike" cap="none" normalizeH="0" baseline="0" smtClean="0">
+                <a:ln>
+                  <a:noFill/>
+                </a:ln>
+                <a:solidFill>
+                  <a:schemeClr val="tx1"/>
+                </a:solidFill>
+                <a:effectLst/>
+                <a:latin typeface="Arial" pitchFamily="34" charset="0"/>
+                <a:cs typeface="Arial" pitchFamily="34" charset="0"/>
+              </a:endParaRPr>
+            </a:p>
+          </p:txBody>
+        </p:sp>
+        <p:sp>
+          <p:nvSpPr>
+            <p:cNvPr id="1032" name="Rectangle 8"/>
+            <p:cNvSpPr>
+              <a:spLocks noChangeArrowheads="1"/>
+            </p:cNvSpPr>
+            <p:nvPr/>
+          </p:nvSpPr>
+          <p:spPr bwMode="auto">
+            <a:xfrm>
+              <a:off x="228600" y="838200"/>
+              <a:ext cx="9144000" cy="0"/>
+            </a:xfrm>
+            <a:prstGeom prst="rect">
+              <a:avLst/>
+            </a:prstGeom>
+            <a:noFill/>
+            <a:ln w="9525">
+              <a:noFill/>
+              <a:miter lim="800000"/>
+              <a:headEnd/>
+              <a:tailEnd/>
+            </a:ln>
+            <a:effectLst/>
+          </p:spPr>
+          <p:txBody>
+            <a:bodyPr vert="horz" wrap="none" lIns="91440" tIns="45720" rIns="91440" bIns="45720" numCol="1" anchor="ctr" anchorCtr="0" compatLnSpc="1">
+              <a:prstTxWarp prst="textNoShape">
+                <a:avLst/>
+              </a:prstTxWarp>
+              <a:spAutoFit/>
+            </a:bodyPr>
+            <a:lstStyle/>
+            <a:p>
+              <a:pPr marL="0" marR="0" lvl="0" indent="0" algn="l" defTabSz="914400" rtl="0" eaLnBrk="1" fontAlgn="base" latinLnBrk="0" hangingPunct="1">
+                <a:lnSpc>
+                  <a:spcPct val="100000"/>
+                </a:lnSpc>
+                <a:spcBef>
+                  <a:spcPct val="0"/>
+                </a:spcBef>
+                <a:spcAft>
+                  <a:spcPct val="0"/>
+                </a:spcAft>
+                <a:buClrTx/>
+                <a:buSzTx/>
+                <a:buFontTx/>
+                <a:buNone/>
+                <a:tabLst/>
+              </a:pPr>
+              <a:endParaRPr kumimoji="0" lang="tr-TR" sz="1800" b="0" i="0" u="none" strike="noStrike" cap="none" normalizeH="0" baseline="0" smtClean="0">
+                <a:ln>
+                  <a:noFill/>
+                </a:ln>
+                <a:solidFill>
+                  <a:schemeClr val="tx1"/>
+                </a:solidFill>
+                <a:effectLst/>
+                <a:latin typeface="Arial" pitchFamily="34" charset="0"/>
+                <a:cs typeface="Arial" pitchFamily="34" charset="0"/>
+              </a:endParaRPr>
+            </a:p>
+          </p:txBody>
+        </p:sp>
+        <p:pic>
+          <p:nvPicPr>
+            <p:cNvPr id="1033" name="Picture 9"/>
+            <p:cNvPicPr>
+              <a:picLocks noChangeAspect="1" noChangeArrowheads="1"/>
+            </p:cNvPicPr>
+            <p:nvPr/>
+          </p:nvPicPr>
+          <p:blipFill>
+            <a:blip r:embed="rId3">
+              <a:clrChange>
+                <a:clrFrom>
+                  <a:srgbClr val="FFFFFF"/>
+                </a:clrFrom>
+                <a:clrTo>
+                  <a:srgbClr val="FFFFFF">
+                    <a:alpha val="0"/>
+                  </a:srgbClr>
+                </a:clrTo>
+              </a:clrChange>
+            </a:blip>
+            <a:srcRect/>
+            <a:stretch>
+              <a:fillRect/>
+            </a:stretch>
+          </p:blipFill>
+          <p:spPr bwMode="auto">
+            <a:xfrm>
+              <a:off x="4215481" y="2209800"/>
+              <a:ext cx="762000" cy="279633"/>
+            </a:xfrm>
+            <a:prstGeom prst="rect">
+              <a:avLst/>
+            </a:prstGeom>
+            <a:noFill/>
+          </p:spPr>
+        </p:pic>
+        <p:sp>
+          <p:nvSpPr>
+            <p:cNvPr id="42" name="Oval 41"/>
+            <p:cNvSpPr/>
+            <p:nvPr/>
+          </p:nvSpPr>
+          <p:spPr>
+            <a:xfrm>
+              <a:off x="1066800" y="1566016"/>
+              <a:ext cx="448574" cy="405442"/>
+            </a:xfrm>
+            <a:prstGeom prst="ellipse">
+              <a:avLst/>
+            </a:prstGeom>
+            <a:noFill/>
+          </p:spPr>
+          <p:style>
+            <a:lnRef idx="2">
+              <a:schemeClr val="accent1">
+                <a:shade val="50000"/>
+              </a:schemeClr>
+            </a:lnRef>
+            <a:fillRef idx="1">
+              <a:schemeClr val="accent1"/>
+            </a:fillRef>
+            <a:effectRef idx="0">
+              <a:schemeClr val="accent1"/>
+            </a:effectRef>
+            <a:fontRef idx="minor">
+              <a:schemeClr val="lt1"/>
+            </a:fontRef>
+          </p:style>
+          <p:txBody>
+            <a:bodyPr rtlCol="0" anchor="ctr"/>
+            <a:lstStyle/>
+            <a:p>
+              <a:pPr algn="ctr"/>
+              <a:endParaRPr lang="tr-TR"/>
+            </a:p>
+          </p:txBody>
+        </p:sp>
+        <p:cxnSp>
+          <p:nvCxnSpPr>
+            <p:cNvPr id="44" name="Straight Arrow Connector 43"/>
+            <p:cNvCxnSpPr>
+              <a:stCxn id="42" idx="6"/>
+              <a:endCxn id="30" idx="1"/>
+            </p:cNvCxnSpPr>
+            <p:nvPr/>
+          </p:nvCxnSpPr>
+          <p:spPr>
+            <a:xfrm flipV="1">
+              <a:off x="1515374" y="1766570"/>
+              <a:ext cx="490307" cy="2167"/>
+            </a:xfrm>
+            <a:prstGeom prst="straightConnector1">
+              <a:avLst/>
+            </a:prstGeom>
+            <a:ln>
+              <a:tailEnd type="arrow"/>
+            </a:ln>
+          </p:spPr>
+          <p:style>
+            <a:lnRef idx="1">
+              <a:schemeClr val="accent1"/>
+            </a:lnRef>
+            <a:fillRef idx="0">
+              <a:schemeClr val="accent1"/>
+            </a:fillRef>
+            <a:effectRef idx="0">
+              <a:schemeClr val="accent1"/>
+            </a:effectRef>
+            <a:fontRef idx="minor">
+              <a:schemeClr val="tx1"/>
+            </a:fontRef>
+          </p:style>
+        </p:cxnSp>
+        <p:cxnSp>
+          <p:nvCxnSpPr>
+            <p:cNvPr id="51" name="Straight Arrow Connector 50"/>
+            <p:cNvCxnSpPr/>
+            <p:nvPr/>
+          </p:nvCxnSpPr>
+          <p:spPr>
+            <a:xfrm>
+              <a:off x="609600" y="1768978"/>
+              <a:ext cx="457200" cy="1588"/>
+            </a:xfrm>
+            <a:prstGeom prst="straightConnector1">
+              <a:avLst/>
+            </a:prstGeom>
+            <a:ln>
+              <a:tailEnd type="arrow"/>
+            </a:ln>
+          </p:spPr>
+          <p:style>
+            <a:lnRef idx="1">
+              <a:schemeClr val="accent1"/>
+            </a:lnRef>
+            <a:fillRef idx="0">
+              <a:schemeClr val="accent1"/>
+            </a:fillRef>
+            <a:effectRef idx="0">
+              <a:schemeClr val="accent1"/>
+            </a:effectRef>
+            <a:fontRef idx="minor">
+              <a:schemeClr val="tx1"/>
+            </a:fontRef>
+          </p:style>
+        </p:cxnSp>
+        <p:sp>
+          <p:nvSpPr>
+            <p:cNvPr id="1037" name="Rectangle 13"/>
+            <p:cNvSpPr>
+              <a:spLocks noChangeArrowheads="1"/>
+            </p:cNvSpPr>
+            <p:nvPr/>
+          </p:nvSpPr>
+          <p:spPr bwMode="auto">
+            <a:xfrm>
+              <a:off x="0" y="838200"/>
+              <a:ext cx="184731" cy="461665"/>
+            </a:xfrm>
+            <a:prstGeom prst="rect">
+              <a:avLst/>
+            </a:prstGeom>
+            <a:noFill/>
+            <a:ln w="9525">
+              <a:noFill/>
+              <a:miter lim="800000"/>
+              <a:headEnd/>
+              <a:tailEnd/>
+            </a:ln>
+            <a:effectLst/>
+          </p:spPr>
+          <p:txBody>
+            <a:bodyPr vert="horz" wrap="none" lIns="91440" tIns="45720" rIns="91440" bIns="45720" numCol="1" anchor="ctr" anchorCtr="0" compatLnSpc="1">
+              <a:prstTxWarp prst="textNoShape">
+                <a:avLst/>
+              </a:prstTxWarp>
+              <a:spAutoFit/>
+            </a:bodyPr>
+            <a:lstStyle/>
+            <a:p>
+              <a:pPr marL="0" marR="0" lvl="0" indent="0" algn="l" defTabSz="914400" rtl="0" eaLnBrk="1" fontAlgn="base" latinLnBrk="0" hangingPunct="1">
+                <a:lnSpc>
+                  <a:spcPct val="100000"/>
+                </a:lnSpc>
+                <a:spcBef>
+                  <a:spcPct val="0"/>
+                </a:spcBef>
+                <a:spcAft>
+                  <a:spcPct val="0"/>
+                </a:spcAft>
+                <a:buClrTx/>
+                <a:buSzTx/>
+                <a:buFontTx/>
+                <a:buNone/>
+                <a:tabLst/>
+              </a:pPr>
+              <a:endParaRPr kumimoji="0" lang="tr-TR" sz="600" b="0" i="0" u="none" strike="noStrike" cap="none" normalizeH="0" baseline="0" dirty="0" smtClean="0">
+                <a:ln>
+                  <a:noFill/>
+                </a:ln>
+                <a:solidFill>
+                  <a:schemeClr val="tx1"/>
+                </a:solidFill>
+                <a:effectLst/>
+                <a:latin typeface="Arial" pitchFamily="34" charset="0"/>
+                <a:cs typeface="Arial" pitchFamily="34" charset="0"/>
+              </a:endParaRPr>
+            </a:p>
+            <a:p>
+              <a:pPr marL="0" marR="0" lvl="0" indent="0" algn="l" defTabSz="914400" rtl="0" eaLnBrk="0" fontAlgn="base" latinLnBrk="0" hangingPunct="0">
+                <a:lnSpc>
+                  <a:spcPct val="100000"/>
+                </a:lnSpc>
+                <a:spcBef>
+                  <a:spcPct val="0"/>
+                </a:spcBef>
+                <a:spcAft>
+                  <a:spcPct val="0"/>
+                </a:spcAft>
+                <a:buClrTx/>
+                <a:buSzTx/>
+                <a:buFontTx/>
+                <a:buNone/>
+                <a:tabLst/>
+              </a:pPr>
+              <a:endParaRPr kumimoji="0" lang="tr-TR" sz="1800" b="0" i="0" u="none" strike="noStrike" cap="none" normalizeH="0" baseline="0" dirty="0" smtClean="0">
+                <a:ln>
+                  <a:noFill/>
+                </a:ln>
+                <a:solidFill>
+                  <a:schemeClr val="tx1"/>
+                </a:solidFill>
+                <a:effectLst/>
+                <a:latin typeface="Arial" pitchFamily="34" charset="0"/>
+                <a:cs typeface="Arial" pitchFamily="34" charset="0"/>
+              </a:endParaRPr>
+            </a:p>
+          </p:txBody>
+        </p:sp>
+        <p:sp>
+          <p:nvSpPr>
+            <p:cNvPr id="55" name="TextBox 54"/>
+            <p:cNvSpPr txBox="1"/>
+            <p:nvPr/>
+          </p:nvSpPr>
+          <p:spPr>
+            <a:xfrm>
+              <a:off x="59108" y="1244025"/>
+              <a:ext cx="1040478" cy="584775"/>
+            </a:xfrm>
+            <a:prstGeom prst="rect">
+              <a:avLst/>
+            </a:prstGeom>
+            <a:noFill/>
+          </p:spPr>
+          <p:txBody>
+            <a:bodyPr wrap="none" rtlCol="0">
+              <a:spAutoFit/>
+            </a:bodyPr>
+            <a:lstStyle/>
+            <a:p>
+              <a:pPr algn="ctr"/>
+              <a:r>
+                <a:rPr lang="tr-TR" sz="1600" dirty="0" smtClean="0"/>
+                <a:t>Goal State</a:t>
+              </a:r>
+            </a:p>
+            <a:p>
+              <a:pPr algn="ctr"/>
+              <a:r>
+                <a:rPr lang="tr-TR" sz="1600" dirty="0" smtClean="0"/>
+                <a:t> Position</a:t>
+              </a:r>
+              <a:endParaRPr lang="tr-TR" sz="1600" dirty="0"/>
+            </a:p>
+          </p:txBody>
+        </p:sp>
+        <p:cxnSp>
+          <p:nvCxnSpPr>
+            <p:cNvPr id="59" name="Straight Connector 58"/>
+            <p:cNvCxnSpPr/>
+            <p:nvPr/>
+          </p:nvCxnSpPr>
+          <p:spPr>
+            <a:xfrm rot="10800000">
+              <a:off x="1295400" y="2996724"/>
+              <a:ext cx="2895600" cy="1588"/>
+            </a:xfrm>
+            <a:prstGeom prst="line">
+              <a:avLst/>
+            </a:prstGeom>
+          </p:spPr>
+          <p:style>
+            <a:lnRef idx="1">
+              <a:schemeClr val="accent1"/>
+            </a:lnRef>
+            <a:fillRef idx="0">
+              <a:schemeClr val="accent1"/>
+            </a:fillRef>
+            <a:effectRef idx="0">
+              <a:schemeClr val="accent1"/>
+            </a:effectRef>
+            <a:fontRef idx="minor">
+              <a:schemeClr val="tx1"/>
+            </a:fontRef>
+          </p:style>
+        </p:cxnSp>
+        <p:cxnSp>
+          <p:nvCxnSpPr>
+            <p:cNvPr id="71" name="Straight Arrow Connector 70"/>
+            <p:cNvCxnSpPr/>
+            <p:nvPr/>
+          </p:nvCxnSpPr>
+          <p:spPr>
+            <a:xfrm rot="16200000" flipV="1">
+              <a:off x="797386" y="2487046"/>
+              <a:ext cx="1000342" cy="4313"/>
+            </a:xfrm>
+            <a:prstGeom prst="straightConnector1">
+              <a:avLst/>
+            </a:prstGeom>
+            <a:ln>
+              <a:tailEnd type="arrow"/>
+            </a:ln>
+          </p:spPr>
+          <p:style>
+            <a:lnRef idx="1">
+              <a:schemeClr val="accent1"/>
+            </a:lnRef>
+            <a:fillRef idx="0">
+              <a:schemeClr val="accent1"/>
+            </a:fillRef>
+            <a:effectRef idx="0">
+              <a:schemeClr val="accent1"/>
+            </a:effectRef>
+            <a:fontRef idx="minor">
+              <a:schemeClr val="tx1"/>
+            </a:fontRef>
+          </p:style>
+        </p:cxnSp>
+        <p:sp>
+          <p:nvSpPr>
+            <p:cNvPr id="1040" name="Rectangle 16"/>
+            <p:cNvSpPr>
+              <a:spLocks noChangeArrowheads="1"/>
+            </p:cNvSpPr>
+            <p:nvPr/>
+          </p:nvSpPr>
+          <p:spPr bwMode="auto">
+            <a:xfrm>
+              <a:off x="0" y="790575"/>
+              <a:ext cx="9144000" cy="0"/>
+            </a:xfrm>
+            <a:prstGeom prst="rect">
+              <a:avLst/>
+            </a:prstGeom>
+            <a:noFill/>
+            <a:ln w="9525">
+              <a:noFill/>
+              <a:miter lim="800000"/>
+              <a:headEnd/>
+              <a:tailEnd/>
+            </a:ln>
+            <a:effectLst/>
+          </p:spPr>
+          <p:txBody>
+            <a:bodyPr vert="horz" wrap="none" lIns="91440" tIns="45720" rIns="91440" bIns="45720" numCol="1" anchor="ctr" anchorCtr="0" compatLnSpc="1">
+              <a:prstTxWarp prst="textNoShape">
+                <a:avLst/>
+              </a:prstTxWarp>
+              <a:spAutoFit/>
+            </a:bodyPr>
+            <a:lstStyle/>
+            <a:p>
+              <a:pPr marL="0" marR="0" lvl="0" indent="0" algn="l" defTabSz="914400" rtl="0" eaLnBrk="1" fontAlgn="base" latinLnBrk="0" hangingPunct="1">
+                <a:lnSpc>
+                  <a:spcPct val="100000"/>
+                </a:lnSpc>
+                <a:spcBef>
+                  <a:spcPct val="0"/>
+                </a:spcBef>
+                <a:spcAft>
+                  <a:spcPct val="0"/>
+                </a:spcAft>
+                <a:buClrTx/>
+                <a:buSzTx/>
+                <a:buFontTx/>
+                <a:buNone/>
+                <a:tabLst/>
+              </a:pPr>
+              <a:endParaRPr kumimoji="0" lang="tr-TR" sz="1800" b="0" i="0" u="none" strike="noStrike" cap="none" normalizeH="0" baseline="0" smtClean="0">
+                <a:ln>
+                  <a:noFill/>
+                </a:ln>
+                <a:solidFill>
+                  <a:schemeClr val="tx1"/>
+                </a:solidFill>
+                <a:effectLst/>
+                <a:latin typeface="Arial" pitchFamily="34" charset="0"/>
+                <a:cs typeface="Arial" pitchFamily="34" charset="0"/>
+              </a:endParaRPr>
+            </a:p>
+          </p:txBody>
+        </p:sp>
+        <p:pic>
+          <p:nvPicPr>
+            <p:cNvPr id="1041" name="Picture 17"/>
+            <p:cNvPicPr>
+              <a:picLocks noChangeAspect="1" noChangeArrowheads="1"/>
+            </p:cNvPicPr>
+            <p:nvPr/>
+          </p:nvPicPr>
+          <p:blipFill>
+            <a:blip r:embed="rId4">
+              <a:clrChange>
+                <a:clrFrom>
+                  <a:srgbClr val="FFFFFF"/>
+                </a:clrFrom>
+                <a:clrTo>
+                  <a:srgbClr val="FFFFFF">
+                    <a:alpha val="0"/>
+                  </a:srgbClr>
+                </a:clrTo>
+              </a:clrChange>
+            </a:blip>
+            <a:srcRect/>
+            <a:stretch>
+              <a:fillRect/>
+            </a:stretch>
+          </p:blipFill>
+          <p:spPr bwMode="auto">
+            <a:xfrm>
+              <a:off x="1345962" y="2286000"/>
+              <a:ext cx="857250" cy="304800"/>
+            </a:xfrm>
+            <a:prstGeom prst="rect">
+              <a:avLst/>
+            </a:prstGeom>
+            <a:noFill/>
+          </p:spPr>
+        </p:pic>
+        <p:sp>
+          <p:nvSpPr>
+            <p:cNvPr id="1043" name="Rectangle 19"/>
+            <p:cNvSpPr>
+              <a:spLocks noChangeArrowheads="1"/>
+            </p:cNvSpPr>
+            <p:nvPr/>
+          </p:nvSpPr>
+          <p:spPr bwMode="auto">
+            <a:xfrm>
+              <a:off x="0" y="762000"/>
+              <a:ext cx="9144000" cy="0"/>
+            </a:xfrm>
+            <a:prstGeom prst="rect">
+              <a:avLst/>
+            </a:prstGeom>
+            <a:noFill/>
+            <a:ln w="9525">
+              <a:noFill/>
+              <a:miter lim="800000"/>
+              <a:headEnd/>
+              <a:tailEnd/>
+            </a:ln>
+            <a:effectLst/>
+          </p:spPr>
+          <p:txBody>
+            <a:bodyPr vert="horz" wrap="none" lIns="91440" tIns="45720" rIns="91440" bIns="45720" numCol="1" anchor="ctr" anchorCtr="0" compatLnSpc="1">
+              <a:prstTxWarp prst="textNoShape">
+                <a:avLst/>
+              </a:prstTxWarp>
+              <a:spAutoFit/>
+            </a:bodyPr>
+            <a:lstStyle/>
+            <a:p>
+              <a:pPr marL="0" marR="0" lvl="0" indent="0" algn="l" defTabSz="914400" rtl="0" eaLnBrk="1" fontAlgn="base" latinLnBrk="0" hangingPunct="1">
+                <a:lnSpc>
+                  <a:spcPct val="100000"/>
+                </a:lnSpc>
+                <a:spcBef>
+                  <a:spcPct val="0"/>
+                </a:spcBef>
+                <a:spcAft>
+                  <a:spcPct val="0"/>
+                </a:spcAft>
+                <a:buClrTx/>
+                <a:buSzTx/>
+                <a:buFontTx/>
+                <a:buNone/>
+                <a:tabLst/>
+              </a:pPr>
+              <a:endParaRPr kumimoji="0" lang="tr-TR" sz="1800" b="0" i="0" u="none" strike="noStrike" cap="none" normalizeH="0" baseline="0" smtClean="0">
+                <a:ln>
+                  <a:noFill/>
+                </a:ln>
+                <a:solidFill>
+                  <a:schemeClr val="tx1"/>
+                </a:solidFill>
+                <a:effectLst/>
+                <a:latin typeface="Arial" pitchFamily="34" charset="0"/>
+                <a:cs typeface="Arial" pitchFamily="34" charset="0"/>
+              </a:endParaRPr>
+            </a:p>
+          </p:txBody>
+        </p:sp>
+      </p:grpSp>
+    </p:spTree>
+  </p:cSld>
+  <p:clrMapOvr>
+    <a:masterClrMapping/>
+  </p:clrMapOvr>
+</p:sld>
+</file>
+
+<file path=ppt/slides/slide29.xml><?xml version="1.0" encoding="utf-8"?>
+<p:sld xmlns:a="http://schemas.openxmlformats.org/drawingml/2006/main" xmlns:r="http://schemas.openxmlformats.org/officeDocument/2006/relationships" xmlns:p="http://schemas.openxmlformats.org/presentationml/2006/main">
+  <p:cSld>
+    <p:spTree>
+      <p:nvGrpSpPr>
+        <p:cNvPr id="1" name=""/>
+        <p:cNvGrpSpPr/>
+        <p:nvPr/>
+      </p:nvGrpSpPr>
+      <p:grpSpPr>
+        <a:xfrm>
+          <a:off x="0" y="0"/>
+          <a:ext cx="0" cy="0"/>
+          <a:chOff x="0" y="0"/>
+          <a:chExt cx="0" cy="0"/>
+        </a:xfrm>
+      </p:grpSpPr>
+      <p:grpSp>
+        <p:nvGrpSpPr>
+          <p:cNvPr id="30" name="Group 29"/>
+          <p:cNvGrpSpPr/>
+          <p:nvPr/>
+        </p:nvGrpSpPr>
+        <p:grpSpPr>
+          <a:xfrm>
+            <a:off x="1905000" y="1981200"/>
+            <a:ext cx="4358833" cy="1639019"/>
+            <a:chOff x="1905000" y="1981200"/>
+            <a:chExt cx="4358833" cy="1639019"/>
+          </a:xfrm>
+        </p:grpSpPr>
+        <p:sp>
+          <p:nvSpPr>
+            <p:cNvPr id="5" name="Oval 4"/>
+            <p:cNvSpPr/>
+            <p:nvPr/>
+          </p:nvSpPr>
+          <p:spPr>
+            <a:xfrm>
+              <a:off x="1905000" y="3050876"/>
+              <a:ext cx="638355" cy="569343"/>
+            </a:xfrm>
+            <a:prstGeom prst="ellipse">
+              <a:avLst/>
+            </a:prstGeom>
+            <a:noFill/>
+          </p:spPr>
+          <p:style>
+            <a:lnRef idx="2">
+              <a:schemeClr val="accent1">
+                <a:shade val="50000"/>
+              </a:schemeClr>
+            </a:lnRef>
+            <a:fillRef idx="1">
+              <a:schemeClr val="accent1"/>
+            </a:fillRef>
+            <a:effectRef idx="0">
+              <a:schemeClr val="accent1"/>
+            </a:effectRef>
+            <a:fontRef idx="minor">
+              <a:schemeClr val="lt1"/>
+            </a:fontRef>
+          </p:style>
+          <p:txBody>
+            <a:bodyPr rtlCol="0" anchor="ctr"/>
+            <a:lstStyle/>
+            <a:p>
+              <a:pPr algn="ctr"/>
+              <a:endParaRPr lang="tr-TR"/>
+            </a:p>
+          </p:txBody>
+        </p:sp>
+        <p:sp>
+          <p:nvSpPr>
+            <p:cNvPr id="6" name="TextBox 5"/>
+            <p:cNvSpPr txBox="1"/>
+            <p:nvPr/>
+          </p:nvSpPr>
+          <p:spPr>
+            <a:xfrm>
+              <a:off x="1917700" y="3162300"/>
+              <a:ext cx="615938" cy="307777"/>
+            </a:xfrm>
+            <a:prstGeom prst="rect">
+              <a:avLst/>
+            </a:prstGeom>
+            <a:noFill/>
+          </p:spPr>
+          <p:txBody>
+            <a:bodyPr wrap="none" rtlCol="0">
+              <a:spAutoFit/>
+            </a:bodyPr>
+            <a:lstStyle/>
+            <a:p>
+              <a:r>
+                <a:rPr lang="tr-TR" sz="1400" dirty="0" smtClean="0"/>
+                <a:t>Agent</a:t>
+              </a:r>
+              <a:endParaRPr lang="tr-TR" sz="1400" dirty="0"/>
+            </a:p>
+          </p:txBody>
+        </p:sp>
+        <p:sp>
+          <p:nvSpPr>
+            <p:cNvPr id="7" name="Oval 6"/>
+            <p:cNvSpPr/>
+            <p:nvPr/>
+          </p:nvSpPr>
+          <p:spPr>
+            <a:xfrm>
+              <a:off x="5277929" y="1981200"/>
+              <a:ext cx="45719" cy="60385"/>
+            </a:xfrm>
+            <a:prstGeom prst="ellipse">
+              <a:avLst/>
+            </a:prstGeom>
+          </p:spPr>
+          <p:style>
+            <a:lnRef idx="2">
+              <a:schemeClr val="accent1">
+                <a:shade val="50000"/>
+              </a:schemeClr>
+            </a:lnRef>
+            <a:fillRef idx="1">
+              <a:schemeClr val="accent1"/>
+            </a:fillRef>
+            <a:effectRef idx="0">
+              <a:schemeClr val="accent1"/>
+            </a:effectRef>
+            <a:fontRef idx="minor">
+              <a:schemeClr val="lt1"/>
+            </a:fontRef>
+          </p:style>
+          <p:txBody>
+            <a:bodyPr rtlCol="0" anchor="ctr"/>
+            <a:lstStyle/>
+            <a:p>
+              <a:pPr algn="ctr"/>
+              <a:endParaRPr lang="tr-TR"/>
+            </a:p>
+          </p:txBody>
+        </p:sp>
+        <p:sp>
+          <p:nvSpPr>
+            <p:cNvPr id="8" name="TextBox 7"/>
+            <p:cNvSpPr txBox="1"/>
+            <p:nvPr/>
+          </p:nvSpPr>
+          <p:spPr>
+            <a:xfrm>
+              <a:off x="5029200" y="2006838"/>
+              <a:ext cx="1234633" cy="369332"/>
+            </a:xfrm>
+            <a:prstGeom prst="rect">
+              <a:avLst/>
+            </a:prstGeom>
+            <a:noFill/>
+          </p:spPr>
+          <p:txBody>
+            <a:bodyPr wrap="none" rtlCol="0">
+              <a:spAutoFit/>
+            </a:bodyPr>
+            <a:lstStyle/>
+            <a:p>
+              <a:r>
+                <a:rPr lang="tr-TR" dirty="0" smtClean="0"/>
+                <a:t>Goal State</a:t>
+              </a:r>
+              <a:endParaRPr lang="tr-TR" dirty="0"/>
+            </a:p>
+          </p:txBody>
+        </p:sp>
+        <p:cxnSp>
+          <p:nvCxnSpPr>
+            <p:cNvPr id="9" name="Straight Arrow Connector 8"/>
+            <p:cNvCxnSpPr>
+              <a:stCxn id="5" idx="7"/>
+            </p:cNvCxnSpPr>
+            <p:nvPr/>
+          </p:nvCxnSpPr>
+          <p:spPr>
+            <a:xfrm rot="5400000" flipH="1" flipV="1">
+              <a:off x="3283059" y="1191143"/>
+              <a:ext cx="1109922" cy="2776300"/>
+            </a:xfrm>
+            <a:prstGeom prst="straightConnector1">
+              <a:avLst/>
+            </a:prstGeom>
+            <a:ln>
+              <a:tailEnd type="arrow"/>
+            </a:ln>
+          </p:spPr>
+          <p:style>
+            <a:lnRef idx="1">
+              <a:schemeClr val="accent1"/>
+            </a:lnRef>
+            <a:fillRef idx="0">
+              <a:schemeClr val="accent1"/>
+            </a:fillRef>
+            <a:effectRef idx="0">
+              <a:schemeClr val="accent1"/>
+            </a:effectRef>
+            <a:fontRef idx="minor">
+              <a:schemeClr val="tx1"/>
+            </a:fontRef>
+          </p:style>
+        </p:cxnSp>
+        <p:cxnSp>
+          <p:nvCxnSpPr>
+            <p:cNvPr id="11" name="Straight Connector 10"/>
+            <p:cNvCxnSpPr>
+              <a:stCxn id="5" idx="7"/>
+            </p:cNvCxnSpPr>
+            <p:nvPr/>
+          </p:nvCxnSpPr>
+          <p:spPr>
+            <a:xfrm rot="5400000" flipH="1" flipV="1">
+              <a:off x="2972508" y="2601562"/>
+              <a:ext cx="10054" cy="1055330"/>
+            </a:xfrm>
+            <a:prstGeom prst="line">
+              <a:avLst/>
+            </a:prstGeom>
+          </p:spPr>
+          <p:style>
+            <a:lnRef idx="1">
+              <a:schemeClr val="accent1"/>
+            </a:lnRef>
+            <a:fillRef idx="0">
+              <a:schemeClr val="accent1"/>
+            </a:fillRef>
+            <a:effectRef idx="0">
+              <a:schemeClr val="accent1"/>
+            </a:effectRef>
+            <a:fontRef idx="minor">
+              <a:schemeClr val="tx1"/>
+            </a:fontRef>
+          </p:style>
+        </p:cxnSp>
+        <p:sp>
+          <p:nvSpPr>
+            <p:cNvPr id="12" name="TextBox 11"/>
+            <p:cNvSpPr txBox="1"/>
+            <p:nvPr/>
+          </p:nvSpPr>
+          <p:spPr>
+            <a:xfrm>
+              <a:off x="3155830" y="2852468"/>
+              <a:ext cx="1140056" cy="276999"/>
+            </a:xfrm>
+            <a:prstGeom prst="rect">
+              <a:avLst/>
+            </a:prstGeom>
+            <a:noFill/>
+          </p:spPr>
+          <p:txBody>
+            <a:bodyPr wrap="none" rtlCol="0">
+              <a:spAutoFit/>
+            </a:bodyPr>
+            <a:lstStyle/>
+            <a:p>
+              <a:r>
+                <a:rPr lang="tr-TR" sz="1200" dirty="0" smtClean="0"/>
+                <a:t>Bearing Angle</a:t>
+              </a:r>
+              <a:endParaRPr lang="tr-TR" sz="1200" dirty="0"/>
+            </a:p>
+          </p:txBody>
+        </p:sp>
+        <p:sp>
+          <p:nvSpPr>
+            <p:cNvPr id="13" name="TextBox 12"/>
+            <p:cNvSpPr txBox="1"/>
+            <p:nvPr/>
+          </p:nvSpPr>
+          <p:spPr>
+            <a:xfrm rot="20365342">
+              <a:off x="3207588" y="2334884"/>
+              <a:ext cx="902811" cy="276999"/>
+            </a:xfrm>
+            <a:prstGeom prst="rect">
+              <a:avLst/>
+            </a:prstGeom>
+            <a:noFill/>
+          </p:spPr>
+          <p:txBody>
+            <a:bodyPr wrap="none" rtlCol="0">
+              <a:spAutoFit/>
+            </a:bodyPr>
+            <a:lstStyle/>
+            <a:p>
+              <a:r>
+                <a:rPr lang="tr-TR" sz="1200" dirty="0" smtClean="0"/>
+                <a:t>Amplitude</a:t>
+              </a:r>
+              <a:endParaRPr lang="tr-TR" sz="1200" dirty="0"/>
+            </a:p>
+          </p:txBody>
+        </p:sp>
+        <p:grpSp>
+          <p:nvGrpSpPr>
+            <p:cNvPr id="29" name="Group 28"/>
+            <p:cNvGrpSpPr/>
+            <p:nvPr/>
+          </p:nvGrpSpPr>
+          <p:grpSpPr>
+            <a:xfrm>
+              <a:off x="2971800" y="2917825"/>
+              <a:ext cx="220054" cy="213645"/>
+              <a:chOff x="2294546" y="1676400"/>
+              <a:chExt cx="252101" cy="366045"/>
+            </a:xfrm>
+          </p:grpSpPr>
+          <p:sp>
+            <p:nvSpPr>
+              <p:cNvPr id="20" name="Freeform 19"/>
+              <p:cNvSpPr/>
+              <p:nvPr/>
+            </p:nvSpPr>
+            <p:spPr>
+              <a:xfrm>
+                <a:off x="2294546" y="1682097"/>
+                <a:ext cx="252101" cy="360348"/>
+              </a:xfrm>
+              <a:custGeom>
+                <a:avLst/>
+                <a:gdLst>
+                  <a:gd name="connsiteX0" fmla="*/ 252101 w 252101"/>
+                  <a:gd name="connsiteY0" fmla="*/ 360348 h 360348"/>
+                  <a:gd name="connsiteX1" fmla="*/ 166643 w 252101"/>
+                  <a:gd name="connsiteY1" fmla="*/ 86882 h 360348"/>
+                  <a:gd name="connsiteX2" fmla="*/ 21364 w 252101"/>
+                  <a:gd name="connsiteY2" fmla="*/ 9970 h 360348"/>
+                  <a:gd name="connsiteX3" fmla="*/ 38456 w 252101"/>
+                  <a:gd name="connsiteY3" fmla="*/ 27062 h 360348"/>
+                </a:gdLst>
+                <a:ahLst/>
+                <a:cxnLst>
+                  <a:cxn ang="0">
+                    <a:pos x="connsiteX0" y="connsiteY0"/>
+                  </a:cxn>
+                  <a:cxn ang="0">
+                    <a:pos x="connsiteX1" y="connsiteY1"/>
+                  </a:cxn>
+                  <a:cxn ang="0">
+                    <a:pos x="connsiteX2" y="connsiteY2"/>
+                  </a:cxn>
+                  <a:cxn ang="0">
+                    <a:pos x="connsiteX3" y="connsiteY3"/>
+                  </a:cxn>
+                </a:cxnLst>
+                <a:rect l="l" t="t" r="r" b="b"/>
+                <a:pathLst>
+                  <a:path w="252101" h="360348">
+                    <a:moveTo>
+                      <a:pt x="252101" y="360348"/>
+                    </a:moveTo>
+                    <a:cubicBezTo>
+                      <a:pt x="228600" y="252813"/>
+                      <a:pt x="205099" y="145278"/>
+                      <a:pt x="166643" y="86882"/>
+                    </a:cubicBezTo>
+                    <a:cubicBezTo>
+                      <a:pt x="128187" y="28486"/>
+                      <a:pt x="42729" y="19940"/>
+                      <a:pt x="21364" y="9970"/>
+                    </a:cubicBezTo>
+                    <a:cubicBezTo>
+                      <a:pt x="0" y="0"/>
+                      <a:pt x="19228" y="13531"/>
+                      <a:pt x="38456" y="27062"/>
+                    </a:cubicBezTo>
+                  </a:path>
+                </a:pathLst>
+              </a:custGeom>
+            </p:spPr>
+            <p:style>
+              <a:lnRef idx="1">
+                <a:schemeClr val="accent1"/>
+              </a:lnRef>
+              <a:fillRef idx="0">
+                <a:schemeClr val="accent1"/>
+              </a:fillRef>
+              <a:effectRef idx="0">
+                <a:schemeClr val="accent1"/>
+              </a:effectRef>
+              <a:fontRef idx="minor">
+                <a:schemeClr val="tx1"/>
+              </a:fontRef>
+            </p:style>
+            <p:txBody>
+              <a:bodyPr rtlCol="0" anchor="ctr"/>
+              <a:lstStyle/>
+              <a:p>
+                <a:pPr algn="ctr"/>
+                <a:endParaRPr lang="tr-TR"/>
+              </a:p>
+            </p:txBody>
+          </p:sp>
+          <p:cxnSp>
+            <p:nvCxnSpPr>
+              <p:cNvPr id="22" name="Straight Connector 21"/>
+              <p:cNvCxnSpPr>
+                <a:stCxn id="20" idx="3"/>
+              </p:cNvCxnSpPr>
+              <p:nvPr/>
+            </p:nvCxnSpPr>
+            <p:spPr>
+              <a:xfrm>
+                <a:off x="2333002" y="1709159"/>
+                <a:ext cx="29198" cy="43441"/>
+              </a:xfrm>
+              <a:prstGeom prst="line">
+                <a:avLst/>
+              </a:prstGeom>
+            </p:spPr>
+            <p:style>
+              <a:lnRef idx="1">
+                <a:schemeClr val="accent1"/>
+              </a:lnRef>
+              <a:fillRef idx="0">
+                <a:schemeClr val="accent1"/>
+              </a:fillRef>
+              <a:effectRef idx="0">
+                <a:schemeClr val="accent1"/>
+              </a:effectRef>
+              <a:fontRef idx="minor">
+                <a:schemeClr val="tx1"/>
+              </a:fontRef>
+            </p:style>
+          </p:cxnSp>
+          <p:cxnSp>
+            <p:nvCxnSpPr>
+              <p:cNvPr id="24" name="Straight Connector 23"/>
+              <p:cNvCxnSpPr>
+                <a:stCxn id="20" idx="3"/>
+                <a:endCxn id="20" idx="3"/>
+              </p:cNvCxnSpPr>
+              <p:nvPr/>
+            </p:nvCxnSpPr>
+            <p:spPr>
+              <a:xfrm>
+                <a:off x="2333002" y="1709159"/>
+                <a:ext cx="1588" cy="1588"/>
+              </a:xfrm>
+              <a:prstGeom prst="line">
+                <a:avLst/>
+              </a:prstGeom>
+            </p:spPr>
+            <p:style>
+              <a:lnRef idx="1">
+                <a:schemeClr val="accent1"/>
+              </a:lnRef>
+              <a:fillRef idx="0">
+                <a:schemeClr val="accent1"/>
+              </a:fillRef>
+              <a:effectRef idx="0">
+                <a:schemeClr val="accent1"/>
+              </a:effectRef>
+              <a:fontRef idx="minor">
+                <a:schemeClr val="tx1"/>
+              </a:fontRef>
+            </p:style>
+          </p:cxnSp>
+          <p:cxnSp>
+            <p:nvCxnSpPr>
+              <p:cNvPr id="26" name="Straight Connector 25"/>
+              <p:cNvCxnSpPr>
+                <a:stCxn id="20" idx="2"/>
+              </p:cNvCxnSpPr>
+              <p:nvPr/>
+            </p:nvCxnSpPr>
+            <p:spPr>
+              <a:xfrm flipV="1">
+                <a:off x="2315910" y="1676400"/>
+                <a:ext cx="122490" cy="15667"/>
+              </a:xfrm>
+              <a:prstGeom prst="line">
+                <a:avLst/>
+              </a:prstGeom>
+            </p:spPr>
+            <p:style>
+              <a:lnRef idx="1">
+                <a:schemeClr val="accent1"/>
+              </a:lnRef>
+              <a:fillRef idx="0">
+                <a:schemeClr val="accent1"/>
+              </a:fillRef>
+              <a:effectRef idx="0">
+                <a:schemeClr val="accent1"/>
+              </a:effectRef>
+              <a:fontRef idx="minor">
+                <a:schemeClr val="tx1"/>
+              </a:fontRef>
+            </p:style>
+          </p:cxnSp>
+        </p:grpSp>
+      </p:grpSp>
+    </p:spTree>
+  </p:cSld>
+  <p:clrMapOvr>
+    <a:masterClrMapping/>
+  </p:clrMapOvr>
+</p:sld>
+</file>
+
 <file path=ppt/slides/slide3.xml><?xml version="1.0" encoding="utf-8"?>
 <p:sld xmlns:a="http://schemas.openxmlformats.org/drawingml/2006/main" xmlns:r="http://schemas.openxmlformats.org/officeDocument/2006/relationships" xmlns:p="http://schemas.openxmlformats.org/presentationml/2006/main">
   <p:cSld>
@@ -26257,6 +28117,1518 @@
           </p:sp>
         </p:grpSp>
       </p:grpSp>
+    </p:spTree>
+  </p:cSld>
+  <p:clrMapOvr>
+    <a:masterClrMapping/>
+  </p:clrMapOvr>
+</p:sld>
+</file>
+
+<file path=ppt/slides/slide30.xml><?xml version="1.0" encoding="utf-8"?>
+<p:sld xmlns:a="http://schemas.openxmlformats.org/drawingml/2006/main" xmlns:r="http://schemas.openxmlformats.org/officeDocument/2006/relationships" xmlns:p="http://schemas.openxmlformats.org/presentationml/2006/main">
+  <p:cSld>
+    <p:spTree>
+      <p:nvGrpSpPr>
+        <p:cNvPr id="1" name=""/>
+        <p:cNvGrpSpPr/>
+        <p:nvPr/>
+      </p:nvGrpSpPr>
+      <p:grpSpPr>
+        <a:xfrm>
+          <a:off x="0" y="0"/>
+          <a:ext cx="0" cy="0"/>
+          <a:chOff x="0" y="0"/>
+          <a:chExt cx="0" cy="0"/>
+        </a:xfrm>
+      </p:grpSpPr>
+      <p:sp>
+        <p:nvSpPr>
+          <p:cNvPr id="41986" name="Rectangle 2"/>
+          <p:cNvSpPr>
+            <a:spLocks noChangeArrowheads="1"/>
+          </p:cNvSpPr>
+          <p:nvPr/>
+        </p:nvSpPr>
+        <p:spPr bwMode="auto">
+          <a:xfrm>
+            <a:off x="0" y="0"/>
+            <a:ext cx="9144000" cy="457200"/>
+          </a:xfrm>
+          <a:prstGeom prst="rect">
+            <a:avLst/>
+          </a:prstGeom>
+          <a:noFill/>
+          <a:ln w="9525">
+            <a:noFill/>
+            <a:miter lim="800000"/>
+            <a:headEnd/>
+            <a:tailEnd/>
+          </a:ln>
+          <a:effectLst/>
+        </p:spPr>
+        <p:txBody>
+          <a:bodyPr vert="horz" wrap="none" lIns="91440" tIns="45720" rIns="91440" bIns="45720" numCol="1" anchor="ctr" anchorCtr="0" compatLnSpc="1">
+            <a:prstTxWarp prst="textNoShape">
+              <a:avLst/>
+            </a:prstTxWarp>
+            <a:spAutoFit/>
+          </a:bodyPr>
+          <a:lstStyle/>
+          <a:p>
+            <a:endParaRPr lang="tr-TR"/>
+          </a:p>
+        </p:txBody>
+      </p:sp>
+      <p:sp>
+        <p:nvSpPr>
+          <p:cNvPr id="41987" name="Rectangle 3"/>
+          <p:cNvSpPr>
+            <a:spLocks noChangeArrowheads="1"/>
+          </p:cNvSpPr>
+          <p:nvPr/>
+        </p:nvSpPr>
+        <p:spPr bwMode="auto">
+          <a:xfrm>
+            <a:off x="0" y="762000"/>
+            <a:ext cx="9144000" cy="0"/>
+          </a:xfrm>
+          <a:prstGeom prst="rect">
+            <a:avLst/>
+          </a:prstGeom>
+          <a:noFill/>
+          <a:ln w="9525">
+            <a:noFill/>
+            <a:miter lim="800000"/>
+            <a:headEnd/>
+            <a:tailEnd/>
+          </a:ln>
+          <a:effectLst/>
+        </p:spPr>
+        <p:txBody>
+          <a:bodyPr vert="horz" wrap="none" lIns="91440" tIns="45720" rIns="91440" bIns="45720" numCol="1" anchor="ctr" anchorCtr="0" compatLnSpc="1">
+            <a:prstTxWarp prst="textNoShape">
+              <a:avLst/>
+            </a:prstTxWarp>
+            <a:spAutoFit/>
+          </a:bodyPr>
+          <a:lstStyle/>
+          <a:p>
+            <a:pPr marL="0" marR="0" lvl="0" indent="0" algn="l" defTabSz="914400" rtl="0" eaLnBrk="1" fontAlgn="base" latinLnBrk="0" hangingPunct="1">
+              <a:lnSpc>
+                <a:spcPct val="100000"/>
+              </a:lnSpc>
+              <a:spcBef>
+                <a:spcPct val="0"/>
+              </a:spcBef>
+              <a:spcAft>
+                <a:spcPct val="0"/>
+              </a:spcAft>
+              <a:buClrTx/>
+              <a:buSzTx/>
+              <a:buFontTx/>
+              <a:buNone/>
+              <a:tabLst/>
+            </a:pPr>
+            <a:endParaRPr kumimoji="0" lang="tr-TR" sz="1800" b="0" i="0" u="none" strike="noStrike" cap="none" normalizeH="0" baseline="0" smtClean="0">
+              <a:ln>
+                <a:noFill/>
+              </a:ln>
+              <a:solidFill>
+                <a:schemeClr val="tx1"/>
+              </a:solidFill>
+              <a:effectLst/>
+              <a:latin typeface="Arial" pitchFamily="34" charset="0"/>
+              <a:cs typeface="Arial" pitchFamily="34" charset="0"/>
+            </a:endParaRPr>
+          </a:p>
+        </p:txBody>
+      </p:sp>
+      <p:sp>
+        <p:nvSpPr>
+          <p:cNvPr id="41989" name="Rectangle 5"/>
+          <p:cNvSpPr>
+            <a:spLocks noChangeArrowheads="1"/>
+          </p:cNvSpPr>
+          <p:nvPr/>
+        </p:nvSpPr>
+        <p:spPr bwMode="auto">
+          <a:xfrm>
+            <a:off x="0" y="0"/>
+            <a:ext cx="9144000" cy="457200"/>
+          </a:xfrm>
+          <a:prstGeom prst="rect">
+            <a:avLst/>
+          </a:prstGeom>
+          <a:noFill/>
+          <a:ln w="9525">
+            <a:noFill/>
+            <a:miter lim="800000"/>
+            <a:headEnd/>
+            <a:tailEnd/>
+          </a:ln>
+          <a:effectLst/>
+        </p:spPr>
+        <p:txBody>
+          <a:bodyPr vert="horz" wrap="none" lIns="91440" tIns="45720" rIns="91440" bIns="45720" numCol="1" anchor="ctr" anchorCtr="0" compatLnSpc="1">
+            <a:prstTxWarp prst="textNoShape">
+              <a:avLst/>
+            </a:prstTxWarp>
+            <a:spAutoFit/>
+          </a:bodyPr>
+          <a:lstStyle/>
+          <a:p>
+            <a:endParaRPr lang="tr-TR"/>
+          </a:p>
+        </p:txBody>
+      </p:sp>
+      <p:sp>
+        <p:nvSpPr>
+          <p:cNvPr id="41990" name="Rectangle 6"/>
+          <p:cNvSpPr>
+            <a:spLocks noChangeArrowheads="1"/>
+          </p:cNvSpPr>
+          <p:nvPr/>
+        </p:nvSpPr>
+        <p:spPr bwMode="auto">
+          <a:xfrm>
+            <a:off x="0" y="762000"/>
+            <a:ext cx="9144000" cy="0"/>
+          </a:xfrm>
+          <a:prstGeom prst="rect">
+            <a:avLst/>
+          </a:prstGeom>
+          <a:noFill/>
+          <a:ln w="9525">
+            <a:noFill/>
+            <a:miter lim="800000"/>
+            <a:headEnd/>
+            <a:tailEnd/>
+          </a:ln>
+          <a:effectLst/>
+        </p:spPr>
+        <p:txBody>
+          <a:bodyPr vert="horz" wrap="none" lIns="91440" tIns="45720" rIns="91440" bIns="45720" numCol="1" anchor="ctr" anchorCtr="0" compatLnSpc="1">
+            <a:prstTxWarp prst="textNoShape">
+              <a:avLst/>
+            </a:prstTxWarp>
+            <a:spAutoFit/>
+          </a:bodyPr>
+          <a:lstStyle/>
+          <a:p>
+            <a:pPr marL="0" marR="0" lvl="0" indent="0" algn="l" defTabSz="914400" rtl="0" eaLnBrk="1" fontAlgn="base" latinLnBrk="0" hangingPunct="1">
+              <a:lnSpc>
+                <a:spcPct val="100000"/>
+              </a:lnSpc>
+              <a:spcBef>
+                <a:spcPct val="0"/>
+              </a:spcBef>
+              <a:spcAft>
+                <a:spcPct val="0"/>
+              </a:spcAft>
+              <a:buClrTx/>
+              <a:buSzTx/>
+              <a:buFontTx/>
+              <a:buNone/>
+              <a:tabLst/>
+            </a:pPr>
+            <a:endParaRPr kumimoji="0" lang="tr-TR" sz="1800" b="0" i="0" u="none" strike="noStrike" cap="none" normalizeH="0" baseline="0" smtClean="0">
+              <a:ln>
+                <a:noFill/>
+              </a:ln>
+              <a:solidFill>
+                <a:schemeClr val="tx1"/>
+              </a:solidFill>
+              <a:effectLst/>
+              <a:latin typeface="Arial" pitchFamily="34" charset="0"/>
+              <a:cs typeface="Arial" pitchFamily="34" charset="0"/>
+            </a:endParaRPr>
+          </a:p>
+        </p:txBody>
+      </p:sp>
+      <p:sp>
+        <p:nvSpPr>
+          <p:cNvPr id="41992" name="Rectangle 8"/>
+          <p:cNvSpPr>
+            <a:spLocks noChangeArrowheads="1"/>
+          </p:cNvSpPr>
+          <p:nvPr/>
+        </p:nvSpPr>
+        <p:spPr bwMode="auto">
+          <a:xfrm>
+            <a:off x="0" y="0"/>
+            <a:ext cx="9144000" cy="457200"/>
+          </a:xfrm>
+          <a:prstGeom prst="rect">
+            <a:avLst/>
+          </a:prstGeom>
+          <a:noFill/>
+          <a:ln w="9525">
+            <a:noFill/>
+            <a:miter lim="800000"/>
+            <a:headEnd/>
+            <a:tailEnd/>
+          </a:ln>
+          <a:effectLst/>
+        </p:spPr>
+        <p:txBody>
+          <a:bodyPr vert="horz" wrap="none" lIns="91440" tIns="45720" rIns="91440" bIns="45720" numCol="1" anchor="ctr" anchorCtr="0" compatLnSpc="1">
+            <a:prstTxWarp prst="textNoShape">
+              <a:avLst/>
+            </a:prstTxWarp>
+            <a:spAutoFit/>
+          </a:bodyPr>
+          <a:lstStyle/>
+          <a:p>
+            <a:endParaRPr lang="tr-TR"/>
+          </a:p>
+        </p:txBody>
+      </p:sp>
+      <p:sp>
+        <p:nvSpPr>
+          <p:cNvPr id="41993" name="Rectangle 9"/>
+          <p:cNvSpPr>
+            <a:spLocks noChangeArrowheads="1"/>
+          </p:cNvSpPr>
+          <p:nvPr/>
+        </p:nvSpPr>
+        <p:spPr bwMode="auto">
+          <a:xfrm>
+            <a:off x="0" y="762000"/>
+            <a:ext cx="9144000" cy="457200"/>
+          </a:xfrm>
+          <a:prstGeom prst="rect">
+            <a:avLst/>
+          </a:prstGeom>
+          <a:noFill/>
+          <a:ln w="9525">
+            <a:noFill/>
+            <a:miter lim="800000"/>
+            <a:headEnd/>
+            <a:tailEnd/>
+          </a:ln>
+          <a:effectLst/>
+        </p:spPr>
+        <p:txBody>
+          <a:bodyPr vert="horz" wrap="none" lIns="91440" tIns="45720" rIns="91440" bIns="45720" numCol="1" anchor="ctr" anchorCtr="0" compatLnSpc="1">
+            <a:prstTxWarp prst="textNoShape">
+              <a:avLst/>
+            </a:prstTxWarp>
+            <a:spAutoFit/>
+          </a:bodyPr>
+          <a:lstStyle/>
+          <a:p>
+            <a:pPr marL="0" marR="0" lvl="0" indent="0" algn="l" defTabSz="914400" rtl="0" eaLnBrk="1" fontAlgn="base" latinLnBrk="0" hangingPunct="1">
+              <a:lnSpc>
+                <a:spcPct val="100000"/>
+              </a:lnSpc>
+              <a:spcBef>
+                <a:spcPct val="0"/>
+              </a:spcBef>
+              <a:spcAft>
+                <a:spcPct val="0"/>
+              </a:spcAft>
+              <a:buClrTx/>
+              <a:buSzTx/>
+              <a:buFontTx/>
+              <a:buNone/>
+              <a:tabLst/>
+            </a:pPr>
+            <a:endParaRPr kumimoji="0" lang="tr-TR" sz="1800" b="0" i="0" u="none" strike="noStrike" cap="none" normalizeH="0" baseline="0" smtClean="0">
+              <a:ln>
+                <a:noFill/>
+              </a:ln>
+              <a:solidFill>
+                <a:schemeClr val="tx1"/>
+              </a:solidFill>
+              <a:effectLst/>
+              <a:latin typeface="Arial" pitchFamily="34" charset="0"/>
+              <a:cs typeface="Arial" pitchFamily="34" charset="0"/>
+            </a:endParaRPr>
+          </a:p>
+        </p:txBody>
+      </p:sp>
+      <p:sp>
+        <p:nvSpPr>
+          <p:cNvPr id="5" name="TextBox 4"/>
+          <p:cNvSpPr txBox="1"/>
+          <p:nvPr/>
+        </p:nvSpPr>
+        <p:spPr>
+          <a:xfrm>
+            <a:off x="5589878" y="1535500"/>
+            <a:ext cx="871268" cy="369332"/>
+          </a:xfrm>
+          <a:prstGeom prst="rect">
+            <a:avLst/>
+          </a:prstGeom>
+          <a:noFill/>
+          <a:ln w="15875">
+            <a:solidFill>
+              <a:schemeClr val="accent1"/>
+            </a:solidFill>
+          </a:ln>
+        </p:spPr>
+        <p:txBody>
+          <a:bodyPr wrap="square" rtlCol="0">
+            <a:spAutoFit/>
+          </a:bodyPr>
+          <a:lstStyle/>
+          <a:p>
+            <a:pPr algn="ctr"/>
+            <a:r>
+              <a:rPr lang="tr-TR" dirty="0" smtClean="0"/>
+              <a:t>Plant</a:t>
+            </a:r>
+            <a:endParaRPr lang="tr-TR" dirty="0"/>
+          </a:p>
+        </p:txBody>
+      </p:sp>
+      <p:cxnSp>
+        <p:nvCxnSpPr>
+          <p:cNvPr id="7" name="Straight Connector 6"/>
+          <p:cNvCxnSpPr/>
+          <p:nvPr/>
+        </p:nvCxnSpPr>
+        <p:spPr>
+          <a:xfrm rot="10800000">
+            <a:off x="5474495" y="2438400"/>
+            <a:ext cx="1524000" cy="1588"/>
+          </a:xfrm>
+          <a:prstGeom prst="line">
+            <a:avLst/>
+          </a:prstGeom>
+        </p:spPr>
+        <p:style>
+          <a:lnRef idx="1">
+            <a:schemeClr val="accent1"/>
+          </a:lnRef>
+          <a:fillRef idx="0">
+            <a:schemeClr val="accent1"/>
+          </a:fillRef>
+          <a:effectRef idx="0">
+            <a:schemeClr val="accent1"/>
+          </a:effectRef>
+          <a:fontRef idx="minor">
+            <a:schemeClr val="tx1"/>
+          </a:fontRef>
+        </p:style>
+      </p:cxnSp>
+      <p:sp>
+        <p:nvSpPr>
+          <p:cNvPr id="8" name="Isosceles Triangle 7"/>
+          <p:cNvSpPr/>
+          <p:nvPr/>
+        </p:nvSpPr>
+        <p:spPr>
+          <a:xfrm rot="16200000">
+            <a:off x="4942897" y="2156603"/>
+            <a:ext cx="500333" cy="569344"/>
+          </a:xfrm>
+          <a:prstGeom prst="triangle">
+            <a:avLst/>
+          </a:prstGeom>
+          <a:noFill/>
+        </p:spPr>
+        <p:style>
+          <a:lnRef idx="2">
+            <a:schemeClr val="accent1">
+              <a:shade val="50000"/>
+            </a:schemeClr>
+          </a:lnRef>
+          <a:fillRef idx="1">
+            <a:schemeClr val="accent1"/>
+          </a:fillRef>
+          <a:effectRef idx="0">
+            <a:schemeClr val="accent1"/>
+          </a:effectRef>
+          <a:fontRef idx="minor">
+            <a:schemeClr val="lt1"/>
+          </a:fontRef>
+        </p:style>
+        <p:txBody>
+          <a:bodyPr rtlCol="0" anchor="ctr"/>
+          <a:lstStyle/>
+          <a:p>
+            <a:pPr algn="ctr"/>
+            <a:endParaRPr lang="tr-TR"/>
+          </a:p>
+        </p:txBody>
+      </p:sp>
+      <p:sp>
+        <p:nvSpPr>
+          <p:cNvPr id="9" name="TextBox 8"/>
+          <p:cNvSpPr txBox="1"/>
+          <p:nvPr/>
+        </p:nvSpPr>
+        <p:spPr>
+          <a:xfrm>
+            <a:off x="5158558" y="2234242"/>
+            <a:ext cx="184731" cy="369332"/>
+          </a:xfrm>
+          <a:prstGeom prst="rect">
+            <a:avLst/>
+          </a:prstGeom>
+          <a:noFill/>
+        </p:spPr>
+        <p:txBody>
+          <a:bodyPr wrap="none" rtlCol="0">
+            <a:spAutoFit/>
+          </a:bodyPr>
+          <a:lstStyle/>
+          <a:p>
+            <a:endParaRPr lang="tr-TR" dirty="0"/>
+          </a:p>
+        </p:txBody>
+      </p:sp>
+      <p:cxnSp>
+        <p:nvCxnSpPr>
+          <p:cNvPr id="11" name="Shape 10"/>
+          <p:cNvCxnSpPr>
+            <a:stCxn id="8" idx="0"/>
+          </p:cNvCxnSpPr>
+          <p:nvPr/>
+        </p:nvCxnSpPr>
+        <p:spPr>
+          <a:xfrm rot="10800000">
+            <a:off x="4571962" y="1932317"/>
+            <a:ext cx="336431" cy="508958"/>
+          </a:xfrm>
+          <a:prstGeom prst="bentConnector2">
+            <a:avLst/>
+          </a:prstGeom>
+          <a:ln>
+            <a:tailEnd type="arrow"/>
+          </a:ln>
+        </p:spPr>
+        <p:style>
+          <a:lnRef idx="1">
+            <a:schemeClr val="accent1"/>
+          </a:lnRef>
+          <a:fillRef idx="0">
+            <a:schemeClr val="accent1"/>
+          </a:fillRef>
+          <a:effectRef idx="0">
+            <a:schemeClr val="accent1"/>
+          </a:effectRef>
+          <a:fontRef idx="minor">
+            <a:schemeClr val="tx1"/>
+          </a:fontRef>
+        </p:style>
+      </p:cxnSp>
+      <p:sp>
+        <p:nvSpPr>
+          <p:cNvPr id="12" name="Oval 11"/>
+          <p:cNvSpPr/>
+          <p:nvPr/>
+        </p:nvSpPr>
+        <p:spPr>
+          <a:xfrm>
+            <a:off x="4364927" y="1526875"/>
+            <a:ext cx="448574" cy="405442"/>
+          </a:xfrm>
+          <a:prstGeom prst="ellipse">
+            <a:avLst/>
+          </a:prstGeom>
+          <a:noFill/>
+        </p:spPr>
+        <p:style>
+          <a:lnRef idx="2">
+            <a:schemeClr val="accent1">
+              <a:shade val="50000"/>
+            </a:schemeClr>
+          </a:lnRef>
+          <a:fillRef idx="1">
+            <a:schemeClr val="accent1"/>
+          </a:fillRef>
+          <a:effectRef idx="0">
+            <a:schemeClr val="accent1"/>
+          </a:effectRef>
+          <a:fontRef idx="minor">
+            <a:schemeClr val="lt1"/>
+          </a:fontRef>
+        </p:style>
+        <p:txBody>
+          <a:bodyPr rtlCol="0" anchor="ctr"/>
+          <a:lstStyle/>
+          <a:p>
+            <a:pPr algn="ctr"/>
+            <a:endParaRPr lang="tr-TR"/>
+          </a:p>
+        </p:txBody>
+      </p:sp>
+      <p:cxnSp>
+        <p:nvCxnSpPr>
+          <p:cNvPr id="13" name="Straight Arrow Connector 12"/>
+          <p:cNvCxnSpPr>
+            <a:stCxn id="12" idx="6"/>
+            <a:endCxn id="5" idx="1"/>
+          </p:cNvCxnSpPr>
+          <p:nvPr/>
+        </p:nvCxnSpPr>
+        <p:spPr>
+          <a:xfrm flipV="1">
+            <a:off x="4813501" y="1720166"/>
+            <a:ext cx="776377" cy="9430"/>
+          </a:xfrm>
+          <a:prstGeom prst="straightConnector1">
+            <a:avLst/>
+          </a:prstGeom>
+          <a:ln>
+            <a:tailEnd type="arrow"/>
+          </a:ln>
+        </p:spPr>
+        <p:style>
+          <a:lnRef idx="1">
+            <a:schemeClr val="accent1"/>
+          </a:lnRef>
+          <a:fillRef idx="0">
+            <a:schemeClr val="accent1"/>
+          </a:fillRef>
+          <a:effectRef idx="0">
+            <a:schemeClr val="accent1"/>
+          </a:effectRef>
+          <a:fontRef idx="minor">
+            <a:schemeClr val="tx1"/>
+          </a:fontRef>
+        </p:style>
+      </p:cxnSp>
+      <p:cxnSp>
+        <p:nvCxnSpPr>
+          <p:cNvPr id="14" name="Straight Arrow Connector 13"/>
+          <p:cNvCxnSpPr>
+            <a:stCxn id="28" idx="0"/>
+            <a:endCxn id="12" idx="2"/>
+          </p:cNvCxnSpPr>
+          <p:nvPr/>
+        </p:nvCxnSpPr>
+        <p:spPr>
+          <a:xfrm flipV="1">
+            <a:off x="3886200" y="1729596"/>
+            <a:ext cx="478727" cy="6470"/>
+          </a:xfrm>
+          <a:prstGeom prst="straightConnector1">
+            <a:avLst/>
+          </a:prstGeom>
+          <a:ln>
+            <a:tailEnd type="arrow"/>
+          </a:ln>
+        </p:spPr>
+        <p:style>
+          <a:lnRef idx="1">
+            <a:schemeClr val="accent1"/>
+          </a:lnRef>
+          <a:fillRef idx="0">
+            <a:schemeClr val="accent1"/>
+          </a:fillRef>
+          <a:effectRef idx="0">
+            <a:schemeClr val="accent1"/>
+          </a:effectRef>
+          <a:fontRef idx="minor">
+            <a:schemeClr val="tx1"/>
+          </a:fontRef>
+        </p:style>
+      </p:cxnSp>
+      <p:sp>
+        <p:nvSpPr>
+          <p:cNvPr id="15" name="Oval 14"/>
+          <p:cNvSpPr/>
+          <p:nvPr/>
+        </p:nvSpPr>
+        <p:spPr>
+          <a:xfrm>
+            <a:off x="1847850" y="1524000"/>
+            <a:ext cx="448574" cy="405442"/>
+          </a:xfrm>
+          <a:prstGeom prst="ellipse">
+            <a:avLst/>
+          </a:prstGeom>
+          <a:noFill/>
+        </p:spPr>
+        <p:style>
+          <a:lnRef idx="2">
+            <a:schemeClr val="accent1">
+              <a:shade val="50000"/>
+            </a:schemeClr>
+          </a:lnRef>
+          <a:fillRef idx="1">
+            <a:schemeClr val="accent1"/>
+          </a:fillRef>
+          <a:effectRef idx="0">
+            <a:schemeClr val="accent1"/>
+          </a:effectRef>
+          <a:fontRef idx="minor">
+            <a:schemeClr val="lt1"/>
+          </a:fontRef>
+        </p:style>
+        <p:txBody>
+          <a:bodyPr rtlCol="0" anchor="ctr"/>
+          <a:lstStyle/>
+          <a:p>
+            <a:pPr algn="ctr"/>
+            <a:endParaRPr lang="tr-TR"/>
+          </a:p>
+        </p:txBody>
+      </p:sp>
+      <p:cxnSp>
+        <p:nvCxnSpPr>
+          <p:cNvPr id="16" name="Straight Arrow Connector 15"/>
+          <p:cNvCxnSpPr>
+            <a:stCxn id="5" idx="3"/>
+          </p:cNvCxnSpPr>
+          <p:nvPr/>
+        </p:nvCxnSpPr>
+        <p:spPr>
+          <a:xfrm flipV="1">
+            <a:off x="6461146" y="1716657"/>
+            <a:ext cx="905773" cy="3509"/>
+          </a:xfrm>
+          <a:prstGeom prst="straightConnector1">
+            <a:avLst/>
+          </a:prstGeom>
+          <a:ln>
+            <a:tailEnd type="arrow"/>
+          </a:ln>
+        </p:spPr>
+        <p:style>
+          <a:lnRef idx="1">
+            <a:schemeClr val="accent1"/>
+          </a:lnRef>
+          <a:fillRef idx="0">
+            <a:schemeClr val="accent1"/>
+          </a:fillRef>
+          <a:effectRef idx="0">
+            <a:schemeClr val="accent1"/>
+          </a:effectRef>
+          <a:fontRef idx="minor">
+            <a:schemeClr val="tx1"/>
+          </a:fontRef>
+        </p:style>
+      </p:cxnSp>
+      <p:cxnSp>
+        <p:nvCxnSpPr>
+          <p:cNvPr id="17" name="Straight Connector 16"/>
+          <p:cNvCxnSpPr/>
+          <p:nvPr/>
+        </p:nvCxnSpPr>
+        <p:spPr>
+          <a:xfrm rot="16200000" flipH="1">
+            <a:off x="6366567" y="2337759"/>
+            <a:ext cx="1259456" cy="17252"/>
+          </a:xfrm>
+          <a:prstGeom prst="line">
+            <a:avLst/>
+          </a:prstGeom>
+        </p:spPr>
+        <p:style>
+          <a:lnRef idx="1">
+            <a:schemeClr val="accent1"/>
+          </a:lnRef>
+          <a:fillRef idx="0">
+            <a:schemeClr val="accent1"/>
+          </a:fillRef>
+          <a:effectRef idx="0">
+            <a:schemeClr val="accent1"/>
+          </a:effectRef>
+          <a:fontRef idx="minor">
+            <a:schemeClr val="tx1"/>
+          </a:fontRef>
+        </p:style>
+      </p:cxnSp>
+      <p:cxnSp>
+        <p:nvCxnSpPr>
+          <p:cNvPr id="18" name="Straight Connector 17"/>
+          <p:cNvCxnSpPr/>
+          <p:nvPr/>
+        </p:nvCxnSpPr>
+        <p:spPr>
+          <a:xfrm rot="10800000">
+            <a:off x="2057400" y="2971800"/>
+            <a:ext cx="4953002" cy="1588"/>
+          </a:xfrm>
+          <a:prstGeom prst="line">
+            <a:avLst/>
+          </a:prstGeom>
+        </p:spPr>
+        <p:style>
+          <a:lnRef idx="1">
+            <a:schemeClr val="accent1"/>
+          </a:lnRef>
+          <a:fillRef idx="0">
+            <a:schemeClr val="accent1"/>
+          </a:fillRef>
+          <a:effectRef idx="0">
+            <a:schemeClr val="accent1"/>
+          </a:effectRef>
+          <a:fontRef idx="minor">
+            <a:schemeClr val="tx1"/>
+          </a:fontRef>
+        </p:style>
+      </p:cxnSp>
+      <p:cxnSp>
+        <p:nvCxnSpPr>
+          <p:cNvPr id="19" name="Straight Arrow Connector 18"/>
+          <p:cNvCxnSpPr/>
+          <p:nvPr/>
+        </p:nvCxnSpPr>
+        <p:spPr>
+          <a:xfrm rot="16200000" flipV="1">
+            <a:off x="1526373" y="2444726"/>
+            <a:ext cx="1063924" cy="2875"/>
+          </a:xfrm>
+          <a:prstGeom prst="straightConnector1">
+            <a:avLst/>
+          </a:prstGeom>
+          <a:ln>
+            <a:tailEnd type="arrow"/>
+          </a:ln>
+        </p:spPr>
+        <p:style>
+          <a:lnRef idx="1">
+            <a:schemeClr val="accent1"/>
+          </a:lnRef>
+          <a:fillRef idx="0">
+            <a:schemeClr val="accent1"/>
+          </a:fillRef>
+          <a:effectRef idx="0">
+            <a:schemeClr val="accent1"/>
+          </a:effectRef>
+          <a:fontRef idx="minor">
+            <a:schemeClr val="tx1"/>
+          </a:fontRef>
+        </p:style>
+      </p:cxnSp>
+      <p:cxnSp>
+        <p:nvCxnSpPr>
+          <p:cNvPr id="20" name="Straight Arrow Connector 19"/>
+          <p:cNvCxnSpPr/>
+          <p:nvPr/>
+        </p:nvCxnSpPr>
+        <p:spPr>
+          <a:xfrm flipV="1">
+            <a:off x="1066800" y="1752600"/>
+            <a:ext cx="790755" cy="7188"/>
+          </a:xfrm>
+          <a:prstGeom prst="straightConnector1">
+            <a:avLst/>
+          </a:prstGeom>
+          <a:ln>
+            <a:tailEnd type="arrow"/>
+          </a:ln>
+        </p:spPr>
+        <p:style>
+          <a:lnRef idx="1">
+            <a:schemeClr val="accent1"/>
+          </a:lnRef>
+          <a:fillRef idx="0">
+            <a:schemeClr val="accent1"/>
+          </a:fillRef>
+          <a:effectRef idx="0">
+            <a:schemeClr val="accent1"/>
+          </a:effectRef>
+          <a:fontRef idx="minor">
+            <a:schemeClr val="tx1"/>
+          </a:fontRef>
+        </p:style>
+      </p:cxnSp>
+      <p:sp>
+        <p:nvSpPr>
+          <p:cNvPr id="21" name="TextBox 20"/>
+          <p:cNvSpPr txBox="1"/>
+          <p:nvPr/>
+        </p:nvSpPr>
+        <p:spPr>
+          <a:xfrm>
+            <a:off x="1295400" y="1371600"/>
+            <a:ext cx="263214" cy="369332"/>
+          </a:xfrm>
+          <a:prstGeom prst="rect">
+            <a:avLst/>
+          </a:prstGeom>
+          <a:noFill/>
+        </p:spPr>
+        <p:txBody>
+          <a:bodyPr wrap="none" rtlCol="0">
+            <a:spAutoFit/>
+          </a:bodyPr>
+          <a:lstStyle/>
+          <a:p>
+            <a:r>
+              <a:rPr lang="tr-TR" i="1" dirty="0" smtClean="0"/>
+              <a:t>r</a:t>
+            </a:r>
+            <a:endParaRPr lang="tr-TR" i="1" dirty="0"/>
+          </a:p>
+        </p:txBody>
+      </p:sp>
+      <p:sp>
+        <p:nvSpPr>
+          <p:cNvPr id="22" name="TextBox 21"/>
+          <p:cNvSpPr txBox="1"/>
+          <p:nvPr/>
+        </p:nvSpPr>
+        <p:spPr>
+          <a:xfrm>
+            <a:off x="6912597" y="1348596"/>
+            <a:ext cx="287258" cy="369332"/>
+          </a:xfrm>
+          <a:prstGeom prst="rect">
+            <a:avLst/>
+          </a:prstGeom>
+          <a:noFill/>
+        </p:spPr>
+        <p:txBody>
+          <a:bodyPr wrap="none" rtlCol="0">
+            <a:spAutoFit/>
+          </a:bodyPr>
+          <a:lstStyle/>
+          <a:p>
+            <a:r>
+              <a:rPr lang="tr-TR" i="1" dirty="0" smtClean="0"/>
+              <a:t>y</a:t>
+            </a:r>
+            <a:endParaRPr lang="tr-TR" i="1" dirty="0"/>
+          </a:p>
+        </p:txBody>
+      </p:sp>
+      <p:sp>
+        <p:nvSpPr>
+          <p:cNvPr id="23" name="Rectangle 22"/>
+          <p:cNvSpPr/>
+          <p:nvPr/>
+        </p:nvSpPr>
+        <p:spPr>
+          <a:xfrm>
+            <a:off x="4045749" y="1319842"/>
+            <a:ext cx="2674189" cy="1570007"/>
+          </a:xfrm>
+          <a:prstGeom prst="rect">
+            <a:avLst/>
+          </a:prstGeom>
+          <a:noFill/>
+          <a:ln w="19050">
+            <a:prstDash val="dash"/>
+          </a:ln>
+        </p:spPr>
+        <p:style>
+          <a:lnRef idx="2">
+            <a:schemeClr val="accent1">
+              <a:shade val="50000"/>
+            </a:schemeClr>
+          </a:lnRef>
+          <a:fillRef idx="1">
+            <a:schemeClr val="accent1"/>
+          </a:fillRef>
+          <a:effectRef idx="0">
+            <a:schemeClr val="accent1"/>
+          </a:effectRef>
+          <a:fontRef idx="minor">
+            <a:schemeClr val="lt1"/>
+          </a:fontRef>
+        </p:style>
+        <p:txBody>
+          <a:bodyPr rtlCol="0" anchor="ctr"/>
+          <a:lstStyle/>
+          <a:p>
+            <a:pPr algn="ctr"/>
+            <a:endParaRPr lang="tr-TR"/>
+          </a:p>
+        </p:txBody>
+      </p:sp>
+      <p:sp>
+        <p:nvSpPr>
+          <p:cNvPr id="25" name="TextBox 24"/>
+          <p:cNvSpPr txBox="1"/>
+          <p:nvPr/>
+        </p:nvSpPr>
+        <p:spPr>
+          <a:xfrm>
+            <a:off x="2590800" y="1570007"/>
+            <a:ext cx="546339" cy="307777"/>
+          </a:xfrm>
+          <a:prstGeom prst="rect">
+            <a:avLst/>
+          </a:prstGeom>
+          <a:noFill/>
+          <a:ln w="15875">
+            <a:solidFill>
+              <a:schemeClr val="accent1"/>
+            </a:solidFill>
+          </a:ln>
+        </p:spPr>
+        <p:txBody>
+          <a:bodyPr wrap="square" rtlCol="0">
+            <a:spAutoFit/>
+          </a:bodyPr>
+          <a:lstStyle/>
+          <a:p>
+            <a:pPr algn="ctr"/>
+            <a:r>
+              <a:rPr lang="tr-TR" sz="1400" dirty="0" smtClean="0"/>
+              <a:t>1/s</a:t>
+            </a:r>
+            <a:endParaRPr lang="tr-TR" sz="1400" dirty="0"/>
+          </a:p>
+        </p:txBody>
+      </p:sp>
+      <p:cxnSp>
+        <p:nvCxnSpPr>
+          <p:cNvPr id="26" name="Straight Arrow Connector 25"/>
+          <p:cNvCxnSpPr>
+            <a:stCxn id="15" idx="6"/>
+            <a:endCxn id="25" idx="1"/>
+          </p:cNvCxnSpPr>
+          <p:nvPr/>
+        </p:nvCxnSpPr>
+        <p:spPr>
+          <a:xfrm flipV="1">
+            <a:off x="2296424" y="1723896"/>
+            <a:ext cx="294376" cy="2825"/>
+          </a:xfrm>
+          <a:prstGeom prst="straightConnector1">
+            <a:avLst/>
+          </a:prstGeom>
+          <a:ln>
+            <a:tailEnd type="arrow"/>
+          </a:ln>
+        </p:spPr>
+        <p:style>
+          <a:lnRef idx="1">
+            <a:schemeClr val="accent1"/>
+          </a:lnRef>
+          <a:fillRef idx="0">
+            <a:schemeClr val="accent1"/>
+          </a:fillRef>
+          <a:effectRef idx="0">
+            <a:schemeClr val="accent1"/>
+          </a:effectRef>
+          <a:fontRef idx="minor">
+            <a:schemeClr val="tx1"/>
+          </a:fontRef>
+        </p:style>
+      </p:cxnSp>
+      <p:sp>
+        <p:nvSpPr>
+          <p:cNvPr id="28" name="Isosceles Triangle 27"/>
+          <p:cNvSpPr/>
+          <p:nvPr/>
+        </p:nvSpPr>
+        <p:spPr>
+          <a:xfrm rot="5400000">
+            <a:off x="3445534" y="1507466"/>
+            <a:ext cx="424132" cy="457200"/>
+          </a:xfrm>
+          <a:prstGeom prst="triangle">
+            <a:avLst/>
+          </a:prstGeom>
+          <a:noFill/>
+        </p:spPr>
+        <p:style>
+          <a:lnRef idx="2">
+            <a:schemeClr val="accent1">
+              <a:shade val="50000"/>
+            </a:schemeClr>
+          </a:lnRef>
+          <a:fillRef idx="1">
+            <a:schemeClr val="accent1"/>
+          </a:fillRef>
+          <a:effectRef idx="0">
+            <a:schemeClr val="accent1"/>
+          </a:effectRef>
+          <a:fontRef idx="minor">
+            <a:schemeClr val="lt1"/>
+          </a:fontRef>
+        </p:style>
+        <p:txBody>
+          <a:bodyPr rtlCol="0" anchor="ctr"/>
+          <a:lstStyle/>
+          <a:p>
+            <a:pPr algn="r"/>
+            <a:endParaRPr lang="tr-TR" dirty="0"/>
+          </a:p>
+        </p:txBody>
+      </p:sp>
+      <p:pic>
+        <p:nvPicPr>
+          <p:cNvPr id="41985" name="Picture 1"/>
+          <p:cNvPicPr>
+            <a:picLocks noChangeAspect="1" noChangeArrowheads="1"/>
+          </p:cNvPicPr>
+          <p:nvPr/>
+        </p:nvPicPr>
+        <p:blipFill>
+          <a:blip r:embed="rId2">
+            <a:clrChange>
+              <a:clrFrom>
+                <a:srgbClr val="FFFFFF"/>
+              </a:clrFrom>
+              <a:clrTo>
+                <a:srgbClr val="FFFFFF">
+                  <a:alpha val="0"/>
+                </a:srgbClr>
+              </a:clrTo>
+            </a:clrChange>
+          </a:blip>
+          <a:srcRect/>
+          <a:stretch>
+            <a:fillRect/>
+          </a:stretch>
+        </p:blipFill>
+        <p:spPr bwMode="auto">
+          <a:xfrm>
+            <a:off x="3465830" y="1612900"/>
+            <a:ext cx="185738" cy="228600"/>
+          </a:xfrm>
+          <a:prstGeom prst="rect">
+            <a:avLst/>
+          </a:prstGeom>
+          <a:noFill/>
+        </p:spPr>
+      </p:pic>
+      <p:pic>
+        <p:nvPicPr>
+          <p:cNvPr id="41988" name="Picture 4"/>
+          <p:cNvPicPr>
+            <a:picLocks noChangeAspect="1" noChangeArrowheads="1"/>
+          </p:cNvPicPr>
+          <p:nvPr/>
+        </p:nvPicPr>
+        <p:blipFill>
+          <a:blip r:embed="rId3">
+            <a:clrChange>
+              <a:clrFrom>
+                <a:srgbClr val="FFFFFF"/>
+              </a:clrFrom>
+              <a:clrTo>
+                <a:srgbClr val="FFFFFF">
+                  <a:alpha val="0"/>
+                </a:srgbClr>
+              </a:clrTo>
+            </a:clrChange>
+          </a:blip>
+          <a:srcRect/>
+          <a:stretch>
+            <a:fillRect/>
+          </a:stretch>
+        </p:blipFill>
+        <p:spPr bwMode="auto">
+          <a:xfrm>
+            <a:off x="5200650" y="2311400"/>
+            <a:ext cx="228600" cy="281354"/>
+          </a:xfrm>
+          <a:prstGeom prst="rect">
+            <a:avLst/>
+          </a:prstGeom>
+          <a:noFill/>
+        </p:spPr>
+      </p:pic>
+      <p:pic>
+        <p:nvPicPr>
+          <p:cNvPr id="41991" name="Picture 7"/>
+          <p:cNvPicPr>
+            <a:picLocks noChangeAspect="1" noChangeArrowheads="1"/>
+          </p:cNvPicPr>
+          <p:nvPr/>
+        </p:nvPicPr>
+        <p:blipFill>
+          <a:blip r:embed="rId4">
+            <a:clrChange>
+              <a:clrFrom>
+                <a:srgbClr val="FFFFFF"/>
+              </a:clrFrom>
+              <a:clrTo>
+                <a:srgbClr val="FFFFFF">
+                  <a:alpha val="0"/>
+                </a:srgbClr>
+              </a:clrTo>
+            </a:clrChange>
+          </a:blip>
+          <a:srcRect/>
+          <a:stretch>
+            <a:fillRect/>
+          </a:stretch>
+        </p:blipFill>
+        <p:spPr bwMode="auto">
+          <a:xfrm>
+            <a:off x="7010400" y="2209800"/>
+            <a:ext cx="100013" cy="228600"/>
+          </a:xfrm>
+          <a:prstGeom prst="rect">
+            <a:avLst/>
+          </a:prstGeom>
+          <a:noFill/>
+        </p:spPr>
+      </p:pic>
+      <p:sp>
+        <p:nvSpPr>
+          <p:cNvPr id="51" name="TextBox 50"/>
+          <p:cNvSpPr txBox="1"/>
+          <p:nvPr/>
+        </p:nvSpPr>
+        <p:spPr>
+          <a:xfrm>
+            <a:off x="1600200" y="1447800"/>
+            <a:ext cx="228600" cy="369332"/>
+          </a:xfrm>
+          <a:prstGeom prst="rect">
+            <a:avLst/>
+          </a:prstGeom>
+          <a:noFill/>
+        </p:spPr>
+        <p:txBody>
+          <a:bodyPr wrap="square" rtlCol="0">
+            <a:spAutoFit/>
+          </a:bodyPr>
+          <a:lstStyle/>
+          <a:p>
+            <a:r>
+              <a:rPr lang="tr-TR" dirty="0" smtClean="0"/>
+              <a:t>+</a:t>
+            </a:r>
+            <a:endParaRPr lang="tr-TR" dirty="0"/>
+          </a:p>
+        </p:txBody>
+      </p:sp>
+      <p:sp>
+        <p:nvSpPr>
+          <p:cNvPr id="52" name="TextBox 51"/>
+          <p:cNvSpPr txBox="1"/>
+          <p:nvPr/>
+        </p:nvSpPr>
+        <p:spPr>
+          <a:xfrm>
+            <a:off x="4183380" y="1379220"/>
+            <a:ext cx="228600" cy="369332"/>
+          </a:xfrm>
+          <a:prstGeom prst="rect">
+            <a:avLst/>
+          </a:prstGeom>
+          <a:noFill/>
+        </p:spPr>
+        <p:txBody>
+          <a:bodyPr wrap="square" rtlCol="0">
+            <a:spAutoFit/>
+          </a:bodyPr>
+          <a:lstStyle/>
+          <a:p>
+            <a:r>
+              <a:rPr lang="tr-TR" dirty="0" smtClean="0"/>
+              <a:t>+</a:t>
+            </a:r>
+            <a:endParaRPr lang="tr-TR" dirty="0"/>
+          </a:p>
+        </p:txBody>
+      </p:sp>
+      <p:sp>
+        <p:nvSpPr>
+          <p:cNvPr id="53" name="TextBox 52"/>
+          <p:cNvSpPr txBox="1"/>
+          <p:nvPr/>
+        </p:nvSpPr>
+        <p:spPr>
+          <a:xfrm>
+            <a:off x="4625340" y="1760220"/>
+            <a:ext cx="228600" cy="369332"/>
+          </a:xfrm>
+          <a:prstGeom prst="rect">
+            <a:avLst/>
+          </a:prstGeom>
+          <a:noFill/>
+        </p:spPr>
+        <p:txBody>
+          <a:bodyPr wrap="square" rtlCol="0">
+            <a:spAutoFit/>
+          </a:bodyPr>
+          <a:lstStyle/>
+          <a:p>
+            <a:r>
+              <a:rPr lang="tr-TR" dirty="0" smtClean="0"/>
+              <a:t>+</a:t>
+            </a:r>
+            <a:endParaRPr lang="tr-TR" dirty="0"/>
+          </a:p>
+        </p:txBody>
+      </p:sp>
+      <p:sp>
+        <p:nvSpPr>
+          <p:cNvPr id="54" name="TextBox 53"/>
+          <p:cNvSpPr txBox="1"/>
+          <p:nvPr/>
+        </p:nvSpPr>
+        <p:spPr>
+          <a:xfrm>
+            <a:off x="2057400" y="1828800"/>
+            <a:ext cx="228600" cy="369332"/>
+          </a:xfrm>
+          <a:prstGeom prst="rect">
+            <a:avLst/>
+          </a:prstGeom>
+          <a:noFill/>
+        </p:spPr>
+        <p:txBody>
+          <a:bodyPr wrap="square" rtlCol="0">
+            <a:spAutoFit/>
+          </a:bodyPr>
+          <a:lstStyle/>
+          <a:p>
+            <a:r>
+              <a:rPr lang="tr-TR" dirty="0" smtClean="0"/>
+              <a:t>-</a:t>
+            </a:r>
+            <a:endParaRPr lang="tr-TR" dirty="0"/>
+          </a:p>
+        </p:txBody>
+      </p:sp>
+      <p:sp>
+        <p:nvSpPr>
+          <p:cNvPr id="55" name="TextBox 54"/>
+          <p:cNvSpPr txBox="1"/>
+          <p:nvPr/>
+        </p:nvSpPr>
+        <p:spPr>
+          <a:xfrm>
+            <a:off x="5029200" y="1447800"/>
+            <a:ext cx="303288" cy="369332"/>
+          </a:xfrm>
+          <a:prstGeom prst="rect">
+            <a:avLst/>
+          </a:prstGeom>
+          <a:noFill/>
+        </p:spPr>
+        <p:txBody>
+          <a:bodyPr wrap="none" rtlCol="0">
+            <a:spAutoFit/>
+          </a:bodyPr>
+          <a:lstStyle/>
+          <a:p>
+            <a:r>
+              <a:rPr lang="tr-TR" i="1" dirty="0" smtClean="0"/>
+              <a:t>u</a:t>
+            </a:r>
+            <a:endParaRPr lang="tr-TR" i="1" dirty="0"/>
+          </a:p>
+        </p:txBody>
+      </p:sp>
+      <p:cxnSp>
+        <p:nvCxnSpPr>
+          <p:cNvPr id="59" name="Straight Connector 58"/>
+          <p:cNvCxnSpPr/>
+          <p:nvPr/>
+        </p:nvCxnSpPr>
+        <p:spPr>
+          <a:xfrm>
+            <a:off x="3124200" y="1752600"/>
+            <a:ext cx="304800" cy="1588"/>
+          </a:xfrm>
+          <a:prstGeom prst="line">
+            <a:avLst/>
+          </a:prstGeom>
+        </p:spPr>
+        <p:style>
+          <a:lnRef idx="1">
+            <a:schemeClr val="accent1"/>
+          </a:lnRef>
+          <a:fillRef idx="0">
+            <a:schemeClr val="accent1"/>
+          </a:fillRef>
+          <a:effectRef idx="0">
+            <a:schemeClr val="accent1"/>
+          </a:effectRef>
+          <a:fontRef idx="minor">
+            <a:schemeClr val="tx1"/>
+          </a:fontRef>
+        </p:style>
+      </p:cxnSp>
+      <p:sp>
+        <p:nvSpPr>
+          <p:cNvPr id="41995" name="Rectangle 11"/>
+          <p:cNvSpPr>
+            <a:spLocks noChangeArrowheads="1"/>
+          </p:cNvSpPr>
+          <p:nvPr/>
+        </p:nvSpPr>
+        <p:spPr bwMode="auto">
+          <a:xfrm>
+            <a:off x="0" y="0"/>
+            <a:ext cx="9144000" cy="457200"/>
+          </a:xfrm>
+          <a:prstGeom prst="rect">
+            <a:avLst/>
+          </a:prstGeom>
+          <a:noFill/>
+          <a:ln w="9525">
+            <a:noFill/>
+            <a:miter lim="800000"/>
+            <a:headEnd/>
+            <a:tailEnd/>
+          </a:ln>
+          <a:effectLst/>
+        </p:spPr>
+        <p:txBody>
+          <a:bodyPr vert="horz" wrap="none" lIns="91440" tIns="45720" rIns="91440" bIns="45720" numCol="1" anchor="ctr" anchorCtr="0" compatLnSpc="1">
+            <a:prstTxWarp prst="textNoShape">
+              <a:avLst/>
+            </a:prstTxWarp>
+            <a:spAutoFit/>
+          </a:bodyPr>
+          <a:lstStyle/>
+          <a:p>
+            <a:endParaRPr lang="tr-TR"/>
+          </a:p>
+        </p:txBody>
+      </p:sp>
+      <p:pic>
+        <p:nvPicPr>
+          <p:cNvPr id="41994" name="Picture 10"/>
+          <p:cNvPicPr>
+            <a:picLocks noChangeAspect="1" noChangeArrowheads="1"/>
+          </p:cNvPicPr>
+          <p:nvPr/>
+        </p:nvPicPr>
+        <p:blipFill>
+          <a:blip r:embed="rId5">
+            <a:clrChange>
+              <a:clrFrom>
+                <a:srgbClr val="FFFFFF"/>
+              </a:clrFrom>
+              <a:clrTo>
+                <a:srgbClr val="FFFFFF">
+                  <a:alpha val="0"/>
+                </a:srgbClr>
+              </a:clrTo>
+            </a:clrChange>
+          </a:blip>
+          <a:srcRect/>
+          <a:stretch>
+            <a:fillRect/>
+          </a:stretch>
+        </p:blipFill>
+        <p:spPr bwMode="auto">
+          <a:xfrm>
+            <a:off x="4724400" y="1127760"/>
+            <a:ext cx="1371600" cy="202941"/>
+          </a:xfrm>
+          <a:prstGeom prst="rect">
+            <a:avLst/>
+          </a:prstGeom>
+          <a:noFill/>
+        </p:spPr>
+      </p:pic>
+      <p:sp>
+        <p:nvSpPr>
+          <p:cNvPr id="41996" name="Rectangle 12"/>
+          <p:cNvSpPr>
+            <a:spLocks noChangeArrowheads="1"/>
+          </p:cNvSpPr>
+          <p:nvPr/>
+        </p:nvSpPr>
+        <p:spPr bwMode="auto">
+          <a:xfrm>
+            <a:off x="0" y="733425"/>
+            <a:ext cx="9144000" cy="0"/>
+          </a:xfrm>
+          <a:prstGeom prst="rect">
+            <a:avLst/>
+          </a:prstGeom>
+          <a:noFill/>
+          <a:ln w="9525">
+            <a:noFill/>
+            <a:miter lim="800000"/>
+            <a:headEnd/>
+            <a:tailEnd/>
+          </a:ln>
+          <a:effectLst/>
+        </p:spPr>
+        <p:txBody>
+          <a:bodyPr vert="horz" wrap="none" lIns="91440" tIns="45720" rIns="91440" bIns="45720" numCol="1" anchor="ctr" anchorCtr="0" compatLnSpc="1">
+            <a:prstTxWarp prst="textNoShape">
+              <a:avLst/>
+            </a:prstTxWarp>
+            <a:spAutoFit/>
+          </a:bodyPr>
+          <a:lstStyle/>
+          <a:p>
+            <a:pPr marL="0" marR="0" lvl="0" indent="0" algn="l" defTabSz="914400" rtl="0" eaLnBrk="1" fontAlgn="base" latinLnBrk="0" hangingPunct="1">
+              <a:lnSpc>
+                <a:spcPct val="100000"/>
+              </a:lnSpc>
+              <a:spcBef>
+                <a:spcPct val="0"/>
+              </a:spcBef>
+              <a:spcAft>
+                <a:spcPct val="0"/>
+              </a:spcAft>
+              <a:buClrTx/>
+              <a:buSzTx/>
+              <a:buFontTx/>
+              <a:buNone/>
+              <a:tabLst/>
+            </a:pPr>
+            <a:endParaRPr kumimoji="0" lang="tr-TR" sz="1800" b="0" i="0" u="none" strike="noStrike" cap="none" normalizeH="0" baseline="0" smtClean="0">
+              <a:ln>
+                <a:noFill/>
+              </a:ln>
+              <a:solidFill>
+                <a:schemeClr val="tx1"/>
+              </a:solidFill>
+              <a:effectLst/>
+              <a:latin typeface="Arial" pitchFamily="34" charset="0"/>
+              <a:cs typeface="Arial" pitchFamily="34" charset="0"/>
+            </a:endParaRPr>
+          </a:p>
+        </p:txBody>
+      </p:sp>
+    </p:spTree>
+  </p:cSld>
+  <p:clrMapOvr>
+    <a:masterClrMapping/>
+  </p:clrMapOvr>
+</p:sld>
+</file>
+
+<file path=ppt/slides/slide31.xml><?xml version="1.0" encoding="utf-8"?>
+<p:sld xmlns:a="http://schemas.openxmlformats.org/drawingml/2006/main" xmlns:r="http://schemas.openxmlformats.org/officeDocument/2006/relationships" xmlns:p="http://schemas.openxmlformats.org/presentationml/2006/main">
+  <p:cSld>
+    <p:spTree>
+      <p:nvGrpSpPr>
+        <p:cNvPr id="1" name=""/>
+        <p:cNvGrpSpPr/>
+        <p:nvPr/>
+      </p:nvGrpSpPr>
+      <p:grpSpPr>
+        <a:xfrm>
+          <a:off x="0" y="0"/>
+          <a:ext cx="0" cy="0"/>
+          <a:chOff x="0" y="0"/>
+          <a:chExt cx="0" cy="0"/>
+        </a:xfrm>
+      </p:grpSpPr>
+      <p:pic>
+        <p:nvPicPr>
+          <p:cNvPr id="4" name="Picture 5" descr="C:\Users\Kadir\Desktop\Formation Control\formation_control\Resim - Video\step(23-237).png"/>
+          <p:cNvPicPr>
+            <a:picLocks noChangeAspect="1" noChangeArrowheads="1"/>
+          </p:cNvPicPr>
+          <p:nvPr/>
+        </p:nvPicPr>
+        <p:blipFill>
+          <a:blip r:embed="rId2"/>
+          <a:srcRect/>
+          <a:stretch>
+            <a:fillRect/>
+          </a:stretch>
+        </p:blipFill>
+        <p:spPr bwMode="auto">
+          <a:xfrm>
+            <a:off x="2286000" y="1752600"/>
+            <a:ext cx="4020321" cy="2831621"/>
+          </a:xfrm>
+          <a:prstGeom prst="rect">
+            <a:avLst/>
+          </a:prstGeom>
+          <a:noFill/>
+        </p:spPr>
+      </p:pic>
     </p:spTree>
   </p:cSld>
   <p:clrMapOvr>

</xml_diff>

<commit_message>
[upgrade] mesh quality part is written
</commit_message>
<xml_diff>
--- a/Tez Çizimleri.pptx
+++ b/Tez Çizimleri.pptx
@@ -36,6 +36,8 @@
     <p:sldId id="284" r:id="rId30"/>
     <p:sldId id="285" r:id="rId31"/>
     <p:sldId id="286" r:id="rId32"/>
+    <p:sldId id="287" r:id="rId33"/>
+    <p:sldId id="288" r:id="rId34"/>
   </p:sldIdLst>
   <p:sldSz cx="9144000" cy="6858000" type="screen4x3"/>
   <p:notesSz cx="6858000" cy="9144000"/>
@@ -171,7 +173,7 @@
                   <c:v>0.2</c:v>
                 </c:pt>
                 <c:pt idx="2">
-                  <c:v>0.3000000000000001</c:v>
+                  <c:v>0.30000000000000016</c:v>
                 </c:pt>
                 <c:pt idx="3">
                   <c:v>0.4</c:v>
@@ -180,10 +182,10 @@
                   <c:v>0.5</c:v>
                 </c:pt>
                 <c:pt idx="5">
-                  <c:v>0.6000000000000002</c:v>
+                  <c:v>0.60000000000000031</c:v>
                 </c:pt>
                 <c:pt idx="6">
-                  <c:v>0.70000000000000018</c:v>
+                  <c:v>0.70000000000000029</c:v>
                 </c:pt>
                 <c:pt idx="7">
                   <c:v>0.8</c:v>
@@ -213,7 +215,7 @@
                   <c:v>1.6</c:v>
                 </c:pt>
                 <c:pt idx="16">
-                  <c:v>1.7000000000000004</c:v>
+                  <c:v>1.7000000000000006</c:v>
                 </c:pt>
                 <c:pt idx="17">
                   <c:v>1.8</c:v>
@@ -264,7 +266,7 @@
                   <c:v>24.999999999999989</c:v>
                 </c:pt>
                 <c:pt idx="2">
-                  <c:v>11.111111111111105</c:v>
+                  <c:v>11.111111111111102</c:v>
                 </c:pt>
                 <c:pt idx="3">
                   <c:v>6.2499999999999991</c:v>
@@ -273,7 +275,7 @@
                   <c:v>4</c:v>
                 </c:pt>
                 <c:pt idx="5">
-                  <c:v>2.7777777777777799</c:v>
+                  <c:v>2.7777777777777808</c:v>
                 </c:pt>
                 <c:pt idx="6">
                   <c:v>2.0408163265306132</c:v>
@@ -288,31 +290,31 @@
                   <c:v>1</c:v>
                 </c:pt>
                 <c:pt idx="10">
-                  <c:v>0.82644628099173523</c:v>
+                  <c:v>0.82644628099173512</c:v>
                 </c:pt>
                 <c:pt idx="11">
-                  <c:v>0.69444444444444475</c:v>
+                  <c:v>0.69444444444444486</c:v>
                 </c:pt>
                 <c:pt idx="12">
-                  <c:v>0.59171597633136108</c:v>
+                  <c:v>0.59171597633136119</c:v>
                 </c:pt>
                 <c:pt idx="13">
-                  <c:v>0.51020408163265296</c:v>
+                  <c:v>0.51020408163265285</c:v>
                 </c:pt>
                 <c:pt idx="14">
-                  <c:v>0.44444444444444453</c:v>
+                  <c:v>0.44444444444444464</c:v>
                 </c:pt>
                 <c:pt idx="15">
-                  <c:v>0.39062500000000017</c:v>
+                  <c:v>0.39062500000000022</c:v>
                 </c:pt>
                 <c:pt idx="16">
-                  <c:v>0.34602076124567521</c:v>
+                  <c:v>0.34602076124567543</c:v>
                 </c:pt>
                 <c:pt idx="17">
-                  <c:v>0.30864197530864218</c:v>
+                  <c:v>0.30864197530864229</c:v>
                 </c:pt>
                 <c:pt idx="18">
-                  <c:v>0.27700831024930761</c:v>
+                  <c:v>0.27700831024930767</c:v>
                 </c:pt>
                 <c:pt idx="19">
                   <c:v>0.25</c:v>
@@ -324,19 +326,19 @@
                   <c:v>0.20661157024793386</c:v>
                 </c:pt>
                 <c:pt idx="22">
-                  <c:v>0.18903591682419674</c:v>
+                  <c:v>0.18903591682419676</c:v>
                 </c:pt>
                 <c:pt idx="23">
-                  <c:v>0.17361111111111116</c:v>
+                  <c:v>0.17361111111111119</c:v>
                 </c:pt>
                 <c:pt idx="24">
-                  <c:v>0.16000000000000006</c:v>
+                  <c:v>0.16000000000000009</c:v>
                 </c:pt>
                 <c:pt idx="25">
-                  <c:v>0.14792899408284033</c:v>
+                  <c:v>0.14792899408284038</c:v>
                 </c:pt>
                 <c:pt idx="26">
-                  <c:v>0.13717421124828524</c:v>
+                  <c:v>0.13717421124828519</c:v>
                 </c:pt>
                 <c:pt idx="27">
                   <c:v>0.1275510204081633</c:v>
@@ -346,11 +348,11 @@
           </c:yVal>
           <c:smooth val="1"/>
         </c:ser>
-        <c:axId val="51393280"/>
-        <c:axId val="51418624"/>
+        <c:axId val="75979776"/>
+        <c:axId val="81667200"/>
       </c:scatterChart>
       <c:valAx>
-        <c:axId val="51393280"/>
+        <c:axId val="75979776"/>
         <c:scaling>
           <c:orientation val="minMax"/>
         </c:scaling>
@@ -376,12 +378,12 @@
         </c:title>
         <c:numFmt formatCode="General" sourceLinked="1"/>
         <c:tickLblPos val="nextTo"/>
-        <c:crossAx val="51418624"/>
+        <c:crossAx val="81667200"/>
         <c:crosses val="autoZero"/>
         <c:crossBetween val="midCat"/>
       </c:valAx>
       <c:valAx>
-        <c:axId val="51418624"/>
+        <c:axId val="81667200"/>
         <c:scaling>
           <c:orientation val="minMax"/>
         </c:scaling>
@@ -412,7 +414,7 @@
         </c:title>
         <c:numFmt formatCode="General" sourceLinked="1"/>
         <c:tickLblPos val="nextTo"/>
-        <c:crossAx val="51393280"/>
+        <c:crossAx val="75979776"/>
         <c:crosses val="autoZero"/>
         <c:crossBetween val="midCat"/>
       </c:valAx>
@@ -458,8 +460,8 @@
         <c:manualLayout>
           <c:xMode val="edge"/>
           <c:yMode val="edge"/>
-          <c:x val="0.18133333333333349"/>
-          <c:y val="2.7777777777777821E-2"/>
+          <c:x val="0.18133333333333351"/>
+          <c:y val="2.7777777777777832E-2"/>
         </c:manualLayout>
       </c:layout>
     </c:title>
@@ -492,7 +494,7 @@
                   <c:v>0.2</c:v>
                 </c:pt>
                 <c:pt idx="3">
-                  <c:v>0.3000000000000001</c:v>
+                  <c:v>0.30000000000000016</c:v>
                 </c:pt>
                 <c:pt idx="4">
                   <c:v>0.4</c:v>
@@ -501,10 +503,10 @@
                   <c:v>0.5</c:v>
                 </c:pt>
                 <c:pt idx="6">
-                  <c:v>0.6000000000000002</c:v>
+                  <c:v>0.60000000000000031</c:v>
                 </c:pt>
                 <c:pt idx="7">
-                  <c:v>0.70000000000000018</c:v>
+                  <c:v>0.70000000000000029</c:v>
                 </c:pt>
                 <c:pt idx="8">
                   <c:v>0.8</c:v>
@@ -686,7 +688,7 @@
                   <c:v>0.2</c:v>
                 </c:pt>
                 <c:pt idx="2">
-                  <c:v>0.3000000000000001</c:v>
+                  <c:v>0.30000000000000016</c:v>
                 </c:pt>
                 <c:pt idx="3">
                   <c:v>0.4</c:v>
@@ -695,10 +697,10 @@
                   <c:v>0.5</c:v>
                 </c:pt>
                 <c:pt idx="5">
-                  <c:v>0.6000000000000002</c:v>
+                  <c:v>0.60000000000000031</c:v>
                 </c:pt>
                 <c:pt idx="6">
-                  <c:v>0.70000000000000018</c:v>
+                  <c:v>0.70000000000000029</c:v>
                 </c:pt>
                 <c:pt idx="7">
                   <c:v>0.8</c:v>
@@ -776,7 +778,7 @@
                   <c:v>24.999999999999989</c:v>
                 </c:pt>
                 <c:pt idx="2">
-                  <c:v>11.111111111111105</c:v>
+                  <c:v>11.111111111111102</c:v>
                 </c:pt>
                 <c:pt idx="3">
                   <c:v>6.2499999999999991</c:v>
@@ -785,7 +787,7 @@
                   <c:v>4</c:v>
                 </c:pt>
                 <c:pt idx="5">
-                  <c:v>2.7777777777777799</c:v>
+                  <c:v>2.7777777777777808</c:v>
                 </c:pt>
                 <c:pt idx="6">
                   <c:v>2.0408163265306132</c:v>
@@ -800,7 +802,7 @@
                   <c:v>1</c:v>
                 </c:pt>
                 <c:pt idx="10">
-                  <c:v>0.82644628099173523</c:v>
+                  <c:v>0.82644628099173512</c:v>
                 </c:pt>
                 <c:pt idx="11">
                   <c:v>0.69444444444444464</c:v>
@@ -809,57 +811,57 @@
                   <c:v>0.59171597633136086</c:v>
                 </c:pt>
                 <c:pt idx="13">
-                  <c:v>0.51020408163265296</c:v>
+                  <c:v>0.51020408163265285</c:v>
                 </c:pt>
                 <c:pt idx="14">
                   <c:v>0.44444444444444442</c:v>
                 </c:pt>
                 <c:pt idx="15">
-                  <c:v>0.39062500000000017</c:v>
+                  <c:v>0.39062500000000022</c:v>
                 </c:pt>
                 <c:pt idx="16">
-                  <c:v>0.3460207612456751</c:v>
+                  <c:v>0.34602076124567527</c:v>
                 </c:pt>
                 <c:pt idx="17">
-                  <c:v>0.30864197530864218</c:v>
+                  <c:v>0.30864197530864229</c:v>
                 </c:pt>
                 <c:pt idx="18">
-                  <c:v>0.27700831024930761</c:v>
+                  <c:v>0.27700831024930767</c:v>
                 </c:pt>
                 <c:pt idx="19">
                   <c:v>0.25</c:v>
                 </c:pt>
                 <c:pt idx="20">
-                  <c:v>0.2267573696145124</c:v>
+                  <c:v>0.22675736961451237</c:v>
                 </c:pt>
                 <c:pt idx="21">
                   <c:v>0.20661157024793386</c:v>
                 </c:pt>
                 <c:pt idx="22">
-                  <c:v>0.18903591682419674</c:v>
+                  <c:v>0.18903591682419676</c:v>
                 </c:pt>
                 <c:pt idx="23">
-                  <c:v>0.17361111111111116</c:v>
+                  <c:v>0.17361111111111119</c:v>
                 </c:pt>
                 <c:pt idx="24">
                   <c:v>0.16</c:v>
                 </c:pt>
                 <c:pt idx="25">
-                  <c:v>0.14792899408284033</c:v>
+                  <c:v>0.14792899408284038</c:v>
                 </c:pt>
                 <c:pt idx="26">
-                  <c:v>0.13717421124828524</c:v>
+                  <c:v>0.13717421124828519</c:v>
                 </c:pt>
               </c:numCache>
             </c:numRef>
           </c:yVal>
           <c:smooth val="1"/>
         </c:ser>
-        <c:axId val="51709440"/>
-        <c:axId val="52245248"/>
+        <c:axId val="81720064"/>
+        <c:axId val="81721984"/>
       </c:scatterChart>
       <c:valAx>
-        <c:axId val="51709440"/>
+        <c:axId val="81720064"/>
         <c:scaling>
           <c:orientation val="minMax"/>
         </c:scaling>
@@ -893,12 +895,12 @@
         </c:title>
         <c:numFmt formatCode="General" sourceLinked="1"/>
         <c:tickLblPos val="nextTo"/>
-        <c:crossAx val="52245248"/>
+        <c:crossAx val="81721984"/>
         <c:crosses val="autoZero"/>
         <c:crossBetween val="midCat"/>
       </c:valAx>
       <c:valAx>
-        <c:axId val="52245248"/>
+        <c:axId val="81721984"/>
         <c:scaling>
           <c:orientation val="minMax"/>
         </c:scaling>
@@ -924,7 +926,7 @@
         </c:title>
         <c:numFmt formatCode="General" sourceLinked="1"/>
         <c:tickLblPos val="nextTo"/>
-        <c:crossAx val="51709440"/>
+        <c:crossAx val="81720064"/>
         <c:crosses val="autoZero"/>
         <c:crossBetween val="midCat"/>
       </c:valAx>
@@ -976,7 +978,7 @@
                   <c:v>0.2</c:v>
                 </c:pt>
                 <c:pt idx="3">
-                  <c:v>0.3000000000000001</c:v>
+                  <c:v>0.30000000000000016</c:v>
                 </c:pt>
                 <c:pt idx="4">
                   <c:v>0.4</c:v>
@@ -985,10 +987,10 @@
                   <c:v>0.5</c:v>
                 </c:pt>
                 <c:pt idx="6">
-                  <c:v>0.6000000000000002</c:v>
+                  <c:v>0.60000000000000031</c:v>
                 </c:pt>
                 <c:pt idx="7">
-                  <c:v>0.70000000000000018</c:v>
+                  <c:v>0.70000000000000029</c:v>
                 </c:pt>
                 <c:pt idx="8">
                   <c:v>0.8</c:v>
@@ -1093,7 +1095,7 @@
                   <c:v>3.9679000000000002</c:v>
                 </c:pt>
                 <c:pt idx="2">
-                  <c:v>3.9311999999999991</c:v>
+                  <c:v>3.9311999999999987</c:v>
                 </c:pt>
                 <c:pt idx="3">
                   <c:v>3.8893</c:v>
@@ -1102,7 +1104,7 @@
                   <c:v>3.8415999999999997</c:v>
                 </c:pt>
                 <c:pt idx="5">
-                  <c:v>3.787500000000001</c:v>
+                  <c:v>3.7875000000000014</c:v>
                 </c:pt>
                 <c:pt idx="6">
                   <c:v>3.7263999999999999</c:v>
@@ -1114,7 +1116,7 @@
                   <c:v>3.5808</c:v>
                 </c:pt>
                 <c:pt idx="9">
-                  <c:v>3.495099999999999</c:v>
+                  <c:v>3.4950999999999985</c:v>
                 </c:pt>
                 <c:pt idx="10">
                   <c:v>3.4</c:v>
@@ -1126,7 +1128,7 @@
                   <c:v>3.1791999999999998</c:v>
                 </c:pt>
                 <c:pt idx="13">
-                  <c:v>3.0522999999999989</c:v>
+                  <c:v>3.0522999999999985</c:v>
                 </c:pt>
                 <c:pt idx="14">
                   <c:v>2.9135999999999997</c:v>
@@ -1147,25 +1149,25 @@
                   <c:v>2.0221</c:v>
                 </c:pt>
                 <c:pt idx="20">
-                  <c:v>1.7999999999999994</c:v>
+                  <c:v>1.7999999999999992</c:v>
                 </c:pt>
                 <c:pt idx="21">
-                  <c:v>1.5618999999999992</c:v>
+                  <c:v>1.561899999999999</c:v>
                 </c:pt>
                 <c:pt idx="22">
-                  <c:v>1.3071999999999986</c:v>
+                  <c:v>1.3071999999999984</c:v>
                 </c:pt>
                 <c:pt idx="23">
                   <c:v>1.0353000000000008</c:v>
                 </c:pt>
                 <c:pt idx="24">
-                  <c:v>0.74560000000000082</c:v>
+                  <c:v>0.74560000000000093</c:v>
                 </c:pt>
                 <c:pt idx="25">
-                  <c:v>0.43750000000000011</c:v>
+                  <c:v>0.43750000000000017</c:v>
                 </c:pt>
                 <c:pt idx="26">
-                  <c:v>0.11039999999999936</c:v>
+                  <c:v>0.11039999999999935</c:v>
                 </c:pt>
                 <c:pt idx="27">
                   <c:v>0</c:v>
@@ -1202,11 +1204,11 @@
           </c:yVal>
           <c:smooth val="1"/>
         </c:ser>
-        <c:axId val="55618176"/>
-        <c:axId val="46425216"/>
+        <c:axId val="80899072"/>
+        <c:axId val="80913536"/>
       </c:scatterChart>
       <c:valAx>
-        <c:axId val="55618176"/>
+        <c:axId val="80899072"/>
         <c:scaling>
           <c:orientation val="minMax"/>
         </c:scaling>
@@ -1231,12 +1233,12 @@
         </c:title>
         <c:numFmt formatCode="General" sourceLinked="1"/>
         <c:tickLblPos val="nextTo"/>
-        <c:crossAx val="46425216"/>
+        <c:crossAx val="80913536"/>
         <c:crosses val="autoZero"/>
         <c:crossBetween val="midCat"/>
       </c:valAx>
       <c:valAx>
-        <c:axId val="46425216"/>
+        <c:axId val="80913536"/>
         <c:scaling>
           <c:orientation val="minMax"/>
         </c:scaling>
@@ -1262,7 +1264,7 @@
         </c:title>
         <c:numFmt formatCode="General" sourceLinked="1"/>
         <c:tickLblPos val="nextTo"/>
-        <c:crossAx val="55618176"/>
+        <c:crossAx val="80899072"/>
         <c:crosses val="autoZero"/>
         <c:crossBetween val="midCat"/>
       </c:valAx>
@@ -1497,7 +1499,7 @@
             <a:fld id="{1D8BD707-D9CF-40AE-B4C6-C98DA3205C09}" type="datetimeFigureOut">
               <a:rPr lang="en-US" smtClean="0"/>
               <a:pPr/>
-              <a:t>9/13/2015</a:t>
+              <a:t>9/20/2015</a:t>
             </a:fld>
             <a:endParaRPr lang="en-US"/>
           </a:p>
@@ -1664,7 +1666,7 @@
             <a:fld id="{1D8BD707-D9CF-40AE-B4C6-C98DA3205C09}" type="datetimeFigureOut">
               <a:rPr lang="en-US" smtClean="0"/>
               <a:pPr/>
-              <a:t>9/13/2015</a:t>
+              <a:t>9/20/2015</a:t>
             </a:fld>
             <a:endParaRPr lang="en-US"/>
           </a:p>
@@ -1841,7 +1843,7 @@
             <a:fld id="{1D8BD707-D9CF-40AE-B4C6-C98DA3205C09}" type="datetimeFigureOut">
               <a:rPr lang="en-US" smtClean="0"/>
               <a:pPr/>
-              <a:t>9/13/2015</a:t>
+              <a:t>9/20/2015</a:t>
             </a:fld>
             <a:endParaRPr lang="en-US"/>
           </a:p>
@@ -2008,7 +2010,7 @@
             <a:fld id="{1D8BD707-D9CF-40AE-B4C6-C98DA3205C09}" type="datetimeFigureOut">
               <a:rPr lang="en-US" smtClean="0"/>
               <a:pPr/>
-              <a:t>9/13/2015</a:t>
+              <a:t>9/20/2015</a:t>
             </a:fld>
             <a:endParaRPr lang="en-US"/>
           </a:p>
@@ -2251,7 +2253,7 @@
             <a:fld id="{1D8BD707-D9CF-40AE-B4C6-C98DA3205C09}" type="datetimeFigureOut">
               <a:rPr lang="en-US" smtClean="0"/>
               <a:pPr/>
-              <a:t>9/13/2015</a:t>
+              <a:t>9/20/2015</a:t>
             </a:fld>
             <a:endParaRPr lang="en-US"/>
           </a:p>
@@ -2536,7 +2538,7 @@
             <a:fld id="{1D8BD707-D9CF-40AE-B4C6-C98DA3205C09}" type="datetimeFigureOut">
               <a:rPr lang="en-US" smtClean="0"/>
               <a:pPr/>
-              <a:t>9/13/2015</a:t>
+              <a:t>9/20/2015</a:t>
             </a:fld>
             <a:endParaRPr lang="en-US"/>
           </a:p>
@@ -2955,7 +2957,7 @@
             <a:fld id="{1D8BD707-D9CF-40AE-B4C6-C98DA3205C09}" type="datetimeFigureOut">
               <a:rPr lang="en-US" smtClean="0"/>
               <a:pPr/>
-              <a:t>9/13/2015</a:t>
+              <a:t>9/20/2015</a:t>
             </a:fld>
             <a:endParaRPr lang="en-US"/>
           </a:p>
@@ -3070,7 +3072,7 @@
             <a:fld id="{1D8BD707-D9CF-40AE-B4C6-C98DA3205C09}" type="datetimeFigureOut">
               <a:rPr lang="en-US" smtClean="0"/>
               <a:pPr/>
-              <a:t>9/13/2015</a:t>
+              <a:t>9/20/2015</a:t>
             </a:fld>
             <a:endParaRPr lang="en-US"/>
           </a:p>
@@ -3162,7 +3164,7 @@
             <a:fld id="{1D8BD707-D9CF-40AE-B4C6-C98DA3205C09}" type="datetimeFigureOut">
               <a:rPr lang="en-US" smtClean="0"/>
               <a:pPr/>
-              <a:t>9/13/2015</a:t>
+              <a:t>9/20/2015</a:t>
             </a:fld>
             <a:endParaRPr lang="en-US"/>
           </a:p>
@@ -3436,7 +3438,7 @@
             <a:fld id="{1D8BD707-D9CF-40AE-B4C6-C98DA3205C09}" type="datetimeFigureOut">
               <a:rPr lang="en-US" smtClean="0"/>
               <a:pPr/>
-              <a:t>9/13/2015</a:t>
+              <a:t>9/20/2015</a:t>
             </a:fld>
             <a:endParaRPr lang="en-US"/>
           </a:p>
@@ -3686,7 +3688,7 @@
             <a:fld id="{1D8BD707-D9CF-40AE-B4C6-C98DA3205C09}" type="datetimeFigureOut">
               <a:rPr lang="en-US" smtClean="0"/>
               <a:pPr/>
-              <a:t>9/13/2015</a:t>
+              <a:t>9/20/2015</a:t>
             </a:fld>
             <a:endParaRPr lang="en-US"/>
           </a:p>
@@ -3896,7 +3898,7 @@
             <a:fld id="{1D8BD707-D9CF-40AE-B4C6-C98DA3205C09}" type="datetimeFigureOut">
               <a:rPr lang="en-US" smtClean="0"/>
               <a:pPr/>
-              <a:t>9/13/2015</a:t>
+              <a:t>9/20/2015</a:t>
             </a:fld>
             <a:endParaRPr lang="en-US"/>
           </a:p>
@@ -29637,6 +29639,3537 @@
 </p:sld>
 </file>
 
+<file path=ppt/slides/slide32.xml><?xml version="1.0" encoding="utf-8"?>
+<p:sld xmlns:a="http://schemas.openxmlformats.org/drawingml/2006/main" xmlns:r="http://schemas.openxmlformats.org/officeDocument/2006/relationships" xmlns:p="http://schemas.openxmlformats.org/presentationml/2006/main">
+  <p:cSld>
+    <p:spTree>
+      <p:nvGrpSpPr>
+        <p:cNvPr id="1" name=""/>
+        <p:cNvGrpSpPr/>
+        <p:nvPr/>
+      </p:nvGrpSpPr>
+      <p:grpSpPr>
+        <a:xfrm>
+          <a:off x="0" y="0"/>
+          <a:ext cx="0" cy="0"/>
+          <a:chOff x="0" y="0"/>
+          <a:chExt cx="0" cy="0"/>
+        </a:xfrm>
+      </p:grpSpPr>
+      <p:grpSp>
+        <p:nvGrpSpPr>
+          <p:cNvPr id="4" name="Group 3"/>
+          <p:cNvGrpSpPr/>
+          <p:nvPr/>
+        </p:nvGrpSpPr>
+        <p:grpSpPr>
+          <a:xfrm>
+            <a:off x="414920" y="1601160"/>
+            <a:ext cx="8314160" cy="3655679"/>
+            <a:chOff x="577970" y="1293962"/>
+            <a:chExt cx="8314160" cy="3655679"/>
+          </a:xfrm>
+        </p:grpSpPr>
+        <p:sp>
+          <p:nvSpPr>
+            <p:cNvPr id="5" name="TextBox 4"/>
+            <p:cNvSpPr txBox="1"/>
+            <p:nvPr/>
+          </p:nvSpPr>
+          <p:spPr>
+            <a:xfrm>
+              <a:off x="6564702" y="2510287"/>
+              <a:ext cx="1143262" cy="369332"/>
+            </a:xfrm>
+            <a:prstGeom prst="rect">
+              <a:avLst/>
+            </a:prstGeom>
+            <a:noFill/>
+            <a:ln>
+              <a:solidFill>
+                <a:schemeClr val="accent1">
+                  <a:shade val="50000"/>
+                </a:schemeClr>
+              </a:solidFill>
+            </a:ln>
+          </p:spPr>
+          <p:txBody>
+            <a:bodyPr wrap="none" rtlCol="0">
+              <a:spAutoFit/>
+            </a:bodyPr>
+            <a:lstStyle>
+              <a:defPPr>
+                <a:defRPr lang="en-US"/>
+              </a:defPPr>
+              <a:lvl1pPr marL="0" algn="l" defTabSz="914400" rtl="0" eaLnBrk="1" latinLnBrk="0" hangingPunct="1">
+                <a:defRPr sz="1800" kern="1200">
+                  <a:solidFill>
+                    <a:schemeClr val="tx1"/>
+                  </a:solidFill>
+                  <a:latin typeface="+mn-lt"/>
+                  <a:ea typeface="+mn-ea"/>
+                  <a:cs typeface="+mn-cs"/>
+                </a:defRPr>
+              </a:lvl1pPr>
+              <a:lvl2pPr marL="457200" algn="l" defTabSz="914400" rtl="0" eaLnBrk="1" latinLnBrk="0" hangingPunct="1">
+                <a:defRPr sz="1800" kern="1200">
+                  <a:solidFill>
+                    <a:schemeClr val="tx1"/>
+                  </a:solidFill>
+                  <a:latin typeface="+mn-lt"/>
+                  <a:ea typeface="+mn-ea"/>
+                  <a:cs typeface="+mn-cs"/>
+                </a:defRPr>
+              </a:lvl2pPr>
+              <a:lvl3pPr marL="914400" algn="l" defTabSz="914400" rtl="0" eaLnBrk="1" latinLnBrk="0" hangingPunct="1">
+                <a:defRPr sz="1800" kern="1200">
+                  <a:solidFill>
+                    <a:schemeClr val="tx1"/>
+                  </a:solidFill>
+                  <a:latin typeface="+mn-lt"/>
+                  <a:ea typeface="+mn-ea"/>
+                  <a:cs typeface="+mn-cs"/>
+                </a:defRPr>
+              </a:lvl3pPr>
+              <a:lvl4pPr marL="1371600" algn="l" defTabSz="914400" rtl="0" eaLnBrk="1" latinLnBrk="0" hangingPunct="1">
+                <a:defRPr sz="1800" kern="1200">
+                  <a:solidFill>
+                    <a:schemeClr val="tx1"/>
+                  </a:solidFill>
+                  <a:latin typeface="+mn-lt"/>
+                  <a:ea typeface="+mn-ea"/>
+                  <a:cs typeface="+mn-cs"/>
+                </a:defRPr>
+              </a:lvl4pPr>
+              <a:lvl5pPr marL="1828800" algn="l" defTabSz="914400" rtl="0" eaLnBrk="1" latinLnBrk="0" hangingPunct="1">
+                <a:defRPr sz="1800" kern="1200">
+                  <a:solidFill>
+                    <a:schemeClr val="tx1"/>
+                  </a:solidFill>
+                  <a:latin typeface="+mn-lt"/>
+                  <a:ea typeface="+mn-ea"/>
+                  <a:cs typeface="+mn-cs"/>
+                </a:defRPr>
+              </a:lvl5pPr>
+              <a:lvl6pPr marL="2286000" algn="l" defTabSz="914400" rtl="0" eaLnBrk="1" latinLnBrk="0" hangingPunct="1">
+                <a:defRPr sz="1800" kern="1200">
+                  <a:solidFill>
+                    <a:schemeClr val="tx1"/>
+                  </a:solidFill>
+                  <a:latin typeface="+mn-lt"/>
+                  <a:ea typeface="+mn-ea"/>
+                  <a:cs typeface="+mn-cs"/>
+                </a:defRPr>
+              </a:lvl6pPr>
+              <a:lvl7pPr marL="2743200" algn="l" defTabSz="914400" rtl="0" eaLnBrk="1" latinLnBrk="0" hangingPunct="1">
+                <a:defRPr sz="1800" kern="1200">
+                  <a:solidFill>
+                    <a:schemeClr val="tx1"/>
+                  </a:solidFill>
+                  <a:latin typeface="+mn-lt"/>
+                  <a:ea typeface="+mn-ea"/>
+                  <a:cs typeface="+mn-cs"/>
+                </a:defRPr>
+              </a:lvl7pPr>
+              <a:lvl8pPr marL="3200400" algn="l" defTabSz="914400" rtl="0" eaLnBrk="1" latinLnBrk="0" hangingPunct="1">
+                <a:defRPr sz="1800" kern="1200">
+                  <a:solidFill>
+                    <a:schemeClr val="tx1"/>
+                  </a:solidFill>
+                  <a:latin typeface="+mn-lt"/>
+                  <a:ea typeface="+mn-ea"/>
+                  <a:cs typeface="+mn-cs"/>
+                </a:defRPr>
+              </a:lvl8pPr>
+              <a:lvl9pPr marL="3657600" algn="l" defTabSz="914400" rtl="0" eaLnBrk="1" latinLnBrk="0" hangingPunct="1">
+                <a:defRPr sz="1800" kern="1200">
+                  <a:solidFill>
+                    <a:schemeClr val="tx1"/>
+                  </a:solidFill>
+                  <a:latin typeface="+mn-lt"/>
+                  <a:ea typeface="+mn-ea"/>
+                  <a:cs typeface="+mn-cs"/>
+                </a:defRPr>
+              </a:lvl9pPr>
+            </a:lstStyle>
+            <a:p>
+              <a:r>
+                <a:rPr lang="tr-TR" dirty="0" smtClean="0"/>
+                <a:t>MATLAB</a:t>
+              </a:r>
+              <a:endParaRPr lang="tr-TR" dirty="0"/>
+            </a:p>
+          </p:txBody>
+        </p:sp>
+        <p:sp>
+          <p:nvSpPr>
+            <p:cNvPr id="6" name="TextBox 5"/>
+            <p:cNvSpPr txBox="1"/>
+            <p:nvPr/>
+          </p:nvSpPr>
+          <p:spPr>
+            <a:xfrm>
+              <a:off x="1509623" y="1302589"/>
+              <a:ext cx="2639683" cy="369332"/>
+            </a:xfrm>
+            <a:prstGeom prst="rect">
+              <a:avLst/>
+            </a:prstGeom>
+            <a:noFill/>
+          </p:spPr>
+          <p:txBody>
+            <a:bodyPr wrap="square" rtlCol="0">
+              <a:spAutoFit/>
+            </a:bodyPr>
+            <a:lstStyle>
+              <a:defPPr>
+                <a:defRPr lang="en-US"/>
+              </a:defPPr>
+              <a:lvl1pPr marL="0" algn="l" defTabSz="914400" rtl="0" eaLnBrk="1" latinLnBrk="0" hangingPunct="1">
+                <a:defRPr sz="1800" kern="1200">
+                  <a:solidFill>
+                    <a:schemeClr val="tx1"/>
+                  </a:solidFill>
+                  <a:latin typeface="+mn-lt"/>
+                  <a:ea typeface="+mn-ea"/>
+                  <a:cs typeface="+mn-cs"/>
+                </a:defRPr>
+              </a:lvl1pPr>
+              <a:lvl2pPr marL="457200" algn="l" defTabSz="914400" rtl="0" eaLnBrk="1" latinLnBrk="0" hangingPunct="1">
+                <a:defRPr sz="1800" kern="1200">
+                  <a:solidFill>
+                    <a:schemeClr val="tx1"/>
+                  </a:solidFill>
+                  <a:latin typeface="+mn-lt"/>
+                  <a:ea typeface="+mn-ea"/>
+                  <a:cs typeface="+mn-cs"/>
+                </a:defRPr>
+              </a:lvl2pPr>
+              <a:lvl3pPr marL="914400" algn="l" defTabSz="914400" rtl="0" eaLnBrk="1" latinLnBrk="0" hangingPunct="1">
+                <a:defRPr sz="1800" kern="1200">
+                  <a:solidFill>
+                    <a:schemeClr val="tx1"/>
+                  </a:solidFill>
+                  <a:latin typeface="+mn-lt"/>
+                  <a:ea typeface="+mn-ea"/>
+                  <a:cs typeface="+mn-cs"/>
+                </a:defRPr>
+              </a:lvl3pPr>
+              <a:lvl4pPr marL="1371600" algn="l" defTabSz="914400" rtl="0" eaLnBrk="1" latinLnBrk="0" hangingPunct="1">
+                <a:defRPr sz="1800" kern="1200">
+                  <a:solidFill>
+                    <a:schemeClr val="tx1"/>
+                  </a:solidFill>
+                  <a:latin typeface="+mn-lt"/>
+                  <a:ea typeface="+mn-ea"/>
+                  <a:cs typeface="+mn-cs"/>
+                </a:defRPr>
+              </a:lvl4pPr>
+              <a:lvl5pPr marL="1828800" algn="l" defTabSz="914400" rtl="0" eaLnBrk="1" latinLnBrk="0" hangingPunct="1">
+                <a:defRPr sz="1800" kern="1200">
+                  <a:solidFill>
+                    <a:schemeClr val="tx1"/>
+                  </a:solidFill>
+                  <a:latin typeface="+mn-lt"/>
+                  <a:ea typeface="+mn-ea"/>
+                  <a:cs typeface="+mn-cs"/>
+                </a:defRPr>
+              </a:lvl5pPr>
+              <a:lvl6pPr marL="2286000" algn="l" defTabSz="914400" rtl="0" eaLnBrk="1" latinLnBrk="0" hangingPunct="1">
+                <a:defRPr sz="1800" kern="1200">
+                  <a:solidFill>
+                    <a:schemeClr val="tx1"/>
+                  </a:solidFill>
+                  <a:latin typeface="+mn-lt"/>
+                  <a:ea typeface="+mn-ea"/>
+                  <a:cs typeface="+mn-cs"/>
+                </a:defRPr>
+              </a:lvl6pPr>
+              <a:lvl7pPr marL="2743200" algn="l" defTabSz="914400" rtl="0" eaLnBrk="1" latinLnBrk="0" hangingPunct="1">
+                <a:defRPr sz="1800" kern="1200">
+                  <a:solidFill>
+                    <a:schemeClr val="tx1"/>
+                  </a:solidFill>
+                  <a:latin typeface="+mn-lt"/>
+                  <a:ea typeface="+mn-ea"/>
+                  <a:cs typeface="+mn-cs"/>
+                </a:defRPr>
+              </a:lvl7pPr>
+              <a:lvl8pPr marL="3200400" algn="l" defTabSz="914400" rtl="0" eaLnBrk="1" latinLnBrk="0" hangingPunct="1">
+                <a:defRPr sz="1800" kern="1200">
+                  <a:solidFill>
+                    <a:schemeClr val="tx1"/>
+                  </a:solidFill>
+                  <a:latin typeface="+mn-lt"/>
+                  <a:ea typeface="+mn-ea"/>
+                  <a:cs typeface="+mn-cs"/>
+                </a:defRPr>
+              </a:lvl8pPr>
+              <a:lvl9pPr marL="3657600" algn="l" defTabSz="914400" rtl="0" eaLnBrk="1" latinLnBrk="0" hangingPunct="1">
+                <a:defRPr sz="1800" kern="1200">
+                  <a:solidFill>
+                    <a:schemeClr val="tx1"/>
+                  </a:solidFill>
+                  <a:latin typeface="+mn-lt"/>
+                  <a:ea typeface="+mn-ea"/>
+                  <a:cs typeface="+mn-cs"/>
+                </a:defRPr>
+              </a:lvl9pPr>
+            </a:lstStyle>
+            <a:p>
+              <a:r>
+                <a:rPr lang="tr-TR" dirty="0" smtClean="0"/>
+                <a:t>GAZEBO </a:t>
+              </a:r>
+              <a:endParaRPr lang="tr-TR" dirty="0"/>
+            </a:p>
+          </p:txBody>
+        </p:sp>
+        <p:sp>
+          <p:nvSpPr>
+            <p:cNvPr id="7" name="Rectangle 6"/>
+            <p:cNvSpPr/>
+            <p:nvPr/>
+          </p:nvSpPr>
+          <p:spPr>
+            <a:xfrm>
+              <a:off x="577970" y="1293962"/>
+              <a:ext cx="2976113" cy="2674189"/>
+            </a:xfrm>
+            <a:prstGeom prst="rect">
+              <a:avLst/>
+            </a:prstGeom>
+            <a:noFill/>
+          </p:spPr>
+          <p:style>
+            <a:lnRef idx="2">
+              <a:schemeClr val="accent1">
+                <a:shade val="50000"/>
+              </a:schemeClr>
+            </a:lnRef>
+            <a:fillRef idx="1">
+              <a:schemeClr val="accent1"/>
+            </a:fillRef>
+            <a:effectRef idx="0">
+              <a:schemeClr val="accent1"/>
+            </a:effectRef>
+            <a:fontRef idx="minor">
+              <a:schemeClr val="lt1"/>
+            </a:fontRef>
+          </p:style>
+          <p:txBody>
+            <a:bodyPr rtlCol="0" anchor="ctr"/>
+            <a:lstStyle>
+              <a:defPPr>
+                <a:defRPr lang="en-US"/>
+              </a:defPPr>
+              <a:lvl1pPr marL="0" algn="l" defTabSz="914400" rtl="0" eaLnBrk="1" latinLnBrk="0" hangingPunct="1">
+                <a:defRPr sz="1800" kern="1200">
+                  <a:solidFill>
+                    <a:schemeClr val="lt1"/>
+                  </a:solidFill>
+                  <a:latin typeface="+mn-lt"/>
+                  <a:ea typeface="+mn-ea"/>
+                  <a:cs typeface="+mn-cs"/>
+                </a:defRPr>
+              </a:lvl1pPr>
+              <a:lvl2pPr marL="457200" algn="l" defTabSz="914400" rtl="0" eaLnBrk="1" latinLnBrk="0" hangingPunct="1">
+                <a:defRPr sz="1800" kern="1200">
+                  <a:solidFill>
+                    <a:schemeClr val="lt1"/>
+                  </a:solidFill>
+                  <a:latin typeface="+mn-lt"/>
+                  <a:ea typeface="+mn-ea"/>
+                  <a:cs typeface="+mn-cs"/>
+                </a:defRPr>
+              </a:lvl2pPr>
+              <a:lvl3pPr marL="914400" algn="l" defTabSz="914400" rtl="0" eaLnBrk="1" latinLnBrk="0" hangingPunct="1">
+                <a:defRPr sz="1800" kern="1200">
+                  <a:solidFill>
+                    <a:schemeClr val="lt1"/>
+                  </a:solidFill>
+                  <a:latin typeface="+mn-lt"/>
+                  <a:ea typeface="+mn-ea"/>
+                  <a:cs typeface="+mn-cs"/>
+                </a:defRPr>
+              </a:lvl3pPr>
+              <a:lvl4pPr marL="1371600" algn="l" defTabSz="914400" rtl="0" eaLnBrk="1" latinLnBrk="0" hangingPunct="1">
+                <a:defRPr sz="1800" kern="1200">
+                  <a:solidFill>
+                    <a:schemeClr val="lt1"/>
+                  </a:solidFill>
+                  <a:latin typeface="+mn-lt"/>
+                  <a:ea typeface="+mn-ea"/>
+                  <a:cs typeface="+mn-cs"/>
+                </a:defRPr>
+              </a:lvl4pPr>
+              <a:lvl5pPr marL="1828800" algn="l" defTabSz="914400" rtl="0" eaLnBrk="1" latinLnBrk="0" hangingPunct="1">
+                <a:defRPr sz="1800" kern="1200">
+                  <a:solidFill>
+                    <a:schemeClr val="lt1"/>
+                  </a:solidFill>
+                  <a:latin typeface="+mn-lt"/>
+                  <a:ea typeface="+mn-ea"/>
+                  <a:cs typeface="+mn-cs"/>
+                </a:defRPr>
+              </a:lvl5pPr>
+              <a:lvl6pPr marL="2286000" algn="l" defTabSz="914400" rtl="0" eaLnBrk="1" latinLnBrk="0" hangingPunct="1">
+                <a:defRPr sz="1800" kern="1200">
+                  <a:solidFill>
+                    <a:schemeClr val="lt1"/>
+                  </a:solidFill>
+                  <a:latin typeface="+mn-lt"/>
+                  <a:ea typeface="+mn-ea"/>
+                  <a:cs typeface="+mn-cs"/>
+                </a:defRPr>
+              </a:lvl6pPr>
+              <a:lvl7pPr marL="2743200" algn="l" defTabSz="914400" rtl="0" eaLnBrk="1" latinLnBrk="0" hangingPunct="1">
+                <a:defRPr sz="1800" kern="1200">
+                  <a:solidFill>
+                    <a:schemeClr val="lt1"/>
+                  </a:solidFill>
+                  <a:latin typeface="+mn-lt"/>
+                  <a:ea typeface="+mn-ea"/>
+                  <a:cs typeface="+mn-cs"/>
+                </a:defRPr>
+              </a:lvl7pPr>
+              <a:lvl8pPr marL="3200400" algn="l" defTabSz="914400" rtl="0" eaLnBrk="1" latinLnBrk="0" hangingPunct="1">
+                <a:defRPr sz="1800" kern="1200">
+                  <a:solidFill>
+                    <a:schemeClr val="lt1"/>
+                  </a:solidFill>
+                  <a:latin typeface="+mn-lt"/>
+                  <a:ea typeface="+mn-ea"/>
+                  <a:cs typeface="+mn-cs"/>
+                </a:defRPr>
+              </a:lvl8pPr>
+              <a:lvl9pPr marL="3657600" algn="l" defTabSz="914400" rtl="0" eaLnBrk="1" latinLnBrk="0" hangingPunct="1">
+                <a:defRPr sz="1800" kern="1200">
+                  <a:solidFill>
+                    <a:schemeClr val="lt1"/>
+                  </a:solidFill>
+                  <a:latin typeface="+mn-lt"/>
+                  <a:ea typeface="+mn-ea"/>
+                  <a:cs typeface="+mn-cs"/>
+                </a:defRPr>
+              </a:lvl9pPr>
+            </a:lstStyle>
+            <a:p>
+              <a:pPr algn="ctr"/>
+              <a:endParaRPr lang="tr-TR"/>
+            </a:p>
+          </p:txBody>
+        </p:sp>
+        <p:sp>
+          <p:nvSpPr>
+            <p:cNvPr id="8" name="TextBox 7"/>
+            <p:cNvSpPr txBox="1"/>
+            <p:nvPr/>
+          </p:nvSpPr>
+          <p:spPr>
+            <a:xfrm>
+              <a:off x="724619" y="2380891"/>
+              <a:ext cx="629728" cy="415498"/>
+            </a:xfrm>
+            <a:prstGeom prst="rect">
+              <a:avLst/>
+            </a:prstGeom>
+            <a:noFill/>
+            <a:ln>
+              <a:solidFill>
+                <a:schemeClr val="accent1">
+                  <a:shade val="50000"/>
+                </a:schemeClr>
+              </a:solidFill>
+            </a:ln>
+          </p:spPr>
+          <p:txBody>
+            <a:bodyPr wrap="square" rtlCol="0">
+              <a:spAutoFit/>
+            </a:bodyPr>
+            <a:lstStyle>
+              <a:defPPr>
+                <a:defRPr lang="en-US"/>
+              </a:defPPr>
+              <a:lvl1pPr marL="0" algn="l" defTabSz="914400" rtl="0" eaLnBrk="1" latinLnBrk="0" hangingPunct="1">
+                <a:defRPr sz="1800" kern="1200">
+                  <a:solidFill>
+                    <a:schemeClr val="tx1"/>
+                  </a:solidFill>
+                  <a:latin typeface="+mn-lt"/>
+                  <a:ea typeface="+mn-ea"/>
+                  <a:cs typeface="+mn-cs"/>
+                </a:defRPr>
+              </a:lvl1pPr>
+              <a:lvl2pPr marL="457200" algn="l" defTabSz="914400" rtl="0" eaLnBrk="1" latinLnBrk="0" hangingPunct="1">
+                <a:defRPr sz="1800" kern="1200">
+                  <a:solidFill>
+                    <a:schemeClr val="tx1"/>
+                  </a:solidFill>
+                  <a:latin typeface="+mn-lt"/>
+                  <a:ea typeface="+mn-ea"/>
+                  <a:cs typeface="+mn-cs"/>
+                </a:defRPr>
+              </a:lvl2pPr>
+              <a:lvl3pPr marL="914400" algn="l" defTabSz="914400" rtl="0" eaLnBrk="1" latinLnBrk="0" hangingPunct="1">
+                <a:defRPr sz="1800" kern="1200">
+                  <a:solidFill>
+                    <a:schemeClr val="tx1"/>
+                  </a:solidFill>
+                  <a:latin typeface="+mn-lt"/>
+                  <a:ea typeface="+mn-ea"/>
+                  <a:cs typeface="+mn-cs"/>
+                </a:defRPr>
+              </a:lvl3pPr>
+              <a:lvl4pPr marL="1371600" algn="l" defTabSz="914400" rtl="0" eaLnBrk="1" latinLnBrk="0" hangingPunct="1">
+                <a:defRPr sz="1800" kern="1200">
+                  <a:solidFill>
+                    <a:schemeClr val="tx1"/>
+                  </a:solidFill>
+                  <a:latin typeface="+mn-lt"/>
+                  <a:ea typeface="+mn-ea"/>
+                  <a:cs typeface="+mn-cs"/>
+                </a:defRPr>
+              </a:lvl4pPr>
+              <a:lvl5pPr marL="1828800" algn="l" defTabSz="914400" rtl="0" eaLnBrk="1" latinLnBrk="0" hangingPunct="1">
+                <a:defRPr sz="1800" kern="1200">
+                  <a:solidFill>
+                    <a:schemeClr val="tx1"/>
+                  </a:solidFill>
+                  <a:latin typeface="+mn-lt"/>
+                  <a:ea typeface="+mn-ea"/>
+                  <a:cs typeface="+mn-cs"/>
+                </a:defRPr>
+              </a:lvl5pPr>
+              <a:lvl6pPr marL="2286000" algn="l" defTabSz="914400" rtl="0" eaLnBrk="1" latinLnBrk="0" hangingPunct="1">
+                <a:defRPr sz="1800" kern="1200">
+                  <a:solidFill>
+                    <a:schemeClr val="tx1"/>
+                  </a:solidFill>
+                  <a:latin typeface="+mn-lt"/>
+                  <a:ea typeface="+mn-ea"/>
+                  <a:cs typeface="+mn-cs"/>
+                </a:defRPr>
+              </a:lvl6pPr>
+              <a:lvl7pPr marL="2743200" algn="l" defTabSz="914400" rtl="0" eaLnBrk="1" latinLnBrk="0" hangingPunct="1">
+                <a:defRPr sz="1800" kern="1200">
+                  <a:solidFill>
+                    <a:schemeClr val="tx1"/>
+                  </a:solidFill>
+                  <a:latin typeface="+mn-lt"/>
+                  <a:ea typeface="+mn-ea"/>
+                  <a:cs typeface="+mn-cs"/>
+                </a:defRPr>
+              </a:lvl7pPr>
+              <a:lvl8pPr marL="3200400" algn="l" defTabSz="914400" rtl="0" eaLnBrk="1" latinLnBrk="0" hangingPunct="1">
+                <a:defRPr sz="1800" kern="1200">
+                  <a:solidFill>
+                    <a:schemeClr val="tx1"/>
+                  </a:solidFill>
+                  <a:latin typeface="+mn-lt"/>
+                  <a:ea typeface="+mn-ea"/>
+                  <a:cs typeface="+mn-cs"/>
+                </a:defRPr>
+              </a:lvl8pPr>
+              <a:lvl9pPr marL="3657600" algn="l" defTabSz="914400" rtl="0" eaLnBrk="1" latinLnBrk="0" hangingPunct="1">
+                <a:defRPr sz="1800" kern="1200">
+                  <a:solidFill>
+                    <a:schemeClr val="tx1"/>
+                  </a:solidFill>
+                  <a:latin typeface="+mn-lt"/>
+                  <a:ea typeface="+mn-ea"/>
+                  <a:cs typeface="+mn-cs"/>
+                </a:defRPr>
+              </a:lvl9pPr>
+            </a:lstStyle>
+            <a:p>
+              <a:pPr algn="ctr"/>
+              <a:r>
+                <a:rPr lang="tr-TR" sz="1050" dirty="0" smtClean="0"/>
+                <a:t>Model1</a:t>
+              </a:r>
+            </a:p>
+            <a:p>
+              <a:pPr algn="ctr"/>
+              <a:r>
+                <a:rPr lang="tr-TR" sz="1050" dirty="0" smtClean="0"/>
+                <a:t>Plugin</a:t>
+              </a:r>
+              <a:endParaRPr lang="tr-TR" sz="1050" dirty="0"/>
+            </a:p>
+          </p:txBody>
+        </p:sp>
+        <p:sp>
+          <p:nvSpPr>
+            <p:cNvPr id="9" name="TextBox 8"/>
+            <p:cNvSpPr txBox="1"/>
+            <p:nvPr/>
+          </p:nvSpPr>
+          <p:spPr>
+            <a:xfrm>
+              <a:off x="1420483" y="2386642"/>
+              <a:ext cx="667109" cy="415498"/>
+            </a:xfrm>
+            <a:prstGeom prst="rect">
+              <a:avLst/>
+            </a:prstGeom>
+            <a:noFill/>
+            <a:ln>
+              <a:solidFill>
+                <a:schemeClr val="accent1">
+                  <a:shade val="50000"/>
+                </a:schemeClr>
+              </a:solidFill>
+            </a:ln>
+          </p:spPr>
+          <p:txBody>
+            <a:bodyPr wrap="square" rtlCol="0">
+              <a:spAutoFit/>
+            </a:bodyPr>
+            <a:lstStyle>
+              <a:defPPr>
+                <a:defRPr lang="en-US"/>
+              </a:defPPr>
+              <a:lvl1pPr marL="0" algn="l" defTabSz="914400" rtl="0" eaLnBrk="1" latinLnBrk="0" hangingPunct="1">
+                <a:defRPr sz="1800" kern="1200">
+                  <a:solidFill>
+                    <a:schemeClr val="tx1"/>
+                  </a:solidFill>
+                  <a:latin typeface="+mn-lt"/>
+                  <a:ea typeface="+mn-ea"/>
+                  <a:cs typeface="+mn-cs"/>
+                </a:defRPr>
+              </a:lvl1pPr>
+              <a:lvl2pPr marL="457200" algn="l" defTabSz="914400" rtl="0" eaLnBrk="1" latinLnBrk="0" hangingPunct="1">
+                <a:defRPr sz="1800" kern="1200">
+                  <a:solidFill>
+                    <a:schemeClr val="tx1"/>
+                  </a:solidFill>
+                  <a:latin typeface="+mn-lt"/>
+                  <a:ea typeface="+mn-ea"/>
+                  <a:cs typeface="+mn-cs"/>
+                </a:defRPr>
+              </a:lvl2pPr>
+              <a:lvl3pPr marL="914400" algn="l" defTabSz="914400" rtl="0" eaLnBrk="1" latinLnBrk="0" hangingPunct="1">
+                <a:defRPr sz="1800" kern="1200">
+                  <a:solidFill>
+                    <a:schemeClr val="tx1"/>
+                  </a:solidFill>
+                  <a:latin typeface="+mn-lt"/>
+                  <a:ea typeface="+mn-ea"/>
+                  <a:cs typeface="+mn-cs"/>
+                </a:defRPr>
+              </a:lvl3pPr>
+              <a:lvl4pPr marL="1371600" algn="l" defTabSz="914400" rtl="0" eaLnBrk="1" latinLnBrk="0" hangingPunct="1">
+                <a:defRPr sz="1800" kern="1200">
+                  <a:solidFill>
+                    <a:schemeClr val="tx1"/>
+                  </a:solidFill>
+                  <a:latin typeface="+mn-lt"/>
+                  <a:ea typeface="+mn-ea"/>
+                  <a:cs typeface="+mn-cs"/>
+                </a:defRPr>
+              </a:lvl4pPr>
+              <a:lvl5pPr marL="1828800" algn="l" defTabSz="914400" rtl="0" eaLnBrk="1" latinLnBrk="0" hangingPunct="1">
+                <a:defRPr sz="1800" kern="1200">
+                  <a:solidFill>
+                    <a:schemeClr val="tx1"/>
+                  </a:solidFill>
+                  <a:latin typeface="+mn-lt"/>
+                  <a:ea typeface="+mn-ea"/>
+                  <a:cs typeface="+mn-cs"/>
+                </a:defRPr>
+              </a:lvl5pPr>
+              <a:lvl6pPr marL="2286000" algn="l" defTabSz="914400" rtl="0" eaLnBrk="1" latinLnBrk="0" hangingPunct="1">
+                <a:defRPr sz="1800" kern="1200">
+                  <a:solidFill>
+                    <a:schemeClr val="tx1"/>
+                  </a:solidFill>
+                  <a:latin typeface="+mn-lt"/>
+                  <a:ea typeface="+mn-ea"/>
+                  <a:cs typeface="+mn-cs"/>
+                </a:defRPr>
+              </a:lvl6pPr>
+              <a:lvl7pPr marL="2743200" algn="l" defTabSz="914400" rtl="0" eaLnBrk="1" latinLnBrk="0" hangingPunct="1">
+                <a:defRPr sz="1800" kern="1200">
+                  <a:solidFill>
+                    <a:schemeClr val="tx1"/>
+                  </a:solidFill>
+                  <a:latin typeface="+mn-lt"/>
+                  <a:ea typeface="+mn-ea"/>
+                  <a:cs typeface="+mn-cs"/>
+                </a:defRPr>
+              </a:lvl7pPr>
+              <a:lvl8pPr marL="3200400" algn="l" defTabSz="914400" rtl="0" eaLnBrk="1" latinLnBrk="0" hangingPunct="1">
+                <a:defRPr sz="1800" kern="1200">
+                  <a:solidFill>
+                    <a:schemeClr val="tx1"/>
+                  </a:solidFill>
+                  <a:latin typeface="+mn-lt"/>
+                  <a:ea typeface="+mn-ea"/>
+                  <a:cs typeface="+mn-cs"/>
+                </a:defRPr>
+              </a:lvl8pPr>
+              <a:lvl9pPr marL="3657600" algn="l" defTabSz="914400" rtl="0" eaLnBrk="1" latinLnBrk="0" hangingPunct="1">
+                <a:defRPr sz="1800" kern="1200">
+                  <a:solidFill>
+                    <a:schemeClr val="tx1"/>
+                  </a:solidFill>
+                  <a:latin typeface="+mn-lt"/>
+                  <a:ea typeface="+mn-ea"/>
+                  <a:cs typeface="+mn-cs"/>
+                </a:defRPr>
+              </a:lvl9pPr>
+            </a:lstStyle>
+            <a:p>
+              <a:pPr algn="ctr"/>
+              <a:r>
+                <a:rPr lang="tr-TR" sz="1050" dirty="0" smtClean="0"/>
+                <a:t>Model2</a:t>
+              </a:r>
+            </a:p>
+            <a:p>
+              <a:pPr algn="ctr"/>
+              <a:r>
+                <a:rPr lang="tr-TR" sz="1050" dirty="0" smtClean="0"/>
+                <a:t>Plugin</a:t>
+              </a:r>
+              <a:endParaRPr lang="tr-TR" sz="1050" dirty="0"/>
+            </a:p>
+          </p:txBody>
+        </p:sp>
+        <p:sp>
+          <p:nvSpPr>
+            <p:cNvPr id="10" name="TextBox 9"/>
+            <p:cNvSpPr txBox="1"/>
+            <p:nvPr/>
+          </p:nvSpPr>
+          <p:spPr>
+            <a:xfrm>
+              <a:off x="2616678" y="2392393"/>
+              <a:ext cx="669985" cy="415498"/>
+            </a:xfrm>
+            <a:prstGeom prst="rect">
+              <a:avLst/>
+            </a:prstGeom>
+            <a:noFill/>
+            <a:ln>
+              <a:solidFill>
+                <a:schemeClr val="accent1">
+                  <a:shade val="50000"/>
+                </a:schemeClr>
+              </a:solidFill>
+            </a:ln>
+          </p:spPr>
+          <p:txBody>
+            <a:bodyPr wrap="square" rtlCol="0">
+              <a:spAutoFit/>
+            </a:bodyPr>
+            <a:lstStyle>
+              <a:defPPr>
+                <a:defRPr lang="en-US"/>
+              </a:defPPr>
+              <a:lvl1pPr marL="0" algn="l" defTabSz="914400" rtl="0" eaLnBrk="1" latinLnBrk="0" hangingPunct="1">
+                <a:defRPr sz="1800" kern="1200">
+                  <a:solidFill>
+                    <a:schemeClr val="tx1"/>
+                  </a:solidFill>
+                  <a:latin typeface="+mn-lt"/>
+                  <a:ea typeface="+mn-ea"/>
+                  <a:cs typeface="+mn-cs"/>
+                </a:defRPr>
+              </a:lvl1pPr>
+              <a:lvl2pPr marL="457200" algn="l" defTabSz="914400" rtl="0" eaLnBrk="1" latinLnBrk="0" hangingPunct="1">
+                <a:defRPr sz="1800" kern="1200">
+                  <a:solidFill>
+                    <a:schemeClr val="tx1"/>
+                  </a:solidFill>
+                  <a:latin typeface="+mn-lt"/>
+                  <a:ea typeface="+mn-ea"/>
+                  <a:cs typeface="+mn-cs"/>
+                </a:defRPr>
+              </a:lvl2pPr>
+              <a:lvl3pPr marL="914400" algn="l" defTabSz="914400" rtl="0" eaLnBrk="1" latinLnBrk="0" hangingPunct="1">
+                <a:defRPr sz="1800" kern="1200">
+                  <a:solidFill>
+                    <a:schemeClr val="tx1"/>
+                  </a:solidFill>
+                  <a:latin typeface="+mn-lt"/>
+                  <a:ea typeface="+mn-ea"/>
+                  <a:cs typeface="+mn-cs"/>
+                </a:defRPr>
+              </a:lvl3pPr>
+              <a:lvl4pPr marL="1371600" algn="l" defTabSz="914400" rtl="0" eaLnBrk="1" latinLnBrk="0" hangingPunct="1">
+                <a:defRPr sz="1800" kern="1200">
+                  <a:solidFill>
+                    <a:schemeClr val="tx1"/>
+                  </a:solidFill>
+                  <a:latin typeface="+mn-lt"/>
+                  <a:ea typeface="+mn-ea"/>
+                  <a:cs typeface="+mn-cs"/>
+                </a:defRPr>
+              </a:lvl4pPr>
+              <a:lvl5pPr marL="1828800" algn="l" defTabSz="914400" rtl="0" eaLnBrk="1" latinLnBrk="0" hangingPunct="1">
+                <a:defRPr sz="1800" kern="1200">
+                  <a:solidFill>
+                    <a:schemeClr val="tx1"/>
+                  </a:solidFill>
+                  <a:latin typeface="+mn-lt"/>
+                  <a:ea typeface="+mn-ea"/>
+                  <a:cs typeface="+mn-cs"/>
+                </a:defRPr>
+              </a:lvl5pPr>
+              <a:lvl6pPr marL="2286000" algn="l" defTabSz="914400" rtl="0" eaLnBrk="1" latinLnBrk="0" hangingPunct="1">
+                <a:defRPr sz="1800" kern="1200">
+                  <a:solidFill>
+                    <a:schemeClr val="tx1"/>
+                  </a:solidFill>
+                  <a:latin typeface="+mn-lt"/>
+                  <a:ea typeface="+mn-ea"/>
+                  <a:cs typeface="+mn-cs"/>
+                </a:defRPr>
+              </a:lvl6pPr>
+              <a:lvl7pPr marL="2743200" algn="l" defTabSz="914400" rtl="0" eaLnBrk="1" latinLnBrk="0" hangingPunct="1">
+                <a:defRPr sz="1800" kern="1200">
+                  <a:solidFill>
+                    <a:schemeClr val="tx1"/>
+                  </a:solidFill>
+                  <a:latin typeface="+mn-lt"/>
+                  <a:ea typeface="+mn-ea"/>
+                  <a:cs typeface="+mn-cs"/>
+                </a:defRPr>
+              </a:lvl7pPr>
+              <a:lvl8pPr marL="3200400" algn="l" defTabSz="914400" rtl="0" eaLnBrk="1" latinLnBrk="0" hangingPunct="1">
+                <a:defRPr sz="1800" kern="1200">
+                  <a:solidFill>
+                    <a:schemeClr val="tx1"/>
+                  </a:solidFill>
+                  <a:latin typeface="+mn-lt"/>
+                  <a:ea typeface="+mn-ea"/>
+                  <a:cs typeface="+mn-cs"/>
+                </a:defRPr>
+              </a:lvl8pPr>
+              <a:lvl9pPr marL="3657600" algn="l" defTabSz="914400" rtl="0" eaLnBrk="1" latinLnBrk="0" hangingPunct="1">
+                <a:defRPr sz="1800" kern="1200">
+                  <a:solidFill>
+                    <a:schemeClr val="tx1"/>
+                  </a:solidFill>
+                  <a:latin typeface="+mn-lt"/>
+                  <a:ea typeface="+mn-ea"/>
+                  <a:cs typeface="+mn-cs"/>
+                </a:defRPr>
+              </a:lvl9pPr>
+            </a:lstStyle>
+            <a:p>
+              <a:pPr algn="ctr"/>
+              <a:r>
+                <a:rPr lang="tr-TR" sz="1050" dirty="0" smtClean="0"/>
+                <a:t>Modeln</a:t>
+              </a:r>
+            </a:p>
+            <a:p>
+              <a:pPr algn="ctr"/>
+              <a:r>
+                <a:rPr lang="tr-TR" sz="1050" dirty="0" smtClean="0"/>
+                <a:t>Plugin</a:t>
+              </a:r>
+              <a:endParaRPr lang="tr-TR" sz="1050" dirty="0"/>
+            </a:p>
+          </p:txBody>
+        </p:sp>
+        <p:sp>
+          <p:nvSpPr>
+            <p:cNvPr id="11" name="TextBox 11"/>
+            <p:cNvSpPr txBox="1"/>
+            <p:nvPr/>
+          </p:nvSpPr>
+          <p:spPr>
+            <a:xfrm>
+              <a:off x="2122098" y="2260118"/>
+              <a:ext cx="434734" cy="369332"/>
+            </a:xfrm>
+            <a:prstGeom prst="rect">
+              <a:avLst/>
+            </a:prstGeom>
+            <a:noFill/>
+          </p:spPr>
+          <p:txBody>
+            <a:bodyPr wrap="none" rtlCol="0">
+              <a:spAutoFit/>
+            </a:bodyPr>
+            <a:lstStyle>
+              <a:defPPr>
+                <a:defRPr lang="en-US"/>
+              </a:defPPr>
+              <a:lvl1pPr marL="0" algn="l" defTabSz="914400" rtl="0" eaLnBrk="1" latinLnBrk="0" hangingPunct="1">
+                <a:defRPr sz="1800" kern="1200">
+                  <a:solidFill>
+                    <a:schemeClr val="tx1"/>
+                  </a:solidFill>
+                  <a:latin typeface="+mn-lt"/>
+                  <a:ea typeface="+mn-ea"/>
+                  <a:cs typeface="+mn-cs"/>
+                </a:defRPr>
+              </a:lvl1pPr>
+              <a:lvl2pPr marL="457200" algn="l" defTabSz="914400" rtl="0" eaLnBrk="1" latinLnBrk="0" hangingPunct="1">
+                <a:defRPr sz="1800" kern="1200">
+                  <a:solidFill>
+                    <a:schemeClr val="tx1"/>
+                  </a:solidFill>
+                  <a:latin typeface="+mn-lt"/>
+                  <a:ea typeface="+mn-ea"/>
+                  <a:cs typeface="+mn-cs"/>
+                </a:defRPr>
+              </a:lvl2pPr>
+              <a:lvl3pPr marL="914400" algn="l" defTabSz="914400" rtl="0" eaLnBrk="1" latinLnBrk="0" hangingPunct="1">
+                <a:defRPr sz="1800" kern="1200">
+                  <a:solidFill>
+                    <a:schemeClr val="tx1"/>
+                  </a:solidFill>
+                  <a:latin typeface="+mn-lt"/>
+                  <a:ea typeface="+mn-ea"/>
+                  <a:cs typeface="+mn-cs"/>
+                </a:defRPr>
+              </a:lvl3pPr>
+              <a:lvl4pPr marL="1371600" algn="l" defTabSz="914400" rtl="0" eaLnBrk="1" latinLnBrk="0" hangingPunct="1">
+                <a:defRPr sz="1800" kern="1200">
+                  <a:solidFill>
+                    <a:schemeClr val="tx1"/>
+                  </a:solidFill>
+                  <a:latin typeface="+mn-lt"/>
+                  <a:ea typeface="+mn-ea"/>
+                  <a:cs typeface="+mn-cs"/>
+                </a:defRPr>
+              </a:lvl4pPr>
+              <a:lvl5pPr marL="1828800" algn="l" defTabSz="914400" rtl="0" eaLnBrk="1" latinLnBrk="0" hangingPunct="1">
+                <a:defRPr sz="1800" kern="1200">
+                  <a:solidFill>
+                    <a:schemeClr val="tx1"/>
+                  </a:solidFill>
+                  <a:latin typeface="+mn-lt"/>
+                  <a:ea typeface="+mn-ea"/>
+                  <a:cs typeface="+mn-cs"/>
+                </a:defRPr>
+              </a:lvl5pPr>
+              <a:lvl6pPr marL="2286000" algn="l" defTabSz="914400" rtl="0" eaLnBrk="1" latinLnBrk="0" hangingPunct="1">
+                <a:defRPr sz="1800" kern="1200">
+                  <a:solidFill>
+                    <a:schemeClr val="tx1"/>
+                  </a:solidFill>
+                  <a:latin typeface="+mn-lt"/>
+                  <a:ea typeface="+mn-ea"/>
+                  <a:cs typeface="+mn-cs"/>
+                </a:defRPr>
+              </a:lvl6pPr>
+              <a:lvl7pPr marL="2743200" algn="l" defTabSz="914400" rtl="0" eaLnBrk="1" latinLnBrk="0" hangingPunct="1">
+                <a:defRPr sz="1800" kern="1200">
+                  <a:solidFill>
+                    <a:schemeClr val="tx1"/>
+                  </a:solidFill>
+                  <a:latin typeface="+mn-lt"/>
+                  <a:ea typeface="+mn-ea"/>
+                  <a:cs typeface="+mn-cs"/>
+                </a:defRPr>
+              </a:lvl7pPr>
+              <a:lvl8pPr marL="3200400" algn="l" defTabSz="914400" rtl="0" eaLnBrk="1" latinLnBrk="0" hangingPunct="1">
+                <a:defRPr sz="1800" kern="1200">
+                  <a:solidFill>
+                    <a:schemeClr val="tx1"/>
+                  </a:solidFill>
+                  <a:latin typeface="+mn-lt"/>
+                  <a:ea typeface="+mn-ea"/>
+                  <a:cs typeface="+mn-cs"/>
+                </a:defRPr>
+              </a:lvl8pPr>
+              <a:lvl9pPr marL="3657600" algn="l" defTabSz="914400" rtl="0" eaLnBrk="1" latinLnBrk="0" hangingPunct="1">
+                <a:defRPr sz="1800" kern="1200">
+                  <a:solidFill>
+                    <a:schemeClr val="tx1"/>
+                  </a:solidFill>
+                  <a:latin typeface="+mn-lt"/>
+                  <a:ea typeface="+mn-ea"/>
+                  <a:cs typeface="+mn-cs"/>
+                </a:defRPr>
+              </a:lvl9pPr>
+            </a:lstStyle>
+            <a:p>
+              <a:r>
+                <a:rPr lang="tr-TR" dirty="0" smtClean="0"/>
+                <a:t>....</a:t>
+              </a:r>
+              <a:endParaRPr lang="tr-TR" dirty="0"/>
+            </a:p>
+          </p:txBody>
+        </p:sp>
+        <p:sp>
+          <p:nvSpPr>
+            <p:cNvPr id="12" name="TextBox 12"/>
+            <p:cNvSpPr txBox="1"/>
+            <p:nvPr/>
+          </p:nvSpPr>
+          <p:spPr>
+            <a:xfrm>
+              <a:off x="5175850" y="1708033"/>
+              <a:ext cx="914400" cy="461665"/>
+            </a:xfrm>
+            <a:prstGeom prst="rect">
+              <a:avLst/>
+            </a:prstGeom>
+            <a:noFill/>
+            <a:ln>
+              <a:solidFill>
+                <a:schemeClr val="accent1">
+                  <a:shade val="50000"/>
+                </a:schemeClr>
+              </a:solidFill>
+            </a:ln>
+          </p:spPr>
+          <p:txBody>
+            <a:bodyPr wrap="square" rtlCol="0">
+              <a:spAutoFit/>
+            </a:bodyPr>
+            <a:lstStyle>
+              <a:defPPr>
+                <a:defRPr lang="en-US"/>
+              </a:defPPr>
+              <a:lvl1pPr marL="0" algn="l" defTabSz="914400" rtl="0" eaLnBrk="1" latinLnBrk="0" hangingPunct="1">
+                <a:defRPr sz="1800" kern="1200">
+                  <a:solidFill>
+                    <a:schemeClr val="tx1"/>
+                  </a:solidFill>
+                  <a:latin typeface="+mn-lt"/>
+                  <a:ea typeface="+mn-ea"/>
+                  <a:cs typeface="+mn-cs"/>
+                </a:defRPr>
+              </a:lvl1pPr>
+              <a:lvl2pPr marL="457200" algn="l" defTabSz="914400" rtl="0" eaLnBrk="1" latinLnBrk="0" hangingPunct="1">
+                <a:defRPr sz="1800" kern="1200">
+                  <a:solidFill>
+                    <a:schemeClr val="tx1"/>
+                  </a:solidFill>
+                  <a:latin typeface="+mn-lt"/>
+                  <a:ea typeface="+mn-ea"/>
+                  <a:cs typeface="+mn-cs"/>
+                </a:defRPr>
+              </a:lvl2pPr>
+              <a:lvl3pPr marL="914400" algn="l" defTabSz="914400" rtl="0" eaLnBrk="1" latinLnBrk="0" hangingPunct="1">
+                <a:defRPr sz="1800" kern="1200">
+                  <a:solidFill>
+                    <a:schemeClr val="tx1"/>
+                  </a:solidFill>
+                  <a:latin typeface="+mn-lt"/>
+                  <a:ea typeface="+mn-ea"/>
+                  <a:cs typeface="+mn-cs"/>
+                </a:defRPr>
+              </a:lvl3pPr>
+              <a:lvl4pPr marL="1371600" algn="l" defTabSz="914400" rtl="0" eaLnBrk="1" latinLnBrk="0" hangingPunct="1">
+                <a:defRPr sz="1800" kern="1200">
+                  <a:solidFill>
+                    <a:schemeClr val="tx1"/>
+                  </a:solidFill>
+                  <a:latin typeface="+mn-lt"/>
+                  <a:ea typeface="+mn-ea"/>
+                  <a:cs typeface="+mn-cs"/>
+                </a:defRPr>
+              </a:lvl4pPr>
+              <a:lvl5pPr marL="1828800" algn="l" defTabSz="914400" rtl="0" eaLnBrk="1" latinLnBrk="0" hangingPunct="1">
+                <a:defRPr sz="1800" kern="1200">
+                  <a:solidFill>
+                    <a:schemeClr val="tx1"/>
+                  </a:solidFill>
+                  <a:latin typeface="+mn-lt"/>
+                  <a:ea typeface="+mn-ea"/>
+                  <a:cs typeface="+mn-cs"/>
+                </a:defRPr>
+              </a:lvl5pPr>
+              <a:lvl6pPr marL="2286000" algn="l" defTabSz="914400" rtl="0" eaLnBrk="1" latinLnBrk="0" hangingPunct="1">
+                <a:defRPr sz="1800" kern="1200">
+                  <a:solidFill>
+                    <a:schemeClr val="tx1"/>
+                  </a:solidFill>
+                  <a:latin typeface="+mn-lt"/>
+                  <a:ea typeface="+mn-ea"/>
+                  <a:cs typeface="+mn-cs"/>
+                </a:defRPr>
+              </a:lvl6pPr>
+              <a:lvl7pPr marL="2743200" algn="l" defTabSz="914400" rtl="0" eaLnBrk="1" latinLnBrk="0" hangingPunct="1">
+                <a:defRPr sz="1800" kern="1200">
+                  <a:solidFill>
+                    <a:schemeClr val="tx1"/>
+                  </a:solidFill>
+                  <a:latin typeface="+mn-lt"/>
+                  <a:ea typeface="+mn-ea"/>
+                  <a:cs typeface="+mn-cs"/>
+                </a:defRPr>
+              </a:lvl7pPr>
+              <a:lvl8pPr marL="3200400" algn="l" defTabSz="914400" rtl="0" eaLnBrk="1" latinLnBrk="0" hangingPunct="1">
+                <a:defRPr sz="1800" kern="1200">
+                  <a:solidFill>
+                    <a:schemeClr val="tx1"/>
+                  </a:solidFill>
+                  <a:latin typeface="+mn-lt"/>
+                  <a:ea typeface="+mn-ea"/>
+                  <a:cs typeface="+mn-cs"/>
+                </a:defRPr>
+              </a:lvl8pPr>
+              <a:lvl9pPr marL="3657600" algn="l" defTabSz="914400" rtl="0" eaLnBrk="1" latinLnBrk="0" hangingPunct="1">
+                <a:defRPr sz="1800" kern="1200">
+                  <a:solidFill>
+                    <a:schemeClr val="tx1"/>
+                  </a:solidFill>
+                  <a:latin typeface="+mn-lt"/>
+                  <a:ea typeface="+mn-ea"/>
+                  <a:cs typeface="+mn-cs"/>
+                </a:defRPr>
+              </a:lvl9pPr>
+            </a:lstStyle>
+            <a:p>
+              <a:r>
+                <a:rPr lang="tr-TR" sz="1200" dirty="0" smtClean="0"/>
+                <a:t>Publisher Interface</a:t>
+              </a:r>
+              <a:endParaRPr lang="tr-TR" sz="1200" dirty="0"/>
+            </a:p>
+          </p:txBody>
+        </p:sp>
+        <p:cxnSp>
+          <p:nvCxnSpPr>
+            <p:cNvPr id="13" name="Shape 14"/>
+            <p:cNvCxnSpPr>
+              <a:stCxn id="5" idx="0"/>
+              <a:endCxn id="12" idx="3"/>
+            </p:cNvCxnSpPr>
+            <p:nvPr/>
+          </p:nvCxnSpPr>
+          <p:spPr>
+            <a:xfrm rot="16200000" flipV="1">
+              <a:off x="6327582" y="1701535"/>
+              <a:ext cx="571421" cy="1046083"/>
+            </a:xfrm>
+            <a:prstGeom prst="bentConnector2">
+              <a:avLst/>
+            </a:prstGeom>
+            <a:ln w="25400">
+              <a:tailEnd type="arrow"/>
+            </a:ln>
+          </p:spPr>
+          <p:style>
+            <a:lnRef idx="1">
+              <a:schemeClr val="accent1"/>
+            </a:lnRef>
+            <a:fillRef idx="0">
+              <a:schemeClr val="accent1"/>
+            </a:fillRef>
+            <a:effectRef idx="0">
+              <a:schemeClr val="accent1"/>
+            </a:effectRef>
+            <a:fontRef idx="minor">
+              <a:schemeClr val="tx1"/>
+            </a:fontRef>
+          </p:style>
+        </p:cxnSp>
+        <p:cxnSp>
+          <p:nvCxnSpPr>
+            <p:cNvPr id="14" name="Shape 17"/>
+            <p:cNvCxnSpPr>
+              <a:stCxn id="12" idx="1"/>
+              <a:endCxn id="8" idx="0"/>
+            </p:cNvCxnSpPr>
+            <p:nvPr/>
+          </p:nvCxnSpPr>
+          <p:spPr>
+            <a:xfrm rot="10800000" flipV="1">
+              <a:off x="1039484" y="1938865"/>
+              <a:ext cx="4136367" cy="442025"/>
+            </a:xfrm>
+            <a:prstGeom prst="bentConnector2">
+              <a:avLst/>
+            </a:prstGeom>
+            <a:ln>
+              <a:tailEnd type="arrow"/>
+            </a:ln>
+          </p:spPr>
+          <p:style>
+            <a:lnRef idx="1">
+              <a:schemeClr val="accent1"/>
+            </a:lnRef>
+            <a:fillRef idx="0">
+              <a:schemeClr val="accent1"/>
+            </a:fillRef>
+            <a:effectRef idx="0">
+              <a:schemeClr val="accent1"/>
+            </a:effectRef>
+            <a:fontRef idx="minor">
+              <a:schemeClr val="tx1"/>
+            </a:fontRef>
+          </p:style>
+        </p:cxnSp>
+        <p:cxnSp>
+          <p:nvCxnSpPr>
+            <p:cNvPr id="15" name="Straight Arrow Connector 14"/>
+            <p:cNvCxnSpPr>
+              <a:endCxn id="9" idx="0"/>
+            </p:cNvCxnSpPr>
+            <p:nvPr/>
+          </p:nvCxnSpPr>
+          <p:spPr>
+            <a:xfrm rot="5400000">
+              <a:off x="1534068" y="2160914"/>
+              <a:ext cx="445699" cy="5757"/>
+            </a:xfrm>
+            <a:prstGeom prst="straightConnector1">
+              <a:avLst/>
+            </a:prstGeom>
+            <a:ln>
+              <a:tailEnd type="arrow"/>
+            </a:ln>
+          </p:spPr>
+          <p:style>
+            <a:lnRef idx="1">
+              <a:schemeClr val="accent1"/>
+            </a:lnRef>
+            <a:fillRef idx="0">
+              <a:schemeClr val="accent1"/>
+            </a:fillRef>
+            <a:effectRef idx="0">
+              <a:schemeClr val="accent1"/>
+            </a:effectRef>
+            <a:fontRef idx="minor">
+              <a:schemeClr val="tx1"/>
+            </a:fontRef>
+          </p:style>
+        </p:cxnSp>
+        <p:cxnSp>
+          <p:nvCxnSpPr>
+            <p:cNvPr id="16" name="Straight Arrow Connector 15"/>
+            <p:cNvCxnSpPr>
+              <a:endCxn id="10" idx="0"/>
+            </p:cNvCxnSpPr>
+            <p:nvPr/>
+          </p:nvCxnSpPr>
+          <p:spPr>
+            <a:xfrm rot="5400000">
+              <a:off x="2729543" y="2163072"/>
+              <a:ext cx="451449" cy="7192"/>
+            </a:xfrm>
+            <a:prstGeom prst="straightConnector1">
+              <a:avLst/>
+            </a:prstGeom>
+            <a:ln>
+              <a:tailEnd type="arrow"/>
+            </a:ln>
+          </p:spPr>
+          <p:style>
+            <a:lnRef idx="1">
+              <a:schemeClr val="accent1"/>
+            </a:lnRef>
+            <a:fillRef idx="0">
+              <a:schemeClr val="accent1"/>
+            </a:fillRef>
+            <a:effectRef idx="0">
+              <a:schemeClr val="accent1"/>
+            </a:effectRef>
+            <a:fontRef idx="minor">
+              <a:schemeClr val="tx1"/>
+            </a:fontRef>
+          </p:style>
+        </p:cxnSp>
+        <p:sp>
+          <p:nvSpPr>
+            <p:cNvPr id="17" name="TextBox 22"/>
+            <p:cNvSpPr txBox="1"/>
+            <p:nvPr/>
+          </p:nvSpPr>
+          <p:spPr>
+            <a:xfrm>
+              <a:off x="3904890" y="1696529"/>
+              <a:ext cx="946093" cy="276999"/>
+            </a:xfrm>
+            <a:prstGeom prst="rect">
+              <a:avLst/>
+            </a:prstGeom>
+            <a:noFill/>
+          </p:spPr>
+          <p:txBody>
+            <a:bodyPr wrap="none" rtlCol="0">
+              <a:spAutoFit/>
+            </a:bodyPr>
+            <a:lstStyle>
+              <a:defPPr>
+                <a:defRPr lang="en-US"/>
+              </a:defPPr>
+              <a:lvl1pPr marL="0" algn="l" defTabSz="914400" rtl="0" eaLnBrk="1" latinLnBrk="0" hangingPunct="1">
+                <a:defRPr sz="1800" kern="1200">
+                  <a:solidFill>
+                    <a:schemeClr val="tx1"/>
+                  </a:solidFill>
+                  <a:latin typeface="+mn-lt"/>
+                  <a:ea typeface="+mn-ea"/>
+                  <a:cs typeface="+mn-cs"/>
+                </a:defRPr>
+              </a:lvl1pPr>
+              <a:lvl2pPr marL="457200" algn="l" defTabSz="914400" rtl="0" eaLnBrk="1" latinLnBrk="0" hangingPunct="1">
+                <a:defRPr sz="1800" kern="1200">
+                  <a:solidFill>
+                    <a:schemeClr val="tx1"/>
+                  </a:solidFill>
+                  <a:latin typeface="+mn-lt"/>
+                  <a:ea typeface="+mn-ea"/>
+                  <a:cs typeface="+mn-cs"/>
+                </a:defRPr>
+              </a:lvl2pPr>
+              <a:lvl3pPr marL="914400" algn="l" defTabSz="914400" rtl="0" eaLnBrk="1" latinLnBrk="0" hangingPunct="1">
+                <a:defRPr sz="1800" kern="1200">
+                  <a:solidFill>
+                    <a:schemeClr val="tx1"/>
+                  </a:solidFill>
+                  <a:latin typeface="+mn-lt"/>
+                  <a:ea typeface="+mn-ea"/>
+                  <a:cs typeface="+mn-cs"/>
+                </a:defRPr>
+              </a:lvl3pPr>
+              <a:lvl4pPr marL="1371600" algn="l" defTabSz="914400" rtl="0" eaLnBrk="1" latinLnBrk="0" hangingPunct="1">
+                <a:defRPr sz="1800" kern="1200">
+                  <a:solidFill>
+                    <a:schemeClr val="tx1"/>
+                  </a:solidFill>
+                  <a:latin typeface="+mn-lt"/>
+                  <a:ea typeface="+mn-ea"/>
+                  <a:cs typeface="+mn-cs"/>
+                </a:defRPr>
+              </a:lvl4pPr>
+              <a:lvl5pPr marL="1828800" algn="l" defTabSz="914400" rtl="0" eaLnBrk="1" latinLnBrk="0" hangingPunct="1">
+                <a:defRPr sz="1800" kern="1200">
+                  <a:solidFill>
+                    <a:schemeClr val="tx1"/>
+                  </a:solidFill>
+                  <a:latin typeface="+mn-lt"/>
+                  <a:ea typeface="+mn-ea"/>
+                  <a:cs typeface="+mn-cs"/>
+                </a:defRPr>
+              </a:lvl5pPr>
+              <a:lvl6pPr marL="2286000" algn="l" defTabSz="914400" rtl="0" eaLnBrk="1" latinLnBrk="0" hangingPunct="1">
+                <a:defRPr sz="1800" kern="1200">
+                  <a:solidFill>
+                    <a:schemeClr val="tx1"/>
+                  </a:solidFill>
+                  <a:latin typeface="+mn-lt"/>
+                  <a:ea typeface="+mn-ea"/>
+                  <a:cs typeface="+mn-cs"/>
+                </a:defRPr>
+              </a:lvl6pPr>
+              <a:lvl7pPr marL="2743200" algn="l" defTabSz="914400" rtl="0" eaLnBrk="1" latinLnBrk="0" hangingPunct="1">
+                <a:defRPr sz="1800" kern="1200">
+                  <a:solidFill>
+                    <a:schemeClr val="tx1"/>
+                  </a:solidFill>
+                  <a:latin typeface="+mn-lt"/>
+                  <a:ea typeface="+mn-ea"/>
+                  <a:cs typeface="+mn-cs"/>
+                </a:defRPr>
+              </a:lvl7pPr>
+              <a:lvl8pPr marL="3200400" algn="l" defTabSz="914400" rtl="0" eaLnBrk="1" latinLnBrk="0" hangingPunct="1">
+                <a:defRPr sz="1800" kern="1200">
+                  <a:solidFill>
+                    <a:schemeClr val="tx1"/>
+                  </a:solidFill>
+                  <a:latin typeface="+mn-lt"/>
+                  <a:ea typeface="+mn-ea"/>
+                  <a:cs typeface="+mn-cs"/>
+                </a:defRPr>
+              </a:lvl8pPr>
+              <a:lvl9pPr marL="3657600" algn="l" defTabSz="914400" rtl="0" eaLnBrk="1" latinLnBrk="0" hangingPunct="1">
+                <a:defRPr sz="1800" kern="1200">
+                  <a:solidFill>
+                    <a:schemeClr val="tx1"/>
+                  </a:solidFill>
+                  <a:latin typeface="+mn-lt"/>
+                  <a:ea typeface="+mn-ea"/>
+                  <a:cs typeface="+mn-cs"/>
+                </a:defRPr>
+              </a:lvl9pPr>
+            </a:lstStyle>
+            <a:p>
+              <a:r>
+                <a:rPr lang="tr-TR" sz="1200" dirty="0" smtClean="0"/>
+                <a:t>Goal States</a:t>
+              </a:r>
+              <a:endParaRPr lang="tr-TR" sz="1200" dirty="0"/>
+            </a:p>
+          </p:txBody>
+        </p:sp>
+        <p:sp>
+          <p:nvSpPr>
+            <p:cNvPr id="18" name="TextBox 26"/>
+            <p:cNvSpPr txBox="1"/>
+            <p:nvPr/>
+          </p:nvSpPr>
+          <p:spPr>
+            <a:xfrm>
+              <a:off x="948906" y="2993363"/>
+              <a:ext cx="2208362" cy="338554"/>
+            </a:xfrm>
+            <a:prstGeom prst="rect">
+              <a:avLst/>
+            </a:prstGeom>
+            <a:noFill/>
+            <a:ln>
+              <a:solidFill>
+                <a:schemeClr val="accent1">
+                  <a:shade val="50000"/>
+                </a:schemeClr>
+              </a:solidFill>
+            </a:ln>
+          </p:spPr>
+          <p:txBody>
+            <a:bodyPr wrap="square" rtlCol="0">
+              <a:spAutoFit/>
+            </a:bodyPr>
+            <a:lstStyle>
+              <a:defPPr>
+                <a:defRPr lang="en-US"/>
+              </a:defPPr>
+              <a:lvl1pPr marL="0" algn="l" defTabSz="914400" rtl="0" eaLnBrk="1" latinLnBrk="0" hangingPunct="1">
+                <a:defRPr sz="1800" kern="1200">
+                  <a:solidFill>
+                    <a:schemeClr val="tx1"/>
+                  </a:solidFill>
+                  <a:latin typeface="+mn-lt"/>
+                  <a:ea typeface="+mn-ea"/>
+                  <a:cs typeface="+mn-cs"/>
+                </a:defRPr>
+              </a:lvl1pPr>
+              <a:lvl2pPr marL="457200" algn="l" defTabSz="914400" rtl="0" eaLnBrk="1" latinLnBrk="0" hangingPunct="1">
+                <a:defRPr sz="1800" kern="1200">
+                  <a:solidFill>
+                    <a:schemeClr val="tx1"/>
+                  </a:solidFill>
+                  <a:latin typeface="+mn-lt"/>
+                  <a:ea typeface="+mn-ea"/>
+                  <a:cs typeface="+mn-cs"/>
+                </a:defRPr>
+              </a:lvl2pPr>
+              <a:lvl3pPr marL="914400" algn="l" defTabSz="914400" rtl="0" eaLnBrk="1" latinLnBrk="0" hangingPunct="1">
+                <a:defRPr sz="1800" kern="1200">
+                  <a:solidFill>
+                    <a:schemeClr val="tx1"/>
+                  </a:solidFill>
+                  <a:latin typeface="+mn-lt"/>
+                  <a:ea typeface="+mn-ea"/>
+                  <a:cs typeface="+mn-cs"/>
+                </a:defRPr>
+              </a:lvl3pPr>
+              <a:lvl4pPr marL="1371600" algn="l" defTabSz="914400" rtl="0" eaLnBrk="1" latinLnBrk="0" hangingPunct="1">
+                <a:defRPr sz="1800" kern="1200">
+                  <a:solidFill>
+                    <a:schemeClr val="tx1"/>
+                  </a:solidFill>
+                  <a:latin typeface="+mn-lt"/>
+                  <a:ea typeface="+mn-ea"/>
+                  <a:cs typeface="+mn-cs"/>
+                </a:defRPr>
+              </a:lvl4pPr>
+              <a:lvl5pPr marL="1828800" algn="l" defTabSz="914400" rtl="0" eaLnBrk="1" latinLnBrk="0" hangingPunct="1">
+                <a:defRPr sz="1800" kern="1200">
+                  <a:solidFill>
+                    <a:schemeClr val="tx1"/>
+                  </a:solidFill>
+                  <a:latin typeface="+mn-lt"/>
+                  <a:ea typeface="+mn-ea"/>
+                  <a:cs typeface="+mn-cs"/>
+                </a:defRPr>
+              </a:lvl5pPr>
+              <a:lvl6pPr marL="2286000" algn="l" defTabSz="914400" rtl="0" eaLnBrk="1" latinLnBrk="0" hangingPunct="1">
+                <a:defRPr sz="1800" kern="1200">
+                  <a:solidFill>
+                    <a:schemeClr val="tx1"/>
+                  </a:solidFill>
+                  <a:latin typeface="+mn-lt"/>
+                  <a:ea typeface="+mn-ea"/>
+                  <a:cs typeface="+mn-cs"/>
+                </a:defRPr>
+              </a:lvl6pPr>
+              <a:lvl7pPr marL="2743200" algn="l" defTabSz="914400" rtl="0" eaLnBrk="1" latinLnBrk="0" hangingPunct="1">
+                <a:defRPr sz="1800" kern="1200">
+                  <a:solidFill>
+                    <a:schemeClr val="tx1"/>
+                  </a:solidFill>
+                  <a:latin typeface="+mn-lt"/>
+                  <a:ea typeface="+mn-ea"/>
+                  <a:cs typeface="+mn-cs"/>
+                </a:defRPr>
+              </a:lvl7pPr>
+              <a:lvl8pPr marL="3200400" algn="l" defTabSz="914400" rtl="0" eaLnBrk="1" latinLnBrk="0" hangingPunct="1">
+                <a:defRPr sz="1800" kern="1200">
+                  <a:solidFill>
+                    <a:schemeClr val="tx1"/>
+                  </a:solidFill>
+                  <a:latin typeface="+mn-lt"/>
+                  <a:ea typeface="+mn-ea"/>
+                  <a:cs typeface="+mn-cs"/>
+                </a:defRPr>
+              </a:lvl8pPr>
+              <a:lvl9pPr marL="3657600" algn="l" defTabSz="914400" rtl="0" eaLnBrk="1" latinLnBrk="0" hangingPunct="1">
+                <a:defRPr sz="1800" kern="1200">
+                  <a:solidFill>
+                    <a:schemeClr val="tx1"/>
+                  </a:solidFill>
+                  <a:latin typeface="+mn-lt"/>
+                  <a:ea typeface="+mn-ea"/>
+                  <a:cs typeface="+mn-cs"/>
+                </a:defRPr>
+              </a:lvl9pPr>
+            </a:lstStyle>
+            <a:p>
+              <a:pPr algn="ctr"/>
+              <a:r>
+                <a:rPr lang="tr-TR" sz="1600" dirty="0" smtClean="0"/>
+                <a:t>Physics Engine</a:t>
+              </a:r>
+              <a:endParaRPr lang="tr-TR" sz="1600" dirty="0"/>
+            </a:p>
+          </p:txBody>
+        </p:sp>
+        <p:cxnSp>
+          <p:nvCxnSpPr>
+            <p:cNvPr id="19" name="Straight Arrow Connector 18"/>
+            <p:cNvCxnSpPr>
+              <a:stCxn id="8" idx="2"/>
+            </p:cNvCxnSpPr>
+            <p:nvPr/>
+          </p:nvCxnSpPr>
+          <p:spPr>
+            <a:xfrm rot="16200000" flipH="1">
+              <a:off x="934524" y="2901347"/>
+              <a:ext cx="214230" cy="4313"/>
+            </a:xfrm>
+            <a:prstGeom prst="straightConnector1">
+              <a:avLst/>
+            </a:prstGeom>
+            <a:ln>
+              <a:tailEnd type="arrow"/>
+            </a:ln>
+          </p:spPr>
+          <p:style>
+            <a:lnRef idx="1">
+              <a:schemeClr val="accent1"/>
+            </a:lnRef>
+            <a:fillRef idx="0">
+              <a:schemeClr val="accent1"/>
+            </a:fillRef>
+            <a:effectRef idx="0">
+              <a:schemeClr val="accent1"/>
+            </a:effectRef>
+            <a:fontRef idx="minor">
+              <a:schemeClr val="tx1"/>
+            </a:fontRef>
+          </p:style>
+        </p:cxnSp>
+        <p:cxnSp>
+          <p:nvCxnSpPr>
+            <p:cNvPr id="20" name="Straight Arrow Connector 19"/>
+            <p:cNvCxnSpPr>
+              <a:stCxn id="9" idx="2"/>
+            </p:cNvCxnSpPr>
+            <p:nvPr/>
+          </p:nvCxnSpPr>
+          <p:spPr>
+            <a:xfrm rot="16200000" flipH="1">
+              <a:off x="1656987" y="2899190"/>
+              <a:ext cx="199852" cy="5751"/>
+            </a:xfrm>
+            <a:prstGeom prst="straightConnector1">
+              <a:avLst/>
+            </a:prstGeom>
+            <a:ln>
+              <a:tailEnd type="arrow"/>
+            </a:ln>
+          </p:spPr>
+          <p:style>
+            <a:lnRef idx="1">
+              <a:schemeClr val="accent1"/>
+            </a:lnRef>
+            <a:fillRef idx="0">
+              <a:schemeClr val="accent1"/>
+            </a:fillRef>
+            <a:effectRef idx="0">
+              <a:schemeClr val="accent1"/>
+            </a:effectRef>
+            <a:fontRef idx="minor">
+              <a:schemeClr val="tx1"/>
+            </a:fontRef>
+          </p:style>
+        </p:cxnSp>
+        <p:cxnSp>
+          <p:nvCxnSpPr>
+            <p:cNvPr id="21" name="Straight Arrow Connector 20"/>
+            <p:cNvCxnSpPr>
+              <a:stCxn id="10" idx="2"/>
+            </p:cNvCxnSpPr>
+            <p:nvPr/>
+          </p:nvCxnSpPr>
+          <p:spPr>
+            <a:xfrm rot="5400000">
+              <a:off x="2853903" y="2904223"/>
+              <a:ext cx="194101" cy="1437"/>
+            </a:xfrm>
+            <a:prstGeom prst="straightConnector1">
+              <a:avLst/>
+            </a:prstGeom>
+            <a:ln>
+              <a:tailEnd type="arrow"/>
+            </a:ln>
+          </p:spPr>
+          <p:style>
+            <a:lnRef idx="1">
+              <a:schemeClr val="accent1"/>
+            </a:lnRef>
+            <a:fillRef idx="0">
+              <a:schemeClr val="accent1"/>
+            </a:fillRef>
+            <a:effectRef idx="0">
+              <a:schemeClr val="accent1"/>
+            </a:effectRef>
+            <a:fontRef idx="minor">
+              <a:schemeClr val="tx1"/>
+            </a:fontRef>
+          </p:style>
+        </p:cxnSp>
+        <p:grpSp>
+          <p:nvGrpSpPr>
+            <p:cNvPr id="22" name="Group 21"/>
+            <p:cNvGrpSpPr/>
+            <p:nvPr/>
+          </p:nvGrpSpPr>
+          <p:grpSpPr>
+            <a:xfrm>
+              <a:off x="940279" y="3554081"/>
+              <a:ext cx="353683" cy="336430"/>
+              <a:chOff x="940279" y="3510951"/>
+              <a:chExt cx="353683" cy="336430"/>
+            </a:xfrm>
+          </p:grpSpPr>
+          <p:sp>
+            <p:nvSpPr>
+              <p:cNvPr id="43" name="Oval 42"/>
+              <p:cNvSpPr/>
+              <p:nvPr/>
+            </p:nvSpPr>
+            <p:spPr>
+              <a:xfrm>
+                <a:off x="940279" y="3510951"/>
+                <a:ext cx="353683" cy="336430"/>
+              </a:xfrm>
+              <a:prstGeom prst="ellipse">
+                <a:avLst/>
+              </a:prstGeom>
+              <a:noFill/>
+            </p:spPr>
+            <p:style>
+              <a:lnRef idx="2">
+                <a:schemeClr val="accent1">
+                  <a:shade val="50000"/>
+                </a:schemeClr>
+              </a:lnRef>
+              <a:fillRef idx="1">
+                <a:schemeClr val="accent1"/>
+              </a:fillRef>
+              <a:effectRef idx="0">
+                <a:schemeClr val="accent1"/>
+              </a:effectRef>
+              <a:fontRef idx="minor">
+                <a:schemeClr val="lt1"/>
+              </a:fontRef>
+            </p:style>
+            <p:txBody>
+              <a:bodyPr rtlCol="0" anchor="ctr"/>
+              <a:lstStyle>
+                <a:defPPr>
+                  <a:defRPr lang="en-US"/>
+                </a:defPPr>
+                <a:lvl1pPr marL="0" algn="l" defTabSz="914400" rtl="0" eaLnBrk="1" latinLnBrk="0" hangingPunct="1">
+                  <a:defRPr sz="1800" kern="1200">
+                    <a:solidFill>
+                      <a:schemeClr val="lt1"/>
+                    </a:solidFill>
+                    <a:latin typeface="+mn-lt"/>
+                    <a:ea typeface="+mn-ea"/>
+                    <a:cs typeface="+mn-cs"/>
+                  </a:defRPr>
+                </a:lvl1pPr>
+                <a:lvl2pPr marL="457200" algn="l" defTabSz="914400" rtl="0" eaLnBrk="1" latinLnBrk="0" hangingPunct="1">
+                  <a:defRPr sz="1800" kern="1200">
+                    <a:solidFill>
+                      <a:schemeClr val="lt1"/>
+                    </a:solidFill>
+                    <a:latin typeface="+mn-lt"/>
+                    <a:ea typeface="+mn-ea"/>
+                    <a:cs typeface="+mn-cs"/>
+                  </a:defRPr>
+                </a:lvl2pPr>
+                <a:lvl3pPr marL="914400" algn="l" defTabSz="914400" rtl="0" eaLnBrk="1" latinLnBrk="0" hangingPunct="1">
+                  <a:defRPr sz="1800" kern="1200">
+                    <a:solidFill>
+                      <a:schemeClr val="lt1"/>
+                    </a:solidFill>
+                    <a:latin typeface="+mn-lt"/>
+                    <a:ea typeface="+mn-ea"/>
+                    <a:cs typeface="+mn-cs"/>
+                  </a:defRPr>
+                </a:lvl3pPr>
+                <a:lvl4pPr marL="1371600" algn="l" defTabSz="914400" rtl="0" eaLnBrk="1" latinLnBrk="0" hangingPunct="1">
+                  <a:defRPr sz="1800" kern="1200">
+                    <a:solidFill>
+                      <a:schemeClr val="lt1"/>
+                    </a:solidFill>
+                    <a:latin typeface="+mn-lt"/>
+                    <a:ea typeface="+mn-ea"/>
+                    <a:cs typeface="+mn-cs"/>
+                  </a:defRPr>
+                </a:lvl4pPr>
+                <a:lvl5pPr marL="1828800" algn="l" defTabSz="914400" rtl="0" eaLnBrk="1" latinLnBrk="0" hangingPunct="1">
+                  <a:defRPr sz="1800" kern="1200">
+                    <a:solidFill>
+                      <a:schemeClr val="lt1"/>
+                    </a:solidFill>
+                    <a:latin typeface="+mn-lt"/>
+                    <a:ea typeface="+mn-ea"/>
+                    <a:cs typeface="+mn-cs"/>
+                  </a:defRPr>
+                </a:lvl5pPr>
+                <a:lvl6pPr marL="2286000" algn="l" defTabSz="914400" rtl="0" eaLnBrk="1" latinLnBrk="0" hangingPunct="1">
+                  <a:defRPr sz="1800" kern="1200">
+                    <a:solidFill>
+                      <a:schemeClr val="lt1"/>
+                    </a:solidFill>
+                    <a:latin typeface="+mn-lt"/>
+                    <a:ea typeface="+mn-ea"/>
+                    <a:cs typeface="+mn-cs"/>
+                  </a:defRPr>
+                </a:lvl6pPr>
+                <a:lvl7pPr marL="2743200" algn="l" defTabSz="914400" rtl="0" eaLnBrk="1" latinLnBrk="0" hangingPunct="1">
+                  <a:defRPr sz="1800" kern="1200">
+                    <a:solidFill>
+                      <a:schemeClr val="lt1"/>
+                    </a:solidFill>
+                    <a:latin typeface="+mn-lt"/>
+                    <a:ea typeface="+mn-ea"/>
+                    <a:cs typeface="+mn-cs"/>
+                  </a:defRPr>
+                </a:lvl7pPr>
+                <a:lvl8pPr marL="3200400" algn="l" defTabSz="914400" rtl="0" eaLnBrk="1" latinLnBrk="0" hangingPunct="1">
+                  <a:defRPr sz="1800" kern="1200">
+                    <a:solidFill>
+                      <a:schemeClr val="lt1"/>
+                    </a:solidFill>
+                    <a:latin typeface="+mn-lt"/>
+                    <a:ea typeface="+mn-ea"/>
+                    <a:cs typeface="+mn-cs"/>
+                  </a:defRPr>
+                </a:lvl8pPr>
+                <a:lvl9pPr marL="3657600" algn="l" defTabSz="914400" rtl="0" eaLnBrk="1" latinLnBrk="0" hangingPunct="1">
+                  <a:defRPr sz="1800" kern="1200">
+                    <a:solidFill>
+                      <a:schemeClr val="lt1"/>
+                    </a:solidFill>
+                    <a:latin typeface="+mn-lt"/>
+                    <a:ea typeface="+mn-ea"/>
+                    <a:cs typeface="+mn-cs"/>
+                  </a:defRPr>
+                </a:lvl9pPr>
+              </a:lstStyle>
+              <a:p>
+                <a:pPr algn="ctr"/>
+                <a:endParaRPr lang="tr-TR"/>
+              </a:p>
+            </p:txBody>
+          </p:sp>
+          <p:sp>
+            <p:nvSpPr>
+              <p:cNvPr id="44" name="TextBox 38"/>
+              <p:cNvSpPr txBox="1"/>
+              <p:nvPr/>
+            </p:nvSpPr>
+            <p:spPr>
+              <a:xfrm>
+                <a:off x="940279" y="3554082"/>
+                <a:ext cx="332142" cy="253916"/>
+              </a:xfrm>
+              <a:prstGeom prst="rect">
+                <a:avLst/>
+              </a:prstGeom>
+              <a:noFill/>
+            </p:spPr>
+            <p:txBody>
+              <a:bodyPr wrap="none" rtlCol="0">
+                <a:spAutoFit/>
+              </a:bodyPr>
+              <a:lstStyle>
+                <a:defPPr>
+                  <a:defRPr lang="en-US"/>
+                </a:defPPr>
+                <a:lvl1pPr marL="0" algn="l" defTabSz="914400" rtl="0" eaLnBrk="1" latinLnBrk="0" hangingPunct="1">
+                  <a:defRPr sz="1800" kern="1200">
+                    <a:solidFill>
+                      <a:schemeClr val="tx1"/>
+                    </a:solidFill>
+                    <a:latin typeface="+mn-lt"/>
+                    <a:ea typeface="+mn-ea"/>
+                    <a:cs typeface="+mn-cs"/>
+                  </a:defRPr>
+                </a:lvl1pPr>
+                <a:lvl2pPr marL="457200" algn="l" defTabSz="914400" rtl="0" eaLnBrk="1" latinLnBrk="0" hangingPunct="1">
+                  <a:defRPr sz="1800" kern="1200">
+                    <a:solidFill>
+                      <a:schemeClr val="tx1"/>
+                    </a:solidFill>
+                    <a:latin typeface="+mn-lt"/>
+                    <a:ea typeface="+mn-ea"/>
+                    <a:cs typeface="+mn-cs"/>
+                  </a:defRPr>
+                </a:lvl2pPr>
+                <a:lvl3pPr marL="914400" algn="l" defTabSz="914400" rtl="0" eaLnBrk="1" latinLnBrk="0" hangingPunct="1">
+                  <a:defRPr sz="1800" kern="1200">
+                    <a:solidFill>
+                      <a:schemeClr val="tx1"/>
+                    </a:solidFill>
+                    <a:latin typeface="+mn-lt"/>
+                    <a:ea typeface="+mn-ea"/>
+                    <a:cs typeface="+mn-cs"/>
+                  </a:defRPr>
+                </a:lvl3pPr>
+                <a:lvl4pPr marL="1371600" algn="l" defTabSz="914400" rtl="0" eaLnBrk="1" latinLnBrk="0" hangingPunct="1">
+                  <a:defRPr sz="1800" kern="1200">
+                    <a:solidFill>
+                      <a:schemeClr val="tx1"/>
+                    </a:solidFill>
+                    <a:latin typeface="+mn-lt"/>
+                    <a:ea typeface="+mn-ea"/>
+                    <a:cs typeface="+mn-cs"/>
+                  </a:defRPr>
+                </a:lvl4pPr>
+                <a:lvl5pPr marL="1828800" algn="l" defTabSz="914400" rtl="0" eaLnBrk="1" latinLnBrk="0" hangingPunct="1">
+                  <a:defRPr sz="1800" kern="1200">
+                    <a:solidFill>
+                      <a:schemeClr val="tx1"/>
+                    </a:solidFill>
+                    <a:latin typeface="+mn-lt"/>
+                    <a:ea typeface="+mn-ea"/>
+                    <a:cs typeface="+mn-cs"/>
+                  </a:defRPr>
+                </a:lvl5pPr>
+                <a:lvl6pPr marL="2286000" algn="l" defTabSz="914400" rtl="0" eaLnBrk="1" latinLnBrk="0" hangingPunct="1">
+                  <a:defRPr sz="1800" kern="1200">
+                    <a:solidFill>
+                      <a:schemeClr val="tx1"/>
+                    </a:solidFill>
+                    <a:latin typeface="+mn-lt"/>
+                    <a:ea typeface="+mn-ea"/>
+                    <a:cs typeface="+mn-cs"/>
+                  </a:defRPr>
+                </a:lvl6pPr>
+                <a:lvl7pPr marL="2743200" algn="l" defTabSz="914400" rtl="0" eaLnBrk="1" latinLnBrk="0" hangingPunct="1">
+                  <a:defRPr sz="1800" kern="1200">
+                    <a:solidFill>
+                      <a:schemeClr val="tx1"/>
+                    </a:solidFill>
+                    <a:latin typeface="+mn-lt"/>
+                    <a:ea typeface="+mn-ea"/>
+                    <a:cs typeface="+mn-cs"/>
+                  </a:defRPr>
+                </a:lvl7pPr>
+                <a:lvl8pPr marL="3200400" algn="l" defTabSz="914400" rtl="0" eaLnBrk="1" latinLnBrk="0" hangingPunct="1">
+                  <a:defRPr sz="1800" kern="1200">
+                    <a:solidFill>
+                      <a:schemeClr val="tx1"/>
+                    </a:solidFill>
+                    <a:latin typeface="+mn-lt"/>
+                    <a:ea typeface="+mn-ea"/>
+                    <a:cs typeface="+mn-cs"/>
+                  </a:defRPr>
+                </a:lvl8pPr>
+                <a:lvl9pPr marL="3657600" algn="l" defTabSz="914400" rtl="0" eaLnBrk="1" latinLnBrk="0" hangingPunct="1">
+                  <a:defRPr sz="1800" kern="1200">
+                    <a:solidFill>
+                      <a:schemeClr val="tx1"/>
+                    </a:solidFill>
+                    <a:latin typeface="+mn-lt"/>
+                    <a:ea typeface="+mn-ea"/>
+                    <a:cs typeface="+mn-cs"/>
+                  </a:defRPr>
+                </a:lvl9pPr>
+              </a:lstStyle>
+              <a:p>
+                <a:r>
+                  <a:rPr lang="tr-TR" sz="1050" dirty="0" smtClean="0"/>
+                  <a:t>A1</a:t>
+                </a:r>
+                <a:endParaRPr lang="tr-TR" sz="1050" dirty="0"/>
+              </a:p>
+            </p:txBody>
+          </p:sp>
+        </p:grpSp>
+        <p:grpSp>
+          <p:nvGrpSpPr>
+            <p:cNvPr id="23" name="Group 22"/>
+            <p:cNvGrpSpPr/>
+            <p:nvPr/>
+          </p:nvGrpSpPr>
+          <p:grpSpPr>
+            <a:xfrm>
+              <a:off x="1558506" y="3542579"/>
+              <a:ext cx="353683" cy="336430"/>
+              <a:chOff x="940279" y="3510951"/>
+              <a:chExt cx="353683" cy="336430"/>
+            </a:xfrm>
+          </p:grpSpPr>
+          <p:sp>
+            <p:nvSpPr>
+              <p:cNvPr id="41" name="Oval 40"/>
+              <p:cNvSpPr/>
+              <p:nvPr/>
+            </p:nvSpPr>
+            <p:spPr>
+              <a:xfrm>
+                <a:off x="940279" y="3510951"/>
+                <a:ext cx="353683" cy="336430"/>
+              </a:xfrm>
+              <a:prstGeom prst="ellipse">
+                <a:avLst/>
+              </a:prstGeom>
+              <a:noFill/>
+            </p:spPr>
+            <p:style>
+              <a:lnRef idx="2">
+                <a:schemeClr val="accent1">
+                  <a:shade val="50000"/>
+                </a:schemeClr>
+              </a:lnRef>
+              <a:fillRef idx="1">
+                <a:schemeClr val="accent1"/>
+              </a:fillRef>
+              <a:effectRef idx="0">
+                <a:schemeClr val="accent1"/>
+              </a:effectRef>
+              <a:fontRef idx="minor">
+                <a:schemeClr val="lt1"/>
+              </a:fontRef>
+            </p:style>
+            <p:txBody>
+              <a:bodyPr rtlCol="0" anchor="ctr"/>
+              <a:lstStyle>
+                <a:defPPr>
+                  <a:defRPr lang="en-US"/>
+                </a:defPPr>
+                <a:lvl1pPr marL="0" algn="l" defTabSz="914400" rtl="0" eaLnBrk="1" latinLnBrk="0" hangingPunct="1">
+                  <a:defRPr sz="1800" kern="1200">
+                    <a:solidFill>
+                      <a:schemeClr val="lt1"/>
+                    </a:solidFill>
+                    <a:latin typeface="+mn-lt"/>
+                    <a:ea typeface="+mn-ea"/>
+                    <a:cs typeface="+mn-cs"/>
+                  </a:defRPr>
+                </a:lvl1pPr>
+                <a:lvl2pPr marL="457200" algn="l" defTabSz="914400" rtl="0" eaLnBrk="1" latinLnBrk="0" hangingPunct="1">
+                  <a:defRPr sz="1800" kern="1200">
+                    <a:solidFill>
+                      <a:schemeClr val="lt1"/>
+                    </a:solidFill>
+                    <a:latin typeface="+mn-lt"/>
+                    <a:ea typeface="+mn-ea"/>
+                    <a:cs typeface="+mn-cs"/>
+                  </a:defRPr>
+                </a:lvl2pPr>
+                <a:lvl3pPr marL="914400" algn="l" defTabSz="914400" rtl="0" eaLnBrk="1" latinLnBrk="0" hangingPunct="1">
+                  <a:defRPr sz="1800" kern="1200">
+                    <a:solidFill>
+                      <a:schemeClr val="lt1"/>
+                    </a:solidFill>
+                    <a:latin typeface="+mn-lt"/>
+                    <a:ea typeface="+mn-ea"/>
+                    <a:cs typeface="+mn-cs"/>
+                  </a:defRPr>
+                </a:lvl3pPr>
+                <a:lvl4pPr marL="1371600" algn="l" defTabSz="914400" rtl="0" eaLnBrk="1" latinLnBrk="0" hangingPunct="1">
+                  <a:defRPr sz="1800" kern="1200">
+                    <a:solidFill>
+                      <a:schemeClr val="lt1"/>
+                    </a:solidFill>
+                    <a:latin typeface="+mn-lt"/>
+                    <a:ea typeface="+mn-ea"/>
+                    <a:cs typeface="+mn-cs"/>
+                  </a:defRPr>
+                </a:lvl4pPr>
+                <a:lvl5pPr marL="1828800" algn="l" defTabSz="914400" rtl="0" eaLnBrk="1" latinLnBrk="0" hangingPunct="1">
+                  <a:defRPr sz="1800" kern="1200">
+                    <a:solidFill>
+                      <a:schemeClr val="lt1"/>
+                    </a:solidFill>
+                    <a:latin typeface="+mn-lt"/>
+                    <a:ea typeface="+mn-ea"/>
+                    <a:cs typeface="+mn-cs"/>
+                  </a:defRPr>
+                </a:lvl5pPr>
+                <a:lvl6pPr marL="2286000" algn="l" defTabSz="914400" rtl="0" eaLnBrk="1" latinLnBrk="0" hangingPunct="1">
+                  <a:defRPr sz="1800" kern="1200">
+                    <a:solidFill>
+                      <a:schemeClr val="lt1"/>
+                    </a:solidFill>
+                    <a:latin typeface="+mn-lt"/>
+                    <a:ea typeface="+mn-ea"/>
+                    <a:cs typeface="+mn-cs"/>
+                  </a:defRPr>
+                </a:lvl6pPr>
+                <a:lvl7pPr marL="2743200" algn="l" defTabSz="914400" rtl="0" eaLnBrk="1" latinLnBrk="0" hangingPunct="1">
+                  <a:defRPr sz="1800" kern="1200">
+                    <a:solidFill>
+                      <a:schemeClr val="lt1"/>
+                    </a:solidFill>
+                    <a:latin typeface="+mn-lt"/>
+                    <a:ea typeface="+mn-ea"/>
+                    <a:cs typeface="+mn-cs"/>
+                  </a:defRPr>
+                </a:lvl7pPr>
+                <a:lvl8pPr marL="3200400" algn="l" defTabSz="914400" rtl="0" eaLnBrk="1" latinLnBrk="0" hangingPunct="1">
+                  <a:defRPr sz="1800" kern="1200">
+                    <a:solidFill>
+                      <a:schemeClr val="lt1"/>
+                    </a:solidFill>
+                    <a:latin typeface="+mn-lt"/>
+                    <a:ea typeface="+mn-ea"/>
+                    <a:cs typeface="+mn-cs"/>
+                  </a:defRPr>
+                </a:lvl8pPr>
+                <a:lvl9pPr marL="3657600" algn="l" defTabSz="914400" rtl="0" eaLnBrk="1" latinLnBrk="0" hangingPunct="1">
+                  <a:defRPr sz="1800" kern="1200">
+                    <a:solidFill>
+                      <a:schemeClr val="lt1"/>
+                    </a:solidFill>
+                    <a:latin typeface="+mn-lt"/>
+                    <a:ea typeface="+mn-ea"/>
+                    <a:cs typeface="+mn-cs"/>
+                  </a:defRPr>
+                </a:lvl9pPr>
+              </a:lstStyle>
+              <a:p>
+                <a:pPr algn="ctr"/>
+                <a:endParaRPr lang="tr-TR"/>
+              </a:p>
+            </p:txBody>
+          </p:sp>
+          <p:sp>
+            <p:nvSpPr>
+              <p:cNvPr id="42" name="TextBox 42"/>
+              <p:cNvSpPr txBox="1"/>
+              <p:nvPr/>
+            </p:nvSpPr>
+            <p:spPr>
+              <a:xfrm>
+                <a:off x="940279" y="3554082"/>
+                <a:ext cx="349776" cy="253916"/>
+              </a:xfrm>
+              <a:prstGeom prst="rect">
+                <a:avLst/>
+              </a:prstGeom>
+              <a:noFill/>
+            </p:spPr>
+            <p:txBody>
+              <a:bodyPr wrap="none" rtlCol="0">
+                <a:spAutoFit/>
+              </a:bodyPr>
+              <a:lstStyle>
+                <a:defPPr>
+                  <a:defRPr lang="en-US"/>
+                </a:defPPr>
+                <a:lvl1pPr marL="0" algn="l" defTabSz="914400" rtl="0" eaLnBrk="1" latinLnBrk="0" hangingPunct="1">
+                  <a:defRPr sz="1800" kern="1200">
+                    <a:solidFill>
+                      <a:schemeClr val="tx1"/>
+                    </a:solidFill>
+                    <a:latin typeface="+mn-lt"/>
+                    <a:ea typeface="+mn-ea"/>
+                    <a:cs typeface="+mn-cs"/>
+                  </a:defRPr>
+                </a:lvl1pPr>
+                <a:lvl2pPr marL="457200" algn="l" defTabSz="914400" rtl="0" eaLnBrk="1" latinLnBrk="0" hangingPunct="1">
+                  <a:defRPr sz="1800" kern="1200">
+                    <a:solidFill>
+                      <a:schemeClr val="tx1"/>
+                    </a:solidFill>
+                    <a:latin typeface="+mn-lt"/>
+                    <a:ea typeface="+mn-ea"/>
+                    <a:cs typeface="+mn-cs"/>
+                  </a:defRPr>
+                </a:lvl2pPr>
+                <a:lvl3pPr marL="914400" algn="l" defTabSz="914400" rtl="0" eaLnBrk="1" latinLnBrk="0" hangingPunct="1">
+                  <a:defRPr sz="1800" kern="1200">
+                    <a:solidFill>
+                      <a:schemeClr val="tx1"/>
+                    </a:solidFill>
+                    <a:latin typeface="+mn-lt"/>
+                    <a:ea typeface="+mn-ea"/>
+                    <a:cs typeface="+mn-cs"/>
+                  </a:defRPr>
+                </a:lvl3pPr>
+                <a:lvl4pPr marL="1371600" algn="l" defTabSz="914400" rtl="0" eaLnBrk="1" latinLnBrk="0" hangingPunct="1">
+                  <a:defRPr sz="1800" kern="1200">
+                    <a:solidFill>
+                      <a:schemeClr val="tx1"/>
+                    </a:solidFill>
+                    <a:latin typeface="+mn-lt"/>
+                    <a:ea typeface="+mn-ea"/>
+                    <a:cs typeface="+mn-cs"/>
+                  </a:defRPr>
+                </a:lvl4pPr>
+                <a:lvl5pPr marL="1828800" algn="l" defTabSz="914400" rtl="0" eaLnBrk="1" latinLnBrk="0" hangingPunct="1">
+                  <a:defRPr sz="1800" kern="1200">
+                    <a:solidFill>
+                      <a:schemeClr val="tx1"/>
+                    </a:solidFill>
+                    <a:latin typeface="+mn-lt"/>
+                    <a:ea typeface="+mn-ea"/>
+                    <a:cs typeface="+mn-cs"/>
+                  </a:defRPr>
+                </a:lvl5pPr>
+                <a:lvl6pPr marL="2286000" algn="l" defTabSz="914400" rtl="0" eaLnBrk="1" latinLnBrk="0" hangingPunct="1">
+                  <a:defRPr sz="1800" kern="1200">
+                    <a:solidFill>
+                      <a:schemeClr val="tx1"/>
+                    </a:solidFill>
+                    <a:latin typeface="+mn-lt"/>
+                    <a:ea typeface="+mn-ea"/>
+                    <a:cs typeface="+mn-cs"/>
+                  </a:defRPr>
+                </a:lvl6pPr>
+                <a:lvl7pPr marL="2743200" algn="l" defTabSz="914400" rtl="0" eaLnBrk="1" latinLnBrk="0" hangingPunct="1">
+                  <a:defRPr sz="1800" kern="1200">
+                    <a:solidFill>
+                      <a:schemeClr val="tx1"/>
+                    </a:solidFill>
+                    <a:latin typeface="+mn-lt"/>
+                    <a:ea typeface="+mn-ea"/>
+                    <a:cs typeface="+mn-cs"/>
+                  </a:defRPr>
+                </a:lvl7pPr>
+                <a:lvl8pPr marL="3200400" algn="l" defTabSz="914400" rtl="0" eaLnBrk="1" latinLnBrk="0" hangingPunct="1">
+                  <a:defRPr sz="1800" kern="1200">
+                    <a:solidFill>
+                      <a:schemeClr val="tx1"/>
+                    </a:solidFill>
+                    <a:latin typeface="+mn-lt"/>
+                    <a:ea typeface="+mn-ea"/>
+                    <a:cs typeface="+mn-cs"/>
+                  </a:defRPr>
+                </a:lvl8pPr>
+                <a:lvl9pPr marL="3657600" algn="l" defTabSz="914400" rtl="0" eaLnBrk="1" latinLnBrk="0" hangingPunct="1">
+                  <a:defRPr sz="1800" kern="1200">
+                    <a:solidFill>
+                      <a:schemeClr val="tx1"/>
+                    </a:solidFill>
+                    <a:latin typeface="+mn-lt"/>
+                    <a:ea typeface="+mn-ea"/>
+                    <a:cs typeface="+mn-cs"/>
+                  </a:defRPr>
+                </a:lvl9pPr>
+              </a:lstStyle>
+              <a:p>
+                <a:r>
+                  <a:rPr lang="tr-TR" sz="1050" dirty="0" smtClean="0"/>
+                  <a:t>A2</a:t>
+                </a:r>
+                <a:endParaRPr lang="tr-TR" sz="1050" dirty="0"/>
+              </a:p>
+            </p:txBody>
+          </p:sp>
+        </p:grpSp>
+        <p:grpSp>
+          <p:nvGrpSpPr>
+            <p:cNvPr id="24" name="Group 23"/>
+            <p:cNvGrpSpPr/>
+            <p:nvPr/>
+          </p:nvGrpSpPr>
+          <p:grpSpPr>
+            <a:xfrm>
+              <a:off x="2711570" y="3539704"/>
+              <a:ext cx="354584" cy="336430"/>
+              <a:chOff x="940279" y="3510951"/>
+              <a:chExt cx="354584" cy="336430"/>
+            </a:xfrm>
+          </p:grpSpPr>
+          <p:sp>
+            <p:nvSpPr>
+              <p:cNvPr id="39" name="Oval 38"/>
+              <p:cNvSpPr/>
+              <p:nvPr/>
+            </p:nvSpPr>
+            <p:spPr>
+              <a:xfrm>
+                <a:off x="940279" y="3510951"/>
+                <a:ext cx="353683" cy="336430"/>
+              </a:xfrm>
+              <a:prstGeom prst="ellipse">
+                <a:avLst/>
+              </a:prstGeom>
+              <a:noFill/>
+            </p:spPr>
+            <p:style>
+              <a:lnRef idx="2">
+                <a:schemeClr val="accent1">
+                  <a:shade val="50000"/>
+                </a:schemeClr>
+              </a:lnRef>
+              <a:fillRef idx="1">
+                <a:schemeClr val="accent1"/>
+              </a:fillRef>
+              <a:effectRef idx="0">
+                <a:schemeClr val="accent1"/>
+              </a:effectRef>
+              <a:fontRef idx="minor">
+                <a:schemeClr val="lt1"/>
+              </a:fontRef>
+            </p:style>
+            <p:txBody>
+              <a:bodyPr rtlCol="0" anchor="ctr"/>
+              <a:lstStyle>
+                <a:defPPr>
+                  <a:defRPr lang="en-US"/>
+                </a:defPPr>
+                <a:lvl1pPr marL="0" algn="l" defTabSz="914400" rtl="0" eaLnBrk="1" latinLnBrk="0" hangingPunct="1">
+                  <a:defRPr sz="1800" kern="1200">
+                    <a:solidFill>
+                      <a:schemeClr val="lt1"/>
+                    </a:solidFill>
+                    <a:latin typeface="+mn-lt"/>
+                    <a:ea typeface="+mn-ea"/>
+                    <a:cs typeface="+mn-cs"/>
+                  </a:defRPr>
+                </a:lvl1pPr>
+                <a:lvl2pPr marL="457200" algn="l" defTabSz="914400" rtl="0" eaLnBrk="1" latinLnBrk="0" hangingPunct="1">
+                  <a:defRPr sz="1800" kern="1200">
+                    <a:solidFill>
+                      <a:schemeClr val="lt1"/>
+                    </a:solidFill>
+                    <a:latin typeface="+mn-lt"/>
+                    <a:ea typeface="+mn-ea"/>
+                    <a:cs typeface="+mn-cs"/>
+                  </a:defRPr>
+                </a:lvl2pPr>
+                <a:lvl3pPr marL="914400" algn="l" defTabSz="914400" rtl="0" eaLnBrk="1" latinLnBrk="0" hangingPunct="1">
+                  <a:defRPr sz="1800" kern="1200">
+                    <a:solidFill>
+                      <a:schemeClr val="lt1"/>
+                    </a:solidFill>
+                    <a:latin typeface="+mn-lt"/>
+                    <a:ea typeface="+mn-ea"/>
+                    <a:cs typeface="+mn-cs"/>
+                  </a:defRPr>
+                </a:lvl3pPr>
+                <a:lvl4pPr marL="1371600" algn="l" defTabSz="914400" rtl="0" eaLnBrk="1" latinLnBrk="0" hangingPunct="1">
+                  <a:defRPr sz="1800" kern="1200">
+                    <a:solidFill>
+                      <a:schemeClr val="lt1"/>
+                    </a:solidFill>
+                    <a:latin typeface="+mn-lt"/>
+                    <a:ea typeface="+mn-ea"/>
+                    <a:cs typeface="+mn-cs"/>
+                  </a:defRPr>
+                </a:lvl4pPr>
+                <a:lvl5pPr marL="1828800" algn="l" defTabSz="914400" rtl="0" eaLnBrk="1" latinLnBrk="0" hangingPunct="1">
+                  <a:defRPr sz="1800" kern="1200">
+                    <a:solidFill>
+                      <a:schemeClr val="lt1"/>
+                    </a:solidFill>
+                    <a:latin typeface="+mn-lt"/>
+                    <a:ea typeface="+mn-ea"/>
+                    <a:cs typeface="+mn-cs"/>
+                  </a:defRPr>
+                </a:lvl5pPr>
+                <a:lvl6pPr marL="2286000" algn="l" defTabSz="914400" rtl="0" eaLnBrk="1" latinLnBrk="0" hangingPunct="1">
+                  <a:defRPr sz="1800" kern="1200">
+                    <a:solidFill>
+                      <a:schemeClr val="lt1"/>
+                    </a:solidFill>
+                    <a:latin typeface="+mn-lt"/>
+                    <a:ea typeface="+mn-ea"/>
+                    <a:cs typeface="+mn-cs"/>
+                  </a:defRPr>
+                </a:lvl6pPr>
+                <a:lvl7pPr marL="2743200" algn="l" defTabSz="914400" rtl="0" eaLnBrk="1" latinLnBrk="0" hangingPunct="1">
+                  <a:defRPr sz="1800" kern="1200">
+                    <a:solidFill>
+                      <a:schemeClr val="lt1"/>
+                    </a:solidFill>
+                    <a:latin typeface="+mn-lt"/>
+                    <a:ea typeface="+mn-ea"/>
+                    <a:cs typeface="+mn-cs"/>
+                  </a:defRPr>
+                </a:lvl7pPr>
+                <a:lvl8pPr marL="3200400" algn="l" defTabSz="914400" rtl="0" eaLnBrk="1" latinLnBrk="0" hangingPunct="1">
+                  <a:defRPr sz="1800" kern="1200">
+                    <a:solidFill>
+                      <a:schemeClr val="lt1"/>
+                    </a:solidFill>
+                    <a:latin typeface="+mn-lt"/>
+                    <a:ea typeface="+mn-ea"/>
+                    <a:cs typeface="+mn-cs"/>
+                  </a:defRPr>
+                </a:lvl8pPr>
+                <a:lvl9pPr marL="3657600" algn="l" defTabSz="914400" rtl="0" eaLnBrk="1" latinLnBrk="0" hangingPunct="1">
+                  <a:defRPr sz="1800" kern="1200">
+                    <a:solidFill>
+                      <a:schemeClr val="lt1"/>
+                    </a:solidFill>
+                    <a:latin typeface="+mn-lt"/>
+                    <a:ea typeface="+mn-ea"/>
+                    <a:cs typeface="+mn-cs"/>
+                  </a:defRPr>
+                </a:lvl9pPr>
+              </a:lstStyle>
+              <a:p>
+                <a:pPr algn="ctr"/>
+                <a:endParaRPr lang="tr-TR"/>
+              </a:p>
+            </p:txBody>
+          </p:sp>
+          <p:sp>
+            <p:nvSpPr>
+              <p:cNvPr id="40" name="TextBox 45"/>
+              <p:cNvSpPr txBox="1"/>
+              <p:nvPr/>
+            </p:nvSpPr>
+            <p:spPr>
+              <a:xfrm>
+                <a:off x="940279" y="3554082"/>
+                <a:ext cx="354584" cy="253916"/>
+              </a:xfrm>
+              <a:prstGeom prst="rect">
+                <a:avLst/>
+              </a:prstGeom>
+              <a:noFill/>
+            </p:spPr>
+            <p:txBody>
+              <a:bodyPr wrap="none" rtlCol="0">
+                <a:spAutoFit/>
+              </a:bodyPr>
+              <a:lstStyle>
+                <a:defPPr>
+                  <a:defRPr lang="en-US"/>
+                </a:defPPr>
+                <a:lvl1pPr marL="0" algn="l" defTabSz="914400" rtl="0" eaLnBrk="1" latinLnBrk="0" hangingPunct="1">
+                  <a:defRPr sz="1800" kern="1200">
+                    <a:solidFill>
+                      <a:schemeClr val="tx1"/>
+                    </a:solidFill>
+                    <a:latin typeface="+mn-lt"/>
+                    <a:ea typeface="+mn-ea"/>
+                    <a:cs typeface="+mn-cs"/>
+                  </a:defRPr>
+                </a:lvl1pPr>
+                <a:lvl2pPr marL="457200" algn="l" defTabSz="914400" rtl="0" eaLnBrk="1" latinLnBrk="0" hangingPunct="1">
+                  <a:defRPr sz="1800" kern="1200">
+                    <a:solidFill>
+                      <a:schemeClr val="tx1"/>
+                    </a:solidFill>
+                    <a:latin typeface="+mn-lt"/>
+                    <a:ea typeface="+mn-ea"/>
+                    <a:cs typeface="+mn-cs"/>
+                  </a:defRPr>
+                </a:lvl2pPr>
+                <a:lvl3pPr marL="914400" algn="l" defTabSz="914400" rtl="0" eaLnBrk="1" latinLnBrk="0" hangingPunct="1">
+                  <a:defRPr sz="1800" kern="1200">
+                    <a:solidFill>
+                      <a:schemeClr val="tx1"/>
+                    </a:solidFill>
+                    <a:latin typeface="+mn-lt"/>
+                    <a:ea typeface="+mn-ea"/>
+                    <a:cs typeface="+mn-cs"/>
+                  </a:defRPr>
+                </a:lvl3pPr>
+                <a:lvl4pPr marL="1371600" algn="l" defTabSz="914400" rtl="0" eaLnBrk="1" latinLnBrk="0" hangingPunct="1">
+                  <a:defRPr sz="1800" kern="1200">
+                    <a:solidFill>
+                      <a:schemeClr val="tx1"/>
+                    </a:solidFill>
+                    <a:latin typeface="+mn-lt"/>
+                    <a:ea typeface="+mn-ea"/>
+                    <a:cs typeface="+mn-cs"/>
+                  </a:defRPr>
+                </a:lvl4pPr>
+                <a:lvl5pPr marL="1828800" algn="l" defTabSz="914400" rtl="0" eaLnBrk="1" latinLnBrk="0" hangingPunct="1">
+                  <a:defRPr sz="1800" kern="1200">
+                    <a:solidFill>
+                      <a:schemeClr val="tx1"/>
+                    </a:solidFill>
+                    <a:latin typeface="+mn-lt"/>
+                    <a:ea typeface="+mn-ea"/>
+                    <a:cs typeface="+mn-cs"/>
+                  </a:defRPr>
+                </a:lvl5pPr>
+                <a:lvl6pPr marL="2286000" algn="l" defTabSz="914400" rtl="0" eaLnBrk="1" latinLnBrk="0" hangingPunct="1">
+                  <a:defRPr sz="1800" kern="1200">
+                    <a:solidFill>
+                      <a:schemeClr val="tx1"/>
+                    </a:solidFill>
+                    <a:latin typeface="+mn-lt"/>
+                    <a:ea typeface="+mn-ea"/>
+                    <a:cs typeface="+mn-cs"/>
+                  </a:defRPr>
+                </a:lvl6pPr>
+                <a:lvl7pPr marL="2743200" algn="l" defTabSz="914400" rtl="0" eaLnBrk="1" latinLnBrk="0" hangingPunct="1">
+                  <a:defRPr sz="1800" kern="1200">
+                    <a:solidFill>
+                      <a:schemeClr val="tx1"/>
+                    </a:solidFill>
+                    <a:latin typeface="+mn-lt"/>
+                    <a:ea typeface="+mn-ea"/>
+                    <a:cs typeface="+mn-cs"/>
+                  </a:defRPr>
+                </a:lvl7pPr>
+                <a:lvl8pPr marL="3200400" algn="l" defTabSz="914400" rtl="0" eaLnBrk="1" latinLnBrk="0" hangingPunct="1">
+                  <a:defRPr sz="1800" kern="1200">
+                    <a:solidFill>
+                      <a:schemeClr val="tx1"/>
+                    </a:solidFill>
+                    <a:latin typeface="+mn-lt"/>
+                    <a:ea typeface="+mn-ea"/>
+                    <a:cs typeface="+mn-cs"/>
+                  </a:defRPr>
+                </a:lvl8pPr>
+                <a:lvl9pPr marL="3657600" algn="l" defTabSz="914400" rtl="0" eaLnBrk="1" latinLnBrk="0" hangingPunct="1">
+                  <a:defRPr sz="1800" kern="1200">
+                    <a:solidFill>
+                      <a:schemeClr val="tx1"/>
+                    </a:solidFill>
+                    <a:latin typeface="+mn-lt"/>
+                    <a:ea typeface="+mn-ea"/>
+                    <a:cs typeface="+mn-cs"/>
+                  </a:defRPr>
+                </a:lvl9pPr>
+              </a:lstStyle>
+              <a:p>
+                <a:r>
+                  <a:rPr lang="tr-TR" sz="1050" dirty="0" smtClean="0"/>
+                  <a:t>An</a:t>
+                </a:r>
+                <a:endParaRPr lang="tr-TR" sz="1050" dirty="0"/>
+              </a:p>
+            </p:txBody>
+          </p:sp>
+        </p:grpSp>
+        <p:sp>
+          <p:nvSpPr>
+            <p:cNvPr id="25" name="TextBox 46"/>
+            <p:cNvSpPr txBox="1"/>
+            <p:nvPr/>
+          </p:nvSpPr>
+          <p:spPr>
+            <a:xfrm>
+              <a:off x="2084717" y="3490820"/>
+              <a:ext cx="434734" cy="369332"/>
+            </a:xfrm>
+            <a:prstGeom prst="rect">
+              <a:avLst/>
+            </a:prstGeom>
+            <a:noFill/>
+          </p:spPr>
+          <p:txBody>
+            <a:bodyPr wrap="none" rtlCol="0">
+              <a:spAutoFit/>
+            </a:bodyPr>
+            <a:lstStyle>
+              <a:defPPr>
+                <a:defRPr lang="en-US"/>
+              </a:defPPr>
+              <a:lvl1pPr marL="0" algn="l" defTabSz="914400" rtl="0" eaLnBrk="1" latinLnBrk="0" hangingPunct="1">
+                <a:defRPr sz="1800" kern="1200">
+                  <a:solidFill>
+                    <a:schemeClr val="tx1"/>
+                  </a:solidFill>
+                  <a:latin typeface="+mn-lt"/>
+                  <a:ea typeface="+mn-ea"/>
+                  <a:cs typeface="+mn-cs"/>
+                </a:defRPr>
+              </a:lvl1pPr>
+              <a:lvl2pPr marL="457200" algn="l" defTabSz="914400" rtl="0" eaLnBrk="1" latinLnBrk="0" hangingPunct="1">
+                <a:defRPr sz="1800" kern="1200">
+                  <a:solidFill>
+                    <a:schemeClr val="tx1"/>
+                  </a:solidFill>
+                  <a:latin typeface="+mn-lt"/>
+                  <a:ea typeface="+mn-ea"/>
+                  <a:cs typeface="+mn-cs"/>
+                </a:defRPr>
+              </a:lvl2pPr>
+              <a:lvl3pPr marL="914400" algn="l" defTabSz="914400" rtl="0" eaLnBrk="1" latinLnBrk="0" hangingPunct="1">
+                <a:defRPr sz="1800" kern="1200">
+                  <a:solidFill>
+                    <a:schemeClr val="tx1"/>
+                  </a:solidFill>
+                  <a:latin typeface="+mn-lt"/>
+                  <a:ea typeface="+mn-ea"/>
+                  <a:cs typeface="+mn-cs"/>
+                </a:defRPr>
+              </a:lvl3pPr>
+              <a:lvl4pPr marL="1371600" algn="l" defTabSz="914400" rtl="0" eaLnBrk="1" latinLnBrk="0" hangingPunct="1">
+                <a:defRPr sz="1800" kern="1200">
+                  <a:solidFill>
+                    <a:schemeClr val="tx1"/>
+                  </a:solidFill>
+                  <a:latin typeface="+mn-lt"/>
+                  <a:ea typeface="+mn-ea"/>
+                  <a:cs typeface="+mn-cs"/>
+                </a:defRPr>
+              </a:lvl4pPr>
+              <a:lvl5pPr marL="1828800" algn="l" defTabSz="914400" rtl="0" eaLnBrk="1" latinLnBrk="0" hangingPunct="1">
+                <a:defRPr sz="1800" kern="1200">
+                  <a:solidFill>
+                    <a:schemeClr val="tx1"/>
+                  </a:solidFill>
+                  <a:latin typeface="+mn-lt"/>
+                  <a:ea typeface="+mn-ea"/>
+                  <a:cs typeface="+mn-cs"/>
+                </a:defRPr>
+              </a:lvl5pPr>
+              <a:lvl6pPr marL="2286000" algn="l" defTabSz="914400" rtl="0" eaLnBrk="1" latinLnBrk="0" hangingPunct="1">
+                <a:defRPr sz="1800" kern="1200">
+                  <a:solidFill>
+                    <a:schemeClr val="tx1"/>
+                  </a:solidFill>
+                  <a:latin typeface="+mn-lt"/>
+                  <a:ea typeface="+mn-ea"/>
+                  <a:cs typeface="+mn-cs"/>
+                </a:defRPr>
+              </a:lvl6pPr>
+              <a:lvl7pPr marL="2743200" algn="l" defTabSz="914400" rtl="0" eaLnBrk="1" latinLnBrk="0" hangingPunct="1">
+                <a:defRPr sz="1800" kern="1200">
+                  <a:solidFill>
+                    <a:schemeClr val="tx1"/>
+                  </a:solidFill>
+                  <a:latin typeface="+mn-lt"/>
+                  <a:ea typeface="+mn-ea"/>
+                  <a:cs typeface="+mn-cs"/>
+                </a:defRPr>
+              </a:lvl7pPr>
+              <a:lvl8pPr marL="3200400" algn="l" defTabSz="914400" rtl="0" eaLnBrk="1" latinLnBrk="0" hangingPunct="1">
+                <a:defRPr sz="1800" kern="1200">
+                  <a:solidFill>
+                    <a:schemeClr val="tx1"/>
+                  </a:solidFill>
+                  <a:latin typeface="+mn-lt"/>
+                  <a:ea typeface="+mn-ea"/>
+                  <a:cs typeface="+mn-cs"/>
+                </a:defRPr>
+              </a:lvl8pPr>
+              <a:lvl9pPr marL="3657600" algn="l" defTabSz="914400" rtl="0" eaLnBrk="1" latinLnBrk="0" hangingPunct="1">
+                <a:defRPr sz="1800" kern="1200">
+                  <a:solidFill>
+                    <a:schemeClr val="tx1"/>
+                  </a:solidFill>
+                  <a:latin typeface="+mn-lt"/>
+                  <a:ea typeface="+mn-ea"/>
+                  <a:cs typeface="+mn-cs"/>
+                </a:defRPr>
+              </a:lvl9pPr>
+            </a:lstStyle>
+            <a:p>
+              <a:r>
+                <a:rPr lang="tr-TR" dirty="0" smtClean="0"/>
+                <a:t>....</a:t>
+              </a:r>
+              <a:endParaRPr lang="tr-TR" dirty="0"/>
+            </a:p>
+          </p:txBody>
+        </p:sp>
+        <p:cxnSp>
+          <p:nvCxnSpPr>
+            <p:cNvPr id="26" name="Straight Arrow Connector 25"/>
+            <p:cNvCxnSpPr>
+              <a:endCxn id="43" idx="0"/>
+            </p:cNvCxnSpPr>
+            <p:nvPr/>
+          </p:nvCxnSpPr>
+          <p:spPr>
+            <a:xfrm rot="5400000">
+              <a:off x="1007136" y="3431156"/>
+              <a:ext cx="232911" cy="12939"/>
+            </a:xfrm>
+            <a:prstGeom prst="straightConnector1">
+              <a:avLst/>
+            </a:prstGeom>
+            <a:ln>
+              <a:tailEnd type="arrow"/>
+            </a:ln>
+          </p:spPr>
+          <p:style>
+            <a:lnRef idx="1">
+              <a:schemeClr val="accent1"/>
+            </a:lnRef>
+            <a:fillRef idx="0">
+              <a:schemeClr val="accent1"/>
+            </a:fillRef>
+            <a:effectRef idx="0">
+              <a:schemeClr val="accent1"/>
+            </a:effectRef>
+            <a:fontRef idx="minor">
+              <a:schemeClr val="tx1"/>
+            </a:fontRef>
+          </p:style>
+        </p:cxnSp>
+        <p:cxnSp>
+          <p:nvCxnSpPr>
+            <p:cNvPr id="27" name="Straight Arrow Connector 26"/>
+            <p:cNvCxnSpPr>
+              <a:endCxn id="41" idx="0"/>
+            </p:cNvCxnSpPr>
+            <p:nvPr/>
+          </p:nvCxnSpPr>
+          <p:spPr>
+            <a:xfrm rot="5400000">
+              <a:off x="1636864" y="3436907"/>
+              <a:ext cx="204156" cy="7188"/>
+            </a:xfrm>
+            <a:prstGeom prst="straightConnector1">
+              <a:avLst/>
+            </a:prstGeom>
+            <a:ln>
+              <a:tailEnd type="arrow"/>
+            </a:ln>
+          </p:spPr>
+          <p:style>
+            <a:lnRef idx="1">
+              <a:schemeClr val="accent1"/>
+            </a:lnRef>
+            <a:fillRef idx="0">
+              <a:schemeClr val="accent1"/>
+            </a:fillRef>
+            <a:effectRef idx="0">
+              <a:schemeClr val="accent1"/>
+            </a:effectRef>
+            <a:fontRef idx="minor">
+              <a:schemeClr val="tx1"/>
+            </a:fontRef>
+          </p:style>
+        </p:cxnSp>
+        <p:cxnSp>
+          <p:nvCxnSpPr>
+            <p:cNvPr id="28" name="Straight Arrow Connector 27"/>
+            <p:cNvCxnSpPr>
+              <a:endCxn id="39" idx="0"/>
+            </p:cNvCxnSpPr>
+            <p:nvPr/>
+          </p:nvCxnSpPr>
+          <p:spPr>
+            <a:xfrm rot="5400000">
+              <a:off x="2792804" y="3434032"/>
+              <a:ext cx="201281" cy="10063"/>
+            </a:xfrm>
+            <a:prstGeom prst="straightConnector1">
+              <a:avLst/>
+            </a:prstGeom>
+            <a:ln>
+              <a:tailEnd type="arrow"/>
+            </a:ln>
+          </p:spPr>
+          <p:style>
+            <a:lnRef idx="1">
+              <a:schemeClr val="accent1"/>
+            </a:lnRef>
+            <a:fillRef idx="0">
+              <a:schemeClr val="accent1"/>
+            </a:fillRef>
+            <a:effectRef idx="0">
+              <a:schemeClr val="accent1"/>
+            </a:effectRef>
+            <a:fontRef idx="minor">
+              <a:schemeClr val="tx1"/>
+            </a:fontRef>
+          </p:style>
+        </p:cxnSp>
+        <p:sp>
+          <p:nvSpPr>
+            <p:cNvPr id="29" name="TextBox 57"/>
+            <p:cNvSpPr txBox="1"/>
+            <p:nvPr/>
+          </p:nvSpPr>
+          <p:spPr>
+            <a:xfrm>
+              <a:off x="2990492" y="4448358"/>
+              <a:ext cx="914400" cy="461665"/>
+            </a:xfrm>
+            <a:prstGeom prst="rect">
+              <a:avLst/>
+            </a:prstGeom>
+            <a:noFill/>
+            <a:ln>
+              <a:solidFill>
+                <a:schemeClr val="accent1">
+                  <a:shade val="50000"/>
+                </a:schemeClr>
+              </a:solidFill>
+            </a:ln>
+          </p:spPr>
+          <p:txBody>
+            <a:bodyPr wrap="square" rtlCol="0">
+              <a:spAutoFit/>
+            </a:bodyPr>
+            <a:lstStyle>
+              <a:defPPr>
+                <a:defRPr lang="en-US"/>
+              </a:defPPr>
+              <a:lvl1pPr marL="0" algn="l" defTabSz="914400" rtl="0" eaLnBrk="1" latinLnBrk="0" hangingPunct="1">
+                <a:defRPr sz="1800" kern="1200">
+                  <a:solidFill>
+                    <a:schemeClr val="tx1"/>
+                  </a:solidFill>
+                  <a:latin typeface="+mn-lt"/>
+                  <a:ea typeface="+mn-ea"/>
+                  <a:cs typeface="+mn-cs"/>
+                </a:defRPr>
+              </a:lvl1pPr>
+              <a:lvl2pPr marL="457200" algn="l" defTabSz="914400" rtl="0" eaLnBrk="1" latinLnBrk="0" hangingPunct="1">
+                <a:defRPr sz="1800" kern="1200">
+                  <a:solidFill>
+                    <a:schemeClr val="tx1"/>
+                  </a:solidFill>
+                  <a:latin typeface="+mn-lt"/>
+                  <a:ea typeface="+mn-ea"/>
+                  <a:cs typeface="+mn-cs"/>
+                </a:defRPr>
+              </a:lvl2pPr>
+              <a:lvl3pPr marL="914400" algn="l" defTabSz="914400" rtl="0" eaLnBrk="1" latinLnBrk="0" hangingPunct="1">
+                <a:defRPr sz="1800" kern="1200">
+                  <a:solidFill>
+                    <a:schemeClr val="tx1"/>
+                  </a:solidFill>
+                  <a:latin typeface="+mn-lt"/>
+                  <a:ea typeface="+mn-ea"/>
+                  <a:cs typeface="+mn-cs"/>
+                </a:defRPr>
+              </a:lvl3pPr>
+              <a:lvl4pPr marL="1371600" algn="l" defTabSz="914400" rtl="0" eaLnBrk="1" latinLnBrk="0" hangingPunct="1">
+                <a:defRPr sz="1800" kern="1200">
+                  <a:solidFill>
+                    <a:schemeClr val="tx1"/>
+                  </a:solidFill>
+                  <a:latin typeface="+mn-lt"/>
+                  <a:ea typeface="+mn-ea"/>
+                  <a:cs typeface="+mn-cs"/>
+                </a:defRPr>
+              </a:lvl4pPr>
+              <a:lvl5pPr marL="1828800" algn="l" defTabSz="914400" rtl="0" eaLnBrk="1" latinLnBrk="0" hangingPunct="1">
+                <a:defRPr sz="1800" kern="1200">
+                  <a:solidFill>
+                    <a:schemeClr val="tx1"/>
+                  </a:solidFill>
+                  <a:latin typeface="+mn-lt"/>
+                  <a:ea typeface="+mn-ea"/>
+                  <a:cs typeface="+mn-cs"/>
+                </a:defRPr>
+              </a:lvl5pPr>
+              <a:lvl6pPr marL="2286000" algn="l" defTabSz="914400" rtl="0" eaLnBrk="1" latinLnBrk="0" hangingPunct="1">
+                <a:defRPr sz="1800" kern="1200">
+                  <a:solidFill>
+                    <a:schemeClr val="tx1"/>
+                  </a:solidFill>
+                  <a:latin typeface="+mn-lt"/>
+                  <a:ea typeface="+mn-ea"/>
+                  <a:cs typeface="+mn-cs"/>
+                </a:defRPr>
+              </a:lvl6pPr>
+              <a:lvl7pPr marL="2743200" algn="l" defTabSz="914400" rtl="0" eaLnBrk="1" latinLnBrk="0" hangingPunct="1">
+                <a:defRPr sz="1800" kern="1200">
+                  <a:solidFill>
+                    <a:schemeClr val="tx1"/>
+                  </a:solidFill>
+                  <a:latin typeface="+mn-lt"/>
+                  <a:ea typeface="+mn-ea"/>
+                  <a:cs typeface="+mn-cs"/>
+                </a:defRPr>
+              </a:lvl7pPr>
+              <a:lvl8pPr marL="3200400" algn="l" defTabSz="914400" rtl="0" eaLnBrk="1" latinLnBrk="0" hangingPunct="1">
+                <a:defRPr sz="1800" kern="1200">
+                  <a:solidFill>
+                    <a:schemeClr val="tx1"/>
+                  </a:solidFill>
+                  <a:latin typeface="+mn-lt"/>
+                  <a:ea typeface="+mn-ea"/>
+                  <a:cs typeface="+mn-cs"/>
+                </a:defRPr>
+              </a:lvl8pPr>
+              <a:lvl9pPr marL="3657600" algn="l" defTabSz="914400" rtl="0" eaLnBrk="1" latinLnBrk="0" hangingPunct="1">
+                <a:defRPr sz="1800" kern="1200">
+                  <a:solidFill>
+                    <a:schemeClr val="tx1"/>
+                  </a:solidFill>
+                  <a:latin typeface="+mn-lt"/>
+                  <a:ea typeface="+mn-ea"/>
+                  <a:cs typeface="+mn-cs"/>
+                </a:defRPr>
+              </a:lvl9pPr>
+            </a:lstStyle>
+            <a:p>
+              <a:pPr algn="ctr"/>
+              <a:r>
+                <a:rPr lang="tr-TR" sz="1200" dirty="0" smtClean="0"/>
+                <a:t>Gazebo Publisher</a:t>
+              </a:r>
+              <a:endParaRPr lang="tr-TR" sz="1200" dirty="0"/>
+            </a:p>
+          </p:txBody>
+        </p:sp>
+        <p:sp>
+          <p:nvSpPr>
+            <p:cNvPr id="30" name="TextBox 58"/>
+            <p:cNvSpPr txBox="1"/>
+            <p:nvPr/>
+          </p:nvSpPr>
+          <p:spPr>
+            <a:xfrm>
+              <a:off x="4393722" y="4445481"/>
+              <a:ext cx="914400" cy="461665"/>
+            </a:xfrm>
+            <a:prstGeom prst="rect">
+              <a:avLst/>
+            </a:prstGeom>
+            <a:noFill/>
+            <a:ln>
+              <a:solidFill>
+                <a:schemeClr val="accent1">
+                  <a:shade val="50000"/>
+                </a:schemeClr>
+              </a:solidFill>
+            </a:ln>
+          </p:spPr>
+          <p:txBody>
+            <a:bodyPr wrap="square" rtlCol="0">
+              <a:spAutoFit/>
+            </a:bodyPr>
+            <a:lstStyle>
+              <a:defPPr>
+                <a:defRPr lang="en-US"/>
+              </a:defPPr>
+              <a:lvl1pPr marL="0" algn="l" defTabSz="914400" rtl="0" eaLnBrk="1" latinLnBrk="0" hangingPunct="1">
+                <a:defRPr sz="1800" kern="1200">
+                  <a:solidFill>
+                    <a:schemeClr val="tx1"/>
+                  </a:solidFill>
+                  <a:latin typeface="+mn-lt"/>
+                  <a:ea typeface="+mn-ea"/>
+                  <a:cs typeface="+mn-cs"/>
+                </a:defRPr>
+              </a:lvl1pPr>
+              <a:lvl2pPr marL="457200" algn="l" defTabSz="914400" rtl="0" eaLnBrk="1" latinLnBrk="0" hangingPunct="1">
+                <a:defRPr sz="1800" kern="1200">
+                  <a:solidFill>
+                    <a:schemeClr val="tx1"/>
+                  </a:solidFill>
+                  <a:latin typeface="+mn-lt"/>
+                  <a:ea typeface="+mn-ea"/>
+                  <a:cs typeface="+mn-cs"/>
+                </a:defRPr>
+              </a:lvl2pPr>
+              <a:lvl3pPr marL="914400" algn="l" defTabSz="914400" rtl="0" eaLnBrk="1" latinLnBrk="0" hangingPunct="1">
+                <a:defRPr sz="1800" kern="1200">
+                  <a:solidFill>
+                    <a:schemeClr val="tx1"/>
+                  </a:solidFill>
+                  <a:latin typeface="+mn-lt"/>
+                  <a:ea typeface="+mn-ea"/>
+                  <a:cs typeface="+mn-cs"/>
+                </a:defRPr>
+              </a:lvl3pPr>
+              <a:lvl4pPr marL="1371600" algn="l" defTabSz="914400" rtl="0" eaLnBrk="1" latinLnBrk="0" hangingPunct="1">
+                <a:defRPr sz="1800" kern="1200">
+                  <a:solidFill>
+                    <a:schemeClr val="tx1"/>
+                  </a:solidFill>
+                  <a:latin typeface="+mn-lt"/>
+                  <a:ea typeface="+mn-ea"/>
+                  <a:cs typeface="+mn-cs"/>
+                </a:defRPr>
+              </a:lvl4pPr>
+              <a:lvl5pPr marL="1828800" algn="l" defTabSz="914400" rtl="0" eaLnBrk="1" latinLnBrk="0" hangingPunct="1">
+                <a:defRPr sz="1800" kern="1200">
+                  <a:solidFill>
+                    <a:schemeClr val="tx1"/>
+                  </a:solidFill>
+                  <a:latin typeface="+mn-lt"/>
+                  <a:ea typeface="+mn-ea"/>
+                  <a:cs typeface="+mn-cs"/>
+                </a:defRPr>
+              </a:lvl5pPr>
+              <a:lvl6pPr marL="2286000" algn="l" defTabSz="914400" rtl="0" eaLnBrk="1" latinLnBrk="0" hangingPunct="1">
+                <a:defRPr sz="1800" kern="1200">
+                  <a:solidFill>
+                    <a:schemeClr val="tx1"/>
+                  </a:solidFill>
+                  <a:latin typeface="+mn-lt"/>
+                  <a:ea typeface="+mn-ea"/>
+                  <a:cs typeface="+mn-cs"/>
+                </a:defRPr>
+              </a:lvl6pPr>
+              <a:lvl7pPr marL="2743200" algn="l" defTabSz="914400" rtl="0" eaLnBrk="1" latinLnBrk="0" hangingPunct="1">
+                <a:defRPr sz="1800" kern="1200">
+                  <a:solidFill>
+                    <a:schemeClr val="tx1"/>
+                  </a:solidFill>
+                  <a:latin typeface="+mn-lt"/>
+                  <a:ea typeface="+mn-ea"/>
+                  <a:cs typeface="+mn-cs"/>
+                </a:defRPr>
+              </a:lvl7pPr>
+              <a:lvl8pPr marL="3200400" algn="l" defTabSz="914400" rtl="0" eaLnBrk="1" latinLnBrk="0" hangingPunct="1">
+                <a:defRPr sz="1800" kern="1200">
+                  <a:solidFill>
+                    <a:schemeClr val="tx1"/>
+                  </a:solidFill>
+                  <a:latin typeface="+mn-lt"/>
+                  <a:ea typeface="+mn-ea"/>
+                  <a:cs typeface="+mn-cs"/>
+                </a:defRPr>
+              </a:lvl8pPr>
+              <a:lvl9pPr marL="3657600" algn="l" defTabSz="914400" rtl="0" eaLnBrk="1" latinLnBrk="0" hangingPunct="1">
+                <a:defRPr sz="1800" kern="1200">
+                  <a:solidFill>
+                    <a:schemeClr val="tx1"/>
+                  </a:solidFill>
+                  <a:latin typeface="+mn-lt"/>
+                  <a:ea typeface="+mn-ea"/>
+                  <a:cs typeface="+mn-cs"/>
+                </a:defRPr>
+              </a:lvl9pPr>
+            </a:lstStyle>
+            <a:p>
+              <a:pPr algn="ctr"/>
+              <a:r>
+                <a:rPr lang="tr-TR" sz="1200" dirty="0" smtClean="0"/>
+                <a:t>Matlab Listener</a:t>
+              </a:r>
+              <a:endParaRPr lang="tr-TR" sz="1200" dirty="0"/>
+            </a:p>
+          </p:txBody>
+        </p:sp>
+        <p:cxnSp>
+          <p:nvCxnSpPr>
+            <p:cNvPr id="31" name="Shape 60"/>
+            <p:cNvCxnSpPr>
+              <a:stCxn id="7" idx="2"/>
+              <a:endCxn id="29" idx="1"/>
+            </p:cNvCxnSpPr>
+            <p:nvPr/>
+          </p:nvCxnSpPr>
+          <p:spPr>
+            <a:xfrm rot="16200000" flipH="1">
+              <a:off x="2172739" y="3861438"/>
+              <a:ext cx="711040" cy="924465"/>
+            </a:xfrm>
+            <a:prstGeom prst="bentConnector2">
+              <a:avLst/>
+            </a:prstGeom>
+            <a:ln w="22225">
+              <a:tailEnd type="arrow"/>
+            </a:ln>
+          </p:spPr>
+          <p:style>
+            <a:lnRef idx="1">
+              <a:schemeClr val="accent1"/>
+            </a:lnRef>
+            <a:fillRef idx="0">
+              <a:schemeClr val="accent1"/>
+            </a:fillRef>
+            <a:effectRef idx="0">
+              <a:schemeClr val="accent1"/>
+            </a:effectRef>
+            <a:fontRef idx="minor">
+              <a:schemeClr val="tx1"/>
+            </a:fontRef>
+          </p:style>
+        </p:cxnSp>
+        <p:sp>
+          <p:nvSpPr>
+            <p:cNvPr id="32" name="Rectangle 31"/>
+            <p:cNvSpPr/>
+            <p:nvPr/>
+          </p:nvSpPr>
+          <p:spPr>
+            <a:xfrm>
+              <a:off x="6107502" y="2415396"/>
+              <a:ext cx="2070340" cy="1613140"/>
+            </a:xfrm>
+            <a:prstGeom prst="rect">
+              <a:avLst/>
+            </a:prstGeom>
+            <a:noFill/>
+          </p:spPr>
+          <p:style>
+            <a:lnRef idx="2">
+              <a:schemeClr val="accent1">
+                <a:shade val="50000"/>
+              </a:schemeClr>
+            </a:lnRef>
+            <a:fillRef idx="1">
+              <a:schemeClr val="accent1"/>
+            </a:fillRef>
+            <a:effectRef idx="0">
+              <a:schemeClr val="accent1"/>
+            </a:effectRef>
+            <a:fontRef idx="minor">
+              <a:schemeClr val="lt1"/>
+            </a:fontRef>
+          </p:style>
+          <p:txBody>
+            <a:bodyPr rtlCol="0" anchor="ctr"/>
+            <a:lstStyle>
+              <a:defPPr>
+                <a:defRPr lang="en-US"/>
+              </a:defPPr>
+              <a:lvl1pPr marL="0" algn="l" defTabSz="914400" rtl="0" eaLnBrk="1" latinLnBrk="0" hangingPunct="1">
+                <a:defRPr sz="1800" kern="1200">
+                  <a:solidFill>
+                    <a:schemeClr val="lt1"/>
+                  </a:solidFill>
+                  <a:latin typeface="+mn-lt"/>
+                  <a:ea typeface="+mn-ea"/>
+                  <a:cs typeface="+mn-cs"/>
+                </a:defRPr>
+              </a:lvl1pPr>
+              <a:lvl2pPr marL="457200" algn="l" defTabSz="914400" rtl="0" eaLnBrk="1" latinLnBrk="0" hangingPunct="1">
+                <a:defRPr sz="1800" kern="1200">
+                  <a:solidFill>
+                    <a:schemeClr val="lt1"/>
+                  </a:solidFill>
+                  <a:latin typeface="+mn-lt"/>
+                  <a:ea typeface="+mn-ea"/>
+                  <a:cs typeface="+mn-cs"/>
+                </a:defRPr>
+              </a:lvl2pPr>
+              <a:lvl3pPr marL="914400" algn="l" defTabSz="914400" rtl="0" eaLnBrk="1" latinLnBrk="0" hangingPunct="1">
+                <a:defRPr sz="1800" kern="1200">
+                  <a:solidFill>
+                    <a:schemeClr val="lt1"/>
+                  </a:solidFill>
+                  <a:latin typeface="+mn-lt"/>
+                  <a:ea typeface="+mn-ea"/>
+                  <a:cs typeface="+mn-cs"/>
+                </a:defRPr>
+              </a:lvl3pPr>
+              <a:lvl4pPr marL="1371600" algn="l" defTabSz="914400" rtl="0" eaLnBrk="1" latinLnBrk="0" hangingPunct="1">
+                <a:defRPr sz="1800" kern="1200">
+                  <a:solidFill>
+                    <a:schemeClr val="lt1"/>
+                  </a:solidFill>
+                  <a:latin typeface="+mn-lt"/>
+                  <a:ea typeface="+mn-ea"/>
+                  <a:cs typeface="+mn-cs"/>
+                </a:defRPr>
+              </a:lvl4pPr>
+              <a:lvl5pPr marL="1828800" algn="l" defTabSz="914400" rtl="0" eaLnBrk="1" latinLnBrk="0" hangingPunct="1">
+                <a:defRPr sz="1800" kern="1200">
+                  <a:solidFill>
+                    <a:schemeClr val="lt1"/>
+                  </a:solidFill>
+                  <a:latin typeface="+mn-lt"/>
+                  <a:ea typeface="+mn-ea"/>
+                  <a:cs typeface="+mn-cs"/>
+                </a:defRPr>
+              </a:lvl5pPr>
+              <a:lvl6pPr marL="2286000" algn="l" defTabSz="914400" rtl="0" eaLnBrk="1" latinLnBrk="0" hangingPunct="1">
+                <a:defRPr sz="1800" kern="1200">
+                  <a:solidFill>
+                    <a:schemeClr val="lt1"/>
+                  </a:solidFill>
+                  <a:latin typeface="+mn-lt"/>
+                  <a:ea typeface="+mn-ea"/>
+                  <a:cs typeface="+mn-cs"/>
+                </a:defRPr>
+              </a:lvl6pPr>
+              <a:lvl7pPr marL="2743200" algn="l" defTabSz="914400" rtl="0" eaLnBrk="1" latinLnBrk="0" hangingPunct="1">
+                <a:defRPr sz="1800" kern="1200">
+                  <a:solidFill>
+                    <a:schemeClr val="lt1"/>
+                  </a:solidFill>
+                  <a:latin typeface="+mn-lt"/>
+                  <a:ea typeface="+mn-ea"/>
+                  <a:cs typeface="+mn-cs"/>
+                </a:defRPr>
+              </a:lvl7pPr>
+              <a:lvl8pPr marL="3200400" algn="l" defTabSz="914400" rtl="0" eaLnBrk="1" latinLnBrk="0" hangingPunct="1">
+                <a:defRPr sz="1800" kern="1200">
+                  <a:solidFill>
+                    <a:schemeClr val="lt1"/>
+                  </a:solidFill>
+                  <a:latin typeface="+mn-lt"/>
+                  <a:ea typeface="+mn-ea"/>
+                  <a:cs typeface="+mn-cs"/>
+                </a:defRPr>
+              </a:lvl8pPr>
+              <a:lvl9pPr marL="3657600" algn="l" defTabSz="914400" rtl="0" eaLnBrk="1" latinLnBrk="0" hangingPunct="1">
+                <a:defRPr sz="1800" kern="1200">
+                  <a:solidFill>
+                    <a:schemeClr val="lt1"/>
+                  </a:solidFill>
+                  <a:latin typeface="+mn-lt"/>
+                  <a:ea typeface="+mn-ea"/>
+                  <a:cs typeface="+mn-cs"/>
+                </a:defRPr>
+              </a:lvl9pPr>
+            </a:lstStyle>
+            <a:p>
+              <a:pPr algn="ctr"/>
+              <a:endParaRPr lang="tr-TR"/>
+            </a:p>
+          </p:txBody>
+        </p:sp>
+        <p:cxnSp>
+          <p:nvCxnSpPr>
+            <p:cNvPr id="33" name="Straight Arrow Connector 32"/>
+            <p:cNvCxnSpPr>
+              <a:stCxn id="29" idx="3"/>
+              <a:endCxn id="30" idx="1"/>
+            </p:cNvCxnSpPr>
+            <p:nvPr/>
+          </p:nvCxnSpPr>
+          <p:spPr>
+            <a:xfrm flipV="1">
+              <a:off x="3904892" y="4676314"/>
+              <a:ext cx="488830" cy="2877"/>
+            </a:xfrm>
+            <a:prstGeom prst="straightConnector1">
+              <a:avLst/>
+            </a:prstGeom>
+            <a:ln w="22225">
+              <a:tailEnd type="arrow"/>
+            </a:ln>
+          </p:spPr>
+          <p:style>
+            <a:lnRef idx="1">
+              <a:schemeClr val="accent1"/>
+            </a:lnRef>
+            <a:fillRef idx="0">
+              <a:schemeClr val="accent1"/>
+            </a:fillRef>
+            <a:effectRef idx="0">
+              <a:schemeClr val="accent1"/>
+            </a:effectRef>
+            <a:fontRef idx="minor">
+              <a:schemeClr val="tx1"/>
+            </a:fontRef>
+          </p:style>
+        </p:cxnSp>
+        <p:cxnSp>
+          <p:nvCxnSpPr>
+            <p:cNvPr id="34" name="Straight Connector 33"/>
+            <p:cNvCxnSpPr>
+              <a:stCxn id="30" idx="3"/>
+            </p:cNvCxnSpPr>
+            <p:nvPr/>
+          </p:nvCxnSpPr>
+          <p:spPr>
+            <a:xfrm flipV="1">
+              <a:off x="5308122" y="4675517"/>
+              <a:ext cx="1454987" cy="797"/>
+            </a:xfrm>
+            <a:prstGeom prst="line">
+              <a:avLst/>
+            </a:prstGeom>
+            <a:ln w="15875"/>
+          </p:spPr>
+          <p:style>
+            <a:lnRef idx="1">
+              <a:schemeClr val="accent1"/>
+            </a:lnRef>
+            <a:fillRef idx="0">
+              <a:schemeClr val="accent1"/>
+            </a:fillRef>
+            <a:effectRef idx="0">
+              <a:schemeClr val="accent1"/>
+            </a:effectRef>
+            <a:fontRef idx="minor">
+              <a:schemeClr val="tx1"/>
+            </a:fontRef>
+          </p:style>
+        </p:cxnSp>
+        <p:cxnSp>
+          <p:nvCxnSpPr>
+            <p:cNvPr id="35" name="Straight Arrow Connector 34"/>
+            <p:cNvCxnSpPr/>
+            <p:nvPr/>
+          </p:nvCxnSpPr>
+          <p:spPr>
+            <a:xfrm rot="5400000" flipH="1" flipV="1">
+              <a:off x="6430992" y="4360653"/>
+              <a:ext cx="664234" cy="1588"/>
+            </a:xfrm>
+            <a:prstGeom prst="straightConnector1">
+              <a:avLst/>
+            </a:prstGeom>
+            <a:ln w="15875">
+              <a:tailEnd type="arrow"/>
+            </a:ln>
+          </p:spPr>
+          <p:style>
+            <a:lnRef idx="1">
+              <a:schemeClr val="accent1"/>
+            </a:lnRef>
+            <a:fillRef idx="0">
+              <a:schemeClr val="accent1"/>
+            </a:fillRef>
+            <a:effectRef idx="0">
+              <a:schemeClr val="accent1"/>
+            </a:effectRef>
+            <a:fontRef idx="minor">
+              <a:schemeClr val="tx1"/>
+            </a:fontRef>
+          </p:style>
+        </p:cxnSp>
+        <p:sp>
+          <p:nvSpPr>
+            <p:cNvPr id="36" name="TextBox 73"/>
+            <p:cNvSpPr txBox="1"/>
+            <p:nvPr/>
+          </p:nvSpPr>
+          <p:spPr>
+            <a:xfrm>
+              <a:off x="7530860" y="4528869"/>
+              <a:ext cx="1361270" cy="276999"/>
+            </a:xfrm>
+            <a:prstGeom prst="rect">
+              <a:avLst/>
+            </a:prstGeom>
+            <a:noFill/>
+          </p:spPr>
+          <p:txBody>
+            <a:bodyPr wrap="none" rtlCol="0">
+              <a:spAutoFit/>
+            </a:bodyPr>
+            <a:lstStyle>
+              <a:defPPr>
+                <a:defRPr lang="en-US"/>
+              </a:defPPr>
+              <a:lvl1pPr marL="0" algn="l" defTabSz="914400" rtl="0" eaLnBrk="1" latinLnBrk="0" hangingPunct="1">
+                <a:defRPr sz="1800" kern="1200">
+                  <a:solidFill>
+                    <a:schemeClr val="tx1"/>
+                  </a:solidFill>
+                  <a:latin typeface="+mn-lt"/>
+                  <a:ea typeface="+mn-ea"/>
+                  <a:cs typeface="+mn-cs"/>
+                </a:defRPr>
+              </a:lvl1pPr>
+              <a:lvl2pPr marL="457200" algn="l" defTabSz="914400" rtl="0" eaLnBrk="1" latinLnBrk="0" hangingPunct="1">
+                <a:defRPr sz="1800" kern="1200">
+                  <a:solidFill>
+                    <a:schemeClr val="tx1"/>
+                  </a:solidFill>
+                  <a:latin typeface="+mn-lt"/>
+                  <a:ea typeface="+mn-ea"/>
+                  <a:cs typeface="+mn-cs"/>
+                </a:defRPr>
+              </a:lvl2pPr>
+              <a:lvl3pPr marL="914400" algn="l" defTabSz="914400" rtl="0" eaLnBrk="1" latinLnBrk="0" hangingPunct="1">
+                <a:defRPr sz="1800" kern="1200">
+                  <a:solidFill>
+                    <a:schemeClr val="tx1"/>
+                  </a:solidFill>
+                  <a:latin typeface="+mn-lt"/>
+                  <a:ea typeface="+mn-ea"/>
+                  <a:cs typeface="+mn-cs"/>
+                </a:defRPr>
+              </a:lvl3pPr>
+              <a:lvl4pPr marL="1371600" algn="l" defTabSz="914400" rtl="0" eaLnBrk="1" latinLnBrk="0" hangingPunct="1">
+                <a:defRPr sz="1800" kern="1200">
+                  <a:solidFill>
+                    <a:schemeClr val="tx1"/>
+                  </a:solidFill>
+                  <a:latin typeface="+mn-lt"/>
+                  <a:ea typeface="+mn-ea"/>
+                  <a:cs typeface="+mn-cs"/>
+                </a:defRPr>
+              </a:lvl4pPr>
+              <a:lvl5pPr marL="1828800" algn="l" defTabSz="914400" rtl="0" eaLnBrk="1" latinLnBrk="0" hangingPunct="1">
+                <a:defRPr sz="1800" kern="1200">
+                  <a:solidFill>
+                    <a:schemeClr val="tx1"/>
+                  </a:solidFill>
+                  <a:latin typeface="+mn-lt"/>
+                  <a:ea typeface="+mn-ea"/>
+                  <a:cs typeface="+mn-cs"/>
+                </a:defRPr>
+              </a:lvl5pPr>
+              <a:lvl6pPr marL="2286000" algn="l" defTabSz="914400" rtl="0" eaLnBrk="1" latinLnBrk="0" hangingPunct="1">
+                <a:defRPr sz="1800" kern="1200">
+                  <a:solidFill>
+                    <a:schemeClr val="tx1"/>
+                  </a:solidFill>
+                  <a:latin typeface="+mn-lt"/>
+                  <a:ea typeface="+mn-ea"/>
+                  <a:cs typeface="+mn-cs"/>
+                </a:defRPr>
+              </a:lvl6pPr>
+              <a:lvl7pPr marL="2743200" algn="l" defTabSz="914400" rtl="0" eaLnBrk="1" latinLnBrk="0" hangingPunct="1">
+                <a:defRPr sz="1800" kern="1200">
+                  <a:solidFill>
+                    <a:schemeClr val="tx1"/>
+                  </a:solidFill>
+                  <a:latin typeface="+mn-lt"/>
+                  <a:ea typeface="+mn-ea"/>
+                  <a:cs typeface="+mn-cs"/>
+                </a:defRPr>
+              </a:lvl7pPr>
+              <a:lvl8pPr marL="3200400" algn="l" defTabSz="914400" rtl="0" eaLnBrk="1" latinLnBrk="0" hangingPunct="1">
+                <a:defRPr sz="1800" kern="1200">
+                  <a:solidFill>
+                    <a:schemeClr val="tx1"/>
+                  </a:solidFill>
+                  <a:latin typeface="+mn-lt"/>
+                  <a:ea typeface="+mn-ea"/>
+                  <a:cs typeface="+mn-cs"/>
+                </a:defRPr>
+              </a:lvl8pPr>
+              <a:lvl9pPr marL="3657600" algn="l" defTabSz="914400" rtl="0" eaLnBrk="1" latinLnBrk="0" hangingPunct="1">
+                <a:defRPr sz="1800" kern="1200">
+                  <a:solidFill>
+                    <a:schemeClr val="tx1"/>
+                  </a:solidFill>
+                  <a:latin typeface="+mn-lt"/>
+                  <a:ea typeface="+mn-ea"/>
+                  <a:cs typeface="+mn-cs"/>
+                </a:defRPr>
+              </a:lvl9pPr>
+            </a:lstStyle>
+            <a:p>
+              <a:r>
+                <a:rPr lang="tr-TR" sz="1200" dirty="0" smtClean="0"/>
+                <a:t>Formation Shape</a:t>
+              </a:r>
+              <a:endParaRPr lang="tr-TR" sz="1200" dirty="0"/>
+            </a:p>
+          </p:txBody>
+        </p:sp>
+        <p:cxnSp>
+          <p:nvCxnSpPr>
+            <p:cNvPr id="37" name="Shape 75"/>
+            <p:cNvCxnSpPr>
+              <a:stCxn id="36" idx="1"/>
+            </p:cNvCxnSpPr>
+            <p:nvPr/>
+          </p:nvCxnSpPr>
+          <p:spPr>
+            <a:xfrm rot="10800000">
+              <a:off x="7341080" y="4037163"/>
+              <a:ext cx="189781" cy="630207"/>
+            </a:xfrm>
+            <a:prstGeom prst="bentConnector2">
+              <a:avLst/>
+            </a:prstGeom>
+            <a:ln w="15875">
+              <a:tailEnd type="arrow"/>
+            </a:ln>
+          </p:spPr>
+          <p:style>
+            <a:lnRef idx="1">
+              <a:schemeClr val="accent1"/>
+            </a:lnRef>
+            <a:fillRef idx="0">
+              <a:schemeClr val="accent1"/>
+            </a:fillRef>
+            <a:effectRef idx="0">
+              <a:schemeClr val="accent1"/>
+            </a:effectRef>
+            <a:fontRef idx="minor">
+              <a:schemeClr val="tx1"/>
+            </a:fontRef>
+          </p:style>
+        </p:cxnSp>
+        <p:sp>
+          <p:nvSpPr>
+            <p:cNvPr id="38" name="TextBox 76"/>
+            <p:cNvSpPr txBox="1"/>
+            <p:nvPr/>
+          </p:nvSpPr>
+          <p:spPr>
+            <a:xfrm>
+              <a:off x="5405886" y="4672642"/>
+              <a:ext cx="1511952" cy="276999"/>
+            </a:xfrm>
+            <a:prstGeom prst="rect">
+              <a:avLst/>
+            </a:prstGeom>
+            <a:noFill/>
+          </p:spPr>
+          <p:txBody>
+            <a:bodyPr wrap="none" rtlCol="0">
+              <a:spAutoFit/>
+            </a:bodyPr>
+            <a:lstStyle>
+              <a:defPPr>
+                <a:defRPr lang="en-US"/>
+              </a:defPPr>
+              <a:lvl1pPr marL="0" algn="l" defTabSz="914400" rtl="0" eaLnBrk="1" latinLnBrk="0" hangingPunct="1">
+                <a:defRPr sz="1800" kern="1200">
+                  <a:solidFill>
+                    <a:schemeClr val="tx1"/>
+                  </a:solidFill>
+                  <a:latin typeface="+mn-lt"/>
+                  <a:ea typeface="+mn-ea"/>
+                  <a:cs typeface="+mn-cs"/>
+                </a:defRPr>
+              </a:lvl1pPr>
+              <a:lvl2pPr marL="457200" algn="l" defTabSz="914400" rtl="0" eaLnBrk="1" latinLnBrk="0" hangingPunct="1">
+                <a:defRPr sz="1800" kern="1200">
+                  <a:solidFill>
+                    <a:schemeClr val="tx1"/>
+                  </a:solidFill>
+                  <a:latin typeface="+mn-lt"/>
+                  <a:ea typeface="+mn-ea"/>
+                  <a:cs typeface="+mn-cs"/>
+                </a:defRPr>
+              </a:lvl2pPr>
+              <a:lvl3pPr marL="914400" algn="l" defTabSz="914400" rtl="0" eaLnBrk="1" latinLnBrk="0" hangingPunct="1">
+                <a:defRPr sz="1800" kern="1200">
+                  <a:solidFill>
+                    <a:schemeClr val="tx1"/>
+                  </a:solidFill>
+                  <a:latin typeface="+mn-lt"/>
+                  <a:ea typeface="+mn-ea"/>
+                  <a:cs typeface="+mn-cs"/>
+                </a:defRPr>
+              </a:lvl3pPr>
+              <a:lvl4pPr marL="1371600" algn="l" defTabSz="914400" rtl="0" eaLnBrk="1" latinLnBrk="0" hangingPunct="1">
+                <a:defRPr sz="1800" kern="1200">
+                  <a:solidFill>
+                    <a:schemeClr val="tx1"/>
+                  </a:solidFill>
+                  <a:latin typeface="+mn-lt"/>
+                  <a:ea typeface="+mn-ea"/>
+                  <a:cs typeface="+mn-cs"/>
+                </a:defRPr>
+              </a:lvl4pPr>
+              <a:lvl5pPr marL="1828800" algn="l" defTabSz="914400" rtl="0" eaLnBrk="1" latinLnBrk="0" hangingPunct="1">
+                <a:defRPr sz="1800" kern="1200">
+                  <a:solidFill>
+                    <a:schemeClr val="tx1"/>
+                  </a:solidFill>
+                  <a:latin typeface="+mn-lt"/>
+                  <a:ea typeface="+mn-ea"/>
+                  <a:cs typeface="+mn-cs"/>
+                </a:defRPr>
+              </a:lvl5pPr>
+              <a:lvl6pPr marL="2286000" algn="l" defTabSz="914400" rtl="0" eaLnBrk="1" latinLnBrk="0" hangingPunct="1">
+                <a:defRPr sz="1800" kern="1200">
+                  <a:solidFill>
+                    <a:schemeClr val="tx1"/>
+                  </a:solidFill>
+                  <a:latin typeface="+mn-lt"/>
+                  <a:ea typeface="+mn-ea"/>
+                  <a:cs typeface="+mn-cs"/>
+                </a:defRPr>
+              </a:lvl6pPr>
+              <a:lvl7pPr marL="2743200" algn="l" defTabSz="914400" rtl="0" eaLnBrk="1" latinLnBrk="0" hangingPunct="1">
+                <a:defRPr sz="1800" kern="1200">
+                  <a:solidFill>
+                    <a:schemeClr val="tx1"/>
+                  </a:solidFill>
+                  <a:latin typeface="+mn-lt"/>
+                  <a:ea typeface="+mn-ea"/>
+                  <a:cs typeface="+mn-cs"/>
+                </a:defRPr>
+              </a:lvl7pPr>
+              <a:lvl8pPr marL="3200400" algn="l" defTabSz="914400" rtl="0" eaLnBrk="1" latinLnBrk="0" hangingPunct="1">
+                <a:defRPr sz="1800" kern="1200">
+                  <a:solidFill>
+                    <a:schemeClr val="tx1"/>
+                  </a:solidFill>
+                  <a:latin typeface="+mn-lt"/>
+                  <a:ea typeface="+mn-ea"/>
+                  <a:cs typeface="+mn-cs"/>
+                </a:defRPr>
+              </a:lvl8pPr>
+              <a:lvl9pPr marL="3657600" algn="l" defTabSz="914400" rtl="0" eaLnBrk="1" latinLnBrk="0" hangingPunct="1">
+                <a:defRPr sz="1800" kern="1200">
+                  <a:solidFill>
+                    <a:schemeClr val="tx1"/>
+                  </a:solidFill>
+                  <a:latin typeface="+mn-lt"/>
+                  <a:ea typeface="+mn-ea"/>
+                  <a:cs typeface="+mn-cs"/>
+                </a:defRPr>
+              </a:lvl9pPr>
+            </a:lstStyle>
+            <a:p>
+              <a:r>
+                <a:rPr lang="tr-TR" sz="1200" dirty="0" smtClean="0"/>
+                <a:t>Agent State Vectors</a:t>
+              </a:r>
+              <a:endParaRPr lang="tr-TR" sz="1200" dirty="0"/>
+            </a:p>
+          </p:txBody>
+        </p:sp>
+      </p:grpSp>
+    </p:spTree>
+  </p:cSld>
+  <p:clrMapOvr>
+    <a:masterClrMapping/>
+  </p:clrMapOvr>
+</p:sld>
+</file>
+
+<file path=ppt/slides/slide33.xml><?xml version="1.0" encoding="utf-8"?>
+<p:sld xmlns:a="http://schemas.openxmlformats.org/drawingml/2006/main" xmlns:r="http://schemas.openxmlformats.org/officeDocument/2006/relationships" xmlns:p="http://schemas.openxmlformats.org/presentationml/2006/main">
+  <p:cSld>
+    <p:spTree>
+      <p:nvGrpSpPr>
+        <p:cNvPr id="1" name=""/>
+        <p:cNvGrpSpPr/>
+        <p:nvPr/>
+      </p:nvGrpSpPr>
+      <p:grpSpPr>
+        <a:xfrm>
+          <a:off x="0" y="0"/>
+          <a:ext cx="0" cy="0"/>
+          <a:chOff x="0" y="0"/>
+          <a:chExt cx="0" cy="0"/>
+        </a:xfrm>
+      </p:grpSpPr>
+      <p:sp>
+        <p:nvSpPr>
+          <p:cNvPr id="4" name="TextBox 3"/>
+          <p:cNvSpPr txBox="1"/>
+          <p:nvPr/>
+        </p:nvSpPr>
+        <p:spPr>
+          <a:xfrm>
+            <a:off x="2590800" y="838200"/>
+            <a:ext cx="4943469" cy="369332"/>
+          </a:xfrm>
+          <a:prstGeom prst="rect">
+            <a:avLst/>
+          </a:prstGeom>
+          <a:noFill/>
+        </p:spPr>
+        <p:txBody>
+          <a:bodyPr wrap="none" rtlCol="0">
+            <a:spAutoFit/>
+          </a:bodyPr>
+          <a:lstStyle/>
+          <a:p>
+            <a:r>
+              <a:rPr lang="tr-TR" dirty="0" smtClean="0"/>
+              <a:t>Üc farklı tip agent ve ortamı gösteren gazebo resmi</a:t>
+            </a:r>
+            <a:endParaRPr lang="tr-TR" dirty="0"/>
+          </a:p>
+        </p:txBody>
+      </p:sp>
+    </p:spTree>
+  </p:cSld>
+  <p:clrMapOvr>
+    <a:masterClrMapping/>
+  </p:clrMapOvr>
+</p:sld>
+</file>
+
 <file path=ppt/slides/slide4.xml><?xml version="1.0" encoding="utf-8"?>
 <p:sld xmlns:a="http://schemas.openxmlformats.org/drawingml/2006/main" xmlns:r="http://schemas.openxmlformats.org/officeDocument/2006/relationships" xmlns:p="http://schemas.openxmlformats.org/presentationml/2006/main">
   <p:cSld>

</xml_diff>